<commit_message>
feat: integrate multimodal model, docx-to-ppt module, content formatter and assistant
</commit_message>
<xml_diff>
--- a/templates/SimpleTemplate.pptx
+++ b/templates/SimpleTemplate.pptx
@@ -229,7 +229,7 @@
           <a:p>
             <a:fld id="{258BFD57-AB0A-470B-A7AF-56DFE7B5174A}" type="datetimeFigureOut">
               <a:rPr lang="en-US" smtClean="0"/>
-              <a:t>10/27/24</a:t>
+              <a:t>10/30/24</a:t>
             </a:fld>
             <a:endParaRPr lang="en-US" dirty="0"/>
           </a:p>
@@ -406,7 +406,7 @@
           <a:p>
             <a:fld id="{D4B3339F-6CEA-4641-BE08-40DAFD6FCF25}" type="datetimeFigureOut">
               <a:rPr lang="en-US" smtClean="0"/>
-              <a:t>10/27/24</a:t>
+              <a:t>10/30/24</a:t>
             </a:fld>
             <a:endParaRPr lang="en-US" dirty="0"/>
           </a:p>
@@ -2397,1311 +2397,6 @@
 
 <file path=ppt/slideLayouts/slideLayout10.xml><?xml version="1.0" encoding="utf-8"?>
 <p:sldLayout xmlns:a="http://schemas.openxmlformats.org/drawingml/2006/main" xmlns:r="http://schemas.openxmlformats.org/officeDocument/2006/relationships" xmlns:p="http://schemas.openxmlformats.org/presentationml/2006/main" showMasterSp="0" preserve="1" userDrawn="1">
-  <p:cSld name="Title, Picture 0">
-    <p:spTree>
-      <p:nvGrpSpPr>
-        <p:cNvPr id="1" name=""/>
-        <p:cNvGrpSpPr/>
-        <p:nvPr/>
-      </p:nvGrpSpPr>
-      <p:grpSpPr>
-        <a:xfrm>
-          <a:off x="0" y="0"/>
-          <a:ext cx="0" cy="0"/>
-          <a:chOff x="0" y="0"/>
-          <a:chExt cx="0" cy="0"/>
-        </a:xfrm>
-      </p:grpSpPr>
-      <p:grpSp>
-        <p:nvGrpSpPr>
-          <p:cNvPr id="5" name="Group 4"/>
-          <p:cNvGrpSpPr/>
-          <p:nvPr/>
-        </p:nvGrpSpPr>
-        <p:grpSpPr>
-          <a:xfrm>
-            <a:off x="-6214" y="-1"/>
-            <a:ext cx="12214827" cy="6858000"/>
-            <a:chOff x="-6214" y="-1"/>
-            <a:chExt cx="12214827" cy="6858000"/>
-          </a:xfrm>
-        </p:grpSpPr>
-        <p:cxnSp>
-          <p:nvCxnSpPr>
-            <p:cNvPr id="6" name="Straight Connector 5"/>
-            <p:cNvCxnSpPr/>
-            <p:nvPr/>
-          </p:nvCxnSpPr>
-          <p:spPr>
-            <a:xfrm>
-              <a:off x="-6214" y="6686283"/>
-              <a:ext cx="12192000" cy="0"/>
-            </a:xfrm>
-            <a:prstGeom prst="line">
-              <a:avLst/>
-            </a:prstGeom>
-            <a:ln w="12700">
-              <a:solidFill>
-                <a:srgbClr val="BCBCBC">
-                  <a:alpha val="29804"/>
-                </a:srgbClr>
-              </a:solidFill>
-              <a:prstDash val="sysDot"/>
-            </a:ln>
-          </p:spPr>
-          <p:style>
-            <a:lnRef idx="1">
-              <a:schemeClr val="accent1"/>
-            </a:lnRef>
-            <a:fillRef idx="0">
-              <a:schemeClr val="accent1"/>
-            </a:fillRef>
-            <a:effectRef idx="0">
-              <a:schemeClr val="accent1"/>
-            </a:effectRef>
-            <a:fontRef idx="minor">
-              <a:schemeClr val="tx1"/>
-            </a:fontRef>
-          </p:style>
-        </p:cxnSp>
-        <p:cxnSp>
-          <p:nvCxnSpPr>
-            <p:cNvPr id="7" name="Straight Connector 6"/>
-            <p:cNvCxnSpPr/>
-            <p:nvPr/>
-          </p:nvCxnSpPr>
-          <p:spPr>
-            <a:xfrm>
-              <a:off x="0" y="-1"/>
-              <a:ext cx="0" cy="6858000"/>
-            </a:xfrm>
-            <a:prstGeom prst="line">
-              <a:avLst/>
-            </a:prstGeom>
-            <a:ln w="12700">
-              <a:solidFill>
-                <a:srgbClr val="BCBCBC">
-                  <a:alpha val="29804"/>
-                </a:srgbClr>
-              </a:solidFill>
-              <a:prstDash val="sysDot"/>
-            </a:ln>
-          </p:spPr>
-          <p:style>
-            <a:lnRef idx="1">
-              <a:schemeClr val="accent1"/>
-            </a:lnRef>
-            <a:fillRef idx="0">
-              <a:schemeClr val="accent1"/>
-            </a:fillRef>
-            <a:effectRef idx="0">
-              <a:schemeClr val="accent1"/>
-            </a:effectRef>
-            <a:fontRef idx="minor">
-              <a:schemeClr val="tx1"/>
-            </a:fontRef>
-          </p:style>
-        </p:cxnSp>
-        <p:cxnSp>
-          <p:nvCxnSpPr>
-            <p:cNvPr id="8" name="Straight Connector 7"/>
-            <p:cNvCxnSpPr/>
-            <p:nvPr/>
-          </p:nvCxnSpPr>
-          <p:spPr>
-            <a:xfrm>
-              <a:off x="11993258" y="-1"/>
-              <a:ext cx="0" cy="6858000"/>
-            </a:xfrm>
-            <a:prstGeom prst="line">
-              <a:avLst/>
-            </a:prstGeom>
-            <a:ln w="12700">
-              <a:solidFill>
-                <a:srgbClr val="BCBCBC">
-                  <a:alpha val="29804"/>
-                </a:srgbClr>
-              </a:solidFill>
-              <a:prstDash val="sysDot"/>
-            </a:ln>
-          </p:spPr>
-          <p:style>
-            <a:lnRef idx="1">
-              <a:schemeClr val="accent1"/>
-            </a:lnRef>
-            <a:fillRef idx="0">
-              <a:schemeClr val="accent1"/>
-            </a:fillRef>
-            <a:effectRef idx="0">
-              <a:schemeClr val="accent1"/>
-            </a:effectRef>
-            <a:fontRef idx="minor">
-              <a:schemeClr val="tx1"/>
-            </a:fontRef>
-          </p:style>
-        </p:cxnSp>
-        <p:cxnSp>
-          <p:nvCxnSpPr>
-            <p:cNvPr id="9" name="Straight Connector 8"/>
-            <p:cNvCxnSpPr/>
-            <p:nvPr/>
-          </p:nvCxnSpPr>
-          <p:spPr>
-            <a:xfrm>
-              <a:off x="192528" y="-1"/>
-              <a:ext cx="0" cy="6858000"/>
-            </a:xfrm>
-            <a:prstGeom prst="line">
-              <a:avLst/>
-            </a:prstGeom>
-            <a:ln w="12700">
-              <a:solidFill>
-                <a:srgbClr val="BCBCBC">
-                  <a:alpha val="29804"/>
-                </a:srgbClr>
-              </a:solidFill>
-              <a:prstDash val="sysDot"/>
-            </a:ln>
-          </p:spPr>
-          <p:style>
-            <a:lnRef idx="1">
-              <a:schemeClr val="accent1"/>
-            </a:lnRef>
-            <a:fillRef idx="0">
-              <a:schemeClr val="accent1"/>
-            </a:fillRef>
-            <a:effectRef idx="0">
-              <a:schemeClr val="accent1"/>
-            </a:effectRef>
-            <a:fontRef idx="minor">
-              <a:schemeClr val="tx1"/>
-            </a:fontRef>
-          </p:style>
-        </p:cxnSp>
-        <p:cxnSp>
-          <p:nvCxnSpPr>
-            <p:cNvPr id="10" name="Straight Connector 9"/>
-            <p:cNvCxnSpPr/>
-            <p:nvPr/>
-          </p:nvCxnSpPr>
-          <p:spPr>
-            <a:xfrm>
-              <a:off x="1175922" y="-1"/>
-              <a:ext cx="0" cy="6858000"/>
-            </a:xfrm>
-            <a:prstGeom prst="line">
-              <a:avLst/>
-            </a:prstGeom>
-            <a:ln w="12700">
-              <a:solidFill>
-                <a:srgbClr val="BCBCBC">
-                  <a:alpha val="29804"/>
-                </a:srgbClr>
-              </a:solidFill>
-              <a:prstDash val="sysDot"/>
-            </a:ln>
-          </p:spPr>
-          <p:style>
-            <a:lnRef idx="1">
-              <a:schemeClr val="accent1"/>
-            </a:lnRef>
-            <a:fillRef idx="0">
-              <a:schemeClr val="accent1"/>
-            </a:fillRef>
-            <a:effectRef idx="0">
-              <a:schemeClr val="accent1"/>
-            </a:effectRef>
-            <a:fontRef idx="minor">
-              <a:schemeClr val="tx1"/>
-            </a:fontRef>
-          </p:style>
-        </p:cxnSp>
-        <p:cxnSp>
-          <p:nvCxnSpPr>
-            <p:cNvPr id="11" name="Straight Connector 10"/>
-            <p:cNvCxnSpPr/>
-            <p:nvPr/>
-          </p:nvCxnSpPr>
-          <p:spPr>
-            <a:xfrm>
-              <a:off x="2159316" y="-1"/>
-              <a:ext cx="0" cy="6858000"/>
-            </a:xfrm>
-            <a:prstGeom prst="line">
-              <a:avLst/>
-            </a:prstGeom>
-            <a:ln w="12700">
-              <a:solidFill>
-                <a:srgbClr val="BCBCBC">
-                  <a:alpha val="29804"/>
-                </a:srgbClr>
-              </a:solidFill>
-              <a:prstDash val="sysDot"/>
-            </a:ln>
-          </p:spPr>
-          <p:style>
-            <a:lnRef idx="1">
-              <a:schemeClr val="accent1"/>
-            </a:lnRef>
-            <a:fillRef idx="0">
-              <a:schemeClr val="accent1"/>
-            </a:fillRef>
-            <a:effectRef idx="0">
-              <a:schemeClr val="accent1"/>
-            </a:effectRef>
-            <a:fontRef idx="minor">
-              <a:schemeClr val="tx1"/>
-            </a:fontRef>
-          </p:style>
-        </p:cxnSp>
-        <p:cxnSp>
-          <p:nvCxnSpPr>
-            <p:cNvPr id="12" name="Straight Connector 11"/>
-            <p:cNvCxnSpPr/>
-            <p:nvPr/>
-          </p:nvCxnSpPr>
-          <p:spPr>
-            <a:xfrm>
-              <a:off x="3142710" y="-1"/>
-              <a:ext cx="0" cy="6858000"/>
-            </a:xfrm>
-            <a:prstGeom prst="line">
-              <a:avLst/>
-            </a:prstGeom>
-            <a:ln w="12700">
-              <a:solidFill>
-                <a:srgbClr val="BCBCBC">
-                  <a:alpha val="29804"/>
-                </a:srgbClr>
-              </a:solidFill>
-              <a:prstDash val="sysDot"/>
-            </a:ln>
-          </p:spPr>
-          <p:style>
-            <a:lnRef idx="1">
-              <a:schemeClr val="accent1"/>
-            </a:lnRef>
-            <a:fillRef idx="0">
-              <a:schemeClr val="accent1"/>
-            </a:fillRef>
-            <a:effectRef idx="0">
-              <a:schemeClr val="accent1"/>
-            </a:effectRef>
-            <a:fontRef idx="minor">
-              <a:schemeClr val="tx1"/>
-            </a:fontRef>
-          </p:style>
-        </p:cxnSp>
-        <p:cxnSp>
-          <p:nvCxnSpPr>
-            <p:cNvPr id="13" name="Straight Connector 12"/>
-            <p:cNvCxnSpPr/>
-            <p:nvPr/>
-          </p:nvCxnSpPr>
-          <p:spPr>
-            <a:xfrm>
-              <a:off x="4126104" y="-1"/>
-              <a:ext cx="0" cy="6858000"/>
-            </a:xfrm>
-            <a:prstGeom prst="line">
-              <a:avLst/>
-            </a:prstGeom>
-            <a:ln w="12700">
-              <a:solidFill>
-                <a:srgbClr val="BCBCBC">
-                  <a:alpha val="29804"/>
-                </a:srgbClr>
-              </a:solidFill>
-              <a:prstDash val="sysDot"/>
-            </a:ln>
-          </p:spPr>
-          <p:style>
-            <a:lnRef idx="1">
-              <a:schemeClr val="accent1"/>
-            </a:lnRef>
-            <a:fillRef idx="0">
-              <a:schemeClr val="accent1"/>
-            </a:fillRef>
-            <a:effectRef idx="0">
-              <a:schemeClr val="accent1"/>
-            </a:effectRef>
-            <a:fontRef idx="minor">
-              <a:schemeClr val="tx1"/>
-            </a:fontRef>
-          </p:style>
-        </p:cxnSp>
-        <p:cxnSp>
-          <p:nvCxnSpPr>
-            <p:cNvPr id="14" name="Straight Connector 13"/>
-            <p:cNvCxnSpPr/>
-            <p:nvPr/>
-          </p:nvCxnSpPr>
-          <p:spPr>
-            <a:xfrm>
-              <a:off x="5109498" y="-1"/>
-              <a:ext cx="0" cy="6858000"/>
-            </a:xfrm>
-            <a:prstGeom prst="line">
-              <a:avLst/>
-            </a:prstGeom>
-            <a:ln w="12700">
-              <a:solidFill>
-                <a:srgbClr val="BCBCBC">
-                  <a:alpha val="29804"/>
-                </a:srgbClr>
-              </a:solidFill>
-              <a:prstDash val="sysDot"/>
-            </a:ln>
-          </p:spPr>
-          <p:style>
-            <a:lnRef idx="1">
-              <a:schemeClr val="accent1"/>
-            </a:lnRef>
-            <a:fillRef idx="0">
-              <a:schemeClr val="accent1"/>
-            </a:fillRef>
-            <a:effectRef idx="0">
-              <a:schemeClr val="accent1"/>
-            </a:effectRef>
-            <a:fontRef idx="minor">
-              <a:schemeClr val="tx1"/>
-            </a:fontRef>
-          </p:style>
-        </p:cxnSp>
-        <p:cxnSp>
-          <p:nvCxnSpPr>
-            <p:cNvPr id="15" name="Straight Connector 14"/>
-            <p:cNvCxnSpPr/>
-            <p:nvPr/>
-          </p:nvCxnSpPr>
-          <p:spPr>
-            <a:xfrm>
-              <a:off x="6092892" y="-1"/>
-              <a:ext cx="0" cy="6858000"/>
-            </a:xfrm>
-            <a:prstGeom prst="line">
-              <a:avLst/>
-            </a:prstGeom>
-            <a:ln w="12700">
-              <a:solidFill>
-                <a:srgbClr val="BCBCBC">
-                  <a:alpha val="29804"/>
-                </a:srgbClr>
-              </a:solidFill>
-              <a:prstDash val="sysDot"/>
-            </a:ln>
-          </p:spPr>
-          <p:style>
-            <a:lnRef idx="1">
-              <a:schemeClr val="accent1"/>
-            </a:lnRef>
-            <a:fillRef idx="0">
-              <a:schemeClr val="accent1"/>
-            </a:fillRef>
-            <a:effectRef idx="0">
-              <a:schemeClr val="accent1"/>
-            </a:effectRef>
-            <a:fontRef idx="minor">
-              <a:schemeClr val="tx1"/>
-            </a:fontRef>
-          </p:style>
-        </p:cxnSp>
-        <p:cxnSp>
-          <p:nvCxnSpPr>
-            <p:cNvPr id="16" name="Straight Connector 15"/>
-            <p:cNvCxnSpPr/>
-            <p:nvPr/>
-          </p:nvCxnSpPr>
-          <p:spPr>
-            <a:xfrm>
-              <a:off x="7076286" y="-1"/>
-              <a:ext cx="0" cy="6858000"/>
-            </a:xfrm>
-            <a:prstGeom prst="line">
-              <a:avLst/>
-            </a:prstGeom>
-            <a:ln w="12700">
-              <a:solidFill>
-                <a:srgbClr val="BCBCBC">
-                  <a:alpha val="29804"/>
-                </a:srgbClr>
-              </a:solidFill>
-              <a:prstDash val="sysDot"/>
-            </a:ln>
-          </p:spPr>
-          <p:style>
-            <a:lnRef idx="1">
-              <a:schemeClr val="accent1"/>
-            </a:lnRef>
-            <a:fillRef idx="0">
-              <a:schemeClr val="accent1"/>
-            </a:fillRef>
-            <a:effectRef idx="0">
-              <a:schemeClr val="accent1"/>
-            </a:effectRef>
-            <a:fontRef idx="minor">
-              <a:schemeClr val="tx1"/>
-            </a:fontRef>
-          </p:style>
-        </p:cxnSp>
-        <p:cxnSp>
-          <p:nvCxnSpPr>
-            <p:cNvPr id="17" name="Straight Connector 16"/>
-            <p:cNvCxnSpPr/>
-            <p:nvPr/>
-          </p:nvCxnSpPr>
-          <p:spPr>
-            <a:xfrm>
-              <a:off x="8059680" y="-1"/>
-              <a:ext cx="0" cy="6858000"/>
-            </a:xfrm>
-            <a:prstGeom prst="line">
-              <a:avLst/>
-            </a:prstGeom>
-            <a:ln w="12700">
-              <a:solidFill>
-                <a:srgbClr val="BCBCBC">
-                  <a:alpha val="29804"/>
-                </a:srgbClr>
-              </a:solidFill>
-              <a:prstDash val="sysDot"/>
-            </a:ln>
-          </p:spPr>
-          <p:style>
-            <a:lnRef idx="1">
-              <a:schemeClr val="accent1"/>
-            </a:lnRef>
-            <a:fillRef idx="0">
-              <a:schemeClr val="accent1"/>
-            </a:fillRef>
-            <a:effectRef idx="0">
-              <a:schemeClr val="accent1"/>
-            </a:effectRef>
-            <a:fontRef idx="minor">
-              <a:schemeClr val="tx1"/>
-            </a:fontRef>
-          </p:style>
-        </p:cxnSp>
-        <p:cxnSp>
-          <p:nvCxnSpPr>
-            <p:cNvPr id="18" name="Straight Connector 17"/>
-            <p:cNvCxnSpPr/>
-            <p:nvPr/>
-          </p:nvCxnSpPr>
-          <p:spPr>
-            <a:xfrm>
-              <a:off x="9043074" y="-1"/>
-              <a:ext cx="0" cy="6858000"/>
-            </a:xfrm>
-            <a:prstGeom prst="line">
-              <a:avLst/>
-            </a:prstGeom>
-            <a:ln w="12700">
-              <a:solidFill>
-                <a:srgbClr val="BCBCBC">
-                  <a:alpha val="29804"/>
-                </a:srgbClr>
-              </a:solidFill>
-              <a:prstDash val="sysDot"/>
-            </a:ln>
-          </p:spPr>
-          <p:style>
-            <a:lnRef idx="1">
-              <a:schemeClr val="accent1"/>
-            </a:lnRef>
-            <a:fillRef idx="0">
-              <a:schemeClr val="accent1"/>
-            </a:fillRef>
-            <a:effectRef idx="0">
-              <a:schemeClr val="accent1"/>
-            </a:effectRef>
-            <a:fontRef idx="minor">
-              <a:schemeClr val="tx1"/>
-            </a:fontRef>
-          </p:style>
-        </p:cxnSp>
-        <p:cxnSp>
-          <p:nvCxnSpPr>
-            <p:cNvPr id="19" name="Straight Connector 18"/>
-            <p:cNvCxnSpPr/>
-            <p:nvPr/>
-          </p:nvCxnSpPr>
-          <p:spPr>
-            <a:xfrm>
-              <a:off x="10026468" y="-1"/>
-              <a:ext cx="0" cy="6858000"/>
-            </a:xfrm>
-            <a:prstGeom prst="line">
-              <a:avLst/>
-            </a:prstGeom>
-            <a:ln w="12700">
-              <a:solidFill>
-                <a:srgbClr val="BCBCBC">
-                  <a:alpha val="29804"/>
-                </a:srgbClr>
-              </a:solidFill>
-              <a:prstDash val="sysDot"/>
-            </a:ln>
-          </p:spPr>
-          <p:style>
-            <a:lnRef idx="1">
-              <a:schemeClr val="accent1"/>
-            </a:lnRef>
-            <a:fillRef idx="0">
-              <a:schemeClr val="accent1"/>
-            </a:fillRef>
-            <a:effectRef idx="0">
-              <a:schemeClr val="accent1"/>
-            </a:effectRef>
-            <a:fontRef idx="minor">
-              <a:schemeClr val="tx1"/>
-            </a:fontRef>
-          </p:style>
-        </p:cxnSp>
-        <p:cxnSp>
-          <p:nvCxnSpPr>
-            <p:cNvPr id="20" name="Straight Connector 19"/>
-            <p:cNvCxnSpPr/>
-            <p:nvPr/>
-          </p:nvCxnSpPr>
-          <p:spPr>
-            <a:xfrm>
-              <a:off x="11009862" y="-1"/>
-              <a:ext cx="0" cy="6858000"/>
-            </a:xfrm>
-            <a:prstGeom prst="line">
-              <a:avLst/>
-            </a:prstGeom>
-            <a:ln w="12700">
-              <a:solidFill>
-                <a:srgbClr val="BCBCBC">
-                  <a:alpha val="29804"/>
-                </a:srgbClr>
-              </a:solidFill>
-              <a:prstDash val="sysDot"/>
-            </a:ln>
-          </p:spPr>
-          <p:style>
-            <a:lnRef idx="1">
-              <a:schemeClr val="accent1"/>
-            </a:lnRef>
-            <a:fillRef idx="0">
-              <a:schemeClr val="accent1"/>
-            </a:fillRef>
-            <a:effectRef idx="0">
-              <a:schemeClr val="accent1"/>
-            </a:effectRef>
-            <a:fontRef idx="minor">
-              <a:schemeClr val="tx1"/>
-            </a:fontRef>
-          </p:style>
-        </p:cxnSp>
-        <p:cxnSp>
-          <p:nvCxnSpPr>
-            <p:cNvPr id="21" name="Straight Connector 20"/>
-            <p:cNvCxnSpPr/>
-            <p:nvPr/>
-          </p:nvCxnSpPr>
-          <p:spPr>
-            <a:xfrm>
-              <a:off x="12185786" y="-1"/>
-              <a:ext cx="0" cy="6858000"/>
-            </a:xfrm>
-            <a:prstGeom prst="line">
-              <a:avLst/>
-            </a:prstGeom>
-            <a:ln w="12700">
-              <a:solidFill>
-                <a:srgbClr val="BCBCBC">
-                  <a:alpha val="29804"/>
-                </a:srgbClr>
-              </a:solidFill>
-              <a:prstDash val="sysDot"/>
-            </a:ln>
-          </p:spPr>
-          <p:style>
-            <a:lnRef idx="1">
-              <a:schemeClr val="accent1"/>
-            </a:lnRef>
-            <a:fillRef idx="0">
-              <a:schemeClr val="accent1"/>
-            </a:fillRef>
-            <a:effectRef idx="0">
-              <a:schemeClr val="accent1"/>
-            </a:effectRef>
-            <a:fontRef idx="minor">
-              <a:schemeClr val="tx1"/>
-            </a:fontRef>
-          </p:style>
-        </p:cxnSp>
-        <p:cxnSp>
-          <p:nvCxnSpPr>
-            <p:cNvPr id="22" name="Straight Connector 21"/>
-            <p:cNvCxnSpPr/>
-            <p:nvPr/>
-          </p:nvCxnSpPr>
-          <p:spPr>
-            <a:xfrm>
-              <a:off x="0" y="171716"/>
-              <a:ext cx="12192000" cy="0"/>
-            </a:xfrm>
-            <a:prstGeom prst="line">
-              <a:avLst/>
-            </a:prstGeom>
-            <a:ln w="12700">
-              <a:solidFill>
-                <a:srgbClr val="BCBCBC">
-                  <a:alpha val="29804"/>
-                </a:srgbClr>
-              </a:solidFill>
-              <a:prstDash val="sysDot"/>
-            </a:ln>
-          </p:spPr>
-          <p:style>
-            <a:lnRef idx="1">
-              <a:schemeClr val="accent1"/>
-            </a:lnRef>
-            <a:fillRef idx="0">
-              <a:schemeClr val="accent1"/>
-            </a:fillRef>
-            <a:effectRef idx="0">
-              <a:schemeClr val="accent1"/>
-            </a:effectRef>
-            <a:fontRef idx="minor">
-              <a:schemeClr val="tx1"/>
-            </a:fontRef>
-          </p:style>
-        </p:cxnSp>
-        <p:cxnSp>
-          <p:nvCxnSpPr>
-            <p:cNvPr id="23" name="Straight Connector 22"/>
-            <p:cNvCxnSpPr/>
-            <p:nvPr/>
-          </p:nvCxnSpPr>
-          <p:spPr>
-            <a:xfrm>
-              <a:off x="0" y="714597"/>
-              <a:ext cx="12192000" cy="0"/>
-            </a:xfrm>
-            <a:prstGeom prst="line">
-              <a:avLst/>
-            </a:prstGeom>
-            <a:ln w="12700">
-              <a:solidFill>
-                <a:srgbClr val="BCBCBC">
-                  <a:alpha val="29804"/>
-                </a:srgbClr>
-              </a:solidFill>
-              <a:prstDash val="sysDot"/>
-            </a:ln>
-          </p:spPr>
-          <p:style>
-            <a:lnRef idx="1">
-              <a:schemeClr val="accent1"/>
-            </a:lnRef>
-            <a:fillRef idx="0">
-              <a:schemeClr val="accent1"/>
-            </a:fillRef>
-            <a:effectRef idx="0">
-              <a:schemeClr val="accent1"/>
-            </a:effectRef>
-            <a:fontRef idx="minor">
-              <a:schemeClr val="tx1"/>
-            </a:fontRef>
-          </p:style>
-        </p:cxnSp>
-        <p:cxnSp>
-          <p:nvCxnSpPr>
-            <p:cNvPr id="24" name="Straight Connector 23"/>
-            <p:cNvCxnSpPr/>
-            <p:nvPr/>
-          </p:nvCxnSpPr>
-          <p:spPr>
-            <a:xfrm>
-              <a:off x="0" y="1257478"/>
-              <a:ext cx="12192000" cy="0"/>
-            </a:xfrm>
-            <a:prstGeom prst="line">
-              <a:avLst/>
-            </a:prstGeom>
-            <a:ln w="12700">
-              <a:solidFill>
-                <a:srgbClr val="BCBCBC">
-                  <a:alpha val="29804"/>
-                </a:srgbClr>
-              </a:solidFill>
-              <a:prstDash val="sysDot"/>
-            </a:ln>
-          </p:spPr>
-          <p:style>
-            <a:lnRef idx="1">
-              <a:schemeClr val="accent1"/>
-            </a:lnRef>
-            <a:fillRef idx="0">
-              <a:schemeClr val="accent1"/>
-            </a:fillRef>
-            <a:effectRef idx="0">
-              <a:schemeClr val="accent1"/>
-            </a:effectRef>
-            <a:fontRef idx="minor">
-              <a:schemeClr val="tx1"/>
-            </a:fontRef>
-          </p:style>
-        </p:cxnSp>
-        <p:cxnSp>
-          <p:nvCxnSpPr>
-            <p:cNvPr id="25" name="Straight Connector 24"/>
-            <p:cNvCxnSpPr/>
-            <p:nvPr/>
-          </p:nvCxnSpPr>
-          <p:spPr>
-            <a:xfrm>
-              <a:off x="0" y="1800359"/>
-              <a:ext cx="12192000" cy="0"/>
-            </a:xfrm>
-            <a:prstGeom prst="line">
-              <a:avLst/>
-            </a:prstGeom>
-            <a:ln w="12700">
-              <a:solidFill>
-                <a:srgbClr val="BCBCBC">
-                  <a:alpha val="29804"/>
-                </a:srgbClr>
-              </a:solidFill>
-              <a:prstDash val="sysDot"/>
-            </a:ln>
-          </p:spPr>
-          <p:style>
-            <a:lnRef idx="1">
-              <a:schemeClr val="accent1"/>
-            </a:lnRef>
-            <a:fillRef idx="0">
-              <a:schemeClr val="accent1"/>
-            </a:fillRef>
-            <a:effectRef idx="0">
-              <a:schemeClr val="accent1"/>
-            </a:effectRef>
-            <a:fontRef idx="minor">
-              <a:schemeClr val="tx1"/>
-            </a:fontRef>
-          </p:style>
-        </p:cxnSp>
-        <p:cxnSp>
-          <p:nvCxnSpPr>
-            <p:cNvPr id="26" name="Straight Connector 25"/>
-            <p:cNvCxnSpPr/>
-            <p:nvPr/>
-          </p:nvCxnSpPr>
-          <p:spPr>
-            <a:xfrm>
-              <a:off x="0" y="2343240"/>
-              <a:ext cx="12192000" cy="0"/>
-            </a:xfrm>
-            <a:prstGeom prst="line">
-              <a:avLst/>
-            </a:prstGeom>
-            <a:ln w="12700">
-              <a:solidFill>
-                <a:srgbClr val="BCBCBC">
-                  <a:alpha val="29804"/>
-                </a:srgbClr>
-              </a:solidFill>
-              <a:prstDash val="sysDot"/>
-            </a:ln>
-          </p:spPr>
-          <p:style>
-            <a:lnRef idx="1">
-              <a:schemeClr val="accent1"/>
-            </a:lnRef>
-            <a:fillRef idx="0">
-              <a:schemeClr val="accent1"/>
-            </a:fillRef>
-            <a:effectRef idx="0">
-              <a:schemeClr val="accent1"/>
-            </a:effectRef>
-            <a:fontRef idx="minor">
-              <a:schemeClr val="tx1"/>
-            </a:fontRef>
-          </p:style>
-        </p:cxnSp>
-        <p:cxnSp>
-          <p:nvCxnSpPr>
-            <p:cNvPr id="27" name="Straight Connector 26"/>
-            <p:cNvCxnSpPr/>
-            <p:nvPr/>
-          </p:nvCxnSpPr>
-          <p:spPr>
-            <a:xfrm>
-              <a:off x="0" y="2886121"/>
-              <a:ext cx="12192000" cy="0"/>
-            </a:xfrm>
-            <a:prstGeom prst="line">
-              <a:avLst/>
-            </a:prstGeom>
-            <a:ln w="12700">
-              <a:solidFill>
-                <a:srgbClr val="BCBCBC">
-                  <a:alpha val="29804"/>
-                </a:srgbClr>
-              </a:solidFill>
-              <a:prstDash val="sysDot"/>
-            </a:ln>
-          </p:spPr>
-          <p:style>
-            <a:lnRef idx="1">
-              <a:schemeClr val="accent1"/>
-            </a:lnRef>
-            <a:fillRef idx="0">
-              <a:schemeClr val="accent1"/>
-            </a:fillRef>
-            <a:effectRef idx="0">
-              <a:schemeClr val="accent1"/>
-            </a:effectRef>
-            <a:fontRef idx="minor">
-              <a:schemeClr val="tx1"/>
-            </a:fontRef>
-          </p:style>
-        </p:cxnSp>
-        <p:cxnSp>
-          <p:nvCxnSpPr>
-            <p:cNvPr id="28" name="Straight Connector 27"/>
-            <p:cNvCxnSpPr/>
-            <p:nvPr/>
-          </p:nvCxnSpPr>
-          <p:spPr>
-            <a:xfrm>
-              <a:off x="0" y="3429002"/>
-              <a:ext cx="12192000" cy="0"/>
-            </a:xfrm>
-            <a:prstGeom prst="line">
-              <a:avLst/>
-            </a:prstGeom>
-            <a:ln w="12700">
-              <a:solidFill>
-                <a:srgbClr val="BCBCBC">
-                  <a:alpha val="29804"/>
-                </a:srgbClr>
-              </a:solidFill>
-              <a:prstDash val="sysDot"/>
-            </a:ln>
-          </p:spPr>
-          <p:style>
-            <a:lnRef idx="1">
-              <a:schemeClr val="accent1"/>
-            </a:lnRef>
-            <a:fillRef idx="0">
-              <a:schemeClr val="accent1"/>
-            </a:fillRef>
-            <a:effectRef idx="0">
-              <a:schemeClr val="accent1"/>
-            </a:effectRef>
-            <a:fontRef idx="minor">
-              <a:schemeClr val="tx1"/>
-            </a:fontRef>
-          </p:style>
-        </p:cxnSp>
-        <p:cxnSp>
-          <p:nvCxnSpPr>
-            <p:cNvPr id="29" name="Straight Connector 28"/>
-            <p:cNvCxnSpPr/>
-            <p:nvPr/>
-          </p:nvCxnSpPr>
-          <p:spPr>
-            <a:xfrm>
-              <a:off x="0" y="3971883"/>
-              <a:ext cx="12192000" cy="0"/>
-            </a:xfrm>
-            <a:prstGeom prst="line">
-              <a:avLst/>
-            </a:prstGeom>
-            <a:ln w="12700">
-              <a:solidFill>
-                <a:srgbClr val="BCBCBC">
-                  <a:alpha val="29804"/>
-                </a:srgbClr>
-              </a:solidFill>
-              <a:prstDash val="sysDot"/>
-            </a:ln>
-          </p:spPr>
-          <p:style>
-            <a:lnRef idx="1">
-              <a:schemeClr val="accent1"/>
-            </a:lnRef>
-            <a:fillRef idx="0">
-              <a:schemeClr val="accent1"/>
-            </a:fillRef>
-            <a:effectRef idx="0">
-              <a:schemeClr val="accent1"/>
-            </a:effectRef>
-            <a:fontRef idx="minor">
-              <a:schemeClr val="tx1"/>
-            </a:fontRef>
-          </p:style>
-        </p:cxnSp>
-        <p:cxnSp>
-          <p:nvCxnSpPr>
-            <p:cNvPr id="30" name="Straight Connector 29"/>
-            <p:cNvCxnSpPr/>
-            <p:nvPr/>
-          </p:nvCxnSpPr>
-          <p:spPr>
-            <a:xfrm>
-              <a:off x="0" y="4514764"/>
-              <a:ext cx="12192000" cy="0"/>
-            </a:xfrm>
-            <a:prstGeom prst="line">
-              <a:avLst/>
-            </a:prstGeom>
-            <a:ln w="12700">
-              <a:solidFill>
-                <a:srgbClr val="BCBCBC">
-                  <a:alpha val="29804"/>
-                </a:srgbClr>
-              </a:solidFill>
-              <a:prstDash val="sysDot"/>
-            </a:ln>
-          </p:spPr>
-          <p:style>
-            <a:lnRef idx="1">
-              <a:schemeClr val="accent1"/>
-            </a:lnRef>
-            <a:fillRef idx="0">
-              <a:schemeClr val="accent1"/>
-            </a:fillRef>
-            <a:effectRef idx="0">
-              <a:schemeClr val="accent1"/>
-            </a:effectRef>
-            <a:fontRef idx="minor">
-              <a:schemeClr val="tx1"/>
-            </a:fontRef>
-          </p:style>
-        </p:cxnSp>
-        <p:cxnSp>
-          <p:nvCxnSpPr>
-            <p:cNvPr id="31" name="Straight Connector 30"/>
-            <p:cNvCxnSpPr/>
-            <p:nvPr/>
-          </p:nvCxnSpPr>
-          <p:spPr>
-            <a:xfrm>
-              <a:off x="0" y="5057645"/>
-              <a:ext cx="12192000" cy="0"/>
-            </a:xfrm>
-            <a:prstGeom prst="line">
-              <a:avLst/>
-            </a:prstGeom>
-            <a:ln w="12700">
-              <a:solidFill>
-                <a:srgbClr val="BCBCBC">
-                  <a:alpha val="29804"/>
-                </a:srgbClr>
-              </a:solidFill>
-              <a:prstDash val="sysDot"/>
-            </a:ln>
-          </p:spPr>
-          <p:style>
-            <a:lnRef idx="1">
-              <a:schemeClr val="accent1"/>
-            </a:lnRef>
-            <a:fillRef idx="0">
-              <a:schemeClr val="accent1"/>
-            </a:fillRef>
-            <a:effectRef idx="0">
-              <a:schemeClr val="accent1"/>
-            </a:effectRef>
-            <a:fontRef idx="minor">
-              <a:schemeClr val="tx1"/>
-            </a:fontRef>
-          </p:style>
-        </p:cxnSp>
-        <p:cxnSp>
-          <p:nvCxnSpPr>
-            <p:cNvPr id="32" name="Straight Connector 31"/>
-            <p:cNvCxnSpPr/>
-            <p:nvPr/>
-          </p:nvCxnSpPr>
-          <p:spPr>
-            <a:xfrm>
-              <a:off x="0" y="5600526"/>
-              <a:ext cx="12192000" cy="0"/>
-            </a:xfrm>
-            <a:prstGeom prst="line">
-              <a:avLst/>
-            </a:prstGeom>
-            <a:ln w="12700">
-              <a:solidFill>
-                <a:srgbClr val="BCBCBC">
-                  <a:alpha val="29804"/>
-                </a:srgbClr>
-              </a:solidFill>
-              <a:prstDash val="sysDot"/>
-            </a:ln>
-          </p:spPr>
-          <p:style>
-            <a:lnRef idx="1">
-              <a:schemeClr val="accent1"/>
-            </a:lnRef>
-            <a:fillRef idx="0">
-              <a:schemeClr val="accent1"/>
-            </a:fillRef>
-            <a:effectRef idx="0">
-              <a:schemeClr val="accent1"/>
-            </a:effectRef>
-            <a:fontRef idx="minor">
-              <a:schemeClr val="tx1"/>
-            </a:fontRef>
-          </p:style>
-        </p:cxnSp>
-        <p:cxnSp>
-          <p:nvCxnSpPr>
-            <p:cNvPr id="33" name="Straight Connector 32"/>
-            <p:cNvCxnSpPr/>
-            <p:nvPr/>
-          </p:nvCxnSpPr>
-          <p:spPr>
-            <a:xfrm>
-              <a:off x="0" y="6857999"/>
-              <a:ext cx="12192000" cy="0"/>
-            </a:xfrm>
-            <a:prstGeom prst="line">
-              <a:avLst/>
-            </a:prstGeom>
-            <a:ln w="12700">
-              <a:solidFill>
-                <a:srgbClr val="BCBCBC">
-                  <a:alpha val="29804"/>
-                </a:srgbClr>
-              </a:solidFill>
-              <a:prstDash val="sysDot"/>
-            </a:ln>
-          </p:spPr>
-          <p:style>
-            <a:lnRef idx="1">
-              <a:schemeClr val="accent1"/>
-            </a:lnRef>
-            <a:fillRef idx="0">
-              <a:schemeClr val="accent1"/>
-            </a:fillRef>
-            <a:effectRef idx="0">
-              <a:schemeClr val="accent1"/>
-            </a:effectRef>
-            <a:fontRef idx="minor">
-              <a:schemeClr val="tx1"/>
-            </a:fontRef>
-          </p:style>
-        </p:cxnSp>
-        <p:cxnSp>
-          <p:nvCxnSpPr>
-            <p:cNvPr id="34" name="Straight Connector 33"/>
-            <p:cNvCxnSpPr/>
-            <p:nvPr/>
-          </p:nvCxnSpPr>
-          <p:spPr>
-            <a:xfrm>
-              <a:off x="16613" y="6143407"/>
-              <a:ext cx="12192000" cy="0"/>
-            </a:xfrm>
-            <a:prstGeom prst="line">
-              <a:avLst/>
-            </a:prstGeom>
-            <a:ln w="12700">
-              <a:solidFill>
-                <a:srgbClr val="BCBCBC">
-                  <a:alpha val="29804"/>
-                </a:srgbClr>
-              </a:solidFill>
-              <a:prstDash val="sysDot"/>
-            </a:ln>
-          </p:spPr>
-          <p:style>
-            <a:lnRef idx="1">
-              <a:schemeClr val="accent1"/>
-            </a:lnRef>
-            <a:fillRef idx="0">
-              <a:schemeClr val="accent1"/>
-            </a:fillRef>
-            <a:effectRef idx="0">
-              <a:schemeClr val="accent1"/>
-            </a:effectRef>
-            <a:fontRef idx="minor">
-              <a:schemeClr val="tx1"/>
-            </a:fontRef>
-          </p:style>
-        </p:cxnSp>
-        <p:cxnSp>
-          <p:nvCxnSpPr>
-            <p:cNvPr id="35" name="Straight Connector 34"/>
-            <p:cNvCxnSpPr/>
-            <p:nvPr/>
-          </p:nvCxnSpPr>
-          <p:spPr>
-            <a:xfrm>
-              <a:off x="684225" y="171716"/>
-              <a:ext cx="0" cy="6511464"/>
-            </a:xfrm>
-            <a:prstGeom prst="line">
-              <a:avLst/>
-            </a:prstGeom>
-            <a:ln w="12700">
-              <a:solidFill>
-                <a:srgbClr val="BCBCBC">
-                  <a:alpha val="29804"/>
-                </a:srgbClr>
-              </a:solidFill>
-              <a:prstDash val="sysDot"/>
-            </a:ln>
-          </p:spPr>
-          <p:style>
-            <a:lnRef idx="1">
-              <a:schemeClr val="accent1"/>
-            </a:lnRef>
-            <a:fillRef idx="0">
-              <a:schemeClr val="accent1"/>
-            </a:fillRef>
-            <a:effectRef idx="0">
-              <a:schemeClr val="accent1"/>
-            </a:effectRef>
-            <a:fontRef idx="minor">
-              <a:schemeClr val="tx1"/>
-            </a:fontRef>
-          </p:style>
-        </p:cxnSp>
-        <p:cxnSp>
-          <p:nvCxnSpPr>
-            <p:cNvPr id="36" name="Straight Connector 35"/>
-            <p:cNvCxnSpPr/>
-            <p:nvPr/>
-          </p:nvCxnSpPr>
-          <p:spPr>
-            <a:xfrm>
-              <a:off x="11508412" y="173267"/>
-              <a:ext cx="0" cy="6511464"/>
-            </a:xfrm>
-            <a:prstGeom prst="line">
-              <a:avLst/>
-            </a:prstGeom>
-            <a:ln w="12700">
-              <a:solidFill>
-                <a:srgbClr val="BCBCBC">
-                  <a:alpha val="29804"/>
-                </a:srgbClr>
-              </a:solidFill>
-              <a:prstDash val="sysDot"/>
-            </a:ln>
-          </p:spPr>
-          <p:style>
-            <a:lnRef idx="1">
-              <a:schemeClr val="accent1"/>
-            </a:lnRef>
-            <a:fillRef idx="0">
-              <a:schemeClr val="accent1"/>
-            </a:fillRef>
-            <a:effectRef idx="0">
-              <a:schemeClr val="accent1"/>
-            </a:effectRef>
-            <a:fontRef idx="minor">
-              <a:schemeClr val="tx1"/>
-            </a:fontRef>
-          </p:style>
-        </p:cxnSp>
-      </p:grpSp>
-      <p:sp>
-        <p:nvSpPr>
-          <p:cNvPr id="38" name="Picture Placeholder 37">
-            <a:extLst>
-              <a:ext uri="{FF2B5EF4-FFF2-40B4-BE49-F238E27FC236}">
-                <a16:creationId xmlns:a16="http://schemas.microsoft.com/office/drawing/2014/main" id="{BC0FE04E-8B1F-5AAB-0D71-93977D91780A}"/>
-              </a:ext>
-            </a:extLst>
-          </p:cNvPr>
-          <p:cNvSpPr>
-            <a:spLocks noGrp="1"/>
-          </p:cNvSpPr>
-          <p:nvPr>
-            <p:ph type="pic" sz="quarter" idx="10"/>
-          </p:nvPr>
-        </p:nvSpPr>
-        <p:spPr>
-          <a:xfrm>
-            <a:off x="-6215" y="-2"/>
-            <a:ext cx="12169165" cy="6857998"/>
-          </a:xfrm>
-        </p:spPr>
-        <p:txBody>
-          <a:bodyPr/>
-          <a:lstStyle/>
-          <a:p>
-            <a:endParaRPr lang="en-CN"/>
-          </a:p>
-        </p:txBody>
-      </p:sp>
-      <p:sp>
-        <p:nvSpPr>
-          <p:cNvPr id="40" name="Title 1">
-            <a:extLst>
-              <a:ext uri="{FF2B5EF4-FFF2-40B4-BE49-F238E27FC236}">
-                <a16:creationId xmlns:a16="http://schemas.microsoft.com/office/drawing/2014/main" id="{6B2C9348-E48E-5174-E099-8CDD4966B455}"/>
-              </a:ext>
-            </a:extLst>
-          </p:cNvPr>
-          <p:cNvSpPr>
-            <a:spLocks noGrp="1"/>
-          </p:cNvSpPr>
-          <p:nvPr>
-            <p:ph type="title"/>
-          </p:nvPr>
-        </p:nvSpPr>
-        <p:spPr>
-          <a:xfrm>
-            <a:off x="876752" y="725951"/>
-            <a:ext cx="9940581" cy="1893175"/>
-          </a:xfrm>
-        </p:spPr>
-        <p:txBody>
-          <a:bodyPr anchor="ctr">
-            <a:normAutofit/>
-          </a:bodyPr>
-          <a:lstStyle>
-            <a:lvl1pPr algn="ctr">
-              <a:defRPr kumimoji="0" lang="en-US" sz="5200" b="1" i="0" u="none" strike="noStrike" kern="1200" cap="none" spc="0" normalizeH="0" baseline="0" dirty="0">
-                <a:ln>
-                  <a:noFill/>
-                </a:ln>
-                <a:solidFill>
-                  <a:srgbClr val="FFFFFF"/>
-                </a:solidFill>
-                <a:effectLst/>
-                <a:uLnTx/>
-                <a:uFillTx/>
-                <a:latin typeface="Helvetica Neue Medium" panose="02000503000000020004"/>
-                <a:ea typeface="Helvetica Neue Medium" panose="02000503000000020004"/>
-                <a:cs typeface="Helvetica Neue Medium" panose="02000503000000020004"/>
-              </a:defRPr>
-            </a:lvl1pPr>
-          </a:lstStyle>
-          <a:p>
-            <a:r>
-              <a:rPr lang="en-US" dirty="0"/>
-              <a:t>Click to edit Master title style</a:t>
-            </a:r>
-          </a:p>
-        </p:txBody>
-      </p:sp>
-    </p:spTree>
-    <p:extLst>
-      <p:ext uri="{BB962C8B-B14F-4D97-AF65-F5344CB8AC3E}">
-        <p14:creationId xmlns:p14="http://schemas.microsoft.com/office/powerpoint/2010/main" val="376238915"/>
-      </p:ext>
-    </p:extLst>
-  </p:cSld>
-  <p:clrMapOvr>
-    <a:masterClrMapping/>
-  </p:clrMapOvr>
-</p:sldLayout>
-</file>
-
-<file path=ppt/slideLayouts/slideLayout11.xml><?xml version="1.0" encoding="utf-8"?>
-<p:sldLayout xmlns:a="http://schemas.openxmlformats.org/drawingml/2006/main" xmlns:r="http://schemas.openxmlformats.org/officeDocument/2006/relationships" xmlns:p="http://schemas.openxmlformats.org/presentationml/2006/main" showMasterSp="0" preserve="1" userDrawn="1">
   <p:cSld name="Picture 0">
     <p:spTree>
       <p:nvGrpSpPr>
@@ -3841,7 +2536,7 @@
 </p:sldLayout>
 </file>
 
-<file path=ppt/slideLayouts/slideLayout12.xml><?xml version="1.0" encoding="utf-8"?>
+<file path=ppt/slideLayouts/slideLayout11.xml><?xml version="1.0" encoding="utf-8"?>
 <p:sldLayout xmlns:a="http://schemas.openxmlformats.org/drawingml/2006/main" xmlns:r="http://schemas.openxmlformats.org/officeDocument/2006/relationships" xmlns:p="http://schemas.openxmlformats.org/presentationml/2006/main" showMasterSp="0" preserve="1" userDrawn="1">
   <p:cSld name="Title, Picture 1">
     <p:spTree>
@@ -4107,7 +2802,7 @@
 </p:sldLayout>
 </file>
 
-<file path=ppt/slideLayouts/slideLayout13.xml><?xml version="1.0" encoding="utf-8"?>
+<file path=ppt/slideLayouts/slideLayout12.xml><?xml version="1.0" encoding="utf-8"?>
 <p:sldLayout xmlns:a="http://schemas.openxmlformats.org/drawingml/2006/main" xmlns:r="http://schemas.openxmlformats.org/officeDocument/2006/relationships" xmlns:p="http://schemas.openxmlformats.org/presentationml/2006/main" preserve="1" userDrawn="1">
   <p:cSld name="blank">
     <p:spTree>
@@ -9027,6 +7722,1425 @@
 
 <file path=ppt/slideLayouts/slideLayout6.xml><?xml version="1.0" encoding="utf-8"?>
 <p:sldLayout xmlns:a="http://schemas.openxmlformats.org/drawingml/2006/main" xmlns:r="http://schemas.openxmlformats.org/officeDocument/2006/relationships" xmlns:p="http://schemas.openxmlformats.org/presentationml/2006/main" showMasterSp="0" preserve="1" userDrawn="1">
+  <p:cSld name="Title, Content, Picture 1">
+    <p:spTree>
+      <p:nvGrpSpPr>
+        <p:cNvPr id="1" name=""/>
+        <p:cNvGrpSpPr/>
+        <p:nvPr/>
+      </p:nvGrpSpPr>
+      <p:grpSpPr>
+        <a:xfrm>
+          <a:off x="0" y="0"/>
+          <a:ext cx="0" cy="0"/>
+          <a:chOff x="0" y="0"/>
+          <a:chExt cx="0" cy="0"/>
+        </a:xfrm>
+      </p:grpSpPr>
+      <p:grpSp>
+        <p:nvGrpSpPr>
+          <p:cNvPr id="8" name="Group 7"/>
+          <p:cNvGrpSpPr/>
+          <p:nvPr/>
+        </p:nvGrpSpPr>
+        <p:grpSpPr>
+          <a:xfrm>
+            <a:off x="-6214" y="-1"/>
+            <a:ext cx="12214827" cy="6858000"/>
+            <a:chOff x="-6214" y="-1"/>
+            <a:chExt cx="12214827" cy="6858000"/>
+          </a:xfrm>
+        </p:grpSpPr>
+        <p:cxnSp>
+          <p:nvCxnSpPr>
+            <p:cNvPr id="9" name="Straight Connector 8"/>
+            <p:cNvCxnSpPr/>
+            <p:nvPr/>
+          </p:nvCxnSpPr>
+          <p:spPr>
+            <a:xfrm>
+              <a:off x="-6214" y="6686283"/>
+              <a:ext cx="12192000" cy="0"/>
+            </a:xfrm>
+            <a:prstGeom prst="line">
+              <a:avLst/>
+            </a:prstGeom>
+            <a:ln w="12700">
+              <a:solidFill>
+                <a:srgbClr val="BCBCBC">
+                  <a:alpha val="29804"/>
+                </a:srgbClr>
+              </a:solidFill>
+              <a:prstDash val="sysDot"/>
+            </a:ln>
+          </p:spPr>
+          <p:style>
+            <a:lnRef idx="1">
+              <a:schemeClr val="accent1"/>
+            </a:lnRef>
+            <a:fillRef idx="0">
+              <a:schemeClr val="accent1"/>
+            </a:fillRef>
+            <a:effectRef idx="0">
+              <a:schemeClr val="accent1"/>
+            </a:effectRef>
+            <a:fontRef idx="minor">
+              <a:schemeClr val="tx1"/>
+            </a:fontRef>
+          </p:style>
+        </p:cxnSp>
+        <p:cxnSp>
+          <p:nvCxnSpPr>
+            <p:cNvPr id="10" name="Straight Connector 9"/>
+            <p:cNvCxnSpPr/>
+            <p:nvPr/>
+          </p:nvCxnSpPr>
+          <p:spPr>
+            <a:xfrm>
+              <a:off x="0" y="-1"/>
+              <a:ext cx="0" cy="6858000"/>
+            </a:xfrm>
+            <a:prstGeom prst="line">
+              <a:avLst/>
+            </a:prstGeom>
+            <a:ln w="12700">
+              <a:solidFill>
+                <a:srgbClr val="BCBCBC">
+                  <a:alpha val="29804"/>
+                </a:srgbClr>
+              </a:solidFill>
+              <a:prstDash val="sysDot"/>
+            </a:ln>
+          </p:spPr>
+          <p:style>
+            <a:lnRef idx="1">
+              <a:schemeClr val="accent1"/>
+            </a:lnRef>
+            <a:fillRef idx="0">
+              <a:schemeClr val="accent1"/>
+            </a:fillRef>
+            <a:effectRef idx="0">
+              <a:schemeClr val="accent1"/>
+            </a:effectRef>
+            <a:fontRef idx="minor">
+              <a:schemeClr val="tx1"/>
+            </a:fontRef>
+          </p:style>
+        </p:cxnSp>
+        <p:cxnSp>
+          <p:nvCxnSpPr>
+            <p:cNvPr id="11" name="Straight Connector 10"/>
+            <p:cNvCxnSpPr/>
+            <p:nvPr/>
+          </p:nvCxnSpPr>
+          <p:spPr>
+            <a:xfrm>
+              <a:off x="11993258" y="-1"/>
+              <a:ext cx="0" cy="6858000"/>
+            </a:xfrm>
+            <a:prstGeom prst="line">
+              <a:avLst/>
+            </a:prstGeom>
+            <a:ln w="12700">
+              <a:solidFill>
+                <a:srgbClr val="BCBCBC">
+                  <a:alpha val="29804"/>
+                </a:srgbClr>
+              </a:solidFill>
+              <a:prstDash val="sysDot"/>
+            </a:ln>
+          </p:spPr>
+          <p:style>
+            <a:lnRef idx="1">
+              <a:schemeClr val="accent1"/>
+            </a:lnRef>
+            <a:fillRef idx="0">
+              <a:schemeClr val="accent1"/>
+            </a:fillRef>
+            <a:effectRef idx="0">
+              <a:schemeClr val="accent1"/>
+            </a:effectRef>
+            <a:fontRef idx="minor">
+              <a:schemeClr val="tx1"/>
+            </a:fontRef>
+          </p:style>
+        </p:cxnSp>
+        <p:cxnSp>
+          <p:nvCxnSpPr>
+            <p:cNvPr id="12" name="Straight Connector 11"/>
+            <p:cNvCxnSpPr/>
+            <p:nvPr/>
+          </p:nvCxnSpPr>
+          <p:spPr>
+            <a:xfrm>
+              <a:off x="192528" y="-1"/>
+              <a:ext cx="0" cy="6858000"/>
+            </a:xfrm>
+            <a:prstGeom prst="line">
+              <a:avLst/>
+            </a:prstGeom>
+            <a:ln w="12700">
+              <a:solidFill>
+                <a:srgbClr val="BCBCBC">
+                  <a:alpha val="29804"/>
+                </a:srgbClr>
+              </a:solidFill>
+              <a:prstDash val="sysDot"/>
+            </a:ln>
+          </p:spPr>
+          <p:style>
+            <a:lnRef idx="1">
+              <a:schemeClr val="accent1"/>
+            </a:lnRef>
+            <a:fillRef idx="0">
+              <a:schemeClr val="accent1"/>
+            </a:fillRef>
+            <a:effectRef idx="0">
+              <a:schemeClr val="accent1"/>
+            </a:effectRef>
+            <a:fontRef idx="minor">
+              <a:schemeClr val="tx1"/>
+            </a:fontRef>
+          </p:style>
+        </p:cxnSp>
+        <p:cxnSp>
+          <p:nvCxnSpPr>
+            <p:cNvPr id="13" name="Straight Connector 12"/>
+            <p:cNvCxnSpPr/>
+            <p:nvPr/>
+          </p:nvCxnSpPr>
+          <p:spPr>
+            <a:xfrm>
+              <a:off x="1175922" y="-1"/>
+              <a:ext cx="0" cy="6858000"/>
+            </a:xfrm>
+            <a:prstGeom prst="line">
+              <a:avLst/>
+            </a:prstGeom>
+            <a:ln w="12700">
+              <a:solidFill>
+                <a:srgbClr val="BCBCBC">
+                  <a:alpha val="29804"/>
+                </a:srgbClr>
+              </a:solidFill>
+              <a:prstDash val="sysDot"/>
+            </a:ln>
+          </p:spPr>
+          <p:style>
+            <a:lnRef idx="1">
+              <a:schemeClr val="accent1"/>
+            </a:lnRef>
+            <a:fillRef idx="0">
+              <a:schemeClr val="accent1"/>
+            </a:fillRef>
+            <a:effectRef idx="0">
+              <a:schemeClr val="accent1"/>
+            </a:effectRef>
+            <a:fontRef idx="minor">
+              <a:schemeClr val="tx1"/>
+            </a:fontRef>
+          </p:style>
+        </p:cxnSp>
+        <p:cxnSp>
+          <p:nvCxnSpPr>
+            <p:cNvPr id="14" name="Straight Connector 13"/>
+            <p:cNvCxnSpPr/>
+            <p:nvPr/>
+          </p:nvCxnSpPr>
+          <p:spPr>
+            <a:xfrm>
+              <a:off x="2159316" y="-1"/>
+              <a:ext cx="0" cy="6858000"/>
+            </a:xfrm>
+            <a:prstGeom prst="line">
+              <a:avLst/>
+            </a:prstGeom>
+            <a:ln w="12700">
+              <a:solidFill>
+                <a:srgbClr val="BCBCBC">
+                  <a:alpha val="29804"/>
+                </a:srgbClr>
+              </a:solidFill>
+              <a:prstDash val="sysDot"/>
+            </a:ln>
+          </p:spPr>
+          <p:style>
+            <a:lnRef idx="1">
+              <a:schemeClr val="accent1"/>
+            </a:lnRef>
+            <a:fillRef idx="0">
+              <a:schemeClr val="accent1"/>
+            </a:fillRef>
+            <a:effectRef idx="0">
+              <a:schemeClr val="accent1"/>
+            </a:effectRef>
+            <a:fontRef idx="minor">
+              <a:schemeClr val="tx1"/>
+            </a:fontRef>
+          </p:style>
+        </p:cxnSp>
+        <p:cxnSp>
+          <p:nvCxnSpPr>
+            <p:cNvPr id="15" name="Straight Connector 14"/>
+            <p:cNvCxnSpPr/>
+            <p:nvPr/>
+          </p:nvCxnSpPr>
+          <p:spPr>
+            <a:xfrm>
+              <a:off x="3142710" y="-1"/>
+              <a:ext cx="0" cy="6858000"/>
+            </a:xfrm>
+            <a:prstGeom prst="line">
+              <a:avLst/>
+            </a:prstGeom>
+            <a:ln w="12700">
+              <a:solidFill>
+                <a:srgbClr val="BCBCBC">
+                  <a:alpha val="29804"/>
+                </a:srgbClr>
+              </a:solidFill>
+              <a:prstDash val="sysDot"/>
+            </a:ln>
+          </p:spPr>
+          <p:style>
+            <a:lnRef idx="1">
+              <a:schemeClr val="accent1"/>
+            </a:lnRef>
+            <a:fillRef idx="0">
+              <a:schemeClr val="accent1"/>
+            </a:fillRef>
+            <a:effectRef idx="0">
+              <a:schemeClr val="accent1"/>
+            </a:effectRef>
+            <a:fontRef idx="minor">
+              <a:schemeClr val="tx1"/>
+            </a:fontRef>
+          </p:style>
+        </p:cxnSp>
+        <p:cxnSp>
+          <p:nvCxnSpPr>
+            <p:cNvPr id="16" name="Straight Connector 15"/>
+            <p:cNvCxnSpPr/>
+            <p:nvPr/>
+          </p:nvCxnSpPr>
+          <p:spPr>
+            <a:xfrm>
+              <a:off x="4126104" y="-1"/>
+              <a:ext cx="0" cy="6858000"/>
+            </a:xfrm>
+            <a:prstGeom prst="line">
+              <a:avLst/>
+            </a:prstGeom>
+            <a:ln w="12700">
+              <a:solidFill>
+                <a:srgbClr val="BCBCBC">
+                  <a:alpha val="29804"/>
+                </a:srgbClr>
+              </a:solidFill>
+              <a:prstDash val="sysDot"/>
+            </a:ln>
+          </p:spPr>
+          <p:style>
+            <a:lnRef idx="1">
+              <a:schemeClr val="accent1"/>
+            </a:lnRef>
+            <a:fillRef idx="0">
+              <a:schemeClr val="accent1"/>
+            </a:fillRef>
+            <a:effectRef idx="0">
+              <a:schemeClr val="accent1"/>
+            </a:effectRef>
+            <a:fontRef idx="minor">
+              <a:schemeClr val="tx1"/>
+            </a:fontRef>
+          </p:style>
+        </p:cxnSp>
+        <p:cxnSp>
+          <p:nvCxnSpPr>
+            <p:cNvPr id="17" name="Straight Connector 16"/>
+            <p:cNvCxnSpPr/>
+            <p:nvPr/>
+          </p:nvCxnSpPr>
+          <p:spPr>
+            <a:xfrm>
+              <a:off x="5109498" y="-1"/>
+              <a:ext cx="0" cy="6858000"/>
+            </a:xfrm>
+            <a:prstGeom prst="line">
+              <a:avLst/>
+            </a:prstGeom>
+            <a:ln w="12700">
+              <a:solidFill>
+                <a:srgbClr val="BCBCBC">
+                  <a:alpha val="29804"/>
+                </a:srgbClr>
+              </a:solidFill>
+              <a:prstDash val="sysDot"/>
+            </a:ln>
+          </p:spPr>
+          <p:style>
+            <a:lnRef idx="1">
+              <a:schemeClr val="accent1"/>
+            </a:lnRef>
+            <a:fillRef idx="0">
+              <a:schemeClr val="accent1"/>
+            </a:fillRef>
+            <a:effectRef idx="0">
+              <a:schemeClr val="accent1"/>
+            </a:effectRef>
+            <a:fontRef idx="minor">
+              <a:schemeClr val="tx1"/>
+            </a:fontRef>
+          </p:style>
+        </p:cxnSp>
+        <p:cxnSp>
+          <p:nvCxnSpPr>
+            <p:cNvPr id="18" name="Straight Connector 17"/>
+            <p:cNvCxnSpPr/>
+            <p:nvPr/>
+          </p:nvCxnSpPr>
+          <p:spPr>
+            <a:xfrm>
+              <a:off x="6092892" y="-1"/>
+              <a:ext cx="0" cy="6858000"/>
+            </a:xfrm>
+            <a:prstGeom prst="line">
+              <a:avLst/>
+            </a:prstGeom>
+            <a:ln w="12700">
+              <a:solidFill>
+                <a:srgbClr val="BCBCBC">
+                  <a:alpha val="29804"/>
+                </a:srgbClr>
+              </a:solidFill>
+              <a:prstDash val="sysDot"/>
+            </a:ln>
+          </p:spPr>
+          <p:style>
+            <a:lnRef idx="1">
+              <a:schemeClr val="accent1"/>
+            </a:lnRef>
+            <a:fillRef idx="0">
+              <a:schemeClr val="accent1"/>
+            </a:fillRef>
+            <a:effectRef idx="0">
+              <a:schemeClr val="accent1"/>
+            </a:effectRef>
+            <a:fontRef idx="minor">
+              <a:schemeClr val="tx1"/>
+            </a:fontRef>
+          </p:style>
+        </p:cxnSp>
+        <p:cxnSp>
+          <p:nvCxnSpPr>
+            <p:cNvPr id="19" name="Straight Connector 18"/>
+            <p:cNvCxnSpPr/>
+            <p:nvPr/>
+          </p:nvCxnSpPr>
+          <p:spPr>
+            <a:xfrm>
+              <a:off x="7076286" y="-1"/>
+              <a:ext cx="0" cy="6858000"/>
+            </a:xfrm>
+            <a:prstGeom prst="line">
+              <a:avLst/>
+            </a:prstGeom>
+            <a:ln w="12700">
+              <a:solidFill>
+                <a:srgbClr val="BCBCBC">
+                  <a:alpha val="29804"/>
+                </a:srgbClr>
+              </a:solidFill>
+              <a:prstDash val="sysDot"/>
+            </a:ln>
+          </p:spPr>
+          <p:style>
+            <a:lnRef idx="1">
+              <a:schemeClr val="accent1"/>
+            </a:lnRef>
+            <a:fillRef idx="0">
+              <a:schemeClr val="accent1"/>
+            </a:fillRef>
+            <a:effectRef idx="0">
+              <a:schemeClr val="accent1"/>
+            </a:effectRef>
+            <a:fontRef idx="minor">
+              <a:schemeClr val="tx1"/>
+            </a:fontRef>
+          </p:style>
+        </p:cxnSp>
+        <p:cxnSp>
+          <p:nvCxnSpPr>
+            <p:cNvPr id="20" name="Straight Connector 19"/>
+            <p:cNvCxnSpPr/>
+            <p:nvPr/>
+          </p:nvCxnSpPr>
+          <p:spPr>
+            <a:xfrm>
+              <a:off x="8059680" y="-1"/>
+              <a:ext cx="0" cy="6858000"/>
+            </a:xfrm>
+            <a:prstGeom prst="line">
+              <a:avLst/>
+            </a:prstGeom>
+            <a:ln w="12700">
+              <a:solidFill>
+                <a:srgbClr val="BCBCBC">
+                  <a:alpha val="29804"/>
+                </a:srgbClr>
+              </a:solidFill>
+              <a:prstDash val="sysDot"/>
+            </a:ln>
+          </p:spPr>
+          <p:style>
+            <a:lnRef idx="1">
+              <a:schemeClr val="accent1"/>
+            </a:lnRef>
+            <a:fillRef idx="0">
+              <a:schemeClr val="accent1"/>
+            </a:fillRef>
+            <a:effectRef idx="0">
+              <a:schemeClr val="accent1"/>
+            </a:effectRef>
+            <a:fontRef idx="minor">
+              <a:schemeClr val="tx1"/>
+            </a:fontRef>
+          </p:style>
+        </p:cxnSp>
+        <p:cxnSp>
+          <p:nvCxnSpPr>
+            <p:cNvPr id="21" name="Straight Connector 20"/>
+            <p:cNvCxnSpPr/>
+            <p:nvPr/>
+          </p:nvCxnSpPr>
+          <p:spPr>
+            <a:xfrm>
+              <a:off x="9043074" y="-1"/>
+              <a:ext cx="0" cy="6858000"/>
+            </a:xfrm>
+            <a:prstGeom prst="line">
+              <a:avLst/>
+            </a:prstGeom>
+            <a:ln w="12700">
+              <a:solidFill>
+                <a:srgbClr val="BCBCBC">
+                  <a:alpha val="29804"/>
+                </a:srgbClr>
+              </a:solidFill>
+              <a:prstDash val="sysDot"/>
+            </a:ln>
+          </p:spPr>
+          <p:style>
+            <a:lnRef idx="1">
+              <a:schemeClr val="accent1"/>
+            </a:lnRef>
+            <a:fillRef idx="0">
+              <a:schemeClr val="accent1"/>
+            </a:fillRef>
+            <a:effectRef idx="0">
+              <a:schemeClr val="accent1"/>
+            </a:effectRef>
+            <a:fontRef idx="minor">
+              <a:schemeClr val="tx1"/>
+            </a:fontRef>
+          </p:style>
+        </p:cxnSp>
+        <p:cxnSp>
+          <p:nvCxnSpPr>
+            <p:cNvPr id="22" name="Straight Connector 21"/>
+            <p:cNvCxnSpPr/>
+            <p:nvPr/>
+          </p:nvCxnSpPr>
+          <p:spPr>
+            <a:xfrm>
+              <a:off x="10026468" y="-1"/>
+              <a:ext cx="0" cy="6858000"/>
+            </a:xfrm>
+            <a:prstGeom prst="line">
+              <a:avLst/>
+            </a:prstGeom>
+            <a:ln w="12700">
+              <a:solidFill>
+                <a:srgbClr val="BCBCBC">
+                  <a:alpha val="29804"/>
+                </a:srgbClr>
+              </a:solidFill>
+              <a:prstDash val="sysDot"/>
+            </a:ln>
+          </p:spPr>
+          <p:style>
+            <a:lnRef idx="1">
+              <a:schemeClr val="accent1"/>
+            </a:lnRef>
+            <a:fillRef idx="0">
+              <a:schemeClr val="accent1"/>
+            </a:fillRef>
+            <a:effectRef idx="0">
+              <a:schemeClr val="accent1"/>
+            </a:effectRef>
+            <a:fontRef idx="minor">
+              <a:schemeClr val="tx1"/>
+            </a:fontRef>
+          </p:style>
+        </p:cxnSp>
+        <p:cxnSp>
+          <p:nvCxnSpPr>
+            <p:cNvPr id="23" name="Straight Connector 22"/>
+            <p:cNvCxnSpPr/>
+            <p:nvPr/>
+          </p:nvCxnSpPr>
+          <p:spPr>
+            <a:xfrm>
+              <a:off x="11009862" y="-1"/>
+              <a:ext cx="0" cy="6858000"/>
+            </a:xfrm>
+            <a:prstGeom prst="line">
+              <a:avLst/>
+            </a:prstGeom>
+            <a:ln w="12700">
+              <a:solidFill>
+                <a:srgbClr val="BCBCBC">
+                  <a:alpha val="29804"/>
+                </a:srgbClr>
+              </a:solidFill>
+              <a:prstDash val="sysDot"/>
+            </a:ln>
+          </p:spPr>
+          <p:style>
+            <a:lnRef idx="1">
+              <a:schemeClr val="accent1"/>
+            </a:lnRef>
+            <a:fillRef idx="0">
+              <a:schemeClr val="accent1"/>
+            </a:fillRef>
+            <a:effectRef idx="0">
+              <a:schemeClr val="accent1"/>
+            </a:effectRef>
+            <a:fontRef idx="minor">
+              <a:schemeClr val="tx1"/>
+            </a:fontRef>
+          </p:style>
+        </p:cxnSp>
+        <p:cxnSp>
+          <p:nvCxnSpPr>
+            <p:cNvPr id="24" name="Straight Connector 23"/>
+            <p:cNvCxnSpPr/>
+            <p:nvPr/>
+          </p:nvCxnSpPr>
+          <p:spPr>
+            <a:xfrm>
+              <a:off x="12185786" y="-1"/>
+              <a:ext cx="0" cy="6858000"/>
+            </a:xfrm>
+            <a:prstGeom prst="line">
+              <a:avLst/>
+            </a:prstGeom>
+            <a:ln w="12700">
+              <a:solidFill>
+                <a:srgbClr val="BCBCBC">
+                  <a:alpha val="29804"/>
+                </a:srgbClr>
+              </a:solidFill>
+              <a:prstDash val="sysDot"/>
+            </a:ln>
+          </p:spPr>
+          <p:style>
+            <a:lnRef idx="1">
+              <a:schemeClr val="accent1"/>
+            </a:lnRef>
+            <a:fillRef idx="0">
+              <a:schemeClr val="accent1"/>
+            </a:fillRef>
+            <a:effectRef idx="0">
+              <a:schemeClr val="accent1"/>
+            </a:effectRef>
+            <a:fontRef idx="minor">
+              <a:schemeClr val="tx1"/>
+            </a:fontRef>
+          </p:style>
+        </p:cxnSp>
+        <p:cxnSp>
+          <p:nvCxnSpPr>
+            <p:cNvPr id="25" name="Straight Connector 24"/>
+            <p:cNvCxnSpPr/>
+            <p:nvPr/>
+          </p:nvCxnSpPr>
+          <p:spPr>
+            <a:xfrm>
+              <a:off x="0" y="171716"/>
+              <a:ext cx="12192000" cy="0"/>
+            </a:xfrm>
+            <a:prstGeom prst="line">
+              <a:avLst/>
+            </a:prstGeom>
+            <a:ln w="12700">
+              <a:solidFill>
+                <a:srgbClr val="BCBCBC">
+                  <a:alpha val="29804"/>
+                </a:srgbClr>
+              </a:solidFill>
+              <a:prstDash val="sysDot"/>
+            </a:ln>
+          </p:spPr>
+          <p:style>
+            <a:lnRef idx="1">
+              <a:schemeClr val="accent1"/>
+            </a:lnRef>
+            <a:fillRef idx="0">
+              <a:schemeClr val="accent1"/>
+            </a:fillRef>
+            <a:effectRef idx="0">
+              <a:schemeClr val="accent1"/>
+            </a:effectRef>
+            <a:fontRef idx="minor">
+              <a:schemeClr val="tx1"/>
+            </a:fontRef>
+          </p:style>
+        </p:cxnSp>
+        <p:cxnSp>
+          <p:nvCxnSpPr>
+            <p:cNvPr id="26" name="Straight Connector 25"/>
+            <p:cNvCxnSpPr/>
+            <p:nvPr/>
+          </p:nvCxnSpPr>
+          <p:spPr>
+            <a:xfrm>
+              <a:off x="0" y="714597"/>
+              <a:ext cx="12192000" cy="0"/>
+            </a:xfrm>
+            <a:prstGeom prst="line">
+              <a:avLst/>
+            </a:prstGeom>
+            <a:ln w="12700">
+              <a:solidFill>
+                <a:srgbClr val="BCBCBC">
+                  <a:alpha val="29804"/>
+                </a:srgbClr>
+              </a:solidFill>
+              <a:prstDash val="sysDot"/>
+            </a:ln>
+          </p:spPr>
+          <p:style>
+            <a:lnRef idx="1">
+              <a:schemeClr val="accent1"/>
+            </a:lnRef>
+            <a:fillRef idx="0">
+              <a:schemeClr val="accent1"/>
+            </a:fillRef>
+            <a:effectRef idx="0">
+              <a:schemeClr val="accent1"/>
+            </a:effectRef>
+            <a:fontRef idx="minor">
+              <a:schemeClr val="tx1"/>
+            </a:fontRef>
+          </p:style>
+        </p:cxnSp>
+        <p:cxnSp>
+          <p:nvCxnSpPr>
+            <p:cNvPr id="27" name="Straight Connector 26"/>
+            <p:cNvCxnSpPr/>
+            <p:nvPr/>
+          </p:nvCxnSpPr>
+          <p:spPr>
+            <a:xfrm>
+              <a:off x="0" y="1257478"/>
+              <a:ext cx="12192000" cy="0"/>
+            </a:xfrm>
+            <a:prstGeom prst="line">
+              <a:avLst/>
+            </a:prstGeom>
+            <a:ln w="12700">
+              <a:solidFill>
+                <a:srgbClr val="BCBCBC">
+                  <a:alpha val="29804"/>
+                </a:srgbClr>
+              </a:solidFill>
+              <a:prstDash val="sysDot"/>
+            </a:ln>
+          </p:spPr>
+          <p:style>
+            <a:lnRef idx="1">
+              <a:schemeClr val="accent1"/>
+            </a:lnRef>
+            <a:fillRef idx="0">
+              <a:schemeClr val="accent1"/>
+            </a:fillRef>
+            <a:effectRef idx="0">
+              <a:schemeClr val="accent1"/>
+            </a:effectRef>
+            <a:fontRef idx="minor">
+              <a:schemeClr val="tx1"/>
+            </a:fontRef>
+          </p:style>
+        </p:cxnSp>
+        <p:cxnSp>
+          <p:nvCxnSpPr>
+            <p:cNvPr id="28" name="Straight Connector 27"/>
+            <p:cNvCxnSpPr/>
+            <p:nvPr/>
+          </p:nvCxnSpPr>
+          <p:spPr>
+            <a:xfrm>
+              <a:off x="0" y="1800359"/>
+              <a:ext cx="12192000" cy="0"/>
+            </a:xfrm>
+            <a:prstGeom prst="line">
+              <a:avLst/>
+            </a:prstGeom>
+            <a:ln w="12700">
+              <a:solidFill>
+                <a:srgbClr val="BCBCBC">
+                  <a:alpha val="29804"/>
+                </a:srgbClr>
+              </a:solidFill>
+              <a:prstDash val="sysDot"/>
+            </a:ln>
+          </p:spPr>
+          <p:style>
+            <a:lnRef idx="1">
+              <a:schemeClr val="accent1"/>
+            </a:lnRef>
+            <a:fillRef idx="0">
+              <a:schemeClr val="accent1"/>
+            </a:fillRef>
+            <a:effectRef idx="0">
+              <a:schemeClr val="accent1"/>
+            </a:effectRef>
+            <a:fontRef idx="minor">
+              <a:schemeClr val="tx1"/>
+            </a:fontRef>
+          </p:style>
+        </p:cxnSp>
+        <p:cxnSp>
+          <p:nvCxnSpPr>
+            <p:cNvPr id="29" name="Straight Connector 28"/>
+            <p:cNvCxnSpPr/>
+            <p:nvPr/>
+          </p:nvCxnSpPr>
+          <p:spPr>
+            <a:xfrm>
+              <a:off x="0" y="2343240"/>
+              <a:ext cx="12192000" cy="0"/>
+            </a:xfrm>
+            <a:prstGeom prst="line">
+              <a:avLst/>
+            </a:prstGeom>
+            <a:ln w="12700">
+              <a:solidFill>
+                <a:srgbClr val="BCBCBC">
+                  <a:alpha val="29804"/>
+                </a:srgbClr>
+              </a:solidFill>
+              <a:prstDash val="sysDot"/>
+            </a:ln>
+          </p:spPr>
+          <p:style>
+            <a:lnRef idx="1">
+              <a:schemeClr val="accent1"/>
+            </a:lnRef>
+            <a:fillRef idx="0">
+              <a:schemeClr val="accent1"/>
+            </a:fillRef>
+            <a:effectRef idx="0">
+              <a:schemeClr val="accent1"/>
+            </a:effectRef>
+            <a:fontRef idx="minor">
+              <a:schemeClr val="tx1"/>
+            </a:fontRef>
+          </p:style>
+        </p:cxnSp>
+        <p:cxnSp>
+          <p:nvCxnSpPr>
+            <p:cNvPr id="30" name="Straight Connector 29"/>
+            <p:cNvCxnSpPr/>
+            <p:nvPr/>
+          </p:nvCxnSpPr>
+          <p:spPr>
+            <a:xfrm>
+              <a:off x="0" y="2886121"/>
+              <a:ext cx="12192000" cy="0"/>
+            </a:xfrm>
+            <a:prstGeom prst="line">
+              <a:avLst/>
+            </a:prstGeom>
+            <a:ln w="12700">
+              <a:solidFill>
+                <a:srgbClr val="BCBCBC">
+                  <a:alpha val="29804"/>
+                </a:srgbClr>
+              </a:solidFill>
+              <a:prstDash val="sysDot"/>
+            </a:ln>
+          </p:spPr>
+          <p:style>
+            <a:lnRef idx="1">
+              <a:schemeClr val="accent1"/>
+            </a:lnRef>
+            <a:fillRef idx="0">
+              <a:schemeClr val="accent1"/>
+            </a:fillRef>
+            <a:effectRef idx="0">
+              <a:schemeClr val="accent1"/>
+            </a:effectRef>
+            <a:fontRef idx="minor">
+              <a:schemeClr val="tx1"/>
+            </a:fontRef>
+          </p:style>
+        </p:cxnSp>
+        <p:cxnSp>
+          <p:nvCxnSpPr>
+            <p:cNvPr id="31" name="Straight Connector 30"/>
+            <p:cNvCxnSpPr/>
+            <p:nvPr/>
+          </p:nvCxnSpPr>
+          <p:spPr>
+            <a:xfrm>
+              <a:off x="0" y="3429002"/>
+              <a:ext cx="12192000" cy="0"/>
+            </a:xfrm>
+            <a:prstGeom prst="line">
+              <a:avLst/>
+            </a:prstGeom>
+            <a:ln w="12700">
+              <a:solidFill>
+                <a:srgbClr val="BCBCBC">
+                  <a:alpha val="29804"/>
+                </a:srgbClr>
+              </a:solidFill>
+              <a:prstDash val="sysDot"/>
+            </a:ln>
+          </p:spPr>
+          <p:style>
+            <a:lnRef idx="1">
+              <a:schemeClr val="accent1"/>
+            </a:lnRef>
+            <a:fillRef idx="0">
+              <a:schemeClr val="accent1"/>
+            </a:fillRef>
+            <a:effectRef idx="0">
+              <a:schemeClr val="accent1"/>
+            </a:effectRef>
+            <a:fontRef idx="minor">
+              <a:schemeClr val="tx1"/>
+            </a:fontRef>
+          </p:style>
+        </p:cxnSp>
+        <p:cxnSp>
+          <p:nvCxnSpPr>
+            <p:cNvPr id="32" name="Straight Connector 31"/>
+            <p:cNvCxnSpPr/>
+            <p:nvPr/>
+          </p:nvCxnSpPr>
+          <p:spPr>
+            <a:xfrm>
+              <a:off x="0" y="3971883"/>
+              <a:ext cx="12192000" cy="0"/>
+            </a:xfrm>
+            <a:prstGeom prst="line">
+              <a:avLst/>
+            </a:prstGeom>
+            <a:ln w="12700">
+              <a:solidFill>
+                <a:srgbClr val="BCBCBC">
+                  <a:alpha val="29804"/>
+                </a:srgbClr>
+              </a:solidFill>
+              <a:prstDash val="sysDot"/>
+            </a:ln>
+          </p:spPr>
+          <p:style>
+            <a:lnRef idx="1">
+              <a:schemeClr val="accent1"/>
+            </a:lnRef>
+            <a:fillRef idx="0">
+              <a:schemeClr val="accent1"/>
+            </a:fillRef>
+            <a:effectRef idx="0">
+              <a:schemeClr val="accent1"/>
+            </a:effectRef>
+            <a:fontRef idx="minor">
+              <a:schemeClr val="tx1"/>
+            </a:fontRef>
+          </p:style>
+        </p:cxnSp>
+        <p:cxnSp>
+          <p:nvCxnSpPr>
+            <p:cNvPr id="33" name="Straight Connector 32"/>
+            <p:cNvCxnSpPr/>
+            <p:nvPr/>
+          </p:nvCxnSpPr>
+          <p:spPr>
+            <a:xfrm>
+              <a:off x="0" y="4514764"/>
+              <a:ext cx="12192000" cy="0"/>
+            </a:xfrm>
+            <a:prstGeom prst="line">
+              <a:avLst/>
+            </a:prstGeom>
+            <a:ln w="12700">
+              <a:solidFill>
+                <a:srgbClr val="BCBCBC">
+                  <a:alpha val="29804"/>
+                </a:srgbClr>
+              </a:solidFill>
+              <a:prstDash val="sysDot"/>
+            </a:ln>
+          </p:spPr>
+          <p:style>
+            <a:lnRef idx="1">
+              <a:schemeClr val="accent1"/>
+            </a:lnRef>
+            <a:fillRef idx="0">
+              <a:schemeClr val="accent1"/>
+            </a:fillRef>
+            <a:effectRef idx="0">
+              <a:schemeClr val="accent1"/>
+            </a:effectRef>
+            <a:fontRef idx="minor">
+              <a:schemeClr val="tx1"/>
+            </a:fontRef>
+          </p:style>
+        </p:cxnSp>
+        <p:cxnSp>
+          <p:nvCxnSpPr>
+            <p:cNvPr id="34" name="Straight Connector 33"/>
+            <p:cNvCxnSpPr/>
+            <p:nvPr/>
+          </p:nvCxnSpPr>
+          <p:spPr>
+            <a:xfrm>
+              <a:off x="0" y="5057645"/>
+              <a:ext cx="12192000" cy="0"/>
+            </a:xfrm>
+            <a:prstGeom prst="line">
+              <a:avLst/>
+            </a:prstGeom>
+            <a:ln w="12700">
+              <a:solidFill>
+                <a:srgbClr val="BCBCBC">
+                  <a:alpha val="29804"/>
+                </a:srgbClr>
+              </a:solidFill>
+              <a:prstDash val="sysDot"/>
+            </a:ln>
+          </p:spPr>
+          <p:style>
+            <a:lnRef idx="1">
+              <a:schemeClr val="accent1"/>
+            </a:lnRef>
+            <a:fillRef idx="0">
+              <a:schemeClr val="accent1"/>
+            </a:fillRef>
+            <a:effectRef idx="0">
+              <a:schemeClr val="accent1"/>
+            </a:effectRef>
+            <a:fontRef idx="minor">
+              <a:schemeClr val="tx1"/>
+            </a:fontRef>
+          </p:style>
+        </p:cxnSp>
+        <p:cxnSp>
+          <p:nvCxnSpPr>
+            <p:cNvPr id="35" name="Straight Connector 34"/>
+            <p:cNvCxnSpPr/>
+            <p:nvPr/>
+          </p:nvCxnSpPr>
+          <p:spPr>
+            <a:xfrm>
+              <a:off x="0" y="5600526"/>
+              <a:ext cx="12192000" cy="0"/>
+            </a:xfrm>
+            <a:prstGeom prst="line">
+              <a:avLst/>
+            </a:prstGeom>
+            <a:ln w="12700">
+              <a:solidFill>
+                <a:srgbClr val="BCBCBC">
+                  <a:alpha val="29804"/>
+                </a:srgbClr>
+              </a:solidFill>
+              <a:prstDash val="sysDot"/>
+            </a:ln>
+          </p:spPr>
+          <p:style>
+            <a:lnRef idx="1">
+              <a:schemeClr val="accent1"/>
+            </a:lnRef>
+            <a:fillRef idx="0">
+              <a:schemeClr val="accent1"/>
+            </a:fillRef>
+            <a:effectRef idx="0">
+              <a:schemeClr val="accent1"/>
+            </a:effectRef>
+            <a:fontRef idx="minor">
+              <a:schemeClr val="tx1"/>
+            </a:fontRef>
+          </p:style>
+        </p:cxnSp>
+        <p:cxnSp>
+          <p:nvCxnSpPr>
+            <p:cNvPr id="36" name="Straight Connector 35"/>
+            <p:cNvCxnSpPr/>
+            <p:nvPr/>
+          </p:nvCxnSpPr>
+          <p:spPr>
+            <a:xfrm>
+              <a:off x="0" y="6857999"/>
+              <a:ext cx="12192000" cy="0"/>
+            </a:xfrm>
+            <a:prstGeom prst="line">
+              <a:avLst/>
+            </a:prstGeom>
+            <a:ln w="12700">
+              <a:solidFill>
+                <a:srgbClr val="BCBCBC">
+                  <a:alpha val="29804"/>
+                </a:srgbClr>
+              </a:solidFill>
+              <a:prstDash val="sysDot"/>
+            </a:ln>
+          </p:spPr>
+          <p:style>
+            <a:lnRef idx="1">
+              <a:schemeClr val="accent1"/>
+            </a:lnRef>
+            <a:fillRef idx="0">
+              <a:schemeClr val="accent1"/>
+            </a:fillRef>
+            <a:effectRef idx="0">
+              <a:schemeClr val="accent1"/>
+            </a:effectRef>
+            <a:fontRef idx="minor">
+              <a:schemeClr val="tx1"/>
+            </a:fontRef>
+          </p:style>
+        </p:cxnSp>
+        <p:cxnSp>
+          <p:nvCxnSpPr>
+            <p:cNvPr id="37" name="Straight Connector 36"/>
+            <p:cNvCxnSpPr/>
+            <p:nvPr/>
+          </p:nvCxnSpPr>
+          <p:spPr>
+            <a:xfrm>
+              <a:off x="16613" y="6143407"/>
+              <a:ext cx="12192000" cy="0"/>
+            </a:xfrm>
+            <a:prstGeom prst="line">
+              <a:avLst/>
+            </a:prstGeom>
+            <a:ln w="12700">
+              <a:solidFill>
+                <a:srgbClr val="BCBCBC">
+                  <a:alpha val="29804"/>
+                </a:srgbClr>
+              </a:solidFill>
+              <a:prstDash val="sysDot"/>
+            </a:ln>
+          </p:spPr>
+          <p:style>
+            <a:lnRef idx="1">
+              <a:schemeClr val="accent1"/>
+            </a:lnRef>
+            <a:fillRef idx="0">
+              <a:schemeClr val="accent1"/>
+            </a:fillRef>
+            <a:effectRef idx="0">
+              <a:schemeClr val="accent1"/>
+            </a:effectRef>
+            <a:fontRef idx="minor">
+              <a:schemeClr val="tx1"/>
+            </a:fontRef>
+          </p:style>
+        </p:cxnSp>
+        <p:cxnSp>
+          <p:nvCxnSpPr>
+            <p:cNvPr id="38" name="Straight Connector 37"/>
+            <p:cNvCxnSpPr/>
+            <p:nvPr/>
+          </p:nvCxnSpPr>
+          <p:spPr>
+            <a:xfrm>
+              <a:off x="684225" y="171716"/>
+              <a:ext cx="0" cy="6511464"/>
+            </a:xfrm>
+            <a:prstGeom prst="line">
+              <a:avLst/>
+            </a:prstGeom>
+            <a:ln w="12700">
+              <a:solidFill>
+                <a:srgbClr val="BCBCBC">
+                  <a:alpha val="29804"/>
+                </a:srgbClr>
+              </a:solidFill>
+              <a:prstDash val="sysDot"/>
+            </a:ln>
+          </p:spPr>
+          <p:style>
+            <a:lnRef idx="1">
+              <a:schemeClr val="accent1"/>
+            </a:lnRef>
+            <a:fillRef idx="0">
+              <a:schemeClr val="accent1"/>
+            </a:fillRef>
+            <a:effectRef idx="0">
+              <a:schemeClr val="accent1"/>
+            </a:effectRef>
+            <a:fontRef idx="minor">
+              <a:schemeClr val="tx1"/>
+            </a:fontRef>
+          </p:style>
+        </p:cxnSp>
+        <p:cxnSp>
+          <p:nvCxnSpPr>
+            <p:cNvPr id="39" name="Straight Connector 38"/>
+            <p:cNvCxnSpPr/>
+            <p:nvPr/>
+          </p:nvCxnSpPr>
+          <p:spPr>
+            <a:xfrm>
+              <a:off x="11508412" y="173267"/>
+              <a:ext cx="0" cy="6511464"/>
+            </a:xfrm>
+            <a:prstGeom prst="line">
+              <a:avLst/>
+            </a:prstGeom>
+            <a:ln w="12700">
+              <a:solidFill>
+                <a:srgbClr val="BCBCBC">
+                  <a:alpha val="29804"/>
+                </a:srgbClr>
+              </a:solidFill>
+              <a:prstDash val="sysDot"/>
+            </a:ln>
+          </p:spPr>
+          <p:style>
+            <a:lnRef idx="1">
+              <a:schemeClr val="accent1"/>
+            </a:lnRef>
+            <a:fillRef idx="0">
+              <a:schemeClr val="accent1"/>
+            </a:fillRef>
+            <a:effectRef idx="0">
+              <a:schemeClr val="accent1"/>
+            </a:effectRef>
+            <a:fontRef idx="minor">
+              <a:schemeClr val="tx1"/>
+            </a:fontRef>
+          </p:style>
+        </p:cxnSp>
+      </p:grpSp>
+      <p:sp>
+        <p:nvSpPr>
+          <p:cNvPr id="2" name="Title 1"/>
+          <p:cNvSpPr>
+            <a:spLocks noGrp="1"/>
+          </p:cNvSpPr>
+          <p:nvPr>
+            <p:ph type="title"/>
+          </p:nvPr>
+        </p:nvSpPr>
+        <p:spPr>
+          <a:xfrm>
+            <a:off x="7120955" y="713678"/>
+            <a:ext cx="4434823" cy="1490078"/>
+          </a:xfrm>
+        </p:spPr>
+        <p:txBody>
+          <a:bodyPr anchor="b">
+            <a:normAutofit/>
+          </a:bodyPr>
+          <a:lstStyle>
+            <a:lvl1pPr>
+              <a:defRPr sz="3600"/>
+            </a:lvl1pPr>
+          </a:lstStyle>
+          <a:p>
+            <a:r>
+              <a:rPr lang="en-US" dirty="0"/>
+              <a:t>Click to edit Master title style</a:t>
+            </a:r>
+          </a:p>
+        </p:txBody>
+      </p:sp>
+      <p:sp>
+        <p:nvSpPr>
+          <p:cNvPr id="40" name="Right Triangle 39"/>
+          <p:cNvSpPr/>
+          <p:nvPr/>
+        </p:nvSpPr>
+        <p:spPr>
+          <a:xfrm rot="2700000">
+            <a:off x="11901643" y="1050650"/>
+            <a:ext cx="568289" cy="568289"/>
+          </a:xfrm>
+          <a:prstGeom prst="rtTriangle">
+            <a:avLst/>
+          </a:prstGeom>
+          <a:solidFill>
+            <a:schemeClr val="accent1">
+              <a:alpha val="50000"/>
+            </a:schemeClr>
+          </a:solidFill>
+          <a:ln>
+            <a:noFill/>
+          </a:ln>
+        </p:spPr>
+        <p:style>
+          <a:lnRef idx="2">
+            <a:schemeClr val="accent1">
+              <a:shade val="50000"/>
+            </a:schemeClr>
+          </a:lnRef>
+          <a:fillRef idx="1">
+            <a:schemeClr val="accent1"/>
+          </a:fillRef>
+          <a:effectRef idx="0">
+            <a:schemeClr val="accent1"/>
+          </a:effectRef>
+          <a:fontRef idx="minor">
+            <a:schemeClr val="lt1"/>
+          </a:fontRef>
+        </p:style>
+        <p:txBody>
+          <a:bodyPr rtlCol="0" anchor="ctr"/>
+          <a:lstStyle/>
+          <a:p>
+            <a:pPr algn="ctr"/>
+            <a:endParaRPr lang="en-US">
+              <a:solidFill>
+                <a:schemeClr val="tx1"/>
+              </a:solidFill>
+            </a:endParaRPr>
+          </a:p>
+        </p:txBody>
+      </p:sp>
+      <p:sp>
+        <p:nvSpPr>
+          <p:cNvPr id="42" name="Text Placeholder 41">
+            <a:extLst>
+              <a:ext uri="{FF2B5EF4-FFF2-40B4-BE49-F238E27FC236}">
+                <a16:creationId xmlns:a16="http://schemas.microsoft.com/office/drawing/2014/main" id="{1233D36C-7D80-714A-B421-3A9542E9AEC8}"/>
+              </a:ext>
+            </a:extLst>
+          </p:cNvPr>
+          <p:cNvSpPr>
+            <a:spLocks noGrp="1"/>
+          </p:cNvSpPr>
+          <p:nvPr>
+            <p:ph type="body" sz="quarter" idx="13"/>
+          </p:nvPr>
+        </p:nvSpPr>
+        <p:spPr>
+          <a:xfrm>
+            <a:off x="7138206" y="2375471"/>
+            <a:ext cx="4419058" cy="3767021"/>
+          </a:xfrm>
+        </p:spPr>
+        <p:txBody>
+          <a:bodyPr>
+            <a:normAutofit/>
+          </a:bodyPr>
+          <a:lstStyle>
+            <a:lvl1pPr>
+              <a:defRPr sz="1800"/>
+            </a:lvl1pPr>
+            <a:lvl2pPr>
+              <a:defRPr sz="1600"/>
+            </a:lvl2pPr>
+            <a:lvl3pPr>
+              <a:defRPr sz="1400"/>
+            </a:lvl3pPr>
+            <a:lvl4pPr>
+              <a:defRPr sz="1200"/>
+            </a:lvl4pPr>
+            <a:lvl5pPr>
+              <a:defRPr sz="1200"/>
+            </a:lvl5pPr>
+          </a:lstStyle>
+          <a:p>
+            <a:pPr lvl="0"/>
+            <a:r>
+              <a:rPr lang="en-US" dirty="0"/>
+              <a:t>Click to edit Master text styles</a:t>
+            </a:r>
+          </a:p>
+          <a:p>
+            <a:pPr lvl="1"/>
+            <a:r>
+              <a:rPr lang="en-US" dirty="0"/>
+              <a:t>Second level</a:t>
+            </a:r>
+          </a:p>
+          <a:p>
+            <a:pPr lvl="2"/>
+            <a:r>
+              <a:rPr lang="en-US" dirty="0"/>
+              <a:t>Third level</a:t>
+            </a:r>
+          </a:p>
+          <a:p>
+            <a:pPr lvl="3"/>
+            <a:r>
+              <a:rPr lang="en-US" dirty="0"/>
+              <a:t>Fourth level</a:t>
+            </a:r>
+          </a:p>
+          <a:p>
+            <a:pPr lvl="4"/>
+            <a:r>
+              <a:rPr lang="en-US" dirty="0"/>
+              <a:t>Fifth level</a:t>
+            </a:r>
+            <a:endParaRPr lang="en-CN" dirty="0"/>
+          </a:p>
+        </p:txBody>
+      </p:sp>
+      <p:sp>
+        <p:nvSpPr>
+          <p:cNvPr id="4" name="Picture Placeholder 12">
+            <a:extLst>
+              <a:ext uri="{FF2B5EF4-FFF2-40B4-BE49-F238E27FC236}">
+                <a16:creationId xmlns:a16="http://schemas.microsoft.com/office/drawing/2014/main" id="{8AFDF614-6457-A597-813C-4E49D8BBEE49}"/>
+              </a:ext>
+            </a:extLst>
+          </p:cNvPr>
+          <p:cNvSpPr>
+            <a:spLocks noGrp="1"/>
+          </p:cNvSpPr>
+          <p:nvPr>
+            <p:ph type="pic" sz="quarter" idx="10"/>
+          </p:nvPr>
+        </p:nvSpPr>
+        <p:spPr>
+          <a:xfrm>
+            <a:off x="431781" y="713677"/>
+            <a:ext cx="6439899" cy="5428167"/>
+          </a:xfrm>
+        </p:spPr>
+        <p:txBody>
+          <a:bodyPr/>
+          <a:lstStyle/>
+          <a:p>
+            <a:endParaRPr lang="en-CN"/>
+          </a:p>
+        </p:txBody>
+      </p:sp>
+    </p:spTree>
+    <p:extLst>
+      <p:ext uri="{BB962C8B-B14F-4D97-AF65-F5344CB8AC3E}">
+        <p14:creationId xmlns:p14="http://schemas.microsoft.com/office/powerpoint/2010/main" val="79095646"/>
+      </p:ext>
+    </p:extLst>
+  </p:cSld>
+  <p:clrMapOvr>
+    <a:masterClrMapping/>
+  </p:clrMapOvr>
+</p:sldLayout>
+</file>
+
+<file path=ppt/slideLayouts/slideLayout7.xml><?xml version="1.0" encoding="utf-8"?>
+<p:sldLayout xmlns:a="http://schemas.openxmlformats.org/drawingml/2006/main" xmlns:r="http://schemas.openxmlformats.org/officeDocument/2006/relationships" xmlns:p="http://schemas.openxmlformats.org/presentationml/2006/main" showMasterSp="0" preserve="1" userDrawn="1">
   <p:cSld name="Title, Content, Picture 0">
     <p:spTree>
       <p:nvGrpSpPr>
@@ -10444,7 +10558,7 @@
 </p:sldLayout>
 </file>
 
-<file path=ppt/slideLayouts/slideLayout7.xml><?xml version="1.0" encoding="utf-8"?>
+<file path=ppt/slideLayouts/slideLayout8.xml><?xml version="1.0" encoding="utf-8"?>
 <p:sldLayout xmlns:a="http://schemas.openxmlformats.org/drawingml/2006/main" xmlns:r="http://schemas.openxmlformats.org/officeDocument/2006/relationships" xmlns:p="http://schemas.openxmlformats.org/presentationml/2006/main" showMasterSp="0" preserve="1" userDrawn="1">
   <p:cSld name="Title, Content, Picture 2">
     <p:spTree>
@@ -11672,26 +11786,26 @@
         </p:nvSpPr>
         <p:spPr>
           <a:xfrm>
-            <a:off x="691079" y="1410196"/>
-            <a:ext cx="10325000" cy="1475914"/>
+            <a:off x="691079" y="929822"/>
+            <a:ext cx="10325000" cy="1241700"/>
           </a:xfrm>
         </p:spPr>
         <p:txBody>
           <a:bodyPr>
-            <a:normAutofit/>
+            <a:noAutofit/>
           </a:bodyPr>
           <a:lstStyle>
             <a:lvl1pPr>
-              <a:defRPr sz="1800"/>
+              <a:defRPr sz="1600"/>
             </a:lvl1pPr>
             <a:lvl2pPr>
-              <a:defRPr sz="1600"/>
+              <a:defRPr sz="1400"/>
             </a:lvl2pPr>
             <a:lvl3pPr>
-              <a:defRPr sz="1400"/>
+              <a:defRPr sz="1200"/>
             </a:lvl3pPr>
             <a:lvl4pPr>
-              <a:defRPr sz="1200"/>
+              <a:defRPr sz="1100"/>
             </a:lvl4pPr>
           </a:lstStyle>
           <a:p>
@@ -11742,7 +11856,7 @@
         </p:nvSpPr>
         <p:spPr>
           <a:xfrm>
-            <a:off x="691079" y="390160"/>
+            <a:off x="691079" y="28510"/>
             <a:ext cx="10325000" cy="695599"/>
           </a:xfrm>
         </p:spPr>
@@ -11765,36 +11879,6 @@
       </p:sp>
       <p:sp>
         <p:nvSpPr>
-          <p:cNvPr id="2" name="Picture Placeholder 12">
-            <a:extLst>
-              <a:ext uri="{FF2B5EF4-FFF2-40B4-BE49-F238E27FC236}">
-                <a16:creationId xmlns:a16="http://schemas.microsoft.com/office/drawing/2014/main" id="{87649066-A930-D161-BFBB-AAEFEF633CA8}"/>
-              </a:ext>
-            </a:extLst>
-          </p:cNvPr>
-          <p:cNvSpPr>
-            <a:spLocks noGrp="1"/>
-          </p:cNvSpPr>
-          <p:nvPr>
-            <p:ph type="pic" sz="quarter" idx="11"/>
-          </p:nvPr>
-        </p:nvSpPr>
-        <p:spPr>
-          <a:xfrm>
-            <a:off x="6722442" y="3053008"/>
-            <a:ext cx="4264589" cy="3519231"/>
-          </a:xfrm>
-        </p:spPr>
-        <p:txBody>
-          <a:bodyPr/>
-          <a:lstStyle/>
-          <a:p>
-            <a:endParaRPr lang="en-CN" dirty="0"/>
-          </a:p>
-        </p:txBody>
-      </p:sp>
-      <p:sp>
-        <p:nvSpPr>
           <p:cNvPr id="39" name="Picture Placeholder 12">
             <a:extLst>
               <a:ext uri="{FF2B5EF4-FFF2-40B4-BE49-F238E27FC236}">
@@ -11811,8 +11895,8 @@
         </p:nvSpPr>
         <p:spPr>
           <a:xfrm>
-            <a:off x="677374" y="3053007"/>
-            <a:ext cx="5723423" cy="3519231"/>
+            <a:off x="677374" y="2244445"/>
+            <a:ext cx="10326270" cy="4599234"/>
           </a:xfrm>
         </p:spPr>
         <p:txBody>
@@ -11836,9 +11920,9 @@
 </p:sldLayout>
 </file>
 
-<file path=ppt/slideLayouts/slideLayout8.xml><?xml version="1.0" encoding="utf-8"?>
+<file path=ppt/slideLayouts/slideLayout9.xml><?xml version="1.0" encoding="utf-8"?>
 <p:sldLayout xmlns:a="http://schemas.openxmlformats.org/drawingml/2006/main" xmlns:r="http://schemas.openxmlformats.org/officeDocument/2006/relationships" xmlns:p="http://schemas.openxmlformats.org/presentationml/2006/main" showMasterSp="0" preserve="1" userDrawn="1">
-  <p:cSld name="Title, Content, Picture 3">
+  <p:cSld name="Title, Picture 0">
     <p:spTree>
       <p:nvGrpSpPr>
         <p:cNvPr id="1" name=""/>
@@ -11857,7 +11941,7 @@
         <p:nvGrpSpPr>
           <p:cNvPr id="5" name="Group 4"/>
           <p:cNvGrpSpPr/>
-          <p:nvPr userDrawn="1"/>
+          <p:nvPr/>
         </p:nvGrpSpPr>
         <p:grpSpPr>
           <a:xfrm>
@@ -13048,10 +13132,10 @@
       </p:grpSp>
       <p:sp>
         <p:nvSpPr>
-          <p:cNvPr id="3" name="Content Placeholder 2">
+          <p:cNvPr id="38" name="Picture Placeholder 37">
             <a:extLst>
               <a:ext uri="{FF2B5EF4-FFF2-40B4-BE49-F238E27FC236}">
-                <a16:creationId xmlns:a16="http://schemas.microsoft.com/office/drawing/2014/main" id="{E4888EAA-7CC8-7452-CD07-51C96DF132EC}"/>
+                <a16:creationId xmlns:a16="http://schemas.microsoft.com/office/drawing/2014/main" id="{BC0FE04E-8B1F-5AAB-0D71-93977D91780A}"/>
               </a:ext>
             </a:extLst>
           </p:cNvPr>
@@ -13059,69 +13143,29 @@
             <a:spLocks noGrp="1"/>
           </p:cNvSpPr>
           <p:nvPr>
-            <p:ph idx="1"/>
+            <p:ph type="pic" sz="quarter" idx="10"/>
           </p:nvPr>
         </p:nvSpPr>
         <p:spPr>
           <a:xfrm>
-            <a:off x="691079" y="1410196"/>
-            <a:ext cx="10325000" cy="1475914"/>
+            <a:off x="-6215" y="-2"/>
+            <a:ext cx="12169165" cy="6857998"/>
           </a:xfrm>
         </p:spPr>
         <p:txBody>
-          <a:bodyPr>
-            <a:normAutofit/>
-          </a:bodyPr>
-          <a:lstStyle>
-            <a:lvl1pPr>
-              <a:defRPr sz="1800"/>
-            </a:lvl1pPr>
-            <a:lvl2pPr>
-              <a:defRPr sz="1600"/>
-            </a:lvl2pPr>
-            <a:lvl3pPr>
-              <a:defRPr sz="1400"/>
-            </a:lvl3pPr>
-            <a:lvl4pPr>
-              <a:defRPr sz="1200"/>
-            </a:lvl4pPr>
-          </a:lstStyle>
+          <a:bodyPr/>
+          <a:lstStyle/>
           <a:p>
-            <a:pPr lvl="0"/>
-            <a:r>
-              <a:rPr lang="en-US" dirty="0"/>
-              <a:t>Click to edit Master text styles</a:t>
-            </a:r>
-          </a:p>
-          <a:p>
-            <a:pPr lvl="1"/>
-            <a:r>
-              <a:rPr lang="en-US" dirty="0"/>
-              <a:t>Second level</a:t>
-            </a:r>
-          </a:p>
-          <a:p>
-            <a:pPr lvl="2"/>
-            <a:r>
-              <a:rPr lang="en-US" dirty="0"/>
-              <a:t>Third level</a:t>
-            </a:r>
-          </a:p>
-          <a:p>
-            <a:pPr lvl="3"/>
-            <a:r>
-              <a:rPr lang="en-US" dirty="0"/>
-              <a:t>Fourth level</a:t>
-            </a:r>
+            <a:endParaRPr lang="en-CN"/>
           </a:p>
         </p:txBody>
       </p:sp>
       <p:sp>
         <p:nvSpPr>
-          <p:cNvPr id="4" name="Title 1">
+          <p:cNvPr id="40" name="Title 1">
             <a:extLst>
               <a:ext uri="{FF2B5EF4-FFF2-40B4-BE49-F238E27FC236}">
-                <a16:creationId xmlns:a16="http://schemas.microsoft.com/office/drawing/2014/main" id="{3FB0C965-27F1-6BE0-F0CD-51B56C0A7AB2}"/>
+                <a16:creationId xmlns:a16="http://schemas.microsoft.com/office/drawing/2014/main" id="{6B2C9348-E48E-5174-E099-8CDD4966B455}"/>
               </a:ext>
             </a:extLst>
           </p:cNvPr>
@@ -13134,17 +13178,30 @@
         </p:nvSpPr>
         <p:spPr>
           <a:xfrm>
-            <a:off x="691079" y="390160"/>
-            <a:ext cx="10325000" cy="695599"/>
+            <a:off x="876752" y="725951"/>
+            <a:ext cx="9940581" cy="1893175"/>
           </a:xfrm>
         </p:spPr>
         <p:txBody>
-          <a:bodyPr>
+          <a:bodyPr anchor="ctr">
             <a:normAutofit/>
           </a:bodyPr>
           <a:lstStyle>
-            <a:lvl1pPr>
-              <a:defRPr sz="3200"/>
+            <a:lvl1pPr algn="ctr">
+              <a:defRPr kumimoji="0" lang="en-US" sz="5200" b="1" i="0" u="none" strike="noStrike" kern="1200" cap="none" spc="0" normalizeH="0" baseline="0" dirty="0">
+                <a:ln>
+                  <a:noFill/>
+                </a:ln>
+                <a:solidFill>
+                  <a:srgbClr val="FFFFFF"/>
+                </a:solidFill>
+                <a:effectLst/>
+                <a:uLnTx/>
+                <a:uFillTx/>
+                <a:latin typeface="Helvetica Neue Medium" panose="02000503000000020004"/>
+                <a:ea typeface="Helvetica Neue Medium" panose="02000503000000020004"/>
+                <a:cs typeface="Helvetica Neue Medium" panose="02000503000000020004"/>
+              </a:defRPr>
             </a:lvl1pPr>
           </a:lstStyle>
           <a:p>
@@ -13155,1462 +13212,10 @@
           </a:p>
         </p:txBody>
       </p:sp>
-      <p:sp>
-        <p:nvSpPr>
-          <p:cNvPr id="37" name="Picture Placeholder 37">
-            <a:extLst>
-              <a:ext uri="{FF2B5EF4-FFF2-40B4-BE49-F238E27FC236}">
-                <a16:creationId xmlns:a16="http://schemas.microsoft.com/office/drawing/2014/main" id="{8E41F4FA-B84A-EDFD-BC14-CB808F3D7496}"/>
-              </a:ext>
-            </a:extLst>
-          </p:cNvPr>
-          <p:cNvSpPr>
-            <a:spLocks noGrp="1"/>
-          </p:cNvSpPr>
-          <p:nvPr>
-            <p:ph type="pic" sz="quarter" idx="10"/>
-          </p:nvPr>
-        </p:nvSpPr>
-        <p:spPr>
-          <a:xfrm>
-            <a:off x="691078" y="3053020"/>
-            <a:ext cx="3900870" cy="3519237"/>
-          </a:xfrm>
-        </p:spPr>
-        <p:txBody>
-          <a:bodyPr/>
-          <a:lstStyle/>
-          <a:p>
-            <a:endParaRPr lang="en-CN"/>
-          </a:p>
-        </p:txBody>
-      </p:sp>
-      <p:sp>
-        <p:nvSpPr>
-          <p:cNvPr id="38" name="Picture Placeholder 37">
-            <a:extLst>
-              <a:ext uri="{FF2B5EF4-FFF2-40B4-BE49-F238E27FC236}">
-                <a16:creationId xmlns:a16="http://schemas.microsoft.com/office/drawing/2014/main" id="{4056F9A8-6C2C-A446-FFA4-8414D183DE8D}"/>
-              </a:ext>
-            </a:extLst>
-          </p:cNvPr>
-          <p:cNvSpPr>
-            <a:spLocks noGrp="1"/>
-          </p:cNvSpPr>
-          <p:nvPr>
-            <p:ph type="pic" sz="quarter" idx="11"/>
-          </p:nvPr>
-        </p:nvSpPr>
-        <p:spPr>
-          <a:xfrm>
-            <a:off x="4784475" y="3053020"/>
-            <a:ext cx="6202561" cy="3519237"/>
-          </a:xfrm>
-        </p:spPr>
-        <p:txBody>
-          <a:bodyPr/>
-          <a:lstStyle/>
-          <a:p>
-            <a:endParaRPr lang="en-CN"/>
-          </a:p>
-        </p:txBody>
-      </p:sp>
     </p:spTree>
     <p:extLst>
       <p:ext uri="{BB962C8B-B14F-4D97-AF65-F5344CB8AC3E}">
-        <p14:creationId xmlns:p14="http://schemas.microsoft.com/office/powerpoint/2010/main" val="1164732475"/>
-      </p:ext>
-    </p:extLst>
-  </p:cSld>
-  <p:clrMapOvr>
-    <a:masterClrMapping/>
-  </p:clrMapOvr>
-</p:sldLayout>
-</file>
-
-<file path=ppt/slideLayouts/slideLayout9.xml><?xml version="1.0" encoding="utf-8"?>
-<p:sldLayout xmlns:a="http://schemas.openxmlformats.org/drawingml/2006/main" xmlns:r="http://schemas.openxmlformats.org/officeDocument/2006/relationships" xmlns:p="http://schemas.openxmlformats.org/presentationml/2006/main" showMasterSp="0" preserve="1" userDrawn="1">
-  <p:cSld name="Title, Content, Picture 4">
-    <p:spTree>
-      <p:nvGrpSpPr>
-        <p:cNvPr id="1" name=""/>
-        <p:cNvGrpSpPr/>
-        <p:nvPr/>
-      </p:nvGrpSpPr>
-      <p:grpSpPr>
-        <a:xfrm>
-          <a:off x="0" y="0"/>
-          <a:ext cx="0" cy="0"/>
-          <a:chOff x="0" y="0"/>
-          <a:chExt cx="0" cy="0"/>
-        </a:xfrm>
-      </p:grpSpPr>
-      <p:grpSp>
-        <p:nvGrpSpPr>
-          <p:cNvPr id="5" name="Group 4"/>
-          <p:cNvGrpSpPr/>
-          <p:nvPr userDrawn="1"/>
-        </p:nvGrpSpPr>
-        <p:grpSpPr>
-          <a:xfrm>
-            <a:off x="-6214" y="-1"/>
-            <a:ext cx="12214827" cy="6858000"/>
-            <a:chOff x="-6214" y="-1"/>
-            <a:chExt cx="12214827" cy="6858000"/>
-          </a:xfrm>
-        </p:grpSpPr>
-        <p:cxnSp>
-          <p:nvCxnSpPr>
-            <p:cNvPr id="6" name="Straight Connector 5"/>
-            <p:cNvCxnSpPr/>
-            <p:nvPr/>
-          </p:nvCxnSpPr>
-          <p:spPr>
-            <a:xfrm>
-              <a:off x="-6214" y="6686283"/>
-              <a:ext cx="12192000" cy="0"/>
-            </a:xfrm>
-            <a:prstGeom prst="line">
-              <a:avLst/>
-            </a:prstGeom>
-            <a:ln w="12700">
-              <a:solidFill>
-                <a:srgbClr val="BCBCBC">
-                  <a:alpha val="29804"/>
-                </a:srgbClr>
-              </a:solidFill>
-              <a:prstDash val="sysDot"/>
-            </a:ln>
-          </p:spPr>
-          <p:style>
-            <a:lnRef idx="1">
-              <a:schemeClr val="accent1"/>
-            </a:lnRef>
-            <a:fillRef idx="0">
-              <a:schemeClr val="accent1"/>
-            </a:fillRef>
-            <a:effectRef idx="0">
-              <a:schemeClr val="accent1"/>
-            </a:effectRef>
-            <a:fontRef idx="minor">
-              <a:schemeClr val="tx1"/>
-            </a:fontRef>
-          </p:style>
-        </p:cxnSp>
-        <p:cxnSp>
-          <p:nvCxnSpPr>
-            <p:cNvPr id="7" name="Straight Connector 6"/>
-            <p:cNvCxnSpPr/>
-            <p:nvPr/>
-          </p:nvCxnSpPr>
-          <p:spPr>
-            <a:xfrm>
-              <a:off x="0" y="-1"/>
-              <a:ext cx="0" cy="6858000"/>
-            </a:xfrm>
-            <a:prstGeom prst="line">
-              <a:avLst/>
-            </a:prstGeom>
-            <a:ln w="12700">
-              <a:solidFill>
-                <a:srgbClr val="BCBCBC">
-                  <a:alpha val="29804"/>
-                </a:srgbClr>
-              </a:solidFill>
-              <a:prstDash val="sysDot"/>
-            </a:ln>
-          </p:spPr>
-          <p:style>
-            <a:lnRef idx="1">
-              <a:schemeClr val="accent1"/>
-            </a:lnRef>
-            <a:fillRef idx="0">
-              <a:schemeClr val="accent1"/>
-            </a:fillRef>
-            <a:effectRef idx="0">
-              <a:schemeClr val="accent1"/>
-            </a:effectRef>
-            <a:fontRef idx="minor">
-              <a:schemeClr val="tx1"/>
-            </a:fontRef>
-          </p:style>
-        </p:cxnSp>
-        <p:cxnSp>
-          <p:nvCxnSpPr>
-            <p:cNvPr id="8" name="Straight Connector 7"/>
-            <p:cNvCxnSpPr/>
-            <p:nvPr/>
-          </p:nvCxnSpPr>
-          <p:spPr>
-            <a:xfrm>
-              <a:off x="11993258" y="-1"/>
-              <a:ext cx="0" cy="6858000"/>
-            </a:xfrm>
-            <a:prstGeom prst="line">
-              <a:avLst/>
-            </a:prstGeom>
-            <a:ln w="12700">
-              <a:solidFill>
-                <a:srgbClr val="BCBCBC">
-                  <a:alpha val="29804"/>
-                </a:srgbClr>
-              </a:solidFill>
-              <a:prstDash val="sysDot"/>
-            </a:ln>
-          </p:spPr>
-          <p:style>
-            <a:lnRef idx="1">
-              <a:schemeClr val="accent1"/>
-            </a:lnRef>
-            <a:fillRef idx="0">
-              <a:schemeClr val="accent1"/>
-            </a:fillRef>
-            <a:effectRef idx="0">
-              <a:schemeClr val="accent1"/>
-            </a:effectRef>
-            <a:fontRef idx="minor">
-              <a:schemeClr val="tx1"/>
-            </a:fontRef>
-          </p:style>
-        </p:cxnSp>
-        <p:cxnSp>
-          <p:nvCxnSpPr>
-            <p:cNvPr id="9" name="Straight Connector 8"/>
-            <p:cNvCxnSpPr/>
-            <p:nvPr/>
-          </p:nvCxnSpPr>
-          <p:spPr>
-            <a:xfrm>
-              <a:off x="192528" y="-1"/>
-              <a:ext cx="0" cy="6858000"/>
-            </a:xfrm>
-            <a:prstGeom prst="line">
-              <a:avLst/>
-            </a:prstGeom>
-            <a:ln w="12700">
-              <a:solidFill>
-                <a:srgbClr val="BCBCBC">
-                  <a:alpha val="29804"/>
-                </a:srgbClr>
-              </a:solidFill>
-              <a:prstDash val="sysDot"/>
-            </a:ln>
-          </p:spPr>
-          <p:style>
-            <a:lnRef idx="1">
-              <a:schemeClr val="accent1"/>
-            </a:lnRef>
-            <a:fillRef idx="0">
-              <a:schemeClr val="accent1"/>
-            </a:fillRef>
-            <a:effectRef idx="0">
-              <a:schemeClr val="accent1"/>
-            </a:effectRef>
-            <a:fontRef idx="minor">
-              <a:schemeClr val="tx1"/>
-            </a:fontRef>
-          </p:style>
-        </p:cxnSp>
-        <p:cxnSp>
-          <p:nvCxnSpPr>
-            <p:cNvPr id="10" name="Straight Connector 9"/>
-            <p:cNvCxnSpPr/>
-            <p:nvPr/>
-          </p:nvCxnSpPr>
-          <p:spPr>
-            <a:xfrm>
-              <a:off x="1175922" y="-1"/>
-              <a:ext cx="0" cy="6858000"/>
-            </a:xfrm>
-            <a:prstGeom prst="line">
-              <a:avLst/>
-            </a:prstGeom>
-            <a:ln w="12700">
-              <a:solidFill>
-                <a:srgbClr val="BCBCBC">
-                  <a:alpha val="29804"/>
-                </a:srgbClr>
-              </a:solidFill>
-              <a:prstDash val="sysDot"/>
-            </a:ln>
-          </p:spPr>
-          <p:style>
-            <a:lnRef idx="1">
-              <a:schemeClr val="accent1"/>
-            </a:lnRef>
-            <a:fillRef idx="0">
-              <a:schemeClr val="accent1"/>
-            </a:fillRef>
-            <a:effectRef idx="0">
-              <a:schemeClr val="accent1"/>
-            </a:effectRef>
-            <a:fontRef idx="minor">
-              <a:schemeClr val="tx1"/>
-            </a:fontRef>
-          </p:style>
-        </p:cxnSp>
-        <p:cxnSp>
-          <p:nvCxnSpPr>
-            <p:cNvPr id="11" name="Straight Connector 10"/>
-            <p:cNvCxnSpPr/>
-            <p:nvPr/>
-          </p:nvCxnSpPr>
-          <p:spPr>
-            <a:xfrm>
-              <a:off x="2159316" y="-1"/>
-              <a:ext cx="0" cy="6858000"/>
-            </a:xfrm>
-            <a:prstGeom prst="line">
-              <a:avLst/>
-            </a:prstGeom>
-            <a:ln w="12700">
-              <a:solidFill>
-                <a:srgbClr val="BCBCBC">
-                  <a:alpha val="29804"/>
-                </a:srgbClr>
-              </a:solidFill>
-              <a:prstDash val="sysDot"/>
-            </a:ln>
-          </p:spPr>
-          <p:style>
-            <a:lnRef idx="1">
-              <a:schemeClr val="accent1"/>
-            </a:lnRef>
-            <a:fillRef idx="0">
-              <a:schemeClr val="accent1"/>
-            </a:fillRef>
-            <a:effectRef idx="0">
-              <a:schemeClr val="accent1"/>
-            </a:effectRef>
-            <a:fontRef idx="minor">
-              <a:schemeClr val="tx1"/>
-            </a:fontRef>
-          </p:style>
-        </p:cxnSp>
-        <p:cxnSp>
-          <p:nvCxnSpPr>
-            <p:cNvPr id="12" name="Straight Connector 11"/>
-            <p:cNvCxnSpPr/>
-            <p:nvPr/>
-          </p:nvCxnSpPr>
-          <p:spPr>
-            <a:xfrm>
-              <a:off x="3142710" y="-1"/>
-              <a:ext cx="0" cy="6858000"/>
-            </a:xfrm>
-            <a:prstGeom prst="line">
-              <a:avLst/>
-            </a:prstGeom>
-            <a:ln w="12700">
-              <a:solidFill>
-                <a:srgbClr val="BCBCBC">
-                  <a:alpha val="29804"/>
-                </a:srgbClr>
-              </a:solidFill>
-              <a:prstDash val="sysDot"/>
-            </a:ln>
-          </p:spPr>
-          <p:style>
-            <a:lnRef idx="1">
-              <a:schemeClr val="accent1"/>
-            </a:lnRef>
-            <a:fillRef idx="0">
-              <a:schemeClr val="accent1"/>
-            </a:fillRef>
-            <a:effectRef idx="0">
-              <a:schemeClr val="accent1"/>
-            </a:effectRef>
-            <a:fontRef idx="minor">
-              <a:schemeClr val="tx1"/>
-            </a:fontRef>
-          </p:style>
-        </p:cxnSp>
-        <p:cxnSp>
-          <p:nvCxnSpPr>
-            <p:cNvPr id="13" name="Straight Connector 12"/>
-            <p:cNvCxnSpPr/>
-            <p:nvPr/>
-          </p:nvCxnSpPr>
-          <p:spPr>
-            <a:xfrm>
-              <a:off x="4126104" y="-1"/>
-              <a:ext cx="0" cy="6858000"/>
-            </a:xfrm>
-            <a:prstGeom prst="line">
-              <a:avLst/>
-            </a:prstGeom>
-            <a:ln w="12700">
-              <a:solidFill>
-                <a:srgbClr val="BCBCBC">
-                  <a:alpha val="29804"/>
-                </a:srgbClr>
-              </a:solidFill>
-              <a:prstDash val="sysDot"/>
-            </a:ln>
-          </p:spPr>
-          <p:style>
-            <a:lnRef idx="1">
-              <a:schemeClr val="accent1"/>
-            </a:lnRef>
-            <a:fillRef idx="0">
-              <a:schemeClr val="accent1"/>
-            </a:fillRef>
-            <a:effectRef idx="0">
-              <a:schemeClr val="accent1"/>
-            </a:effectRef>
-            <a:fontRef idx="minor">
-              <a:schemeClr val="tx1"/>
-            </a:fontRef>
-          </p:style>
-        </p:cxnSp>
-        <p:cxnSp>
-          <p:nvCxnSpPr>
-            <p:cNvPr id="14" name="Straight Connector 13"/>
-            <p:cNvCxnSpPr/>
-            <p:nvPr/>
-          </p:nvCxnSpPr>
-          <p:spPr>
-            <a:xfrm>
-              <a:off x="5109498" y="-1"/>
-              <a:ext cx="0" cy="6858000"/>
-            </a:xfrm>
-            <a:prstGeom prst="line">
-              <a:avLst/>
-            </a:prstGeom>
-            <a:ln w="12700">
-              <a:solidFill>
-                <a:srgbClr val="BCBCBC">
-                  <a:alpha val="29804"/>
-                </a:srgbClr>
-              </a:solidFill>
-              <a:prstDash val="sysDot"/>
-            </a:ln>
-          </p:spPr>
-          <p:style>
-            <a:lnRef idx="1">
-              <a:schemeClr val="accent1"/>
-            </a:lnRef>
-            <a:fillRef idx="0">
-              <a:schemeClr val="accent1"/>
-            </a:fillRef>
-            <a:effectRef idx="0">
-              <a:schemeClr val="accent1"/>
-            </a:effectRef>
-            <a:fontRef idx="minor">
-              <a:schemeClr val="tx1"/>
-            </a:fontRef>
-          </p:style>
-        </p:cxnSp>
-        <p:cxnSp>
-          <p:nvCxnSpPr>
-            <p:cNvPr id="15" name="Straight Connector 14"/>
-            <p:cNvCxnSpPr/>
-            <p:nvPr/>
-          </p:nvCxnSpPr>
-          <p:spPr>
-            <a:xfrm>
-              <a:off x="6092892" y="-1"/>
-              <a:ext cx="0" cy="6858000"/>
-            </a:xfrm>
-            <a:prstGeom prst="line">
-              <a:avLst/>
-            </a:prstGeom>
-            <a:ln w="12700">
-              <a:solidFill>
-                <a:srgbClr val="BCBCBC">
-                  <a:alpha val="29804"/>
-                </a:srgbClr>
-              </a:solidFill>
-              <a:prstDash val="sysDot"/>
-            </a:ln>
-          </p:spPr>
-          <p:style>
-            <a:lnRef idx="1">
-              <a:schemeClr val="accent1"/>
-            </a:lnRef>
-            <a:fillRef idx="0">
-              <a:schemeClr val="accent1"/>
-            </a:fillRef>
-            <a:effectRef idx="0">
-              <a:schemeClr val="accent1"/>
-            </a:effectRef>
-            <a:fontRef idx="minor">
-              <a:schemeClr val="tx1"/>
-            </a:fontRef>
-          </p:style>
-        </p:cxnSp>
-        <p:cxnSp>
-          <p:nvCxnSpPr>
-            <p:cNvPr id="16" name="Straight Connector 15"/>
-            <p:cNvCxnSpPr/>
-            <p:nvPr/>
-          </p:nvCxnSpPr>
-          <p:spPr>
-            <a:xfrm>
-              <a:off x="7076286" y="-1"/>
-              <a:ext cx="0" cy="6858000"/>
-            </a:xfrm>
-            <a:prstGeom prst="line">
-              <a:avLst/>
-            </a:prstGeom>
-            <a:ln w="12700">
-              <a:solidFill>
-                <a:srgbClr val="BCBCBC">
-                  <a:alpha val="29804"/>
-                </a:srgbClr>
-              </a:solidFill>
-              <a:prstDash val="sysDot"/>
-            </a:ln>
-          </p:spPr>
-          <p:style>
-            <a:lnRef idx="1">
-              <a:schemeClr val="accent1"/>
-            </a:lnRef>
-            <a:fillRef idx="0">
-              <a:schemeClr val="accent1"/>
-            </a:fillRef>
-            <a:effectRef idx="0">
-              <a:schemeClr val="accent1"/>
-            </a:effectRef>
-            <a:fontRef idx="minor">
-              <a:schemeClr val="tx1"/>
-            </a:fontRef>
-          </p:style>
-        </p:cxnSp>
-        <p:cxnSp>
-          <p:nvCxnSpPr>
-            <p:cNvPr id="17" name="Straight Connector 16"/>
-            <p:cNvCxnSpPr/>
-            <p:nvPr/>
-          </p:nvCxnSpPr>
-          <p:spPr>
-            <a:xfrm>
-              <a:off x="8059680" y="-1"/>
-              <a:ext cx="0" cy="6858000"/>
-            </a:xfrm>
-            <a:prstGeom prst="line">
-              <a:avLst/>
-            </a:prstGeom>
-            <a:ln w="12700">
-              <a:solidFill>
-                <a:srgbClr val="BCBCBC">
-                  <a:alpha val="29804"/>
-                </a:srgbClr>
-              </a:solidFill>
-              <a:prstDash val="sysDot"/>
-            </a:ln>
-          </p:spPr>
-          <p:style>
-            <a:lnRef idx="1">
-              <a:schemeClr val="accent1"/>
-            </a:lnRef>
-            <a:fillRef idx="0">
-              <a:schemeClr val="accent1"/>
-            </a:fillRef>
-            <a:effectRef idx="0">
-              <a:schemeClr val="accent1"/>
-            </a:effectRef>
-            <a:fontRef idx="minor">
-              <a:schemeClr val="tx1"/>
-            </a:fontRef>
-          </p:style>
-        </p:cxnSp>
-        <p:cxnSp>
-          <p:nvCxnSpPr>
-            <p:cNvPr id="18" name="Straight Connector 17"/>
-            <p:cNvCxnSpPr/>
-            <p:nvPr/>
-          </p:nvCxnSpPr>
-          <p:spPr>
-            <a:xfrm>
-              <a:off x="9043074" y="-1"/>
-              <a:ext cx="0" cy="6858000"/>
-            </a:xfrm>
-            <a:prstGeom prst="line">
-              <a:avLst/>
-            </a:prstGeom>
-            <a:ln w="12700">
-              <a:solidFill>
-                <a:srgbClr val="BCBCBC">
-                  <a:alpha val="29804"/>
-                </a:srgbClr>
-              </a:solidFill>
-              <a:prstDash val="sysDot"/>
-            </a:ln>
-          </p:spPr>
-          <p:style>
-            <a:lnRef idx="1">
-              <a:schemeClr val="accent1"/>
-            </a:lnRef>
-            <a:fillRef idx="0">
-              <a:schemeClr val="accent1"/>
-            </a:fillRef>
-            <a:effectRef idx="0">
-              <a:schemeClr val="accent1"/>
-            </a:effectRef>
-            <a:fontRef idx="minor">
-              <a:schemeClr val="tx1"/>
-            </a:fontRef>
-          </p:style>
-        </p:cxnSp>
-        <p:cxnSp>
-          <p:nvCxnSpPr>
-            <p:cNvPr id="19" name="Straight Connector 18"/>
-            <p:cNvCxnSpPr/>
-            <p:nvPr/>
-          </p:nvCxnSpPr>
-          <p:spPr>
-            <a:xfrm>
-              <a:off x="10026468" y="-1"/>
-              <a:ext cx="0" cy="6858000"/>
-            </a:xfrm>
-            <a:prstGeom prst="line">
-              <a:avLst/>
-            </a:prstGeom>
-            <a:ln w="12700">
-              <a:solidFill>
-                <a:srgbClr val="BCBCBC">
-                  <a:alpha val="29804"/>
-                </a:srgbClr>
-              </a:solidFill>
-              <a:prstDash val="sysDot"/>
-            </a:ln>
-          </p:spPr>
-          <p:style>
-            <a:lnRef idx="1">
-              <a:schemeClr val="accent1"/>
-            </a:lnRef>
-            <a:fillRef idx="0">
-              <a:schemeClr val="accent1"/>
-            </a:fillRef>
-            <a:effectRef idx="0">
-              <a:schemeClr val="accent1"/>
-            </a:effectRef>
-            <a:fontRef idx="minor">
-              <a:schemeClr val="tx1"/>
-            </a:fontRef>
-          </p:style>
-        </p:cxnSp>
-        <p:cxnSp>
-          <p:nvCxnSpPr>
-            <p:cNvPr id="20" name="Straight Connector 19"/>
-            <p:cNvCxnSpPr/>
-            <p:nvPr/>
-          </p:nvCxnSpPr>
-          <p:spPr>
-            <a:xfrm>
-              <a:off x="11009862" y="-1"/>
-              <a:ext cx="0" cy="6858000"/>
-            </a:xfrm>
-            <a:prstGeom prst="line">
-              <a:avLst/>
-            </a:prstGeom>
-            <a:ln w="12700">
-              <a:solidFill>
-                <a:srgbClr val="BCBCBC">
-                  <a:alpha val="29804"/>
-                </a:srgbClr>
-              </a:solidFill>
-              <a:prstDash val="sysDot"/>
-            </a:ln>
-          </p:spPr>
-          <p:style>
-            <a:lnRef idx="1">
-              <a:schemeClr val="accent1"/>
-            </a:lnRef>
-            <a:fillRef idx="0">
-              <a:schemeClr val="accent1"/>
-            </a:fillRef>
-            <a:effectRef idx="0">
-              <a:schemeClr val="accent1"/>
-            </a:effectRef>
-            <a:fontRef idx="minor">
-              <a:schemeClr val="tx1"/>
-            </a:fontRef>
-          </p:style>
-        </p:cxnSp>
-        <p:cxnSp>
-          <p:nvCxnSpPr>
-            <p:cNvPr id="21" name="Straight Connector 20"/>
-            <p:cNvCxnSpPr/>
-            <p:nvPr/>
-          </p:nvCxnSpPr>
-          <p:spPr>
-            <a:xfrm>
-              <a:off x="12185786" y="-1"/>
-              <a:ext cx="0" cy="6858000"/>
-            </a:xfrm>
-            <a:prstGeom prst="line">
-              <a:avLst/>
-            </a:prstGeom>
-            <a:ln w="12700">
-              <a:solidFill>
-                <a:srgbClr val="BCBCBC">
-                  <a:alpha val="29804"/>
-                </a:srgbClr>
-              </a:solidFill>
-              <a:prstDash val="sysDot"/>
-            </a:ln>
-          </p:spPr>
-          <p:style>
-            <a:lnRef idx="1">
-              <a:schemeClr val="accent1"/>
-            </a:lnRef>
-            <a:fillRef idx="0">
-              <a:schemeClr val="accent1"/>
-            </a:fillRef>
-            <a:effectRef idx="0">
-              <a:schemeClr val="accent1"/>
-            </a:effectRef>
-            <a:fontRef idx="minor">
-              <a:schemeClr val="tx1"/>
-            </a:fontRef>
-          </p:style>
-        </p:cxnSp>
-        <p:cxnSp>
-          <p:nvCxnSpPr>
-            <p:cNvPr id="22" name="Straight Connector 21"/>
-            <p:cNvCxnSpPr/>
-            <p:nvPr/>
-          </p:nvCxnSpPr>
-          <p:spPr>
-            <a:xfrm>
-              <a:off x="0" y="171716"/>
-              <a:ext cx="12192000" cy="0"/>
-            </a:xfrm>
-            <a:prstGeom prst="line">
-              <a:avLst/>
-            </a:prstGeom>
-            <a:ln w="12700">
-              <a:solidFill>
-                <a:srgbClr val="BCBCBC">
-                  <a:alpha val="29804"/>
-                </a:srgbClr>
-              </a:solidFill>
-              <a:prstDash val="sysDot"/>
-            </a:ln>
-          </p:spPr>
-          <p:style>
-            <a:lnRef idx="1">
-              <a:schemeClr val="accent1"/>
-            </a:lnRef>
-            <a:fillRef idx="0">
-              <a:schemeClr val="accent1"/>
-            </a:fillRef>
-            <a:effectRef idx="0">
-              <a:schemeClr val="accent1"/>
-            </a:effectRef>
-            <a:fontRef idx="minor">
-              <a:schemeClr val="tx1"/>
-            </a:fontRef>
-          </p:style>
-        </p:cxnSp>
-        <p:cxnSp>
-          <p:nvCxnSpPr>
-            <p:cNvPr id="23" name="Straight Connector 22"/>
-            <p:cNvCxnSpPr/>
-            <p:nvPr/>
-          </p:nvCxnSpPr>
-          <p:spPr>
-            <a:xfrm>
-              <a:off x="0" y="714597"/>
-              <a:ext cx="12192000" cy="0"/>
-            </a:xfrm>
-            <a:prstGeom prst="line">
-              <a:avLst/>
-            </a:prstGeom>
-            <a:ln w="12700">
-              <a:solidFill>
-                <a:srgbClr val="BCBCBC">
-                  <a:alpha val="29804"/>
-                </a:srgbClr>
-              </a:solidFill>
-              <a:prstDash val="sysDot"/>
-            </a:ln>
-          </p:spPr>
-          <p:style>
-            <a:lnRef idx="1">
-              <a:schemeClr val="accent1"/>
-            </a:lnRef>
-            <a:fillRef idx="0">
-              <a:schemeClr val="accent1"/>
-            </a:fillRef>
-            <a:effectRef idx="0">
-              <a:schemeClr val="accent1"/>
-            </a:effectRef>
-            <a:fontRef idx="minor">
-              <a:schemeClr val="tx1"/>
-            </a:fontRef>
-          </p:style>
-        </p:cxnSp>
-        <p:cxnSp>
-          <p:nvCxnSpPr>
-            <p:cNvPr id="24" name="Straight Connector 23"/>
-            <p:cNvCxnSpPr/>
-            <p:nvPr/>
-          </p:nvCxnSpPr>
-          <p:spPr>
-            <a:xfrm>
-              <a:off x="0" y="1257478"/>
-              <a:ext cx="12192000" cy="0"/>
-            </a:xfrm>
-            <a:prstGeom prst="line">
-              <a:avLst/>
-            </a:prstGeom>
-            <a:ln w="12700">
-              <a:solidFill>
-                <a:srgbClr val="BCBCBC">
-                  <a:alpha val="29804"/>
-                </a:srgbClr>
-              </a:solidFill>
-              <a:prstDash val="sysDot"/>
-            </a:ln>
-          </p:spPr>
-          <p:style>
-            <a:lnRef idx="1">
-              <a:schemeClr val="accent1"/>
-            </a:lnRef>
-            <a:fillRef idx="0">
-              <a:schemeClr val="accent1"/>
-            </a:fillRef>
-            <a:effectRef idx="0">
-              <a:schemeClr val="accent1"/>
-            </a:effectRef>
-            <a:fontRef idx="minor">
-              <a:schemeClr val="tx1"/>
-            </a:fontRef>
-          </p:style>
-        </p:cxnSp>
-        <p:cxnSp>
-          <p:nvCxnSpPr>
-            <p:cNvPr id="25" name="Straight Connector 24"/>
-            <p:cNvCxnSpPr/>
-            <p:nvPr/>
-          </p:nvCxnSpPr>
-          <p:spPr>
-            <a:xfrm>
-              <a:off x="0" y="1800359"/>
-              <a:ext cx="12192000" cy="0"/>
-            </a:xfrm>
-            <a:prstGeom prst="line">
-              <a:avLst/>
-            </a:prstGeom>
-            <a:ln w="12700">
-              <a:solidFill>
-                <a:srgbClr val="BCBCBC">
-                  <a:alpha val="29804"/>
-                </a:srgbClr>
-              </a:solidFill>
-              <a:prstDash val="sysDot"/>
-            </a:ln>
-          </p:spPr>
-          <p:style>
-            <a:lnRef idx="1">
-              <a:schemeClr val="accent1"/>
-            </a:lnRef>
-            <a:fillRef idx="0">
-              <a:schemeClr val="accent1"/>
-            </a:fillRef>
-            <a:effectRef idx="0">
-              <a:schemeClr val="accent1"/>
-            </a:effectRef>
-            <a:fontRef idx="minor">
-              <a:schemeClr val="tx1"/>
-            </a:fontRef>
-          </p:style>
-        </p:cxnSp>
-        <p:cxnSp>
-          <p:nvCxnSpPr>
-            <p:cNvPr id="26" name="Straight Connector 25"/>
-            <p:cNvCxnSpPr/>
-            <p:nvPr/>
-          </p:nvCxnSpPr>
-          <p:spPr>
-            <a:xfrm>
-              <a:off x="0" y="2343240"/>
-              <a:ext cx="12192000" cy="0"/>
-            </a:xfrm>
-            <a:prstGeom prst="line">
-              <a:avLst/>
-            </a:prstGeom>
-            <a:ln w="12700">
-              <a:solidFill>
-                <a:srgbClr val="BCBCBC">
-                  <a:alpha val="29804"/>
-                </a:srgbClr>
-              </a:solidFill>
-              <a:prstDash val="sysDot"/>
-            </a:ln>
-          </p:spPr>
-          <p:style>
-            <a:lnRef idx="1">
-              <a:schemeClr val="accent1"/>
-            </a:lnRef>
-            <a:fillRef idx="0">
-              <a:schemeClr val="accent1"/>
-            </a:fillRef>
-            <a:effectRef idx="0">
-              <a:schemeClr val="accent1"/>
-            </a:effectRef>
-            <a:fontRef idx="minor">
-              <a:schemeClr val="tx1"/>
-            </a:fontRef>
-          </p:style>
-        </p:cxnSp>
-        <p:cxnSp>
-          <p:nvCxnSpPr>
-            <p:cNvPr id="27" name="Straight Connector 26"/>
-            <p:cNvCxnSpPr/>
-            <p:nvPr/>
-          </p:nvCxnSpPr>
-          <p:spPr>
-            <a:xfrm>
-              <a:off x="0" y="2886121"/>
-              <a:ext cx="12192000" cy="0"/>
-            </a:xfrm>
-            <a:prstGeom prst="line">
-              <a:avLst/>
-            </a:prstGeom>
-            <a:ln w="12700">
-              <a:solidFill>
-                <a:srgbClr val="BCBCBC">
-                  <a:alpha val="29804"/>
-                </a:srgbClr>
-              </a:solidFill>
-              <a:prstDash val="sysDot"/>
-            </a:ln>
-          </p:spPr>
-          <p:style>
-            <a:lnRef idx="1">
-              <a:schemeClr val="accent1"/>
-            </a:lnRef>
-            <a:fillRef idx="0">
-              <a:schemeClr val="accent1"/>
-            </a:fillRef>
-            <a:effectRef idx="0">
-              <a:schemeClr val="accent1"/>
-            </a:effectRef>
-            <a:fontRef idx="minor">
-              <a:schemeClr val="tx1"/>
-            </a:fontRef>
-          </p:style>
-        </p:cxnSp>
-        <p:cxnSp>
-          <p:nvCxnSpPr>
-            <p:cNvPr id="28" name="Straight Connector 27"/>
-            <p:cNvCxnSpPr/>
-            <p:nvPr/>
-          </p:nvCxnSpPr>
-          <p:spPr>
-            <a:xfrm>
-              <a:off x="0" y="3429002"/>
-              <a:ext cx="12192000" cy="0"/>
-            </a:xfrm>
-            <a:prstGeom prst="line">
-              <a:avLst/>
-            </a:prstGeom>
-            <a:ln w="12700">
-              <a:solidFill>
-                <a:srgbClr val="BCBCBC">
-                  <a:alpha val="29804"/>
-                </a:srgbClr>
-              </a:solidFill>
-              <a:prstDash val="sysDot"/>
-            </a:ln>
-          </p:spPr>
-          <p:style>
-            <a:lnRef idx="1">
-              <a:schemeClr val="accent1"/>
-            </a:lnRef>
-            <a:fillRef idx="0">
-              <a:schemeClr val="accent1"/>
-            </a:fillRef>
-            <a:effectRef idx="0">
-              <a:schemeClr val="accent1"/>
-            </a:effectRef>
-            <a:fontRef idx="minor">
-              <a:schemeClr val="tx1"/>
-            </a:fontRef>
-          </p:style>
-        </p:cxnSp>
-        <p:cxnSp>
-          <p:nvCxnSpPr>
-            <p:cNvPr id="29" name="Straight Connector 28"/>
-            <p:cNvCxnSpPr/>
-            <p:nvPr/>
-          </p:nvCxnSpPr>
-          <p:spPr>
-            <a:xfrm>
-              <a:off x="0" y="3971883"/>
-              <a:ext cx="12192000" cy="0"/>
-            </a:xfrm>
-            <a:prstGeom prst="line">
-              <a:avLst/>
-            </a:prstGeom>
-            <a:ln w="12700">
-              <a:solidFill>
-                <a:srgbClr val="BCBCBC">
-                  <a:alpha val="29804"/>
-                </a:srgbClr>
-              </a:solidFill>
-              <a:prstDash val="sysDot"/>
-            </a:ln>
-          </p:spPr>
-          <p:style>
-            <a:lnRef idx="1">
-              <a:schemeClr val="accent1"/>
-            </a:lnRef>
-            <a:fillRef idx="0">
-              <a:schemeClr val="accent1"/>
-            </a:fillRef>
-            <a:effectRef idx="0">
-              <a:schemeClr val="accent1"/>
-            </a:effectRef>
-            <a:fontRef idx="minor">
-              <a:schemeClr val="tx1"/>
-            </a:fontRef>
-          </p:style>
-        </p:cxnSp>
-        <p:cxnSp>
-          <p:nvCxnSpPr>
-            <p:cNvPr id="30" name="Straight Connector 29"/>
-            <p:cNvCxnSpPr/>
-            <p:nvPr/>
-          </p:nvCxnSpPr>
-          <p:spPr>
-            <a:xfrm>
-              <a:off x="0" y="4514764"/>
-              <a:ext cx="12192000" cy="0"/>
-            </a:xfrm>
-            <a:prstGeom prst="line">
-              <a:avLst/>
-            </a:prstGeom>
-            <a:ln w="12700">
-              <a:solidFill>
-                <a:srgbClr val="BCBCBC">
-                  <a:alpha val="29804"/>
-                </a:srgbClr>
-              </a:solidFill>
-              <a:prstDash val="sysDot"/>
-            </a:ln>
-          </p:spPr>
-          <p:style>
-            <a:lnRef idx="1">
-              <a:schemeClr val="accent1"/>
-            </a:lnRef>
-            <a:fillRef idx="0">
-              <a:schemeClr val="accent1"/>
-            </a:fillRef>
-            <a:effectRef idx="0">
-              <a:schemeClr val="accent1"/>
-            </a:effectRef>
-            <a:fontRef idx="minor">
-              <a:schemeClr val="tx1"/>
-            </a:fontRef>
-          </p:style>
-        </p:cxnSp>
-        <p:cxnSp>
-          <p:nvCxnSpPr>
-            <p:cNvPr id="31" name="Straight Connector 30"/>
-            <p:cNvCxnSpPr/>
-            <p:nvPr/>
-          </p:nvCxnSpPr>
-          <p:spPr>
-            <a:xfrm>
-              <a:off x="0" y="5057645"/>
-              <a:ext cx="12192000" cy="0"/>
-            </a:xfrm>
-            <a:prstGeom prst="line">
-              <a:avLst/>
-            </a:prstGeom>
-            <a:ln w="12700">
-              <a:solidFill>
-                <a:srgbClr val="BCBCBC">
-                  <a:alpha val="29804"/>
-                </a:srgbClr>
-              </a:solidFill>
-              <a:prstDash val="sysDot"/>
-            </a:ln>
-          </p:spPr>
-          <p:style>
-            <a:lnRef idx="1">
-              <a:schemeClr val="accent1"/>
-            </a:lnRef>
-            <a:fillRef idx="0">
-              <a:schemeClr val="accent1"/>
-            </a:fillRef>
-            <a:effectRef idx="0">
-              <a:schemeClr val="accent1"/>
-            </a:effectRef>
-            <a:fontRef idx="minor">
-              <a:schemeClr val="tx1"/>
-            </a:fontRef>
-          </p:style>
-        </p:cxnSp>
-        <p:cxnSp>
-          <p:nvCxnSpPr>
-            <p:cNvPr id="32" name="Straight Connector 31"/>
-            <p:cNvCxnSpPr/>
-            <p:nvPr/>
-          </p:nvCxnSpPr>
-          <p:spPr>
-            <a:xfrm>
-              <a:off x="0" y="5600526"/>
-              <a:ext cx="12192000" cy="0"/>
-            </a:xfrm>
-            <a:prstGeom prst="line">
-              <a:avLst/>
-            </a:prstGeom>
-            <a:ln w="12700">
-              <a:solidFill>
-                <a:srgbClr val="BCBCBC">
-                  <a:alpha val="29804"/>
-                </a:srgbClr>
-              </a:solidFill>
-              <a:prstDash val="sysDot"/>
-            </a:ln>
-          </p:spPr>
-          <p:style>
-            <a:lnRef idx="1">
-              <a:schemeClr val="accent1"/>
-            </a:lnRef>
-            <a:fillRef idx="0">
-              <a:schemeClr val="accent1"/>
-            </a:fillRef>
-            <a:effectRef idx="0">
-              <a:schemeClr val="accent1"/>
-            </a:effectRef>
-            <a:fontRef idx="minor">
-              <a:schemeClr val="tx1"/>
-            </a:fontRef>
-          </p:style>
-        </p:cxnSp>
-        <p:cxnSp>
-          <p:nvCxnSpPr>
-            <p:cNvPr id="33" name="Straight Connector 32"/>
-            <p:cNvCxnSpPr/>
-            <p:nvPr/>
-          </p:nvCxnSpPr>
-          <p:spPr>
-            <a:xfrm>
-              <a:off x="0" y="6857999"/>
-              <a:ext cx="12192000" cy="0"/>
-            </a:xfrm>
-            <a:prstGeom prst="line">
-              <a:avLst/>
-            </a:prstGeom>
-            <a:ln w="12700">
-              <a:solidFill>
-                <a:srgbClr val="BCBCBC">
-                  <a:alpha val="29804"/>
-                </a:srgbClr>
-              </a:solidFill>
-              <a:prstDash val="sysDot"/>
-            </a:ln>
-          </p:spPr>
-          <p:style>
-            <a:lnRef idx="1">
-              <a:schemeClr val="accent1"/>
-            </a:lnRef>
-            <a:fillRef idx="0">
-              <a:schemeClr val="accent1"/>
-            </a:fillRef>
-            <a:effectRef idx="0">
-              <a:schemeClr val="accent1"/>
-            </a:effectRef>
-            <a:fontRef idx="minor">
-              <a:schemeClr val="tx1"/>
-            </a:fontRef>
-          </p:style>
-        </p:cxnSp>
-        <p:cxnSp>
-          <p:nvCxnSpPr>
-            <p:cNvPr id="34" name="Straight Connector 33"/>
-            <p:cNvCxnSpPr/>
-            <p:nvPr/>
-          </p:nvCxnSpPr>
-          <p:spPr>
-            <a:xfrm>
-              <a:off x="16613" y="6143407"/>
-              <a:ext cx="12192000" cy="0"/>
-            </a:xfrm>
-            <a:prstGeom prst="line">
-              <a:avLst/>
-            </a:prstGeom>
-            <a:ln w="12700">
-              <a:solidFill>
-                <a:srgbClr val="BCBCBC">
-                  <a:alpha val="29804"/>
-                </a:srgbClr>
-              </a:solidFill>
-              <a:prstDash val="sysDot"/>
-            </a:ln>
-          </p:spPr>
-          <p:style>
-            <a:lnRef idx="1">
-              <a:schemeClr val="accent1"/>
-            </a:lnRef>
-            <a:fillRef idx="0">
-              <a:schemeClr val="accent1"/>
-            </a:fillRef>
-            <a:effectRef idx="0">
-              <a:schemeClr val="accent1"/>
-            </a:effectRef>
-            <a:fontRef idx="minor">
-              <a:schemeClr val="tx1"/>
-            </a:fontRef>
-          </p:style>
-        </p:cxnSp>
-        <p:cxnSp>
-          <p:nvCxnSpPr>
-            <p:cNvPr id="35" name="Straight Connector 34"/>
-            <p:cNvCxnSpPr/>
-            <p:nvPr/>
-          </p:nvCxnSpPr>
-          <p:spPr>
-            <a:xfrm>
-              <a:off x="684225" y="171716"/>
-              <a:ext cx="0" cy="6511464"/>
-            </a:xfrm>
-            <a:prstGeom prst="line">
-              <a:avLst/>
-            </a:prstGeom>
-            <a:ln w="12700">
-              <a:solidFill>
-                <a:srgbClr val="BCBCBC">
-                  <a:alpha val="29804"/>
-                </a:srgbClr>
-              </a:solidFill>
-              <a:prstDash val="sysDot"/>
-            </a:ln>
-          </p:spPr>
-          <p:style>
-            <a:lnRef idx="1">
-              <a:schemeClr val="accent1"/>
-            </a:lnRef>
-            <a:fillRef idx="0">
-              <a:schemeClr val="accent1"/>
-            </a:fillRef>
-            <a:effectRef idx="0">
-              <a:schemeClr val="accent1"/>
-            </a:effectRef>
-            <a:fontRef idx="minor">
-              <a:schemeClr val="tx1"/>
-            </a:fontRef>
-          </p:style>
-        </p:cxnSp>
-        <p:cxnSp>
-          <p:nvCxnSpPr>
-            <p:cNvPr id="36" name="Straight Connector 35"/>
-            <p:cNvCxnSpPr/>
-            <p:nvPr/>
-          </p:nvCxnSpPr>
-          <p:spPr>
-            <a:xfrm>
-              <a:off x="11508412" y="173267"/>
-              <a:ext cx="0" cy="6511464"/>
-            </a:xfrm>
-            <a:prstGeom prst="line">
-              <a:avLst/>
-            </a:prstGeom>
-            <a:ln w="12700">
-              <a:solidFill>
-                <a:srgbClr val="BCBCBC">
-                  <a:alpha val="29804"/>
-                </a:srgbClr>
-              </a:solidFill>
-              <a:prstDash val="sysDot"/>
-            </a:ln>
-          </p:spPr>
-          <p:style>
-            <a:lnRef idx="1">
-              <a:schemeClr val="accent1"/>
-            </a:lnRef>
-            <a:fillRef idx="0">
-              <a:schemeClr val="accent1"/>
-            </a:fillRef>
-            <a:effectRef idx="0">
-              <a:schemeClr val="accent1"/>
-            </a:effectRef>
-            <a:fontRef idx="minor">
-              <a:schemeClr val="tx1"/>
-            </a:fontRef>
-          </p:style>
-        </p:cxnSp>
-      </p:grpSp>
-      <p:sp>
-        <p:nvSpPr>
-          <p:cNvPr id="3" name="Content Placeholder 2">
-            <a:extLst>
-              <a:ext uri="{FF2B5EF4-FFF2-40B4-BE49-F238E27FC236}">
-                <a16:creationId xmlns:a16="http://schemas.microsoft.com/office/drawing/2014/main" id="{E4888EAA-7CC8-7452-CD07-51C96DF132EC}"/>
-              </a:ext>
-            </a:extLst>
-          </p:cNvPr>
-          <p:cNvSpPr>
-            <a:spLocks noGrp="1"/>
-          </p:cNvSpPr>
-          <p:nvPr>
-            <p:ph idx="1"/>
-          </p:nvPr>
-        </p:nvSpPr>
-        <p:spPr>
-          <a:xfrm>
-            <a:off x="691079" y="1410196"/>
-            <a:ext cx="10325000" cy="1475914"/>
-          </a:xfrm>
-        </p:spPr>
-        <p:txBody>
-          <a:bodyPr>
-            <a:normAutofit/>
-          </a:bodyPr>
-          <a:lstStyle>
-            <a:lvl1pPr>
-              <a:defRPr sz="1800"/>
-            </a:lvl1pPr>
-            <a:lvl2pPr>
-              <a:defRPr sz="1600"/>
-            </a:lvl2pPr>
-            <a:lvl3pPr>
-              <a:defRPr sz="1400"/>
-            </a:lvl3pPr>
-            <a:lvl4pPr>
-              <a:defRPr sz="1200"/>
-            </a:lvl4pPr>
-          </a:lstStyle>
-          <a:p>
-            <a:pPr lvl="0"/>
-            <a:r>
-              <a:rPr lang="en-US" dirty="0"/>
-              <a:t>Click to edit Master text styles</a:t>
-            </a:r>
-          </a:p>
-          <a:p>
-            <a:pPr lvl="1"/>
-            <a:r>
-              <a:rPr lang="en-US" dirty="0"/>
-              <a:t>Second level</a:t>
-            </a:r>
-          </a:p>
-          <a:p>
-            <a:pPr lvl="2"/>
-            <a:r>
-              <a:rPr lang="en-US" dirty="0"/>
-              <a:t>Third level</a:t>
-            </a:r>
-          </a:p>
-          <a:p>
-            <a:pPr lvl="3"/>
-            <a:r>
-              <a:rPr lang="en-US" dirty="0"/>
-              <a:t>Fourth level</a:t>
-            </a:r>
-          </a:p>
-        </p:txBody>
-      </p:sp>
-      <p:sp>
-        <p:nvSpPr>
-          <p:cNvPr id="4" name="Title 1">
-            <a:extLst>
-              <a:ext uri="{FF2B5EF4-FFF2-40B4-BE49-F238E27FC236}">
-                <a16:creationId xmlns:a16="http://schemas.microsoft.com/office/drawing/2014/main" id="{3FB0C965-27F1-6BE0-F0CD-51B56C0A7AB2}"/>
-              </a:ext>
-            </a:extLst>
-          </p:cNvPr>
-          <p:cNvSpPr>
-            <a:spLocks noGrp="1"/>
-          </p:cNvSpPr>
-          <p:nvPr>
-            <p:ph type="title"/>
-          </p:nvPr>
-        </p:nvSpPr>
-        <p:spPr>
-          <a:xfrm>
-            <a:off x="691079" y="390160"/>
-            <a:ext cx="10325000" cy="695599"/>
-          </a:xfrm>
-        </p:spPr>
-        <p:txBody>
-          <a:bodyPr>
-            <a:normAutofit/>
-          </a:bodyPr>
-          <a:lstStyle>
-            <a:lvl1pPr>
-              <a:defRPr sz="3200"/>
-            </a:lvl1pPr>
-          </a:lstStyle>
-          <a:p>
-            <a:r>
-              <a:rPr lang="en-US" dirty="0"/>
-              <a:t>Click to edit Master title style</a:t>
-            </a:r>
-          </a:p>
-        </p:txBody>
-      </p:sp>
-      <p:sp>
-        <p:nvSpPr>
-          <p:cNvPr id="37" name="Picture Placeholder 37">
-            <a:extLst>
-              <a:ext uri="{FF2B5EF4-FFF2-40B4-BE49-F238E27FC236}">
-                <a16:creationId xmlns:a16="http://schemas.microsoft.com/office/drawing/2014/main" id="{8E41F4FA-B84A-EDFD-BC14-CB808F3D7496}"/>
-              </a:ext>
-            </a:extLst>
-          </p:cNvPr>
-          <p:cNvSpPr>
-            <a:spLocks noGrp="1"/>
-          </p:cNvSpPr>
-          <p:nvPr>
-            <p:ph type="pic" sz="quarter" idx="10"/>
-          </p:nvPr>
-        </p:nvSpPr>
-        <p:spPr>
-          <a:xfrm>
-            <a:off x="691077" y="3053020"/>
-            <a:ext cx="4745655" cy="3519237"/>
-          </a:xfrm>
-        </p:spPr>
-        <p:txBody>
-          <a:bodyPr/>
-          <a:lstStyle/>
-          <a:p>
-            <a:endParaRPr lang="en-CN"/>
-          </a:p>
-        </p:txBody>
-      </p:sp>
-      <p:sp>
-        <p:nvSpPr>
-          <p:cNvPr id="38" name="Picture Placeholder 37">
-            <a:extLst>
-              <a:ext uri="{FF2B5EF4-FFF2-40B4-BE49-F238E27FC236}">
-                <a16:creationId xmlns:a16="http://schemas.microsoft.com/office/drawing/2014/main" id="{4056F9A8-6C2C-A446-FFA4-8414D183DE8D}"/>
-              </a:ext>
-            </a:extLst>
-          </p:cNvPr>
-          <p:cNvSpPr>
-            <a:spLocks noGrp="1"/>
-          </p:cNvSpPr>
-          <p:nvPr>
-            <p:ph type="pic" sz="quarter" idx="11"/>
-          </p:nvPr>
-        </p:nvSpPr>
-        <p:spPr>
-          <a:xfrm>
-            <a:off x="5935293" y="3053020"/>
-            <a:ext cx="5051743" cy="3519237"/>
-          </a:xfrm>
-        </p:spPr>
-        <p:txBody>
-          <a:bodyPr/>
-          <a:lstStyle/>
-          <a:p>
-            <a:endParaRPr lang="en-CN"/>
-          </a:p>
-        </p:txBody>
-      </p:sp>
-    </p:spTree>
-    <p:extLst>
-      <p:ext uri="{BB962C8B-B14F-4D97-AF65-F5344CB8AC3E}">
-        <p14:creationId xmlns:p14="http://schemas.microsoft.com/office/powerpoint/2010/main" val="1679595926"/>
+        <p14:creationId xmlns:p14="http://schemas.microsoft.com/office/powerpoint/2010/main" val="376238915"/>
       </p:ext>
     </p:extLst>
   </p:cSld>
@@ -15964,7 +14569,7 @@
           <a:p>
             <a:fld id="{8F72BA41-EC5B-4197-BCC8-0FD2E523CD7A}" type="datetimeFigureOut">
               <a:rPr lang="en-US" smtClean="0"/>
-              <a:t>10/27/24</a:t>
+              <a:t>10/30/24</a:t>
             </a:fld>
             <a:endParaRPr lang="en-US" dirty="0"/>
           </a:p>
@@ -16114,14 +14719,13 @@
     <p:sldLayoutId id="2147483702" r:id="rId3"/>
     <p:sldLayoutId id="2147483708" r:id="rId4"/>
     <p:sldLayoutId id="2147483719" r:id="rId5"/>
-    <p:sldLayoutId id="2147483709" r:id="rId6"/>
-    <p:sldLayoutId id="2147483720" r:id="rId7"/>
-    <p:sldLayoutId id="2147483721" r:id="rId8"/>
-    <p:sldLayoutId id="2147483722" r:id="rId9"/>
-    <p:sldLayoutId id="2147483707" r:id="rId10"/>
-    <p:sldLayoutId id="2147483716" r:id="rId11"/>
-    <p:sldLayoutId id="2147483715" r:id="rId12"/>
-    <p:sldLayoutId id="2147483717" r:id="rId13"/>
+    <p:sldLayoutId id="2147483725" r:id="rId6"/>
+    <p:sldLayoutId id="2147483709" r:id="rId7"/>
+    <p:sldLayoutId id="2147483720" r:id="rId8"/>
+    <p:sldLayoutId id="2147483707" r:id="rId9"/>
+    <p:sldLayoutId id="2147483716" r:id="rId10"/>
+    <p:sldLayoutId id="2147483715" r:id="rId11"/>
+    <p:sldLayoutId id="2147483717" r:id="rId12"/>
   </p:sldLayoutIdLst>
   <p:txStyles>
     <p:titleStyle>
@@ -17233,6 +15837,15 @@
 </file>
 
 <file path=customXml/item1.xml><?xml version="1.0" encoding="utf-8"?>
+<?mso-contentType ?>
+<FormTemplates xmlns="http://schemas.microsoft.com/sharepoint/v3/contenttype/forms">
+  <Display>DocumentLibraryForm</Display>
+  <Edit>DocumentLibraryForm</Edit>
+  <New>DocumentLibraryForm</New>
+</FormTemplates>
+</file>
+
+<file path=customXml/item2.xml><?xml version="1.0" encoding="utf-8"?>
 <p:properties xmlns:p="http://schemas.microsoft.com/office/2006/metadata/properties" xmlns:xsi="http://www.w3.org/2001/XMLSchema-instance" xmlns:pc="http://schemas.microsoft.com/office/infopath/2007/PartnerControls">
   <documentManagement>
     <_ip_UnifiedCompliancePolicyUIAction xmlns="http://schemas.microsoft.com/sharepoint/v3" xsi:nil="true"/>
@@ -17250,15 +15863,6 @@
     <MediaServiceKeyPoints xmlns="71af3243-3dd4-4a8d-8c0d-dd76da1f02a5" xsi:nil="true"/>
   </documentManagement>
 </p:properties>
-</file>
-
-<file path=customXml/item2.xml><?xml version="1.0" encoding="utf-8"?>
-<?mso-contentType ?>
-<FormTemplates xmlns="http://schemas.microsoft.com/sharepoint/v3/contenttype/forms">
-  <Display>DocumentLibraryForm</Display>
-  <Edit>DocumentLibraryForm</Edit>
-  <New>DocumentLibraryForm</New>
-</FormTemplates>
 </file>
 
 <file path=customXml/item3.xml><?xml version="1.0" encoding="utf-8"?>
@@ -17574,6 +16178,14 @@
 </file>
 
 <file path=customXml/itemProps1.xml><?xml version="1.0" encoding="utf-8"?>
+<ds:datastoreItem xmlns:ds="http://schemas.openxmlformats.org/officeDocument/2006/customXml" ds:itemID="{A78D9019-7CE1-4B77-8F5D-67F6576598CB}">
+  <ds:schemaRefs>
+    <ds:schemaRef ds:uri="http://schemas.microsoft.com/sharepoint/v3/contenttype/forms"/>
+  </ds:schemaRefs>
+</ds:datastoreItem>
+</file>
+
+<file path=customXml/itemProps2.xml><?xml version="1.0" encoding="utf-8"?>
 <ds:datastoreItem xmlns:ds="http://schemas.openxmlformats.org/officeDocument/2006/customXml" ds:itemID="{E42E6C21-1752-4E06-9FE3-208D45ADB668}">
   <ds:schemaRefs>
     <ds:schemaRef ds:uri="http://schemas.microsoft.com/office/2006/metadata/properties"/>
@@ -17581,14 +16193,6 @@
     <ds:schemaRef ds:uri="http://schemas.microsoft.com/sharepoint/v3"/>
     <ds:schemaRef ds:uri="71af3243-3dd4-4a8d-8c0d-dd76da1f02a5"/>
     <ds:schemaRef ds:uri="230e9df3-be65-4c73-a93b-d1236ebd677e"/>
-  </ds:schemaRefs>
-</ds:datastoreItem>
-</file>
-
-<file path=customXml/itemProps2.xml><?xml version="1.0" encoding="utf-8"?>
-<ds:datastoreItem xmlns:ds="http://schemas.openxmlformats.org/officeDocument/2006/customXml" ds:itemID="{A78D9019-7CE1-4B77-8F5D-67F6576598CB}">
-  <ds:schemaRefs>
-    <ds:schemaRef ds:uri="http://schemas.microsoft.com/sharepoint/v3/contenttype/forms"/>
   </ds:schemaRefs>
 </ds:datastoreItem>
 </file>

</xml_diff>

<commit_message>
fix docx parser issues and update template
</commit_message>
<xml_diff>
--- a/templates/SimpleTemplate.pptx
+++ b/templates/SimpleTemplate.pptx
@@ -2397,6 +2397,1311 @@
 
 <file path=ppt/slideLayouts/slideLayout10.xml><?xml version="1.0" encoding="utf-8"?>
 <p:sldLayout xmlns:a="http://schemas.openxmlformats.org/drawingml/2006/main" xmlns:r="http://schemas.openxmlformats.org/officeDocument/2006/relationships" xmlns:p="http://schemas.openxmlformats.org/presentationml/2006/main" showMasterSp="0" preserve="1" userDrawn="1">
+  <p:cSld name="Title, Picture 0">
+    <p:spTree>
+      <p:nvGrpSpPr>
+        <p:cNvPr id="1" name=""/>
+        <p:cNvGrpSpPr/>
+        <p:nvPr/>
+      </p:nvGrpSpPr>
+      <p:grpSpPr>
+        <a:xfrm>
+          <a:off x="0" y="0"/>
+          <a:ext cx="0" cy="0"/>
+          <a:chOff x="0" y="0"/>
+          <a:chExt cx="0" cy="0"/>
+        </a:xfrm>
+      </p:grpSpPr>
+      <p:grpSp>
+        <p:nvGrpSpPr>
+          <p:cNvPr id="5" name="Group 4"/>
+          <p:cNvGrpSpPr/>
+          <p:nvPr/>
+        </p:nvGrpSpPr>
+        <p:grpSpPr>
+          <a:xfrm>
+            <a:off x="-6214" y="-1"/>
+            <a:ext cx="12214827" cy="6858000"/>
+            <a:chOff x="-6214" y="-1"/>
+            <a:chExt cx="12214827" cy="6858000"/>
+          </a:xfrm>
+        </p:grpSpPr>
+        <p:cxnSp>
+          <p:nvCxnSpPr>
+            <p:cNvPr id="6" name="Straight Connector 5"/>
+            <p:cNvCxnSpPr/>
+            <p:nvPr/>
+          </p:nvCxnSpPr>
+          <p:spPr>
+            <a:xfrm>
+              <a:off x="-6214" y="6686283"/>
+              <a:ext cx="12192000" cy="0"/>
+            </a:xfrm>
+            <a:prstGeom prst="line">
+              <a:avLst/>
+            </a:prstGeom>
+            <a:ln w="12700">
+              <a:solidFill>
+                <a:srgbClr val="BCBCBC">
+                  <a:alpha val="29804"/>
+                </a:srgbClr>
+              </a:solidFill>
+              <a:prstDash val="sysDot"/>
+            </a:ln>
+          </p:spPr>
+          <p:style>
+            <a:lnRef idx="1">
+              <a:schemeClr val="accent1"/>
+            </a:lnRef>
+            <a:fillRef idx="0">
+              <a:schemeClr val="accent1"/>
+            </a:fillRef>
+            <a:effectRef idx="0">
+              <a:schemeClr val="accent1"/>
+            </a:effectRef>
+            <a:fontRef idx="minor">
+              <a:schemeClr val="tx1"/>
+            </a:fontRef>
+          </p:style>
+        </p:cxnSp>
+        <p:cxnSp>
+          <p:nvCxnSpPr>
+            <p:cNvPr id="7" name="Straight Connector 6"/>
+            <p:cNvCxnSpPr/>
+            <p:nvPr/>
+          </p:nvCxnSpPr>
+          <p:spPr>
+            <a:xfrm>
+              <a:off x="0" y="-1"/>
+              <a:ext cx="0" cy="6858000"/>
+            </a:xfrm>
+            <a:prstGeom prst="line">
+              <a:avLst/>
+            </a:prstGeom>
+            <a:ln w="12700">
+              <a:solidFill>
+                <a:srgbClr val="BCBCBC">
+                  <a:alpha val="29804"/>
+                </a:srgbClr>
+              </a:solidFill>
+              <a:prstDash val="sysDot"/>
+            </a:ln>
+          </p:spPr>
+          <p:style>
+            <a:lnRef idx="1">
+              <a:schemeClr val="accent1"/>
+            </a:lnRef>
+            <a:fillRef idx="0">
+              <a:schemeClr val="accent1"/>
+            </a:fillRef>
+            <a:effectRef idx="0">
+              <a:schemeClr val="accent1"/>
+            </a:effectRef>
+            <a:fontRef idx="minor">
+              <a:schemeClr val="tx1"/>
+            </a:fontRef>
+          </p:style>
+        </p:cxnSp>
+        <p:cxnSp>
+          <p:nvCxnSpPr>
+            <p:cNvPr id="8" name="Straight Connector 7"/>
+            <p:cNvCxnSpPr/>
+            <p:nvPr/>
+          </p:nvCxnSpPr>
+          <p:spPr>
+            <a:xfrm>
+              <a:off x="11993258" y="-1"/>
+              <a:ext cx="0" cy="6858000"/>
+            </a:xfrm>
+            <a:prstGeom prst="line">
+              <a:avLst/>
+            </a:prstGeom>
+            <a:ln w="12700">
+              <a:solidFill>
+                <a:srgbClr val="BCBCBC">
+                  <a:alpha val="29804"/>
+                </a:srgbClr>
+              </a:solidFill>
+              <a:prstDash val="sysDot"/>
+            </a:ln>
+          </p:spPr>
+          <p:style>
+            <a:lnRef idx="1">
+              <a:schemeClr val="accent1"/>
+            </a:lnRef>
+            <a:fillRef idx="0">
+              <a:schemeClr val="accent1"/>
+            </a:fillRef>
+            <a:effectRef idx="0">
+              <a:schemeClr val="accent1"/>
+            </a:effectRef>
+            <a:fontRef idx="minor">
+              <a:schemeClr val="tx1"/>
+            </a:fontRef>
+          </p:style>
+        </p:cxnSp>
+        <p:cxnSp>
+          <p:nvCxnSpPr>
+            <p:cNvPr id="9" name="Straight Connector 8"/>
+            <p:cNvCxnSpPr/>
+            <p:nvPr/>
+          </p:nvCxnSpPr>
+          <p:spPr>
+            <a:xfrm>
+              <a:off x="192528" y="-1"/>
+              <a:ext cx="0" cy="6858000"/>
+            </a:xfrm>
+            <a:prstGeom prst="line">
+              <a:avLst/>
+            </a:prstGeom>
+            <a:ln w="12700">
+              <a:solidFill>
+                <a:srgbClr val="BCBCBC">
+                  <a:alpha val="29804"/>
+                </a:srgbClr>
+              </a:solidFill>
+              <a:prstDash val="sysDot"/>
+            </a:ln>
+          </p:spPr>
+          <p:style>
+            <a:lnRef idx="1">
+              <a:schemeClr val="accent1"/>
+            </a:lnRef>
+            <a:fillRef idx="0">
+              <a:schemeClr val="accent1"/>
+            </a:fillRef>
+            <a:effectRef idx="0">
+              <a:schemeClr val="accent1"/>
+            </a:effectRef>
+            <a:fontRef idx="minor">
+              <a:schemeClr val="tx1"/>
+            </a:fontRef>
+          </p:style>
+        </p:cxnSp>
+        <p:cxnSp>
+          <p:nvCxnSpPr>
+            <p:cNvPr id="10" name="Straight Connector 9"/>
+            <p:cNvCxnSpPr/>
+            <p:nvPr/>
+          </p:nvCxnSpPr>
+          <p:spPr>
+            <a:xfrm>
+              <a:off x="1175922" y="-1"/>
+              <a:ext cx="0" cy="6858000"/>
+            </a:xfrm>
+            <a:prstGeom prst="line">
+              <a:avLst/>
+            </a:prstGeom>
+            <a:ln w="12700">
+              <a:solidFill>
+                <a:srgbClr val="BCBCBC">
+                  <a:alpha val="29804"/>
+                </a:srgbClr>
+              </a:solidFill>
+              <a:prstDash val="sysDot"/>
+            </a:ln>
+          </p:spPr>
+          <p:style>
+            <a:lnRef idx="1">
+              <a:schemeClr val="accent1"/>
+            </a:lnRef>
+            <a:fillRef idx="0">
+              <a:schemeClr val="accent1"/>
+            </a:fillRef>
+            <a:effectRef idx="0">
+              <a:schemeClr val="accent1"/>
+            </a:effectRef>
+            <a:fontRef idx="minor">
+              <a:schemeClr val="tx1"/>
+            </a:fontRef>
+          </p:style>
+        </p:cxnSp>
+        <p:cxnSp>
+          <p:nvCxnSpPr>
+            <p:cNvPr id="11" name="Straight Connector 10"/>
+            <p:cNvCxnSpPr/>
+            <p:nvPr/>
+          </p:nvCxnSpPr>
+          <p:spPr>
+            <a:xfrm>
+              <a:off x="2159316" y="-1"/>
+              <a:ext cx="0" cy="6858000"/>
+            </a:xfrm>
+            <a:prstGeom prst="line">
+              <a:avLst/>
+            </a:prstGeom>
+            <a:ln w="12700">
+              <a:solidFill>
+                <a:srgbClr val="BCBCBC">
+                  <a:alpha val="29804"/>
+                </a:srgbClr>
+              </a:solidFill>
+              <a:prstDash val="sysDot"/>
+            </a:ln>
+          </p:spPr>
+          <p:style>
+            <a:lnRef idx="1">
+              <a:schemeClr val="accent1"/>
+            </a:lnRef>
+            <a:fillRef idx="0">
+              <a:schemeClr val="accent1"/>
+            </a:fillRef>
+            <a:effectRef idx="0">
+              <a:schemeClr val="accent1"/>
+            </a:effectRef>
+            <a:fontRef idx="minor">
+              <a:schemeClr val="tx1"/>
+            </a:fontRef>
+          </p:style>
+        </p:cxnSp>
+        <p:cxnSp>
+          <p:nvCxnSpPr>
+            <p:cNvPr id="12" name="Straight Connector 11"/>
+            <p:cNvCxnSpPr/>
+            <p:nvPr/>
+          </p:nvCxnSpPr>
+          <p:spPr>
+            <a:xfrm>
+              <a:off x="3142710" y="-1"/>
+              <a:ext cx="0" cy="6858000"/>
+            </a:xfrm>
+            <a:prstGeom prst="line">
+              <a:avLst/>
+            </a:prstGeom>
+            <a:ln w="12700">
+              <a:solidFill>
+                <a:srgbClr val="BCBCBC">
+                  <a:alpha val="29804"/>
+                </a:srgbClr>
+              </a:solidFill>
+              <a:prstDash val="sysDot"/>
+            </a:ln>
+          </p:spPr>
+          <p:style>
+            <a:lnRef idx="1">
+              <a:schemeClr val="accent1"/>
+            </a:lnRef>
+            <a:fillRef idx="0">
+              <a:schemeClr val="accent1"/>
+            </a:fillRef>
+            <a:effectRef idx="0">
+              <a:schemeClr val="accent1"/>
+            </a:effectRef>
+            <a:fontRef idx="minor">
+              <a:schemeClr val="tx1"/>
+            </a:fontRef>
+          </p:style>
+        </p:cxnSp>
+        <p:cxnSp>
+          <p:nvCxnSpPr>
+            <p:cNvPr id="13" name="Straight Connector 12"/>
+            <p:cNvCxnSpPr/>
+            <p:nvPr/>
+          </p:nvCxnSpPr>
+          <p:spPr>
+            <a:xfrm>
+              <a:off x="4126104" y="-1"/>
+              <a:ext cx="0" cy="6858000"/>
+            </a:xfrm>
+            <a:prstGeom prst="line">
+              <a:avLst/>
+            </a:prstGeom>
+            <a:ln w="12700">
+              <a:solidFill>
+                <a:srgbClr val="BCBCBC">
+                  <a:alpha val="29804"/>
+                </a:srgbClr>
+              </a:solidFill>
+              <a:prstDash val="sysDot"/>
+            </a:ln>
+          </p:spPr>
+          <p:style>
+            <a:lnRef idx="1">
+              <a:schemeClr val="accent1"/>
+            </a:lnRef>
+            <a:fillRef idx="0">
+              <a:schemeClr val="accent1"/>
+            </a:fillRef>
+            <a:effectRef idx="0">
+              <a:schemeClr val="accent1"/>
+            </a:effectRef>
+            <a:fontRef idx="minor">
+              <a:schemeClr val="tx1"/>
+            </a:fontRef>
+          </p:style>
+        </p:cxnSp>
+        <p:cxnSp>
+          <p:nvCxnSpPr>
+            <p:cNvPr id="14" name="Straight Connector 13"/>
+            <p:cNvCxnSpPr/>
+            <p:nvPr/>
+          </p:nvCxnSpPr>
+          <p:spPr>
+            <a:xfrm>
+              <a:off x="5109498" y="-1"/>
+              <a:ext cx="0" cy="6858000"/>
+            </a:xfrm>
+            <a:prstGeom prst="line">
+              <a:avLst/>
+            </a:prstGeom>
+            <a:ln w="12700">
+              <a:solidFill>
+                <a:srgbClr val="BCBCBC">
+                  <a:alpha val="29804"/>
+                </a:srgbClr>
+              </a:solidFill>
+              <a:prstDash val="sysDot"/>
+            </a:ln>
+          </p:spPr>
+          <p:style>
+            <a:lnRef idx="1">
+              <a:schemeClr val="accent1"/>
+            </a:lnRef>
+            <a:fillRef idx="0">
+              <a:schemeClr val="accent1"/>
+            </a:fillRef>
+            <a:effectRef idx="0">
+              <a:schemeClr val="accent1"/>
+            </a:effectRef>
+            <a:fontRef idx="minor">
+              <a:schemeClr val="tx1"/>
+            </a:fontRef>
+          </p:style>
+        </p:cxnSp>
+        <p:cxnSp>
+          <p:nvCxnSpPr>
+            <p:cNvPr id="15" name="Straight Connector 14"/>
+            <p:cNvCxnSpPr/>
+            <p:nvPr/>
+          </p:nvCxnSpPr>
+          <p:spPr>
+            <a:xfrm>
+              <a:off x="6092892" y="-1"/>
+              <a:ext cx="0" cy="6858000"/>
+            </a:xfrm>
+            <a:prstGeom prst="line">
+              <a:avLst/>
+            </a:prstGeom>
+            <a:ln w="12700">
+              <a:solidFill>
+                <a:srgbClr val="BCBCBC">
+                  <a:alpha val="29804"/>
+                </a:srgbClr>
+              </a:solidFill>
+              <a:prstDash val="sysDot"/>
+            </a:ln>
+          </p:spPr>
+          <p:style>
+            <a:lnRef idx="1">
+              <a:schemeClr val="accent1"/>
+            </a:lnRef>
+            <a:fillRef idx="0">
+              <a:schemeClr val="accent1"/>
+            </a:fillRef>
+            <a:effectRef idx="0">
+              <a:schemeClr val="accent1"/>
+            </a:effectRef>
+            <a:fontRef idx="minor">
+              <a:schemeClr val="tx1"/>
+            </a:fontRef>
+          </p:style>
+        </p:cxnSp>
+        <p:cxnSp>
+          <p:nvCxnSpPr>
+            <p:cNvPr id="16" name="Straight Connector 15"/>
+            <p:cNvCxnSpPr/>
+            <p:nvPr/>
+          </p:nvCxnSpPr>
+          <p:spPr>
+            <a:xfrm>
+              <a:off x="7076286" y="-1"/>
+              <a:ext cx="0" cy="6858000"/>
+            </a:xfrm>
+            <a:prstGeom prst="line">
+              <a:avLst/>
+            </a:prstGeom>
+            <a:ln w="12700">
+              <a:solidFill>
+                <a:srgbClr val="BCBCBC">
+                  <a:alpha val="29804"/>
+                </a:srgbClr>
+              </a:solidFill>
+              <a:prstDash val="sysDot"/>
+            </a:ln>
+          </p:spPr>
+          <p:style>
+            <a:lnRef idx="1">
+              <a:schemeClr val="accent1"/>
+            </a:lnRef>
+            <a:fillRef idx="0">
+              <a:schemeClr val="accent1"/>
+            </a:fillRef>
+            <a:effectRef idx="0">
+              <a:schemeClr val="accent1"/>
+            </a:effectRef>
+            <a:fontRef idx="minor">
+              <a:schemeClr val="tx1"/>
+            </a:fontRef>
+          </p:style>
+        </p:cxnSp>
+        <p:cxnSp>
+          <p:nvCxnSpPr>
+            <p:cNvPr id="17" name="Straight Connector 16"/>
+            <p:cNvCxnSpPr/>
+            <p:nvPr/>
+          </p:nvCxnSpPr>
+          <p:spPr>
+            <a:xfrm>
+              <a:off x="8059680" y="-1"/>
+              <a:ext cx="0" cy="6858000"/>
+            </a:xfrm>
+            <a:prstGeom prst="line">
+              <a:avLst/>
+            </a:prstGeom>
+            <a:ln w="12700">
+              <a:solidFill>
+                <a:srgbClr val="BCBCBC">
+                  <a:alpha val="29804"/>
+                </a:srgbClr>
+              </a:solidFill>
+              <a:prstDash val="sysDot"/>
+            </a:ln>
+          </p:spPr>
+          <p:style>
+            <a:lnRef idx="1">
+              <a:schemeClr val="accent1"/>
+            </a:lnRef>
+            <a:fillRef idx="0">
+              <a:schemeClr val="accent1"/>
+            </a:fillRef>
+            <a:effectRef idx="0">
+              <a:schemeClr val="accent1"/>
+            </a:effectRef>
+            <a:fontRef idx="minor">
+              <a:schemeClr val="tx1"/>
+            </a:fontRef>
+          </p:style>
+        </p:cxnSp>
+        <p:cxnSp>
+          <p:nvCxnSpPr>
+            <p:cNvPr id="18" name="Straight Connector 17"/>
+            <p:cNvCxnSpPr/>
+            <p:nvPr/>
+          </p:nvCxnSpPr>
+          <p:spPr>
+            <a:xfrm>
+              <a:off x="9043074" y="-1"/>
+              <a:ext cx="0" cy="6858000"/>
+            </a:xfrm>
+            <a:prstGeom prst="line">
+              <a:avLst/>
+            </a:prstGeom>
+            <a:ln w="12700">
+              <a:solidFill>
+                <a:srgbClr val="BCBCBC">
+                  <a:alpha val="29804"/>
+                </a:srgbClr>
+              </a:solidFill>
+              <a:prstDash val="sysDot"/>
+            </a:ln>
+          </p:spPr>
+          <p:style>
+            <a:lnRef idx="1">
+              <a:schemeClr val="accent1"/>
+            </a:lnRef>
+            <a:fillRef idx="0">
+              <a:schemeClr val="accent1"/>
+            </a:fillRef>
+            <a:effectRef idx="0">
+              <a:schemeClr val="accent1"/>
+            </a:effectRef>
+            <a:fontRef idx="minor">
+              <a:schemeClr val="tx1"/>
+            </a:fontRef>
+          </p:style>
+        </p:cxnSp>
+        <p:cxnSp>
+          <p:nvCxnSpPr>
+            <p:cNvPr id="19" name="Straight Connector 18"/>
+            <p:cNvCxnSpPr/>
+            <p:nvPr/>
+          </p:nvCxnSpPr>
+          <p:spPr>
+            <a:xfrm>
+              <a:off x="10026468" y="-1"/>
+              <a:ext cx="0" cy="6858000"/>
+            </a:xfrm>
+            <a:prstGeom prst="line">
+              <a:avLst/>
+            </a:prstGeom>
+            <a:ln w="12700">
+              <a:solidFill>
+                <a:srgbClr val="BCBCBC">
+                  <a:alpha val="29804"/>
+                </a:srgbClr>
+              </a:solidFill>
+              <a:prstDash val="sysDot"/>
+            </a:ln>
+          </p:spPr>
+          <p:style>
+            <a:lnRef idx="1">
+              <a:schemeClr val="accent1"/>
+            </a:lnRef>
+            <a:fillRef idx="0">
+              <a:schemeClr val="accent1"/>
+            </a:fillRef>
+            <a:effectRef idx="0">
+              <a:schemeClr val="accent1"/>
+            </a:effectRef>
+            <a:fontRef idx="minor">
+              <a:schemeClr val="tx1"/>
+            </a:fontRef>
+          </p:style>
+        </p:cxnSp>
+        <p:cxnSp>
+          <p:nvCxnSpPr>
+            <p:cNvPr id="20" name="Straight Connector 19"/>
+            <p:cNvCxnSpPr/>
+            <p:nvPr/>
+          </p:nvCxnSpPr>
+          <p:spPr>
+            <a:xfrm>
+              <a:off x="11009862" y="-1"/>
+              <a:ext cx="0" cy="6858000"/>
+            </a:xfrm>
+            <a:prstGeom prst="line">
+              <a:avLst/>
+            </a:prstGeom>
+            <a:ln w="12700">
+              <a:solidFill>
+                <a:srgbClr val="BCBCBC">
+                  <a:alpha val="29804"/>
+                </a:srgbClr>
+              </a:solidFill>
+              <a:prstDash val="sysDot"/>
+            </a:ln>
+          </p:spPr>
+          <p:style>
+            <a:lnRef idx="1">
+              <a:schemeClr val="accent1"/>
+            </a:lnRef>
+            <a:fillRef idx="0">
+              <a:schemeClr val="accent1"/>
+            </a:fillRef>
+            <a:effectRef idx="0">
+              <a:schemeClr val="accent1"/>
+            </a:effectRef>
+            <a:fontRef idx="minor">
+              <a:schemeClr val="tx1"/>
+            </a:fontRef>
+          </p:style>
+        </p:cxnSp>
+        <p:cxnSp>
+          <p:nvCxnSpPr>
+            <p:cNvPr id="21" name="Straight Connector 20"/>
+            <p:cNvCxnSpPr/>
+            <p:nvPr/>
+          </p:nvCxnSpPr>
+          <p:spPr>
+            <a:xfrm>
+              <a:off x="12185786" y="-1"/>
+              <a:ext cx="0" cy="6858000"/>
+            </a:xfrm>
+            <a:prstGeom prst="line">
+              <a:avLst/>
+            </a:prstGeom>
+            <a:ln w="12700">
+              <a:solidFill>
+                <a:srgbClr val="BCBCBC">
+                  <a:alpha val="29804"/>
+                </a:srgbClr>
+              </a:solidFill>
+              <a:prstDash val="sysDot"/>
+            </a:ln>
+          </p:spPr>
+          <p:style>
+            <a:lnRef idx="1">
+              <a:schemeClr val="accent1"/>
+            </a:lnRef>
+            <a:fillRef idx="0">
+              <a:schemeClr val="accent1"/>
+            </a:fillRef>
+            <a:effectRef idx="0">
+              <a:schemeClr val="accent1"/>
+            </a:effectRef>
+            <a:fontRef idx="minor">
+              <a:schemeClr val="tx1"/>
+            </a:fontRef>
+          </p:style>
+        </p:cxnSp>
+        <p:cxnSp>
+          <p:nvCxnSpPr>
+            <p:cNvPr id="22" name="Straight Connector 21"/>
+            <p:cNvCxnSpPr/>
+            <p:nvPr/>
+          </p:nvCxnSpPr>
+          <p:spPr>
+            <a:xfrm>
+              <a:off x="0" y="171716"/>
+              <a:ext cx="12192000" cy="0"/>
+            </a:xfrm>
+            <a:prstGeom prst="line">
+              <a:avLst/>
+            </a:prstGeom>
+            <a:ln w="12700">
+              <a:solidFill>
+                <a:srgbClr val="BCBCBC">
+                  <a:alpha val="29804"/>
+                </a:srgbClr>
+              </a:solidFill>
+              <a:prstDash val="sysDot"/>
+            </a:ln>
+          </p:spPr>
+          <p:style>
+            <a:lnRef idx="1">
+              <a:schemeClr val="accent1"/>
+            </a:lnRef>
+            <a:fillRef idx="0">
+              <a:schemeClr val="accent1"/>
+            </a:fillRef>
+            <a:effectRef idx="0">
+              <a:schemeClr val="accent1"/>
+            </a:effectRef>
+            <a:fontRef idx="minor">
+              <a:schemeClr val="tx1"/>
+            </a:fontRef>
+          </p:style>
+        </p:cxnSp>
+        <p:cxnSp>
+          <p:nvCxnSpPr>
+            <p:cNvPr id="23" name="Straight Connector 22"/>
+            <p:cNvCxnSpPr/>
+            <p:nvPr/>
+          </p:nvCxnSpPr>
+          <p:spPr>
+            <a:xfrm>
+              <a:off x="0" y="714597"/>
+              <a:ext cx="12192000" cy="0"/>
+            </a:xfrm>
+            <a:prstGeom prst="line">
+              <a:avLst/>
+            </a:prstGeom>
+            <a:ln w="12700">
+              <a:solidFill>
+                <a:srgbClr val="BCBCBC">
+                  <a:alpha val="29804"/>
+                </a:srgbClr>
+              </a:solidFill>
+              <a:prstDash val="sysDot"/>
+            </a:ln>
+          </p:spPr>
+          <p:style>
+            <a:lnRef idx="1">
+              <a:schemeClr val="accent1"/>
+            </a:lnRef>
+            <a:fillRef idx="0">
+              <a:schemeClr val="accent1"/>
+            </a:fillRef>
+            <a:effectRef idx="0">
+              <a:schemeClr val="accent1"/>
+            </a:effectRef>
+            <a:fontRef idx="minor">
+              <a:schemeClr val="tx1"/>
+            </a:fontRef>
+          </p:style>
+        </p:cxnSp>
+        <p:cxnSp>
+          <p:nvCxnSpPr>
+            <p:cNvPr id="24" name="Straight Connector 23"/>
+            <p:cNvCxnSpPr/>
+            <p:nvPr/>
+          </p:nvCxnSpPr>
+          <p:spPr>
+            <a:xfrm>
+              <a:off x="0" y="1257478"/>
+              <a:ext cx="12192000" cy="0"/>
+            </a:xfrm>
+            <a:prstGeom prst="line">
+              <a:avLst/>
+            </a:prstGeom>
+            <a:ln w="12700">
+              <a:solidFill>
+                <a:srgbClr val="BCBCBC">
+                  <a:alpha val="29804"/>
+                </a:srgbClr>
+              </a:solidFill>
+              <a:prstDash val="sysDot"/>
+            </a:ln>
+          </p:spPr>
+          <p:style>
+            <a:lnRef idx="1">
+              <a:schemeClr val="accent1"/>
+            </a:lnRef>
+            <a:fillRef idx="0">
+              <a:schemeClr val="accent1"/>
+            </a:fillRef>
+            <a:effectRef idx="0">
+              <a:schemeClr val="accent1"/>
+            </a:effectRef>
+            <a:fontRef idx="minor">
+              <a:schemeClr val="tx1"/>
+            </a:fontRef>
+          </p:style>
+        </p:cxnSp>
+        <p:cxnSp>
+          <p:nvCxnSpPr>
+            <p:cNvPr id="25" name="Straight Connector 24"/>
+            <p:cNvCxnSpPr/>
+            <p:nvPr/>
+          </p:nvCxnSpPr>
+          <p:spPr>
+            <a:xfrm>
+              <a:off x="0" y="1800359"/>
+              <a:ext cx="12192000" cy="0"/>
+            </a:xfrm>
+            <a:prstGeom prst="line">
+              <a:avLst/>
+            </a:prstGeom>
+            <a:ln w="12700">
+              <a:solidFill>
+                <a:srgbClr val="BCBCBC">
+                  <a:alpha val="29804"/>
+                </a:srgbClr>
+              </a:solidFill>
+              <a:prstDash val="sysDot"/>
+            </a:ln>
+          </p:spPr>
+          <p:style>
+            <a:lnRef idx="1">
+              <a:schemeClr val="accent1"/>
+            </a:lnRef>
+            <a:fillRef idx="0">
+              <a:schemeClr val="accent1"/>
+            </a:fillRef>
+            <a:effectRef idx="0">
+              <a:schemeClr val="accent1"/>
+            </a:effectRef>
+            <a:fontRef idx="minor">
+              <a:schemeClr val="tx1"/>
+            </a:fontRef>
+          </p:style>
+        </p:cxnSp>
+        <p:cxnSp>
+          <p:nvCxnSpPr>
+            <p:cNvPr id="26" name="Straight Connector 25"/>
+            <p:cNvCxnSpPr/>
+            <p:nvPr/>
+          </p:nvCxnSpPr>
+          <p:spPr>
+            <a:xfrm>
+              <a:off x="0" y="2343240"/>
+              <a:ext cx="12192000" cy="0"/>
+            </a:xfrm>
+            <a:prstGeom prst="line">
+              <a:avLst/>
+            </a:prstGeom>
+            <a:ln w="12700">
+              <a:solidFill>
+                <a:srgbClr val="BCBCBC">
+                  <a:alpha val="29804"/>
+                </a:srgbClr>
+              </a:solidFill>
+              <a:prstDash val="sysDot"/>
+            </a:ln>
+          </p:spPr>
+          <p:style>
+            <a:lnRef idx="1">
+              <a:schemeClr val="accent1"/>
+            </a:lnRef>
+            <a:fillRef idx="0">
+              <a:schemeClr val="accent1"/>
+            </a:fillRef>
+            <a:effectRef idx="0">
+              <a:schemeClr val="accent1"/>
+            </a:effectRef>
+            <a:fontRef idx="minor">
+              <a:schemeClr val="tx1"/>
+            </a:fontRef>
+          </p:style>
+        </p:cxnSp>
+        <p:cxnSp>
+          <p:nvCxnSpPr>
+            <p:cNvPr id="27" name="Straight Connector 26"/>
+            <p:cNvCxnSpPr/>
+            <p:nvPr/>
+          </p:nvCxnSpPr>
+          <p:spPr>
+            <a:xfrm>
+              <a:off x="0" y="2886121"/>
+              <a:ext cx="12192000" cy="0"/>
+            </a:xfrm>
+            <a:prstGeom prst="line">
+              <a:avLst/>
+            </a:prstGeom>
+            <a:ln w="12700">
+              <a:solidFill>
+                <a:srgbClr val="BCBCBC">
+                  <a:alpha val="29804"/>
+                </a:srgbClr>
+              </a:solidFill>
+              <a:prstDash val="sysDot"/>
+            </a:ln>
+          </p:spPr>
+          <p:style>
+            <a:lnRef idx="1">
+              <a:schemeClr val="accent1"/>
+            </a:lnRef>
+            <a:fillRef idx="0">
+              <a:schemeClr val="accent1"/>
+            </a:fillRef>
+            <a:effectRef idx="0">
+              <a:schemeClr val="accent1"/>
+            </a:effectRef>
+            <a:fontRef idx="minor">
+              <a:schemeClr val="tx1"/>
+            </a:fontRef>
+          </p:style>
+        </p:cxnSp>
+        <p:cxnSp>
+          <p:nvCxnSpPr>
+            <p:cNvPr id="28" name="Straight Connector 27"/>
+            <p:cNvCxnSpPr/>
+            <p:nvPr/>
+          </p:nvCxnSpPr>
+          <p:spPr>
+            <a:xfrm>
+              <a:off x="0" y="3429002"/>
+              <a:ext cx="12192000" cy="0"/>
+            </a:xfrm>
+            <a:prstGeom prst="line">
+              <a:avLst/>
+            </a:prstGeom>
+            <a:ln w="12700">
+              <a:solidFill>
+                <a:srgbClr val="BCBCBC">
+                  <a:alpha val="29804"/>
+                </a:srgbClr>
+              </a:solidFill>
+              <a:prstDash val="sysDot"/>
+            </a:ln>
+          </p:spPr>
+          <p:style>
+            <a:lnRef idx="1">
+              <a:schemeClr val="accent1"/>
+            </a:lnRef>
+            <a:fillRef idx="0">
+              <a:schemeClr val="accent1"/>
+            </a:fillRef>
+            <a:effectRef idx="0">
+              <a:schemeClr val="accent1"/>
+            </a:effectRef>
+            <a:fontRef idx="minor">
+              <a:schemeClr val="tx1"/>
+            </a:fontRef>
+          </p:style>
+        </p:cxnSp>
+        <p:cxnSp>
+          <p:nvCxnSpPr>
+            <p:cNvPr id="29" name="Straight Connector 28"/>
+            <p:cNvCxnSpPr/>
+            <p:nvPr/>
+          </p:nvCxnSpPr>
+          <p:spPr>
+            <a:xfrm>
+              <a:off x="0" y="3971883"/>
+              <a:ext cx="12192000" cy="0"/>
+            </a:xfrm>
+            <a:prstGeom prst="line">
+              <a:avLst/>
+            </a:prstGeom>
+            <a:ln w="12700">
+              <a:solidFill>
+                <a:srgbClr val="BCBCBC">
+                  <a:alpha val="29804"/>
+                </a:srgbClr>
+              </a:solidFill>
+              <a:prstDash val="sysDot"/>
+            </a:ln>
+          </p:spPr>
+          <p:style>
+            <a:lnRef idx="1">
+              <a:schemeClr val="accent1"/>
+            </a:lnRef>
+            <a:fillRef idx="0">
+              <a:schemeClr val="accent1"/>
+            </a:fillRef>
+            <a:effectRef idx="0">
+              <a:schemeClr val="accent1"/>
+            </a:effectRef>
+            <a:fontRef idx="minor">
+              <a:schemeClr val="tx1"/>
+            </a:fontRef>
+          </p:style>
+        </p:cxnSp>
+        <p:cxnSp>
+          <p:nvCxnSpPr>
+            <p:cNvPr id="30" name="Straight Connector 29"/>
+            <p:cNvCxnSpPr/>
+            <p:nvPr/>
+          </p:nvCxnSpPr>
+          <p:spPr>
+            <a:xfrm>
+              <a:off x="0" y="4514764"/>
+              <a:ext cx="12192000" cy="0"/>
+            </a:xfrm>
+            <a:prstGeom prst="line">
+              <a:avLst/>
+            </a:prstGeom>
+            <a:ln w="12700">
+              <a:solidFill>
+                <a:srgbClr val="BCBCBC">
+                  <a:alpha val="29804"/>
+                </a:srgbClr>
+              </a:solidFill>
+              <a:prstDash val="sysDot"/>
+            </a:ln>
+          </p:spPr>
+          <p:style>
+            <a:lnRef idx="1">
+              <a:schemeClr val="accent1"/>
+            </a:lnRef>
+            <a:fillRef idx="0">
+              <a:schemeClr val="accent1"/>
+            </a:fillRef>
+            <a:effectRef idx="0">
+              <a:schemeClr val="accent1"/>
+            </a:effectRef>
+            <a:fontRef idx="minor">
+              <a:schemeClr val="tx1"/>
+            </a:fontRef>
+          </p:style>
+        </p:cxnSp>
+        <p:cxnSp>
+          <p:nvCxnSpPr>
+            <p:cNvPr id="31" name="Straight Connector 30"/>
+            <p:cNvCxnSpPr/>
+            <p:nvPr/>
+          </p:nvCxnSpPr>
+          <p:spPr>
+            <a:xfrm>
+              <a:off x="0" y="5057645"/>
+              <a:ext cx="12192000" cy="0"/>
+            </a:xfrm>
+            <a:prstGeom prst="line">
+              <a:avLst/>
+            </a:prstGeom>
+            <a:ln w="12700">
+              <a:solidFill>
+                <a:srgbClr val="BCBCBC">
+                  <a:alpha val="29804"/>
+                </a:srgbClr>
+              </a:solidFill>
+              <a:prstDash val="sysDot"/>
+            </a:ln>
+          </p:spPr>
+          <p:style>
+            <a:lnRef idx="1">
+              <a:schemeClr val="accent1"/>
+            </a:lnRef>
+            <a:fillRef idx="0">
+              <a:schemeClr val="accent1"/>
+            </a:fillRef>
+            <a:effectRef idx="0">
+              <a:schemeClr val="accent1"/>
+            </a:effectRef>
+            <a:fontRef idx="minor">
+              <a:schemeClr val="tx1"/>
+            </a:fontRef>
+          </p:style>
+        </p:cxnSp>
+        <p:cxnSp>
+          <p:nvCxnSpPr>
+            <p:cNvPr id="32" name="Straight Connector 31"/>
+            <p:cNvCxnSpPr/>
+            <p:nvPr/>
+          </p:nvCxnSpPr>
+          <p:spPr>
+            <a:xfrm>
+              <a:off x="0" y="5600526"/>
+              <a:ext cx="12192000" cy="0"/>
+            </a:xfrm>
+            <a:prstGeom prst="line">
+              <a:avLst/>
+            </a:prstGeom>
+            <a:ln w="12700">
+              <a:solidFill>
+                <a:srgbClr val="BCBCBC">
+                  <a:alpha val="29804"/>
+                </a:srgbClr>
+              </a:solidFill>
+              <a:prstDash val="sysDot"/>
+            </a:ln>
+          </p:spPr>
+          <p:style>
+            <a:lnRef idx="1">
+              <a:schemeClr val="accent1"/>
+            </a:lnRef>
+            <a:fillRef idx="0">
+              <a:schemeClr val="accent1"/>
+            </a:fillRef>
+            <a:effectRef idx="0">
+              <a:schemeClr val="accent1"/>
+            </a:effectRef>
+            <a:fontRef idx="minor">
+              <a:schemeClr val="tx1"/>
+            </a:fontRef>
+          </p:style>
+        </p:cxnSp>
+        <p:cxnSp>
+          <p:nvCxnSpPr>
+            <p:cNvPr id="33" name="Straight Connector 32"/>
+            <p:cNvCxnSpPr/>
+            <p:nvPr/>
+          </p:nvCxnSpPr>
+          <p:spPr>
+            <a:xfrm>
+              <a:off x="0" y="6857999"/>
+              <a:ext cx="12192000" cy="0"/>
+            </a:xfrm>
+            <a:prstGeom prst="line">
+              <a:avLst/>
+            </a:prstGeom>
+            <a:ln w="12700">
+              <a:solidFill>
+                <a:srgbClr val="BCBCBC">
+                  <a:alpha val="29804"/>
+                </a:srgbClr>
+              </a:solidFill>
+              <a:prstDash val="sysDot"/>
+            </a:ln>
+          </p:spPr>
+          <p:style>
+            <a:lnRef idx="1">
+              <a:schemeClr val="accent1"/>
+            </a:lnRef>
+            <a:fillRef idx="0">
+              <a:schemeClr val="accent1"/>
+            </a:fillRef>
+            <a:effectRef idx="0">
+              <a:schemeClr val="accent1"/>
+            </a:effectRef>
+            <a:fontRef idx="minor">
+              <a:schemeClr val="tx1"/>
+            </a:fontRef>
+          </p:style>
+        </p:cxnSp>
+        <p:cxnSp>
+          <p:nvCxnSpPr>
+            <p:cNvPr id="34" name="Straight Connector 33"/>
+            <p:cNvCxnSpPr/>
+            <p:nvPr/>
+          </p:nvCxnSpPr>
+          <p:spPr>
+            <a:xfrm>
+              <a:off x="16613" y="6143407"/>
+              <a:ext cx="12192000" cy="0"/>
+            </a:xfrm>
+            <a:prstGeom prst="line">
+              <a:avLst/>
+            </a:prstGeom>
+            <a:ln w="12700">
+              <a:solidFill>
+                <a:srgbClr val="BCBCBC">
+                  <a:alpha val="29804"/>
+                </a:srgbClr>
+              </a:solidFill>
+              <a:prstDash val="sysDot"/>
+            </a:ln>
+          </p:spPr>
+          <p:style>
+            <a:lnRef idx="1">
+              <a:schemeClr val="accent1"/>
+            </a:lnRef>
+            <a:fillRef idx="0">
+              <a:schemeClr val="accent1"/>
+            </a:fillRef>
+            <a:effectRef idx="0">
+              <a:schemeClr val="accent1"/>
+            </a:effectRef>
+            <a:fontRef idx="minor">
+              <a:schemeClr val="tx1"/>
+            </a:fontRef>
+          </p:style>
+        </p:cxnSp>
+        <p:cxnSp>
+          <p:nvCxnSpPr>
+            <p:cNvPr id="35" name="Straight Connector 34"/>
+            <p:cNvCxnSpPr/>
+            <p:nvPr/>
+          </p:nvCxnSpPr>
+          <p:spPr>
+            <a:xfrm>
+              <a:off x="684225" y="171716"/>
+              <a:ext cx="0" cy="6511464"/>
+            </a:xfrm>
+            <a:prstGeom prst="line">
+              <a:avLst/>
+            </a:prstGeom>
+            <a:ln w="12700">
+              <a:solidFill>
+                <a:srgbClr val="BCBCBC">
+                  <a:alpha val="29804"/>
+                </a:srgbClr>
+              </a:solidFill>
+              <a:prstDash val="sysDot"/>
+            </a:ln>
+          </p:spPr>
+          <p:style>
+            <a:lnRef idx="1">
+              <a:schemeClr val="accent1"/>
+            </a:lnRef>
+            <a:fillRef idx="0">
+              <a:schemeClr val="accent1"/>
+            </a:fillRef>
+            <a:effectRef idx="0">
+              <a:schemeClr val="accent1"/>
+            </a:effectRef>
+            <a:fontRef idx="minor">
+              <a:schemeClr val="tx1"/>
+            </a:fontRef>
+          </p:style>
+        </p:cxnSp>
+        <p:cxnSp>
+          <p:nvCxnSpPr>
+            <p:cNvPr id="36" name="Straight Connector 35"/>
+            <p:cNvCxnSpPr/>
+            <p:nvPr/>
+          </p:nvCxnSpPr>
+          <p:spPr>
+            <a:xfrm>
+              <a:off x="11508412" y="173267"/>
+              <a:ext cx="0" cy="6511464"/>
+            </a:xfrm>
+            <a:prstGeom prst="line">
+              <a:avLst/>
+            </a:prstGeom>
+            <a:ln w="12700">
+              <a:solidFill>
+                <a:srgbClr val="BCBCBC">
+                  <a:alpha val="29804"/>
+                </a:srgbClr>
+              </a:solidFill>
+              <a:prstDash val="sysDot"/>
+            </a:ln>
+          </p:spPr>
+          <p:style>
+            <a:lnRef idx="1">
+              <a:schemeClr val="accent1"/>
+            </a:lnRef>
+            <a:fillRef idx="0">
+              <a:schemeClr val="accent1"/>
+            </a:fillRef>
+            <a:effectRef idx="0">
+              <a:schemeClr val="accent1"/>
+            </a:effectRef>
+            <a:fontRef idx="minor">
+              <a:schemeClr val="tx1"/>
+            </a:fontRef>
+          </p:style>
+        </p:cxnSp>
+      </p:grpSp>
+      <p:sp>
+        <p:nvSpPr>
+          <p:cNvPr id="38" name="Picture Placeholder 37">
+            <a:extLst>
+              <a:ext uri="{FF2B5EF4-FFF2-40B4-BE49-F238E27FC236}">
+                <a16:creationId xmlns:a16="http://schemas.microsoft.com/office/drawing/2014/main" id="{BC0FE04E-8B1F-5AAB-0D71-93977D91780A}"/>
+              </a:ext>
+            </a:extLst>
+          </p:cNvPr>
+          <p:cNvSpPr>
+            <a:spLocks noGrp="1"/>
+          </p:cNvSpPr>
+          <p:nvPr>
+            <p:ph type="pic" sz="quarter" idx="10"/>
+          </p:nvPr>
+        </p:nvSpPr>
+        <p:spPr>
+          <a:xfrm>
+            <a:off x="-6215" y="-2"/>
+            <a:ext cx="12169165" cy="6857998"/>
+          </a:xfrm>
+        </p:spPr>
+        <p:txBody>
+          <a:bodyPr/>
+          <a:lstStyle/>
+          <a:p>
+            <a:endParaRPr lang="en-CN"/>
+          </a:p>
+        </p:txBody>
+      </p:sp>
+      <p:sp>
+        <p:nvSpPr>
+          <p:cNvPr id="40" name="Title 1">
+            <a:extLst>
+              <a:ext uri="{FF2B5EF4-FFF2-40B4-BE49-F238E27FC236}">
+                <a16:creationId xmlns:a16="http://schemas.microsoft.com/office/drawing/2014/main" id="{6B2C9348-E48E-5174-E099-8CDD4966B455}"/>
+              </a:ext>
+            </a:extLst>
+          </p:cNvPr>
+          <p:cNvSpPr>
+            <a:spLocks noGrp="1"/>
+          </p:cNvSpPr>
+          <p:nvPr>
+            <p:ph type="title"/>
+          </p:nvPr>
+        </p:nvSpPr>
+        <p:spPr>
+          <a:xfrm>
+            <a:off x="876752" y="725951"/>
+            <a:ext cx="9940581" cy="1893175"/>
+          </a:xfrm>
+        </p:spPr>
+        <p:txBody>
+          <a:bodyPr anchor="ctr">
+            <a:normAutofit/>
+          </a:bodyPr>
+          <a:lstStyle>
+            <a:lvl1pPr algn="ctr">
+              <a:defRPr kumimoji="0" lang="en-US" sz="5200" b="1" i="0" u="none" strike="noStrike" kern="1200" cap="none" spc="0" normalizeH="0" baseline="0" dirty="0">
+                <a:ln>
+                  <a:noFill/>
+                </a:ln>
+                <a:solidFill>
+                  <a:srgbClr val="FFFFFF"/>
+                </a:solidFill>
+                <a:effectLst/>
+                <a:uLnTx/>
+                <a:uFillTx/>
+                <a:latin typeface="Helvetica Neue Medium" panose="02000503000000020004"/>
+                <a:ea typeface="Helvetica Neue Medium" panose="02000503000000020004"/>
+                <a:cs typeface="Helvetica Neue Medium" panose="02000503000000020004"/>
+              </a:defRPr>
+            </a:lvl1pPr>
+          </a:lstStyle>
+          <a:p>
+            <a:r>
+              <a:rPr lang="en-US" dirty="0"/>
+              <a:t>Click to edit Master title style</a:t>
+            </a:r>
+          </a:p>
+        </p:txBody>
+      </p:sp>
+    </p:spTree>
+    <p:extLst>
+      <p:ext uri="{BB962C8B-B14F-4D97-AF65-F5344CB8AC3E}">
+        <p14:creationId xmlns:p14="http://schemas.microsoft.com/office/powerpoint/2010/main" val="376238915"/>
+      </p:ext>
+    </p:extLst>
+  </p:cSld>
+  <p:clrMapOvr>
+    <a:masterClrMapping/>
+  </p:clrMapOvr>
+</p:sldLayout>
+</file>
+
+<file path=ppt/slideLayouts/slideLayout11.xml><?xml version="1.0" encoding="utf-8"?>
+<p:sldLayout xmlns:a="http://schemas.openxmlformats.org/drawingml/2006/main" xmlns:r="http://schemas.openxmlformats.org/officeDocument/2006/relationships" xmlns:p="http://schemas.openxmlformats.org/presentationml/2006/main" showMasterSp="0" preserve="1" userDrawn="1">
   <p:cSld name="Picture 0">
     <p:spTree>
       <p:nvGrpSpPr>
@@ -2536,7 +3841,7 @@
 </p:sldLayout>
 </file>
 
-<file path=ppt/slideLayouts/slideLayout11.xml><?xml version="1.0" encoding="utf-8"?>
+<file path=ppt/slideLayouts/slideLayout12.xml><?xml version="1.0" encoding="utf-8"?>
 <p:sldLayout xmlns:a="http://schemas.openxmlformats.org/drawingml/2006/main" xmlns:r="http://schemas.openxmlformats.org/officeDocument/2006/relationships" xmlns:p="http://schemas.openxmlformats.org/presentationml/2006/main" showMasterSp="0" preserve="1" userDrawn="1">
   <p:cSld name="Title, Picture 1">
     <p:spTree>
@@ -2802,7 +4107,7 @@
 </p:sldLayout>
 </file>
 
-<file path=ppt/slideLayouts/slideLayout12.xml><?xml version="1.0" encoding="utf-8"?>
+<file path=ppt/slideLayouts/slideLayout13.xml><?xml version="1.0" encoding="utf-8"?>
 <p:sldLayout xmlns:a="http://schemas.openxmlformats.org/drawingml/2006/main" xmlns:r="http://schemas.openxmlformats.org/officeDocument/2006/relationships" xmlns:p="http://schemas.openxmlformats.org/presentationml/2006/main" preserve="1" userDrawn="1">
   <p:cSld name="blank">
     <p:spTree>
@@ -5103,7 +6408,7 @@
           </a:xfrm>
         </p:spPr>
         <p:txBody>
-          <a:bodyPr>
+          <a:bodyPr anchor="ctr">
             <a:normAutofit/>
           </a:bodyPr>
           <a:lstStyle>
@@ -6379,6 +7684,1400 @@
 </file>
 
 <file path=ppt/slideLayouts/slideLayout5.xml><?xml version="1.0" encoding="utf-8"?>
+<p:sldLayout xmlns:a="http://schemas.openxmlformats.org/drawingml/2006/main" xmlns:r="http://schemas.openxmlformats.org/officeDocument/2006/relationships" xmlns:p="http://schemas.openxmlformats.org/presentationml/2006/main" showMasterSp="0" preserve="1" userDrawn="1">
+  <p:cSld name="Title, Content 3">
+    <p:spTree>
+      <p:nvGrpSpPr>
+        <p:cNvPr id="1" name=""/>
+        <p:cNvGrpSpPr/>
+        <p:nvPr/>
+      </p:nvGrpSpPr>
+      <p:grpSpPr>
+        <a:xfrm>
+          <a:off x="0" y="0"/>
+          <a:ext cx="0" cy="0"/>
+          <a:chOff x="0" y="0"/>
+          <a:chExt cx="0" cy="0"/>
+        </a:xfrm>
+      </p:grpSpPr>
+      <p:grpSp>
+        <p:nvGrpSpPr>
+          <p:cNvPr id="8" name="Group 7"/>
+          <p:cNvGrpSpPr/>
+          <p:nvPr/>
+        </p:nvGrpSpPr>
+        <p:grpSpPr>
+          <a:xfrm>
+            <a:off x="-6214" y="-1"/>
+            <a:ext cx="12214827" cy="6858000"/>
+            <a:chOff x="-6214" y="-1"/>
+            <a:chExt cx="12214827" cy="6858000"/>
+          </a:xfrm>
+        </p:grpSpPr>
+        <p:cxnSp>
+          <p:nvCxnSpPr>
+            <p:cNvPr id="25" name="Straight Connector 24"/>
+            <p:cNvCxnSpPr/>
+            <p:nvPr/>
+          </p:nvCxnSpPr>
+          <p:spPr>
+            <a:xfrm>
+              <a:off x="0" y="171716"/>
+              <a:ext cx="12192000" cy="0"/>
+            </a:xfrm>
+            <a:prstGeom prst="line">
+              <a:avLst/>
+            </a:prstGeom>
+            <a:ln w="12700">
+              <a:solidFill>
+                <a:srgbClr val="BCBCBC">
+                  <a:alpha val="29804"/>
+                </a:srgbClr>
+              </a:solidFill>
+              <a:prstDash val="sysDot"/>
+            </a:ln>
+          </p:spPr>
+          <p:style>
+            <a:lnRef idx="1">
+              <a:schemeClr val="accent1"/>
+            </a:lnRef>
+            <a:fillRef idx="0">
+              <a:schemeClr val="accent1"/>
+            </a:fillRef>
+            <a:effectRef idx="0">
+              <a:schemeClr val="accent1"/>
+            </a:effectRef>
+            <a:fontRef idx="minor">
+              <a:schemeClr val="tx1"/>
+            </a:fontRef>
+          </p:style>
+        </p:cxnSp>
+        <p:cxnSp>
+          <p:nvCxnSpPr>
+            <p:cNvPr id="9" name="Straight Connector 8"/>
+            <p:cNvCxnSpPr/>
+            <p:nvPr/>
+          </p:nvCxnSpPr>
+          <p:spPr>
+            <a:xfrm>
+              <a:off x="-6214" y="6686283"/>
+              <a:ext cx="12192000" cy="0"/>
+            </a:xfrm>
+            <a:prstGeom prst="line">
+              <a:avLst/>
+            </a:prstGeom>
+            <a:ln w="12700">
+              <a:solidFill>
+                <a:srgbClr val="BCBCBC">
+                  <a:alpha val="29804"/>
+                </a:srgbClr>
+              </a:solidFill>
+              <a:prstDash val="sysDot"/>
+            </a:ln>
+          </p:spPr>
+          <p:style>
+            <a:lnRef idx="1">
+              <a:schemeClr val="accent1"/>
+            </a:lnRef>
+            <a:fillRef idx="0">
+              <a:schemeClr val="accent1"/>
+            </a:fillRef>
+            <a:effectRef idx="0">
+              <a:schemeClr val="accent1"/>
+            </a:effectRef>
+            <a:fontRef idx="minor">
+              <a:schemeClr val="tx1"/>
+            </a:fontRef>
+          </p:style>
+        </p:cxnSp>
+        <p:cxnSp>
+          <p:nvCxnSpPr>
+            <p:cNvPr id="10" name="Straight Connector 9"/>
+            <p:cNvCxnSpPr/>
+            <p:nvPr/>
+          </p:nvCxnSpPr>
+          <p:spPr>
+            <a:xfrm>
+              <a:off x="0" y="-1"/>
+              <a:ext cx="0" cy="6858000"/>
+            </a:xfrm>
+            <a:prstGeom prst="line">
+              <a:avLst/>
+            </a:prstGeom>
+            <a:ln w="12700">
+              <a:solidFill>
+                <a:srgbClr val="BCBCBC">
+                  <a:alpha val="29804"/>
+                </a:srgbClr>
+              </a:solidFill>
+              <a:prstDash val="sysDot"/>
+            </a:ln>
+          </p:spPr>
+          <p:style>
+            <a:lnRef idx="1">
+              <a:schemeClr val="accent1"/>
+            </a:lnRef>
+            <a:fillRef idx="0">
+              <a:schemeClr val="accent1"/>
+            </a:fillRef>
+            <a:effectRef idx="0">
+              <a:schemeClr val="accent1"/>
+            </a:effectRef>
+            <a:fontRef idx="minor">
+              <a:schemeClr val="tx1"/>
+            </a:fontRef>
+          </p:style>
+        </p:cxnSp>
+        <p:cxnSp>
+          <p:nvCxnSpPr>
+            <p:cNvPr id="11" name="Straight Connector 10"/>
+            <p:cNvCxnSpPr/>
+            <p:nvPr/>
+          </p:nvCxnSpPr>
+          <p:spPr>
+            <a:xfrm>
+              <a:off x="11993258" y="-1"/>
+              <a:ext cx="0" cy="6858000"/>
+            </a:xfrm>
+            <a:prstGeom prst="line">
+              <a:avLst/>
+            </a:prstGeom>
+            <a:ln w="12700">
+              <a:solidFill>
+                <a:srgbClr val="BCBCBC">
+                  <a:alpha val="29804"/>
+                </a:srgbClr>
+              </a:solidFill>
+              <a:prstDash val="sysDot"/>
+            </a:ln>
+          </p:spPr>
+          <p:style>
+            <a:lnRef idx="1">
+              <a:schemeClr val="accent1"/>
+            </a:lnRef>
+            <a:fillRef idx="0">
+              <a:schemeClr val="accent1"/>
+            </a:fillRef>
+            <a:effectRef idx="0">
+              <a:schemeClr val="accent1"/>
+            </a:effectRef>
+            <a:fontRef idx="minor">
+              <a:schemeClr val="tx1"/>
+            </a:fontRef>
+          </p:style>
+        </p:cxnSp>
+        <p:cxnSp>
+          <p:nvCxnSpPr>
+            <p:cNvPr id="12" name="Straight Connector 11"/>
+            <p:cNvCxnSpPr/>
+            <p:nvPr/>
+          </p:nvCxnSpPr>
+          <p:spPr>
+            <a:xfrm>
+              <a:off x="192528" y="-1"/>
+              <a:ext cx="0" cy="6858000"/>
+            </a:xfrm>
+            <a:prstGeom prst="line">
+              <a:avLst/>
+            </a:prstGeom>
+            <a:ln w="12700">
+              <a:solidFill>
+                <a:srgbClr val="BCBCBC">
+                  <a:alpha val="29804"/>
+                </a:srgbClr>
+              </a:solidFill>
+              <a:prstDash val="sysDot"/>
+            </a:ln>
+          </p:spPr>
+          <p:style>
+            <a:lnRef idx="1">
+              <a:schemeClr val="accent1"/>
+            </a:lnRef>
+            <a:fillRef idx="0">
+              <a:schemeClr val="accent1"/>
+            </a:fillRef>
+            <a:effectRef idx="0">
+              <a:schemeClr val="accent1"/>
+            </a:effectRef>
+            <a:fontRef idx="minor">
+              <a:schemeClr val="tx1"/>
+            </a:fontRef>
+          </p:style>
+        </p:cxnSp>
+        <p:cxnSp>
+          <p:nvCxnSpPr>
+            <p:cNvPr id="13" name="Straight Connector 12"/>
+            <p:cNvCxnSpPr/>
+            <p:nvPr/>
+          </p:nvCxnSpPr>
+          <p:spPr>
+            <a:xfrm>
+              <a:off x="1175922" y="-1"/>
+              <a:ext cx="0" cy="6858000"/>
+            </a:xfrm>
+            <a:prstGeom prst="line">
+              <a:avLst/>
+            </a:prstGeom>
+            <a:ln w="12700">
+              <a:solidFill>
+                <a:srgbClr val="BCBCBC">
+                  <a:alpha val="29804"/>
+                </a:srgbClr>
+              </a:solidFill>
+              <a:prstDash val="sysDot"/>
+            </a:ln>
+          </p:spPr>
+          <p:style>
+            <a:lnRef idx="1">
+              <a:schemeClr val="accent1"/>
+            </a:lnRef>
+            <a:fillRef idx="0">
+              <a:schemeClr val="accent1"/>
+            </a:fillRef>
+            <a:effectRef idx="0">
+              <a:schemeClr val="accent1"/>
+            </a:effectRef>
+            <a:fontRef idx="minor">
+              <a:schemeClr val="tx1"/>
+            </a:fontRef>
+          </p:style>
+        </p:cxnSp>
+        <p:cxnSp>
+          <p:nvCxnSpPr>
+            <p:cNvPr id="14" name="Straight Connector 13"/>
+            <p:cNvCxnSpPr/>
+            <p:nvPr/>
+          </p:nvCxnSpPr>
+          <p:spPr>
+            <a:xfrm>
+              <a:off x="2159316" y="-1"/>
+              <a:ext cx="0" cy="6858000"/>
+            </a:xfrm>
+            <a:prstGeom prst="line">
+              <a:avLst/>
+            </a:prstGeom>
+            <a:ln w="12700">
+              <a:solidFill>
+                <a:srgbClr val="BCBCBC">
+                  <a:alpha val="29804"/>
+                </a:srgbClr>
+              </a:solidFill>
+              <a:prstDash val="sysDot"/>
+            </a:ln>
+          </p:spPr>
+          <p:style>
+            <a:lnRef idx="1">
+              <a:schemeClr val="accent1"/>
+            </a:lnRef>
+            <a:fillRef idx="0">
+              <a:schemeClr val="accent1"/>
+            </a:fillRef>
+            <a:effectRef idx="0">
+              <a:schemeClr val="accent1"/>
+            </a:effectRef>
+            <a:fontRef idx="minor">
+              <a:schemeClr val="tx1"/>
+            </a:fontRef>
+          </p:style>
+        </p:cxnSp>
+        <p:cxnSp>
+          <p:nvCxnSpPr>
+            <p:cNvPr id="15" name="Straight Connector 14"/>
+            <p:cNvCxnSpPr/>
+            <p:nvPr/>
+          </p:nvCxnSpPr>
+          <p:spPr>
+            <a:xfrm>
+              <a:off x="3142710" y="-1"/>
+              <a:ext cx="0" cy="6858000"/>
+            </a:xfrm>
+            <a:prstGeom prst="line">
+              <a:avLst/>
+            </a:prstGeom>
+            <a:ln w="12700">
+              <a:solidFill>
+                <a:srgbClr val="BCBCBC">
+                  <a:alpha val="29804"/>
+                </a:srgbClr>
+              </a:solidFill>
+              <a:prstDash val="sysDot"/>
+            </a:ln>
+          </p:spPr>
+          <p:style>
+            <a:lnRef idx="1">
+              <a:schemeClr val="accent1"/>
+            </a:lnRef>
+            <a:fillRef idx="0">
+              <a:schemeClr val="accent1"/>
+            </a:fillRef>
+            <a:effectRef idx="0">
+              <a:schemeClr val="accent1"/>
+            </a:effectRef>
+            <a:fontRef idx="minor">
+              <a:schemeClr val="tx1"/>
+            </a:fontRef>
+          </p:style>
+        </p:cxnSp>
+        <p:cxnSp>
+          <p:nvCxnSpPr>
+            <p:cNvPr id="16" name="Straight Connector 15"/>
+            <p:cNvCxnSpPr/>
+            <p:nvPr/>
+          </p:nvCxnSpPr>
+          <p:spPr>
+            <a:xfrm>
+              <a:off x="4126104" y="-1"/>
+              <a:ext cx="0" cy="6858000"/>
+            </a:xfrm>
+            <a:prstGeom prst="line">
+              <a:avLst/>
+            </a:prstGeom>
+            <a:ln w="12700">
+              <a:solidFill>
+                <a:srgbClr val="BCBCBC">
+                  <a:alpha val="29804"/>
+                </a:srgbClr>
+              </a:solidFill>
+              <a:prstDash val="sysDot"/>
+            </a:ln>
+          </p:spPr>
+          <p:style>
+            <a:lnRef idx="1">
+              <a:schemeClr val="accent1"/>
+            </a:lnRef>
+            <a:fillRef idx="0">
+              <a:schemeClr val="accent1"/>
+            </a:fillRef>
+            <a:effectRef idx="0">
+              <a:schemeClr val="accent1"/>
+            </a:effectRef>
+            <a:fontRef idx="minor">
+              <a:schemeClr val="tx1"/>
+            </a:fontRef>
+          </p:style>
+        </p:cxnSp>
+        <p:cxnSp>
+          <p:nvCxnSpPr>
+            <p:cNvPr id="17" name="Straight Connector 16"/>
+            <p:cNvCxnSpPr/>
+            <p:nvPr/>
+          </p:nvCxnSpPr>
+          <p:spPr>
+            <a:xfrm>
+              <a:off x="5109498" y="-1"/>
+              <a:ext cx="0" cy="6858000"/>
+            </a:xfrm>
+            <a:prstGeom prst="line">
+              <a:avLst/>
+            </a:prstGeom>
+            <a:ln w="12700">
+              <a:solidFill>
+                <a:srgbClr val="BCBCBC">
+                  <a:alpha val="29804"/>
+                </a:srgbClr>
+              </a:solidFill>
+              <a:prstDash val="sysDot"/>
+            </a:ln>
+          </p:spPr>
+          <p:style>
+            <a:lnRef idx="1">
+              <a:schemeClr val="accent1"/>
+            </a:lnRef>
+            <a:fillRef idx="0">
+              <a:schemeClr val="accent1"/>
+            </a:fillRef>
+            <a:effectRef idx="0">
+              <a:schemeClr val="accent1"/>
+            </a:effectRef>
+            <a:fontRef idx="minor">
+              <a:schemeClr val="tx1"/>
+            </a:fontRef>
+          </p:style>
+        </p:cxnSp>
+        <p:cxnSp>
+          <p:nvCxnSpPr>
+            <p:cNvPr id="18" name="Straight Connector 17"/>
+            <p:cNvCxnSpPr/>
+            <p:nvPr/>
+          </p:nvCxnSpPr>
+          <p:spPr>
+            <a:xfrm>
+              <a:off x="6092892" y="-1"/>
+              <a:ext cx="0" cy="6858000"/>
+            </a:xfrm>
+            <a:prstGeom prst="line">
+              <a:avLst/>
+            </a:prstGeom>
+            <a:ln w="12700">
+              <a:solidFill>
+                <a:srgbClr val="BCBCBC">
+                  <a:alpha val="29804"/>
+                </a:srgbClr>
+              </a:solidFill>
+              <a:prstDash val="sysDot"/>
+            </a:ln>
+          </p:spPr>
+          <p:style>
+            <a:lnRef idx="1">
+              <a:schemeClr val="accent1"/>
+            </a:lnRef>
+            <a:fillRef idx="0">
+              <a:schemeClr val="accent1"/>
+            </a:fillRef>
+            <a:effectRef idx="0">
+              <a:schemeClr val="accent1"/>
+            </a:effectRef>
+            <a:fontRef idx="minor">
+              <a:schemeClr val="tx1"/>
+            </a:fontRef>
+          </p:style>
+        </p:cxnSp>
+        <p:cxnSp>
+          <p:nvCxnSpPr>
+            <p:cNvPr id="19" name="Straight Connector 18"/>
+            <p:cNvCxnSpPr/>
+            <p:nvPr/>
+          </p:nvCxnSpPr>
+          <p:spPr>
+            <a:xfrm>
+              <a:off x="7076286" y="-1"/>
+              <a:ext cx="0" cy="6858000"/>
+            </a:xfrm>
+            <a:prstGeom prst="line">
+              <a:avLst/>
+            </a:prstGeom>
+            <a:ln w="12700">
+              <a:solidFill>
+                <a:srgbClr val="BCBCBC">
+                  <a:alpha val="29804"/>
+                </a:srgbClr>
+              </a:solidFill>
+              <a:prstDash val="sysDot"/>
+            </a:ln>
+          </p:spPr>
+          <p:style>
+            <a:lnRef idx="1">
+              <a:schemeClr val="accent1"/>
+            </a:lnRef>
+            <a:fillRef idx="0">
+              <a:schemeClr val="accent1"/>
+            </a:fillRef>
+            <a:effectRef idx="0">
+              <a:schemeClr val="accent1"/>
+            </a:effectRef>
+            <a:fontRef idx="minor">
+              <a:schemeClr val="tx1"/>
+            </a:fontRef>
+          </p:style>
+        </p:cxnSp>
+        <p:cxnSp>
+          <p:nvCxnSpPr>
+            <p:cNvPr id="20" name="Straight Connector 19"/>
+            <p:cNvCxnSpPr/>
+            <p:nvPr/>
+          </p:nvCxnSpPr>
+          <p:spPr>
+            <a:xfrm>
+              <a:off x="8059680" y="-1"/>
+              <a:ext cx="0" cy="6858000"/>
+            </a:xfrm>
+            <a:prstGeom prst="line">
+              <a:avLst/>
+            </a:prstGeom>
+            <a:ln w="12700">
+              <a:solidFill>
+                <a:srgbClr val="BCBCBC">
+                  <a:alpha val="29804"/>
+                </a:srgbClr>
+              </a:solidFill>
+              <a:prstDash val="sysDot"/>
+            </a:ln>
+          </p:spPr>
+          <p:style>
+            <a:lnRef idx="1">
+              <a:schemeClr val="accent1"/>
+            </a:lnRef>
+            <a:fillRef idx="0">
+              <a:schemeClr val="accent1"/>
+            </a:fillRef>
+            <a:effectRef idx="0">
+              <a:schemeClr val="accent1"/>
+            </a:effectRef>
+            <a:fontRef idx="minor">
+              <a:schemeClr val="tx1"/>
+            </a:fontRef>
+          </p:style>
+        </p:cxnSp>
+        <p:cxnSp>
+          <p:nvCxnSpPr>
+            <p:cNvPr id="21" name="Straight Connector 20"/>
+            <p:cNvCxnSpPr/>
+            <p:nvPr/>
+          </p:nvCxnSpPr>
+          <p:spPr>
+            <a:xfrm>
+              <a:off x="9043074" y="-1"/>
+              <a:ext cx="0" cy="6858000"/>
+            </a:xfrm>
+            <a:prstGeom prst="line">
+              <a:avLst/>
+            </a:prstGeom>
+            <a:ln w="12700">
+              <a:solidFill>
+                <a:srgbClr val="BCBCBC">
+                  <a:alpha val="29804"/>
+                </a:srgbClr>
+              </a:solidFill>
+              <a:prstDash val="sysDot"/>
+            </a:ln>
+          </p:spPr>
+          <p:style>
+            <a:lnRef idx="1">
+              <a:schemeClr val="accent1"/>
+            </a:lnRef>
+            <a:fillRef idx="0">
+              <a:schemeClr val="accent1"/>
+            </a:fillRef>
+            <a:effectRef idx="0">
+              <a:schemeClr val="accent1"/>
+            </a:effectRef>
+            <a:fontRef idx="minor">
+              <a:schemeClr val="tx1"/>
+            </a:fontRef>
+          </p:style>
+        </p:cxnSp>
+        <p:cxnSp>
+          <p:nvCxnSpPr>
+            <p:cNvPr id="22" name="Straight Connector 21"/>
+            <p:cNvCxnSpPr/>
+            <p:nvPr/>
+          </p:nvCxnSpPr>
+          <p:spPr>
+            <a:xfrm>
+              <a:off x="10026468" y="-1"/>
+              <a:ext cx="0" cy="6858000"/>
+            </a:xfrm>
+            <a:prstGeom prst="line">
+              <a:avLst/>
+            </a:prstGeom>
+            <a:ln w="12700">
+              <a:solidFill>
+                <a:srgbClr val="BCBCBC">
+                  <a:alpha val="29804"/>
+                </a:srgbClr>
+              </a:solidFill>
+              <a:prstDash val="sysDot"/>
+            </a:ln>
+          </p:spPr>
+          <p:style>
+            <a:lnRef idx="1">
+              <a:schemeClr val="accent1"/>
+            </a:lnRef>
+            <a:fillRef idx="0">
+              <a:schemeClr val="accent1"/>
+            </a:fillRef>
+            <a:effectRef idx="0">
+              <a:schemeClr val="accent1"/>
+            </a:effectRef>
+            <a:fontRef idx="minor">
+              <a:schemeClr val="tx1"/>
+            </a:fontRef>
+          </p:style>
+        </p:cxnSp>
+        <p:cxnSp>
+          <p:nvCxnSpPr>
+            <p:cNvPr id="23" name="Straight Connector 22"/>
+            <p:cNvCxnSpPr/>
+            <p:nvPr/>
+          </p:nvCxnSpPr>
+          <p:spPr>
+            <a:xfrm>
+              <a:off x="11009862" y="-1"/>
+              <a:ext cx="0" cy="6858000"/>
+            </a:xfrm>
+            <a:prstGeom prst="line">
+              <a:avLst/>
+            </a:prstGeom>
+            <a:ln w="12700">
+              <a:solidFill>
+                <a:srgbClr val="BCBCBC">
+                  <a:alpha val="29804"/>
+                </a:srgbClr>
+              </a:solidFill>
+              <a:prstDash val="sysDot"/>
+            </a:ln>
+          </p:spPr>
+          <p:style>
+            <a:lnRef idx="1">
+              <a:schemeClr val="accent1"/>
+            </a:lnRef>
+            <a:fillRef idx="0">
+              <a:schemeClr val="accent1"/>
+            </a:fillRef>
+            <a:effectRef idx="0">
+              <a:schemeClr val="accent1"/>
+            </a:effectRef>
+            <a:fontRef idx="minor">
+              <a:schemeClr val="tx1"/>
+            </a:fontRef>
+          </p:style>
+        </p:cxnSp>
+        <p:cxnSp>
+          <p:nvCxnSpPr>
+            <p:cNvPr id="24" name="Straight Connector 23"/>
+            <p:cNvCxnSpPr/>
+            <p:nvPr/>
+          </p:nvCxnSpPr>
+          <p:spPr>
+            <a:xfrm>
+              <a:off x="12185786" y="-1"/>
+              <a:ext cx="0" cy="6858000"/>
+            </a:xfrm>
+            <a:prstGeom prst="line">
+              <a:avLst/>
+            </a:prstGeom>
+            <a:ln w="12700">
+              <a:solidFill>
+                <a:srgbClr val="BCBCBC">
+                  <a:alpha val="29804"/>
+                </a:srgbClr>
+              </a:solidFill>
+              <a:prstDash val="sysDot"/>
+            </a:ln>
+          </p:spPr>
+          <p:style>
+            <a:lnRef idx="1">
+              <a:schemeClr val="accent1"/>
+            </a:lnRef>
+            <a:fillRef idx="0">
+              <a:schemeClr val="accent1"/>
+            </a:fillRef>
+            <a:effectRef idx="0">
+              <a:schemeClr val="accent1"/>
+            </a:effectRef>
+            <a:fontRef idx="minor">
+              <a:schemeClr val="tx1"/>
+            </a:fontRef>
+          </p:style>
+        </p:cxnSp>
+        <p:cxnSp>
+          <p:nvCxnSpPr>
+            <p:cNvPr id="26" name="Straight Connector 25"/>
+            <p:cNvCxnSpPr/>
+            <p:nvPr/>
+          </p:nvCxnSpPr>
+          <p:spPr>
+            <a:xfrm>
+              <a:off x="0" y="714597"/>
+              <a:ext cx="12192000" cy="0"/>
+            </a:xfrm>
+            <a:prstGeom prst="line">
+              <a:avLst/>
+            </a:prstGeom>
+            <a:ln w="12700">
+              <a:solidFill>
+                <a:srgbClr val="BCBCBC">
+                  <a:alpha val="29804"/>
+                </a:srgbClr>
+              </a:solidFill>
+              <a:prstDash val="sysDot"/>
+            </a:ln>
+          </p:spPr>
+          <p:style>
+            <a:lnRef idx="1">
+              <a:schemeClr val="accent1"/>
+            </a:lnRef>
+            <a:fillRef idx="0">
+              <a:schemeClr val="accent1"/>
+            </a:fillRef>
+            <a:effectRef idx="0">
+              <a:schemeClr val="accent1"/>
+            </a:effectRef>
+            <a:fontRef idx="minor">
+              <a:schemeClr val="tx1"/>
+            </a:fontRef>
+          </p:style>
+        </p:cxnSp>
+        <p:cxnSp>
+          <p:nvCxnSpPr>
+            <p:cNvPr id="27" name="Straight Connector 26"/>
+            <p:cNvCxnSpPr/>
+            <p:nvPr/>
+          </p:nvCxnSpPr>
+          <p:spPr>
+            <a:xfrm>
+              <a:off x="0" y="1257478"/>
+              <a:ext cx="12192000" cy="0"/>
+            </a:xfrm>
+            <a:prstGeom prst="line">
+              <a:avLst/>
+            </a:prstGeom>
+            <a:ln w="12700">
+              <a:solidFill>
+                <a:srgbClr val="BCBCBC">
+                  <a:alpha val="29804"/>
+                </a:srgbClr>
+              </a:solidFill>
+              <a:prstDash val="sysDot"/>
+            </a:ln>
+          </p:spPr>
+          <p:style>
+            <a:lnRef idx="1">
+              <a:schemeClr val="accent1"/>
+            </a:lnRef>
+            <a:fillRef idx="0">
+              <a:schemeClr val="accent1"/>
+            </a:fillRef>
+            <a:effectRef idx="0">
+              <a:schemeClr val="accent1"/>
+            </a:effectRef>
+            <a:fontRef idx="minor">
+              <a:schemeClr val="tx1"/>
+            </a:fontRef>
+          </p:style>
+        </p:cxnSp>
+        <p:cxnSp>
+          <p:nvCxnSpPr>
+            <p:cNvPr id="28" name="Straight Connector 27"/>
+            <p:cNvCxnSpPr/>
+            <p:nvPr/>
+          </p:nvCxnSpPr>
+          <p:spPr>
+            <a:xfrm>
+              <a:off x="0" y="1800359"/>
+              <a:ext cx="12192000" cy="0"/>
+            </a:xfrm>
+            <a:prstGeom prst="line">
+              <a:avLst/>
+            </a:prstGeom>
+            <a:ln w="12700">
+              <a:solidFill>
+                <a:srgbClr val="BCBCBC">
+                  <a:alpha val="29804"/>
+                </a:srgbClr>
+              </a:solidFill>
+              <a:prstDash val="sysDot"/>
+            </a:ln>
+          </p:spPr>
+          <p:style>
+            <a:lnRef idx="1">
+              <a:schemeClr val="accent1"/>
+            </a:lnRef>
+            <a:fillRef idx="0">
+              <a:schemeClr val="accent1"/>
+            </a:fillRef>
+            <a:effectRef idx="0">
+              <a:schemeClr val="accent1"/>
+            </a:effectRef>
+            <a:fontRef idx="minor">
+              <a:schemeClr val="tx1"/>
+            </a:fontRef>
+          </p:style>
+        </p:cxnSp>
+        <p:cxnSp>
+          <p:nvCxnSpPr>
+            <p:cNvPr id="29" name="Straight Connector 28"/>
+            <p:cNvCxnSpPr/>
+            <p:nvPr/>
+          </p:nvCxnSpPr>
+          <p:spPr>
+            <a:xfrm>
+              <a:off x="0" y="2343240"/>
+              <a:ext cx="12192000" cy="0"/>
+            </a:xfrm>
+            <a:prstGeom prst="line">
+              <a:avLst/>
+            </a:prstGeom>
+            <a:ln w="12700">
+              <a:solidFill>
+                <a:srgbClr val="BCBCBC">
+                  <a:alpha val="29804"/>
+                </a:srgbClr>
+              </a:solidFill>
+              <a:prstDash val="sysDot"/>
+            </a:ln>
+          </p:spPr>
+          <p:style>
+            <a:lnRef idx="1">
+              <a:schemeClr val="accent1"/>
+            </a:lnRef>
+            <a:fillRef idx="0">
+              <a:schemeClr val="accent1"/>
+            </a:fillRef>
+            <a:effectRef idx="0">
+              <a:schemeClr val="accent1"/>
+            </a:effectRef>
+            <a:fontRef idx="minor">
+              <a:schemeClr val="tx1"/>
+            </a:fontRef>
+          </p:style>
+        </p:cxnSp>
+        <p:cxnSp>
+          <p:nvCxnSpPr>
+            <p:cNvPr id="30" name="Straight Connector 29"/>
+            <p:cNvCxnSpPr/>
+            <p:nvPr/>
+          </p:nvCxnSpPr>
+          <p:spPr>
+            <a:xfrm>
+              <a:off x="0" y="2886121"/>
+              <a:ext cx="12192000" cy="0"/>
+            </a:xfrm>
+            <a:prstGeom prst="line">
+              <a:avLst/>
+            </a:prstGeom>
+            <a:ln w="12700">
+              <a:solidFill>
+                <a:srgbClr val="BCBCBC">
+                  <a:alpha val="29804"/>
+                </a:srgbClr>
+              </a:solidFill>
+              <a:prstDash val="sysDot"/>
+            </a:ln>
+          </p:spPr>
+          <p:style>
+            <a:lnRef idx="1">
+              <a:schemeClr val="accent1"/>
+            </a:lnRef>
+            <a:fillRef idx="0">
+              <a:schemeClr val="accent1"/>
+            </a:fillRef>
+            <a:effectRef idx="0">
+              <a:schemeClr val="accent1"/>
+            </a:effectRef>
+            <a:fontRef idx="minor">
+              <a:schemeClr val="tx1"/>
+            </a:fontRef>
+          </p:style>
+        </p:cxnSp>
+        <p:cxnSp>
+          <p:nvCxnSpPr>
+            <p:cNvPr id="31" name="Straight Connector 30"/>
+            <p:cNvCxnSpPr/>
+            <p:nvPr/>
+          </p:nvCxnSpPr>
+          <p:spPr>
+            <a:xfrm>
+              <a:off x="0" y="3429002"/>
+              <a:ext cx="12192000" cy="0"/>
+            </a:xfrm>
+            <a:prstGeom prst="line">
+              <a:avLst/>
+            </a:prstGeom>
+            <a:ln w="12700">
+              <a:solidFill>
+                <a:srgbClr val="BCBCBC">
+                  <a:alpha val="29804"/>
+                </a:srgbClr>
+              </a:solidFill>
+              <a:prstDash val="sysDot"/>
+            </a:ln>
+          </p:spPr>
+          <p:style>
+            <a:lnRef idx="1">
+              <a:schemeClr val="accent1"/>
+            </a:lnRef>
+            <a:fillRef idx="0">
+              <a:schemeClr val="accent1"/>
+            </a:fillRef>
+            <a:effectRef idx="0">
+              <a:schemeClr val="accent1"/>
+            </a:effectRef>
+            <a:fontRef idx="minor">
+              <a:schemeClr val="tx1"/>
+            </a:fontRef>
+          </p:style>
+        </p:cxnSp>
+        <p:cxnSp>
+          <p:nvCxnSpPr>
+            <p:cNvPr id="32" name="Straight Connector 31"/>
+            <p:cNvCxnSpPr/>
+            <p:nvPr/>
+          </p:nvCxnSpPr>
+          <p:spPr>
+            <a:xfrm>
+              <a:off x="0" y="3971883"/>
+              <a:ext cx="12192000" cy="0"/>
+            </a:xfrm>
+            <a:prstGeom prst="line">
+              <a:avLst/>
+            </a:prstGeom>
+            <a:ln w="12700">
+              <a:solidFill>
+                <a:srgbClr val="BCBCBC">
+                  <a:alpha val="29804"/>
+                </a:srgbClr>
+              </a:solidFill>
+              <a:prstDash val="sysDot"/>
+            </a:ln>
+          </p:spPr>
+          <p:style>
+            <a:lnRef idx="1">
+              <a:schemeClr val="accent1"/>
+            </a:lnRef>
+            <a:fillRef idx="0">
+              <a:schemeClr val="accent1"/>
+            </a:fillRef>
+            <a:effectRef idx="0">
+              <a:schemeClr val="accent1"/>
+            </a:effectRef>
+            <a:fontRef idx="minor">
+              <a:schemeClr val="tx1"/>
+            </a:fontRef>
+          </p:style>
+        </p:cxnSp>
+        <p:cxnSp>
+          <p:nvCxnSpPr>
+            <p:cNvPr id="33" name="Straight Connector 32"/>
+            <p:cNvCxnSpPr/>
+            <p:nvPr/>
+          </p:nvCxnSpPr>
+          <p:spPr>
+            <a:xfrm>
+              <a:off x="0" y="4514764"/>
+              <a:ext cx="12192000" cy="0"/>
+            </a:xfrm>
+            <a:prstGeom prst="line">
+              <a:avLst/>
+            </a:prstGeom>
+            <a:ln w="12700">
+              <a:solidFill>
+                <a:srgbClr val="BCBCBC">
+                  <a:alpha val="29804"/>
+                </a:srgbClr>
+              </a:solidFill>
+              <a:prstDash val="sysDot"/>
+            </a:ln>
+          </p:spPr>
+          <p:style>
+            <a:lnRef idx="1">
+              <a:schemeClr val="accent1"/>
+            </a:lnRef>
+            <a:fillRef idx="0">
+              <a:schemeClr val="accent1"/>
+            </a:fillRef>
+            <a:effectRef idx="0">
+              <a:schemeClr val="accent1"/>
+            </a:effectRef>
+            <a:fontRef idx="minor">
+              <a:schemeClr val="tx1"/>
+            </a:fontRef>
+          </p:style>
+        </p:cxnSp>
+        <p:cxnSp>
+          <p:nvCxnSpPr>
+            <p:cNvPr id="34" name="Straight Connector 33"/>
+            <p:cNvCxnSpPr/>
+            <p:nvPr/>
+          </p:nvCxnSpPr>
+          <p:spPr>
+            <a:xfrm>
+              <a:off x="0" y="5057645"/>
+              <a:ext cx="12192000" cy="0"/>
+            </a:xfrm>
+            <a:prstGeom prst="line">
+              <a:avLst/>
+            </a:prstGeom>
+            <a:ln w="12700">
+              <a:solidFill>
+                <a:srgbClr val="BCBCBC">
+                  <a:alpha val="29804"/>
+                </a:srgbClr>
+              </a:solidFill>
+              <a:prstDash val="sysDot"/>
+            </a:ln>
+          </p:spPr>
+          <p:style>
+            <a:lnRef idx="1">
+              <a:schemeClr val="accent1"/>
+            </a:lnRef>
+            <a:fillRef idx="0">
+              <a:schemeClr val="accent1"/>
+            </a:fillRef>
+            <a:effectRef idx="0">
+              <a:schemeClr val="accent1"/>
+            </a:effectRef>
+            <a:fontRef idx="minor">
+              <a:schemeClr val="tx1"/>
+            </a:fontRef>
+          </p:style>
+        </p:cxnSp>
+        <p:cxnSp>
+          <p:nvCxnSpPr>
+            <p:cNvPr id="35" name="Straight Connector 34"/>
+            <p:cNvCxnSpPr/>
+            <p:nvPr/>
+          </p:nvCxnSpPr>
+          <p:spPr>
+            <a:xfrm>
+              <a:off x="0" y="5600526"/>
+              <a:ext cx="12192000" cy="0"/>
+            </a:xfrm>
+            <a:prstGeom prst="line">
+              <a:avLst/>
+            </a:prstGeom>
+            <a:ln w="12700">
+              <a:solidFill>
+                <a:srgbClr val="BCBCBC">
+                  <a:alpha val="29804"/>
+                </a:srgbClr>
+              </a:solidFill>
+              <a:prstDash val="sysDot"/>
+            </a:ln>
+          </p:spPr>
+          <p:style>
+            <a:lnRef idx="1">
+              <a:schemeClr val="accent1"/>
+            </a:lnRef>
+            <a:fillRef idx="0">
+              <a:schemeClr val="accent1"/>
+            </a:fillRef>
+            <a:effectRef idx="0">
+              <a:schemeClr val="accent1"/>
+            </a:effectRef>
+            <a:fontRef idx="minor">
+              <a:schemeClr val="tx1"/>
+            </a:fontRef>
+          </p:style>
+        </p:cxnSp>
+        <p:cxnSp>
+          <p:nvCxnSpPr>
+            <p:cNvPr id="36" name="Straight Connector 35"/>
+            <p:cNvCxnSpPr/>
+            <p:nvPr/>
+          </p:nvCxnSpPr>
+          <p:spPr>
+            <a:xfrm>
+              <a:off x="0" y="6857999"/>
+              <a:ext cx="12192000" cy="0"/>
+            </a:xfrm>
+            <a:prstGeom prst="line">
+              <a:avLst/>
+            </a:prstGeom>
+            <a:ln w="12700">
+              <a:solidFill>
+                <a:srgbClr val="BCBCBC">
+                  <a:alpha val="29804"/>
+                </a:srgbClr>
+              </a:solidFill>
+              <a:prstDash val="sysDot"/>
+            </a:ln>
+          </p:spPr>
+          <p:style>
+            <a:lnRef idx="1">
+              <a:schemeClr val="accent1"/>
+            </a:lnRef>
+            <a:fillRef idx="0">
+              <a:schemeClr val="accent1"/>
+            </a:fillRef>
+            <a:effectRef idx="0">
+              <a:schemeClr val="accent1"/>
+            </a:effectRef>
+            <a:fontRef idx="minor">
+              <a:schemeClr val="tx1"/>
+            </a:fontRef>
+          </p:style>
+        </p:cxnSp>
+        <p:cxnSp>
+          <p:nvCxnSpPr>
+            <p:cNvPr id="37" name="Straight Connector 36"/>
+            <p:cNvCxnSpPr/>
+            <p:nvPr/>
+          </p:nvCxnSpPr>
+          <p:spPr>
+            <a:xfrm>
+              <a:off x="16613" y="6143407"/>
+              <a:ext cx="12192000" cy="0"/>
+            </a:xfrm>
+            <a:prstGeom prst="line">
+              <a:avLst/>
+            </a:prstGeom>
+            <a:ln w="12700">
+              <a:solidFill>
+                <a:srgbClr val="BCBCBC">
+                  <a:alpha val="29804"/>
+                </a:srgbClr>
+              </a:solidFill>
+              <a:prstDash val="sysDot"/>
+            </a:ln>
+          </p:spPr>
+          <p:style>
+            <a:lnRef idx="1">
+              <a:schemeClr val="accent1"/>
+            </a:lnRef>
+            <a:fillRef idx="0">
+              <a:schemeClr val="accent1"/>
+            </a:fillRef>
+            <a:effectRef idx="0">
+              <a:schemeClr val="accent1"/>
+            </a:effectRef>
+            <a:fontRef idx="minor">
+              <a:schemeClr val="tx1"/>
+            </a:fontRef>
+          </p:style>
+        </p:cxnSp>
+        <p:cxnSp>
+          <p:nvCxnSpPr>
+            <p:cNvPr id="38" name="Straight Connector 37"/>
+            <p:cNvCxnSpPr/>
+            <p:nvPr/>
+          </p:nvCxnSpPr>
+          <p:spPr>
+            <a:xfrm>
+              <a:off x="684225" y="171716"/>
+              <a:ext cx="0" cy="6511464"/>
+            </a:xfrm>
+            <a:prstGeom prst="line">
+              <a:avLst/>
+            </a:prstGeom>
+            <a:ln w="12700">
+              <a:solidFill>
+                <a:srgbClr val="BCBCBC">
+                  <a:alpha val="29804"/>
+                </a:srgbClr>
+              </a:solidFill>
+              <a:prstDash val="sysDot"/>
+            </a:ln>
+          </p:spPr>
+          <p:style>
+            <a:lnRef idx="1">
+              <a:schemeClr val="accent1"/>
+            </a:lnRef>
+            <a:fillRef idx="0">
+              <a:schemeClr val="accent1"/>
+            </a:fillRef>
+            <a:effectRef idx="0">
+              <a:schemeClr val="accent1"/>
+            </a:effectRef>
+            <a:fontRef idx="minor">
+              <a:schemeClr val="tx1"/>
+            </a:fontRef>
+          </p:style>
+        </p:cxnSp>
+        <p:cxnSp>
+          <p:nvCxnSpPr>
+            <p:cNvPr id="39" name="Straight Connector 38"/>
+            <p:cNvCxnSpPr/>
+            <p:nvPr/>
+          </p:nvCxnSpPr>
+          <p:spPr>
+            <a:xfrm>
+              <a:off x="11508412" y="173267"/>
+              <a:ext cx="0" cy="6511464"/>
+            </a:xfrm>
+            <a:prstGeom prst="line">
+              <a:avLst/>
+            </a:prstGeom>
+            <a:ln w="12700">
+              <a:solidFill>
+                <a:srgbClr val="BCBCBC">
+                  <a:alpha val="29804"/>
+                </a:srgbClr>
+              </a:solidFill>
+              <a:prstDash val="sysDot"/>
+            </a:ln>
+          </p:spPr>
+          <p:style>
+            <a:lnRef idx="1">
+              <a:schemeClr val="accent1"/>
+            </a:lnRef>
+            <a:fillRef idx="0">
+              <a:schemeClr val="accent1"/>
+            </a:fillRef>
+            <a:effectRef idx="0">
+              <a:schemeClr val="accent1"/>
+            </a:effectRef>
+            <a:fontRef idx="minor">
+              <a:schemeClr val="tx1"/>
+            </a:fontRef>
+          </p:style>
+        </p:cxnSp>
+      </p:grpSp>
+      <p:sp>
+        <p:nvSpPr>
+          <p:cNvPr id="40" name="Right Triangle 39"/>
+          <p:cNvSpPr/>
+          <p:nvPr/>
+        </p:nvSpPr>
+        <p:spPr>
+          <a:xfrm rot="2700000">
+            <a:off x="11900889" y="2571302"/>
+            <a:ext cx="568289" cy="568289"/>
+          </a:xfrm>
+          <a:prstGeom prst="rtTriangle">
+            <a:avLst/>
+          </a:prstGeom>
+          <a:solidFill>
+            <a:schemeClr val="accent1">
+              <a:alpha val="50000"/>
+            </a:schemeClr>
+          </a:solidFill>
+          <a:ln>
+            <a:noFill/>
+          </a:ln>
+        </p:spPr>
+        <p:style>
+          <a:lnRef idx="2">
+            <a:schemeClr val="accent1">
+              <a:shade val="50000"/>
+            </a:schemeClr>
+          </a:lnRef>
+          <a:fillRef idx="1">
+            <a:schemeClr val="accent1"/>
+          </a:fillRef>
+          <a:effectRef idx="0">
+            <a:schemeClr val="accent1"/>
+          </a:effectRef>
+          <a:fontRef idx="minor">
+            <a:schemeClr val="lt1"/>
+          </a:fontRef>
+        </p:style>
+        <p:txBody>
+          <a:bodyPr rtlCol="0" anchor="ctr"/>
+          <a:lstStyle/>
+          <a:p>
+            <a:pPr algn="ctr"/>
+            <a:endParaRPr lang="en-US">
+              <a:solidFill>
+                <a:schemeClr val="tx1"/>
+              </a:solidFill>
+            </a:endParaRPr>
+          </a:p>
+        </p:txBody>
+      </p:sp>
+      <p:sp>
+        <p:nvSpPr>
+          <p:cNvPr id="2" name="Title 1"/>
+          <p:cNvSpPr>
+            <a:spLocks noGrp="1"/>
+          </p:cNvSpPr>
+          <p:nvPr>
+            <p:ph type="title"/>
+          </p:nvPr>
+        </p:nvSpPr>
+        <p:spPr>
+          <a:xfrm>
+            <a:off x="6956611" y="713677"/>
+            <a:ext cx="4499914" cy="2996581"/>
+          </a:xfrm>
+        </p:spPr>
+        <p:txBody>
+          <a:bodyPr anchor="b">
+            <a:normAutofit/>
+          </a:bodyPr>
+          <a:lstStyle>
+            <a:lvl1pPr>
+              <a:defRPr sz="3600"/>
+            </a:lvl1pPr>
+          </a:lstStyle>
+          <a:p>
+            <a:r>
+              <a:rPr lang="en-US" dirty="0"/>
+              <a:t>Click to edit Master title style</a:t>
+            </a:r>
+          </a:p>
+        </p:txBody>
+      </p:sp>
+      <p:sp>
+        <p:nvSpPr>
+          <p:cNvPr id="3" name="Content Placeholder 2"/>
+          <p:cNvSpPr>
+            <a:spLocks noGrp="1"/>
+          </p:cNvSpPr>
+          <p:nvPr>
+            <p:ph idx="1"/>
+          </p:nvPr>
+        </p:nvSpPr>
+        <p:spPr>
+          <a:xfrm>
+            <a:off x="498550" y="708102"/>
+            <a:ext cx="5656716" cy="5430644"/>
+          </a:xfrm>
+        </p:spPr>
+        <p:txBody>
+          <a:bodyPr anchor="ctr">
+            <a:normAutofit/>
+          </a:bodyPr>
+          <a:lstStyle>
+            <a:lvl1pPr>
+              <a:defRPr sz="2000"/>
+            </a:lvl1pPr>
+            <a:lvl2pPr>
+              <a:defRPr sz="1800"/>
+            </a:lvl2pPr>
+            <a:lvl3pPr>
+              <a:defRPr sz="1600"/>
+            </a:lvl3pPr>
+            <a:lvl4pPr>
+              <a:defRPr sz="1400"/>
+            </a:lvl4pPr>
+            <a:lvl5pPr>
+              <a:defRPr sz="1400"/>
+            </a:lvl5pPr>
+            <a:lvl6pPr>
+              <a:defRPr sz="2000"/>
+            </a:lvl6pPr>
+            <a:lvl7pPr>
+              <a:defRPr sz="2000"/>
+            </a:lvl7pPr>
+            <a:lvl8pPr>
+              <a:defRPr sz="2000"/>
+            </a:lvl8pPr>
+            <a:lvl9pPr>
+              <a:defRPr sz="2000"/>
+            </a:lvl9pPr>
+          </a:lstStyle>
+          <a:p>
+            <a:pPr lvl="0"/>
+            <a:r>
+              <a:rPr lang="en-US" dirty="0"/>
+              <a:t>Click to edit Master text styles</a:t>
+            </a:r>
+          </a:p>
+          <a:p>
+            <a:pPr lvl="1"/>
+            <a:r>
+              <a:rPr lang="en-US" dirty="0"/>
+              <a:t>Second level</a:t>
+            </a:r>
+          </a:p>
+          <a:p>
+            <a:pPr lvl="2"/>
+            <a:r>
+              <a:rPr lang="en-US" dirty="0"/>
+              <a:t>Third level</a:t>
+            </a:r>
+          </a:p>
+          <a:p>
+            <a:pPr lvl="3"/>
+            <a:r>
+              <a:rPr lang="en-US" dirty="0"/>
+              <a:t>Fourth level</a:t>
+            </a:r>
+          </a:p>
+          <a:p>
+            <a:pPr lvl="4"/>
+            <a:r>
+              <a:rPr lang="en-US" dirty="0"/>
+              <a:t>Fifth level</a:t>
+            </a:r>
+          </a:p>
+        </p:txBody>
+      </p:sp>
+    </p:spTree>
+    <p:extLst>
+      <p:ext uri="{BB962C8B-B14F-4D97-AF65-F5344CB8AC3E}">
+        <p14:creationId xmlns:p14="http://schemas.microsoft.com/office/powerpoint/2010/main" val="780301283"/>
+      </p:ext>
+    </p:extLst>
+  </p:cSld>
+  <p:clrMapOvr>
+    <a:masterClrMapping/>
+  </p:clrMapOvr>
+</p:sldLayout>
+</file>
+
+<file path=ppt/slideLayouts/slideLayout6.xml><?xml version="1.0" encoding="utf-8"?>
 <p:sldLayout xmlns:a="http://schemas.openxmlformats.org/drawingml/2006/main" xmlns:r="http://schemas.openxmlformats.org/officeDocument/2006/relationships" xmlns:p="http://schemas.openxmlformats.org/presentationml/2006/main" showMasterSp="0" preserve="1" userDrawn="1">
   <p:cSld name="Title, Content 2">
     <p:spTree>
@@ -7720,7 +10419,7 @@
 </p:sldLayout>
 </file>
 
-<file path=ppt/slideLayouts/slideLayout6.xml><?xml version="1.0" encoding="utf-8"?>
+<file path=ppt/slideLayouts/slideLayout7.xml><?xml version="1.0" encoding="utf-8"?>
 <p:sldLayout xmlns:a="http://schemas.openxmlformats.org/drawingml/2006/main" xmlns:r="http://schemas.openxmlformats.org/officeDocument/2006/relationships" xmlns:p="http://schemas.openxmlformats.org/presentationml/2006/main" showMasterSp="0" preserve="1" userDrawn="1">
   <p:cSld name="Title, Content, Picture 1">
     <p:spTree>
@@ -9139,7 +11838,7 @@
 </p:sldLayout>
 </file>
 
-<file path=ppt/slideLayouts/slideLayout7.xml><?xml version="1.0" encoding="utf-8"?>
+<file path=ppt/slideLayouts/slideLayout8.xml><?xml version="1.0" encoding="utf-8"?>
 <p:sldLayout xmlns:a="http://schemas.openxmlformats.org/drawingml/2006/main" xmlns:r="http://schemas.openxmlformats.org/officeDocument/2006/relationships" xmlns:p="http://schemas.openxmlformats.org/presentationml/2006/main" showMasterSp="0" preserve="1" userDrawn="1">
   <p:cSld name="Title, Content, Picture 0">
     <p:spTree>
@@ -10558,7 +13257,7 @@
 </p:sldLayout>
 </file>
 
-<file path=ppt/slideLayouts/slideLayout8.xml><?xml version="1.0" encoding="utf-8"?>
+<file path=ppt/slideLayouts/slideLayout9.xml><?xml version="1.0" encoding="utf-8"?>
 <p:sldLayout xmlns:a="http://schemas.openxmlformats.org/drawingml/2006/main" xmlns:r="http://schemas.openxmlformats.org/officeDocument/2006/relationships" xmlns:p="http://schemas.openxmlformats.org/presentationml/2006/main" showMasterSp="0" preserve="1" userDrawn="1">
   <p:cSld name="Title, Content, Picture 2">
     <p:spTree>
@@ -11911,1311 +14610,6 @@
     <p:extLst>
       <p:ext uri="{BB962C8B-B14F-4D97-AF65-F5344CB8AC3E}">
         <p14:creationId xmlns:p14="http://schemas.microsoft.com/office/powerpoint/2010/main" val="3621662310"/>
-      </p:ext>
-    </p:extLst>
-  </p:cSld>
-  <p:clrMapOvr>
-    <a:masterClrMapping/>
-  </p:clrMapOvr>
-</p:sldLayout>
-</file>
-
-<file path=ppt/slideLayouts/slideLayout9.xml><?xml version="1.0" encoding="utf-8"?>
-<p:sldLayout xmlns:a="http://schemas.openxmlformats.org/drawingml/2006/main" xmlns:r="http://schemas.openxmlformats.org/officeDocument/2006/relationships" xmlns:p="http://schemas.openxmlformats.org/presentationml/2006/main" showMasterSp="0" preserve="1" userDrawn="1">
-  <p:cSld name="Title, Picture 0">
-    <p:spTree>
-      <p:nvGrpSpPr>
-        <p:cNvPr id="1" name=""/>
-        <p:cNvGrpSpPr/>
-        <p:nvPr/>
-      </p:nvGrpSpPr>
-      <p:grpSpPr>
-        <a:xfrm>
-          <a:off x="0" y="0"/>
-          <a:ext cx="0" cy="0"/>
-          <a:chOff x="0" y="0"/>
-          <a:chExt cx="0" cy="0"/>
-        </a:xfrm>
-      </p:grpSpPr>
-      <p:grpSp>
-        <p:nvGrpSpPr>
-          <p:cNvPr id="5" name="Group 4"/>
-          <p:cNvGrpSpPr/>
-          <p:nvPr/>
-        </p:nvGrpSpPr>
-        <p:grpSpPr>
-          <a:xfrm>
-            <a:off x="-6214" y="-1"/>
-            <a:ext cx="12214827" cy="6858000"/>
-            <a:chOff x="-6214" y="-1"/>
-            <a:chExt cx="12214827" cy="6858000"/>
-          </a:xfrm>
-        </p:grpSpPr>
-        <p:cxnSp>
-          <p:nvCxnSpPr>
-            <p:cNvPr id="6" name="Straight Connector 5"/>
-            <p:cNvCxnSpPr/>
-            <p:nvPr/>
-          </p:nvCxnSpPr>
-          <p:spPr>
-            <a:xfrm>
-              <a:off x="-6214" y="6686283"/>
-              <a:ext cx="12192000" cy="0"/>
-            </a:xfrm>
-            <a:prstGeom prst="line">
-              <a:avLst/>
-            </a:prstGeom>
-            <a:ln w="12700">
-              <a:solidFill>
-                <a:srgbClr val="BCBCBC">
-                  <a:alpha val="29804"/>
-                </a:srgbClr>
-              </a:solidFill>
-              <a:prstDash val="sysDot"/>
-            </a:ln>
-          </p:spPr>
-          <p:style>
-            <a:lnRef idx="1">
-              <a:schemeClr val="accent1"/>
-            </a:lnRef>
-            <a:fillRef idx="0">
-              <a:schemeClr val="accent1"/>
-            </a:fillRef>
-            <a:effectRef idx="0">
-              <a:schemeClr val="accent1"/>
-            </a:effectRef>
-            <a:fontRef idx="minor">
-              <a:schemeClr val="tx1"/>
-            </a:fontRef>
-          </p:style>
-        </p:cxnSp>
-        <p:cxnSp>
-          <p:nvCxnSpPr>
-            <p:cNvPr id="7" name="Straight Connector 6"/>
-            <p:cNvCxnSpPr/>
-            <p:nvPr/>
-          </p:nvCxnSpPr>
-          <p:spPr>
-            <a:xfrm>
-              <a:off x="0" y="-1"/>
-              <a:ext cx="0" cy="6858000"/>
-            </a:xfrm>
-            <a:prstGeom prst="line">
-              <a:avLst/>
-            </a:prstGeom>
-            <a:ln w="12700">
-              <a:solidFill>
-                <a:srgbClr val="BCBCBC">
-                  <a:alpha val="29804"/>
-                </a:srgbClr>
-              </a:solidFill>
-              <a:prstDash val="sysDot"/>
-            </a:ln>
-          </p:spPr>
-          <p:style>
-            <a:lnRef idx="1">
-              <a:schemeClr val="accent1"/>
-            </a:lnRef>
-            <a:fillRef idx="0">
-              <a:schemeClr val="accent1"/>
-            </a:fillRef>
-            <a:effectRef idx="0">
-              <a:schemeClr val="accent1"/>
-            </a:effectRef>
-            <a:fontRef idx="minor">
-              <a:schemeClr val="tx1"/>
-            </a:fontRef>
-          </p:style>
-        </p:cxnSp>
-        <p:cxnSp>
-          <p:nvCxnSpPr>
-            <p:cNvPr id="8" name="Straight Connector 7"/>
-            <p:cNvCxnSpPr/>
-            <p:nvPr/>
-          </p:nvCxnSpPr>
-          <p:spPr>
-            <a:xfrm>
-              <a:off x="11993258" y="-1"/>
-              <a:ext cx="0" cy="6858000"/>
-            </a:xfrm>
-            <a:prstGeom prst="line">
-              <a:avLst/>
-            </a:prstGeom>
-            <a:ln w="12700">
-              <a:solidFill>
-                <a:srgbClr val="BCBCBC">
-                  <a:alpha val="29804"/>
-                </a:srgbClr>
-              </a:solidFill>
-              <a:prstDash val="sysDot"/>
-            </a:ln>
-          </p:spPr>
-          <p:style>
-            <a:lnRef idx="1">
-              <a:schemeClr val="accent1"/>
-            </a:lnRef>
-            <a:fillRef idx="0">
-              <a:schemeClr val="accent1"/>
-            </a:fillRef>
-            <a:effectRef idx="0">
-              <a:schemeClr val="accent1"/>
-            </a:effectRef>
-            <a:fontRef idx="minor">
-              <a:schemeClr val="tx1"/>
-            </a:fontRef>
-          </p:style>
-        </p:cxnSp>
-        <p:cxnSp>
-          <p:nvCxnSpPr>
-            <p:cNvPr id="9" name="Straight Connector 8"/>
-            <p:cNvCxnSpPr/>
-            <p:nvPr/>
-          </p:nvCxnSpPr>
-          <p:spPr>
-            <a:xfrm>
-              <a:off x="192528" y="-1"/>
-              <a:ext cx="0" cy="6858000"/>
-            </a:xfrm>
-            <a:prstGeom prst="line">
-              <a:avLst/>
-            </a:prstGeom>
-            <a:ln w="12700">
-              <a:solidFill>
-                <a:srgbClr val="BCBCBC">
-                  <a:alpha val="29804"/>
-                </a:srgbClr>
-              </a:solidFill>
-              <a:prstDash val="sysDot"/>
-            </a:ln>
-          </p:spPr>
-          <p:style>
-            <a:lnRef idx="1">
-              <a:schemeClr val="accent1"/>
-            </a:lnRef>
-            <a:fillRef idx="0">
-              <a:schemeClr val="accent1"/>
-            </a:fillRef>
-            <a:effectRef idx="0">
-              <a:schemeClr val="accent1"/>
-            </a:effectRef>
-            <a:fontRef idx="minor">
-              <a:schemeClr val="tx1"/>
-            </a:fontRef>
-          </p:style>
-        </p:cxnSp>
-        <p:cxnSp>
-          <p:nvCxnSpPr>
-            <p:cNvPr id="10" name="Straight Connector 9"/>
-            <p:cNvCxnSpPr/>
-            <p:nvPr/>
-          </p:nvCxnSpPr>
-          <p:spPr>
-            <a:xfrm>
-              <a:off x="1175922" y="-1"/>
-              <a:ext cx="0" cy="6858000"/>
-            </a:xfrm>
-            <a:prstGeom prst="line">
-              <a:avLst/>
-            </a:prstGeom>
-            <a:ln w="12700">
-              <a:solidFill>
-                <a:srgbClr val="BCBCBC">
-                  <a:alpha val="29804"/>
-                </a:srgbClr>
-              </a:solidFill>
-              <a:prstDash val="sysDot"/>
-            </a:ln>
-          </p:spPr>
-          <p:style>
-            <a:lnRef idx="1">
-              <a:schemeClr val="accent1"/>
-            </a:lnRef>
-            <a:fillRef idx="0">
-              <a:schemeClr val="accent1"/>
-            </a:fillRef>
-            <a:effectRef idx="0">
-              <a:schemeClr val="accent1"/>
-            </a:effectRef>
-            <a:fontRef idx="minor">
-              <a:schemeClr val="tx1"/>
-            </a:fontRef>
-          </p:style>
-        </p:cxnSp>
-        <p:cxnSp>
-          <p:nvCxnSpPr>
-            <p:cNvPr id="11" name="Straight Connector 10"/>
-            <p:cNvCxnSpPr/>
-            <p:nvPr/>
-          </p:nvCxnSpPr>
-          <p:spPr>
-            <a:xfrm>
-              <a:off x="2159316" y="-1"/>
-              <a:ext cx="0" cy="6858000"/>
-            </a:xfrm>
-            <a:prstGeom prst="line">
-              <a:avLst/>
-            </a:prstGeom>
-            <a:ln w="12700">
-              <a:solidFill>
-                <a:srgbClr val="BCBCBC">
-                  <a:alpha val="29804"/>
-                </a:srgbClr>
-              </a:solidFill>
-              <a:prstDash val="sysDot"/>
-            </a:ln>
-          </p:spPr>
-          <p:style>
-            <a:lnRef idx="1">
-              <a:schemeClr val="accent1"/>
-            </a:lnRef>
-            <a:fillRef idx="0">
-              <a:schemeClr val="accent1"/>
-            </a:fillRef>
-            <a:effectRef idx="0">
-              <a:schemeClr val="accent1"/>
-            </a:effectRef>
-            <a:fontRef idx="minor">
-              <a:schemeClr val="tx1"/>
-            </a:fontRef>
-          </p:style>
-        </p:cxnSp>
-        <p:cxnSp>
-          <p:nvCxnSpPr>
-            <p:cNvPr id="12" name="Straight Connector 11"/>
-            <p:cNvCxnSpPr/>
-            <p:nvPr/>
-          </p:nvCxnSpPr>
-          <p:spPr>
-            <a:xfrm>
-              <a:off x="3142710" y="-1"/>
-              <a:ext cx="0" cy="6858000"/>
-            </a:xfrm>
-            <a:prstGeom prst="line">
-              <a:avLst/>
-            </a:prstGeom>
-            <a:ln w="12700">
-              <a:solidFill>
-                <a:srgbClr val="BCBCBC">
-                  <a:alpha val="29804"/>
-                </a:srgbClr>
-              </a:solidFill>
-              <a:prstDash val="sysDot"/>
-            </a:ln>
-          </p:spPr>
-          <p:style>
-            <a:lnRef idx="1">
-              <a:schemeClr val="accent1"/>
-            </a:lnRef>
-            <a:fillRef idx="0">
-              <a:schemeClr val="accent1"/>
-            </a:fillRef>
-            <a:effectRef idx="0">
-              <a:schemeClr val="accent1"/>
-            </a:effectRef>
-            <a:fontRef idx="minor">
-              <a:schemeClr val="tx1"/>
-            </a:fontRef>
-          </p:style>
-        </p:cxnSp>
-        <p:cxnSp>
-          <p:nvCxnSpPr>
-            <p:cNvPr id="13" name="Straight Connector 12"/>
-            <p:cNvCxnSpPr/>
-            <p:nvPr/>
-          </p:nvCxnSpPr>
-          <p:spPr>
-            <a:xfrm>
-              <a:off x="4126104" y="-1"/>
-              <a:ext cx="0" cy="6858000"/>
-            </a:xfrm>
-            <a:prstGeom prst="line">
-              <a:avLst/>
-            </a:prstGeom>
-            <a:ln w="12700">
-              <a:solidFill>
-                <a:srgbClr val="BCBCBC">
-                  <a:alpha val="29804"/>
-                </a:srgbClr>
-              </a:solidFill>
-              <a:prstDash val="sysDot"/>
-            </a:ln>
-          </p:spPr>
-          <p:style>
-            <a:lnRef idx="1">
-              <a:schemeClr val="accent1"/>
-            </a:lnRef>
-            <a:fillRef idx="0">
-              <a:schemeClr val="accent1"/>
-            </a:fillRef>
-            <a:effectRef idx="0">
-              <a:schemeClr val="accent1"/>
-            </a:effectRef>
-            <a:fontRef idx="minor">
-              <a:schemeClr val="tx1"/>
-            </a:fontRef>
-          </p:style>
-        </p:cxnSp>
-        <p:cxnSp>
-          <p:nvCxnSpPr>
-            <p:cNvPr id="14" name="Straight Connector 13"/>
-            <p:cNvCxnSpPr/>
-            <p:nvPr/>
-          </p:nvCxnSpPr>
-          <p:spPr>
-            <a:xfrm>
-              <a:off x="5109498" y="-1"/>
-              <a:ext cx="0" cy="6858000"/>
-            </a:xfrm>
-            <a:prstGeom prst="line">
-              <a:avLst/>
-            </a:prstGeom>
-            <a:ln w="12700">
-              <a:solidFill>
-                <a:srgbClr val="BCBCBC">
-                  <a:alpha val="29804"/>
-                </a:srgbClr>
-              </a:solidFill>
-              <a:prstDash val="sysDot"/>
-            </a:ln>
-          </p:spPr>
-          <p:style>
-            <a:lnRef idx="1">
-              <a:schemeClr val="accent1"/>
-            </a:lnRef>
-            <a:fillRef idx="0">
-              <a:schemeClr val="accent1"/>
-            </a:fillRef>
-            <a:effectRef idx="0">
-              <a:schemeClr val="accent1"/>
-            </a:effectRef>
-            <a:fontRef idx="minor">
-              <a:schemeClr val="tx1"/>
-            </a:fontRef>
-          </p:style>
-        </p:cxnSp>
-        <p:cxnSp>
-          <p:nvCxnSpPr>
-            <p:cNvPr id="15" name="Straight Connector 14"/>
-            <p:cNvCxnSpPr/>
-            <p:nvPr/>
-          </p:nvCxnSpPr>
-          <p:spPr>
-            <a:xfrm>
-              <a:off x="6092892" y="-1"/>
-              <a:ext cx="0" cy="6858000"/>
-            </a:xfrm>
-            <a:prstGeom prst="line">
-              <a:avLst/>
-            </a:prstGeom>
-            <a:ln w="12700">
-              <a:solidFill>
-                <a:srgbClr val="BCBCBC">
-                  <a:alpha val="29804"/>
-                </a:srgbClr>
-              </a:solidFill>
-              <a:prstDash val="sysDot"/>
-            </a:ln>
-          </p:spPr>
-          <p:style>
-            <a:lnRef idx="1">
-              <a:schemeClr val="accent1"/>
-            </a:lnRef>
-            <a:fillRef idx="0">
-              <a:schemeClr val="accent1"/>
-            </a:fillRef>
-            <a:effectRef idx="0">
-              <a:schemeClr val="accent1"/>
-            </a:effectRef>
-            <a:fontRef idx="minor">
-              <a:schemeClr val="tx1"/>
-            </a:fontRef>
-          </p:style>
-        </p:cxnSp>
-        <p:cxnSp>
-          <p:nvCxnSpPr>
-            <p:cNvPr id="16" name="Straight Connector 15"/>
-            <p:cNvCxnSpPr/>
-            <p:nvPr/>
-          </p:nvCxnSpPr>
-          <p:spPr>
-            <a:xfrm>
-              <a:off x="7076286" y="-1"/>
-              <a:ext cx="0" cy="6858000"/>
-            </a:xfrm>
-            <a:prstGeom prst="line">
-              <a:avLst/>
-            </a:prstGeom>
-            <a:ln w="12700">
-              <a:solidFill>
-                <a:srgbClr val="BCBCBC">
-                  <a:alpha val="29804"/>
-                </a:srgbClr>
-              </a:solidFill>
-              <a:prstDash val="sysDot"/>
-            </a:ln>
-          </p:spPr>
-          <p:style>
-            <a:lnRef idx="1">
-              <a:schemeClr val="accent1"/>
-            </a:lnRef>
-            <a:fillRef idx="0">
-              <a:schemeClr val="accent1"/>
-            </a:fillRef>
-            <a:effectRef idx="0">
-              <a:schemeClr val="accent1"/>
-            </a:effectRef>
-            <a:fontRef idx="minor">
-              <a:schemeClr val="tx1"/>
-            </a:fontRef>
-          </p:style>
-        </p:cxnSp>
-        <p:cxnSp>
-          <p:nvCxnSpPr>
-            <p:cNvPr id="17" name="Straight Connector 16"/>
-            <p:cNvCxnSpPr/>
-            <p:nvPr/>
-          </p:nvCxnSpPr>
-          <p:spPr>
-            <a:xfrm>
-              <a:off x="8059680" y="-1"/>
-              <a:ext cx="0" cy="6858000"/>
-            </a:xfrm>
-            <a:prstGeom prst="line">
-              <a:avLst/>
-            </a:prstGeom>
-            <a:ln w="12700">
-              <a:solidFill>
-                <a:srgbClr val="BCBCBC">
-                  <a:alpha val="29804"/>
-                </a:srgbClr>
-              </a:solidFill>
-              <a:prstDash val="sysDot"/>
-            </a:ln>
-          </p:spPr>
-          <p:style>
-            <a:lnRef idx="1">
-              <a:schemeClr val="accent1"/>
-            </a:lnRef>
-            <a:fillRef idx="0">
-              <a:schemeClr val="accent1"/>
-            </a:fillRef>
-            <a:effectRef idx="0">
-              <a:schemeClr val="accent1"/>
-            </a:effectRef>
-            <a:fontRef idx="minor">
-              <a:schemeClr val="tx1"/>
-            </a:fontRef>
-          </p:style>
-        </p:cxnSp>
-        <p:cxnSp>
-          <p:nvCxnSpPr>
-            <p:cNvPr id="18" name="Straight Connector 17"/>
-            <p:cNvCxnSpPr/>
-            <p:nvPr/>
-          </p:nvCxnSpPr>
-          <p:spPr>
-            <a:xfrm>
-              <a:off x="9043074" y="-1"/>
-              <a:ext cx="0" cy="6858000"/>
-            </a:xfrm>
-            <a:prstGeom prst="line">
-              <a:avLst/>
-            </a:prstGeom>
-            <a:ln w="12700">
-              <a:solidFill>
-                <a:srgbClr val="BCBCBC">
-                  <a:alpha val="29804"/>
-                </a:srgbClr>
-              </a:solidFill>
-              <a:prstDash val="sysDot"/>
-            </a:ln>
-          </p:spPr>
-          <p:style>
-            <a:lnRef idx="1">
-              <a:schemeClr val="accent1"/>
-            </a:lnRef>
-            <a:fillRef idx="0">
-              <a:schemeClr val="accent1"/>
-            </a:fillRef>
-            <a:effectRef idx="0">
-              <a:schemeClr val="accent1"/>
-            </a:effectRef>
-            <a:fontRef idx="minor">
-              <a:schemeClr val="tx1"/>
-            </a:fontRef>
-          </p:style>
-        </p:cxnSp>
-        <p:cxnSp>
-          <p:nvCxnSpPr>
-            <p:cNvPr id="19" name="Straight Connector 18"/>
-            <p:cNvCxnSpPr/>
-            <p:nvPr/>
-          </p:nvCxnSpPr>
-          <p:spPr>
-            <a:xfrm>
-              <a:off x="10026468" y="-1"/>
-              <a:ext cx="0" cy="6858000"/>
-            </a:xfrm>
-            <a:prstGeom prst="line">
-              <a:avLst/>
-            </a:prstGeom>
-            <a:ln w="12700">
-              <a:solidFill>
-                <a:srgbClr val="BCBCBC">
-                  <a:alpha val="29804"/>
-                </a:srgbClr>
-              </a:solidFill>
-              <a:prstDash val="sysDot"/>
-            </a:ln>
-          </p:spPr>
-          <p:style>
-            <a:lnRef idx="1">
-              <a:schemeClr val="accent1"/>
-            </a:lnRef>
-            <a:fillRef idx="0">
-              <a:schemeClr val="accent1"/>
-            </a:fillRef>
-            <a:effectRef idx="0">
-              <a:schemeClr val="accent1"/>
-            </a:effectRef>
-            <a:fontRef idx="minor">
-              <a:schemeClr val="tx1"/>
-            </a:fontRef>
-          </p:style>
-        </p:cxnSp>
-        <p:cxnSp>
-          <p:nvCxnSpPr>
-            <p:cNvPr id="20" name="Straight Connector 19"/>
-            <p:cNvCxnSpPr/>
-            <p:nvPr/>
-          </p:nvCxnSpPr>
-          <p:spPr>
-            <a:xfrm>
-              <a:off x="11009862" y="-1"/>
-              <a:ext cx="0" cy="6858000"/>
-            </a:xfrm>
-            <a:prstGeom prst="line">
-              <a:avLst/>
-            </a:prstGeom>
-            <a:ln w="12700">
-              <a:solidFill>
-                <a:srgbClr val="BCBCBC">
-                  <a:alpha val="29804"/>
-                </a:srgbClr>
-              </a:solidFill>
-              <a:prstDash val="sysDot"/>
-            </a:ln>
-          </p:spPr>
-          <p:style>
-            <a:lnRef idx="1">
-              <a:schemeClr val="accent1"/>
-            </a:lnRef>
-            <a:fillRef idx="0">
-              <a:schemeClr val="accent1"/>
-            </a:fillRef>
-            <a:effectRef idx="0">
-              <a:schemeClr val="accent1"/>
-            </a:effectRef>
-            <a:fontRef idx="minor">
-              <a:schemeClr val="tx1"/>
-            </a:fontRef>
-          </p:style>
-        </p:cxnSp>
-        <p:cxnSp>
-          <p:nvCxnSpPr>
-            <p:cNvPr id="21" name="Straight Connector 20"/>
-            <p:cNvCxnSpPr/>
-            <p:nvPr/>
-          </p:nvCxnSpPr>
-          <p:spPr>
-            <a:xfrm>
-              <a:off x="12185786" y="-1"/>
-              <a:ext cx="0" cy="6858000"/>
-            </a:xfrm>
-            <a:prstGeom prst="line">
-              <a:avLst/>
-            </a:prstGeom>
-            <a:ln w="12700">
-              <a:solidFill>
-                <a:srgbClr val="BCBCBC">
-                  <a:alpha val="29804"/>
-                </a:srgbClr>
-              </a:solidFill>
-              <a:prstDash val="sysDot"/>
-            </a:ln>
-          </p:spPr>
-          <p:style>
-            <a:lnRef idx="1">
-              <a:schemeClr val="accent1"/>
-            </a:lnRef>
-            <a:fillRef idx="0">
-              <a:schemeClr val="accent1"/>
-            </a:fillRef>
-            <a:effectRef idx="0">
-              <a:schemeClr val="accent1"/>
-            </a:effectRef>
-            <a:fontRef idx="minor">
-              <a:schemeClr val="tx1"/>
-            </a:fontRef>
-          </p:style>
-        </p:cxnSp>
-        <p:cxnSp>
-          <p:nvCxnSpPr>
-            <p:cNvPr id="22" name="Straight Connector 21"/>
-            <p:cNvCxnSpPr/>
-            <p:nvPr/>
-          </p:nvCxnSpPr>
-          <p:spPr>
-            <a:xfrm>
-              <a:off x="0" y="171716"/>
-              <a:ext cx="12192000" cy="0"/>
-            </a:xfrm>
-            <a:prstGeom prst="line">
-              <a:avLst/>
-            </a:prstGeom>
-            <a:ln w="12700">
-              <a:solidFill>
-                <a:srgbClr val="BCBCBC">
-                  <a:alpha val="29804"/>
-                </a:srgbClr>
-              </a:solidFill>
-              <a:prstDash val="sysDot"/>
-            </a:ln>
-          </p:spPr>
-          <p:style>
-            <a:lnRef idx="1">
-              <a:schemeClr val="accent1"/>
-            </a:lnRef>
-            <a:fillRef idx="0">
-              <a:schemeClr val="accent1"/>
-            </a:fillRef>
-            <a:effectRef idx="0">
-              <a:schemeClr val="accent1"/>
-            </a:effectRef>
-            <a:fontRef idx="minor">
-              <a:schemeClr val="tx1"/>
-            </a:fontRef>
-          </p:style>
-        </p:cxnSp>
-        <p:cxnSp>
-          <p:nvCxnSpPr>
-            <p:cNvPr id="23" name="Straight Connector 22"/>
-            <p:cNvCxnSpPr/>
-            <p:nvPr/>
-          </p:nvCxnSpPr>
-          <p:spPr>
-            <a:xfrm>
-              <a:off x="0" y="714597"/>
-              <a:ext cx="12192000" cy="0"/>
-            </a:xfrm>
-            <a:prstGeom prst="line">
-              <a:avLst/>
-            </a:prstGeom>
-            <a:ln w="12700">
-              <a:solidFill>
-                <a:srgbClr val="BCBCBC">
-                  <a:alpha val="29804"/>
-                </a:srgbClr>
-              </a:solidFill>
-              <a:prstDash val="sysDot"/>
-            </a:ln>
-          </p:spPr>
-          <p:style>
-            <a:lnRef idx="1">
-              <a:schemeClr val="accent1"/>
-            </a:lnRef>
-            <a:fillRef idx="0">
-              <a:schemeClr val="accent1"/>
-            </a:fillRef>
-            <a:effectRef idx="0">
-              <a:schemeClr val="accent1"/>
-            </a:effectRef>
-            <a:fontRef idx="minor">
-              <a:schemeClr val="tx1"/>
-            </a:fontRef>
-          </p:style>
-        </p:cxnSp>
-        <p:cxnSp>
-          <p:nvCxnSpPr>
-            <p:cNvPr id="24" name="Straight Connector 23"/>
-            <p:cNvCxnSpPr/>
-            <p:nvPr/>
-          </p:nvCxnSpPr>
-          <p:spPr>
-            <a:xfrm>
-              <a:off x="0" y="1257478"/>
-              <a:ext cx="12192000" cy="0"/>
-            </a:xfrm>
-            <a:prstGeom prst="line">
-              <a:avLst/>
-            </a:prstGeom>
-            <a:ln w="12700">
-              <a:solidFill>
-                <a:srgbClr val="BCBCBC">
-                  <a:alpha val="29804"/>
-                </a:srgbClr>
-              </a:solidFill>
-              <a:prstDash val="sysDot"/>
-            </a:ln>
-          </p:spPr>
-          <p:style>
-            <a:lnRef idx="1">
-              <a:schemeClr val="accent1"/>
-            </a:lnRef>
-            <a:fillRef idx="0">
-              <a:schemeClr val="accent1"/>
-            </a:fillRef>
-            <a:effectRef idx="0">
-              <a:schemeClr val="accent1"/>
-            </a:effectRef>
-            <a:fontRef idx="minor">
-              <a:schemeClr val="tx1"/>
-            </a:fontRef>
-          </p:style>
-        </p:cxnSp>
-        <p:cxnSp>
-          <p:nvCxnSpPr>
-            <p:cNvPr id="25" name="Straight Connector 24"/>
-            <p:cNvCxnSpPr/>
-            <p:nvPr/>
-          </p:nvCxnSpPr>
-          <p:spPr>
-            <a:xfrm>
-              <a:off x="0" y="1800359"/>
-              <a:ext cx="12192000" cy="0"/>
-            </a:xfrm>
-            <a:prstGeom prst="line">
-              <a:avLst/>
-            </a:prstGeom>
-            <a:ln w="12700">
-              <a:solidFill>
-                <a:srgbClr val="BCBCBC">
-                  <a:alpha val="29804"/>
-                </a:srgbClr>
-              </a:solidFill>
-              <a:prstDash val="sysDot"/>
-            </a:ln>
-          </p:spPr>
-          <p:style>
-            <a:lnRef idx="1">
-              <a:schemeClr val="accent1"/>
-            </a:lnRef>
-            <a:fillRef idx="0">
-              <a:schemeClr val="accent1"/>
-            </a:fillRef>
-            <a:effectRef idx="0">
-              <a:schemeClr val="accent1"/>
-            </a:effectRef>
-            <a:fontRef idx="minor">
-              <a:schemeClr val="tx1"/>
-            </a:fontRef>
-          </p:style>
-        </p:cxnSp>
-        <p:cxnSp>
-          <p:nvCxnSpPr>
-            <p:cNvPr id="26" name="Straight Connector 25"/>
-            <p:cNvCxnSpPr/>
-            <p:nvPr/>
-          </p:nvCxnSpPr>
-          <p:spPr>
-            <a:xfrm>
-              <a:off x="0" y="2343240"/>
-              <a:ext cx="12192000" cy="0"/>
-            </a:xfrm>
-            <a:prstGeom prst="line">
-              <a:avLst/>
-            </a:prstGeom>
-            <a:ln w="12700">
-              <a:solidFill>
-                <a:srgbClr val="BCBCBC">
-                  <a:alpha val="29804"/>
-                </a:srgbClr>
-              </a:solidFill>
-              <a:prstDash val="sysDot"/>
-            </a:ln>
-          </p:spPr>
-          <p:style>
-            <a:lnRef idx="1">
-              <a:schemeClr val="accent1"/>
-            </a:lnRef>
-            <a:fillRef idx="0">
-              <a:schemeClr val="accent1"/>
-            </a:fillRef>
-            <a:effectRef idx="0">
-              <a:schemeClr val="accent1"/>
-            </a:effectRef>
-            <a:fontRef idx="minor">
-              <a:schemeClr val="tx1"/>
-            </a:fontRef>
-          </p:style>
-        </p:cxnSp>
-        <p:cxnSp>
-          <p:nvCxnSpPr>
-            <p:cNvPr id="27" name="Straight Connector 26"/>
-            <p:cNvCxnSpPr/>
-            <p:nvPr/>
-          </p:nvCxnSpPr>
-          <p:spPr>
-            <a:xfrm>
-              <a:off x="0" y="2886121"/>
-              <a:ext cx="12192000" cy="0"/>
-            </a:xfrm>
-            <a:prstGeom prst="line">
-              <a:avLst/>
-            </a:prstGeom>
-            <a:ln w="12700">
-              <a:solidFill>
-                <a:srgbClr val="BCBCBC">
-                  <a:alpha val="29804"/>
-                </a:srgbClr>
-              </a:solidFill>
-              <a:prstDash val="sysDot"/>
-            </a:ln>
-          </p:spPr>
-          <p:style>
-            <a:lnRef idx="1">
-              <a:schemeClr val="accent1"/>
-            </a:lnRef>
-            <a:fillRef idx="0">
-              <a:schemeClr val="accent1"/>
-            </a:fillRef>
-            <a:effectRef idx="0">
-              <a:schemeClr val="accent1"/>
-            </a:effectRef>
-            <a:fontRef idx="minor">
-              <a:schemeClr val="tx1"/>
-            </a:fontRef>
-          </p:style>
-        </p:cxnSp>
-        <p:cxnSp>
-          <p:nvCxnSpPr>
-            <p:cNvPr id="28" name="Straight Connector 27"/>
-            <p:cNvCxnSpPr/>
-            <p:nvPr/>
-          </p:nvCxnSpPr>
-          <p:spPr>
-            <a:xfrm>
-              <a:off x="0" y="3429002"/>
-              <a:ext cx="12192000" cy="0"/>
-            </a:xfrm>
-            <a:prstGeom prst="line">
-              <a:avLst/>
-            </a:prstGeom>
-            <a:ln w="12700">
-              <a:solidFill>
-                <a:srgbClr val="BCBCBC">
-                  <a:alpha val="29804"/>
-                </a:srgbClr>
-              </a:solidFill>
-              <a:prstDash val="sysDot"/>
-            </a:ln>
-          </p:spPr>
-          <p:style>
-            <a:lnRef idx="1">
-              <a:schemeClr val="accent1"/>
-            </a:lnRef>
-            <a:fillRef idx="0">
-              <a:schemeClr val="accent1"/>
-            </a:fillRef>
-            <a:effectRef idx="0">
-              <a:schemeClr val="accent1"/>
-            </a:effectRef>
-            <a:fontRef idx="minor">
-              <a:schemeClr val="tx1"/>
-            </a:fontRef>
-          </p:style>
-        </p:cxnSp>
-        <p:cxnSp>
-          <p:nvCxnSpPr>
-            <p:cNvPr id="29" name="Straight Connector 28"/>
-            <p:cNvCxnSpPr/>
-            <p:nvPr/>
-          </p:nvCxnSpPr>
-          <p:spPr>
-            <a:xfrm>
-              <a:off x="0" y="3971883"/>
-              <a:ext cx="12192000" cy="0"/>
-            </a:xfrm>
-            <a:prstGeom prst="line">
-              <a:avLst/>
-            </a:prstGeom>
-            <a:ln w="12700">
-              <a:solidFill>
-                <a:srgbClr val="BCBCBC">
-                  <a:alpha val="29804"/>
-                </a:srgbClr>
-              </a:solidFill>
-              <a:prstDash val="sysDot"/>
-            </a:ln>
-          </p:spPr>
-          <p:style>
-            <a:lnRef idx="1">
-              <a:schemeClr val="accent1"/>
-            </a:lnRef>
-            <a:fillRef idx="0">
-              <a:schemeClr val="accent1"/>
-            </a:fillRef>
-            <a:effectRef idx="0">
-              <a:schemeClr val="accent1"/>
-            </a:effectRef>
-            <a:fontRef idx="minor">
-              <a:schemeClr val="tx1"/>
-            </a:fontRef>
-          </p:style>
-        </p:cxnSp>
-        <p:cxnSp>
-          <p:nvCxnSpPr>
-            <p:cNvPr id="30" name="Straight Connector 29"/>
-            <p:cNvCxnSpPr/>
-            <p:nvPr/>
-          </p:nvCxnSpPr>
-          <p:spPr>
-            <a:xfrm>
-              <a:off x="0" y="4514764"/>
-              <a:ext cx="12192000" cy="0"/>
-            </a:xfrm>
-            <a:prstGeom prst="line">
-              <a:avLst/>
-            </a:prstGeom>
-            <a:ln w="12700">
-              <a:solidFill>
-                <a:srgbClr val="BCBCBC">
-                  <a:alpha val="29804"/>
-                </a:srgbClr>
-              </a:solidFill>
-              <a:prstDash val="sysDot"/>
-            </a:ln>
-          </p:spPr>
-          <p:style>
-            <a:lnRef idx="1">
-              <a:schemeClr val="accent1"/>
-            </a:lnRef>
-            <a:fillRef idx="0">
-              <a:schemeClr val="accent1"/>
-            </a:fillRef>
-            <a:effectRef idx="0">
-              <a:schemeClr val="accent1"/>
-            </a:effectRef>
-            <a:fontRef idx="minor">
-              <a:schemeClr val="tx1"/>
-            </a:fontRef>
-          </p:style>
-        </p:cxnSp>
-        <p:cxnSp>
-          <p:nvCxnSpPr>
-            <p:cNvPr id="31" name="Straight Connector 30"/>
-            <p:cNvCxnSpPr/>
-            <p:nvPr/>
-          </p:nvCxnSpPr>
-          <p:spPr>
-            <a:xfrm>
-              <a:off x="0" y="5057645"/>
-              <a:ext cx="12192000" cy="0"/>
-            </a:xfrm>
-            <a:prstGeom prst="line">
-              <a:avLst/>
-            </a:prstGeom>
-            <a:ln w="12700">
-              <a:solidFill>
-                <a:srgbClr val="BCBCBC">
-                  <a:alpha val="29804"/>
-                </a:srgbClr>
-              </a:solidFill>
-              <a:prstDash val="sysDot"/>
-            </a:ln>
-          </p:spPr>
-          <p:style>
-            <a:lnRef idx="1">
-              <a:schemeClr val="accent1"/>
-            </a:lnRef>
-            <a:fillRef idx="0">
-              <a:schemeClr val="accent1"/>
-            </a:fillRef>
-            <a:effectRef idx="0">
-              <a:schemeClr val="accent1"/>
-            </a:effectRef>
-            <a:fontRef idx="minor">
-              <a:schemeClr val="tx1"/>
-            </a:fontRef>
-          </p:style>
-        </p:cxnSp>
-        <p:cxnSp>
-          <p:nvCxnSpPr>
-            <p:cNvPr id="32" name="Straight Connector 31"/>
-            <p:cNvCxnSpPr/>
-            <p:nvPr/>
-          </p:nvCxnSpPr>
-          <p:spPr>
-            <a:xfrm>
-              <a:off x="0" y="5600526"/>
-              <a:ext cx="12192000" cy="0"/>
-            </a:xfrm>
-            <a:prstGeom prst="line">
-              <a:avLst/>
-            </a:prstGeom>
-            <a:ln w="12700">
-              <a:solidFill>
-                <a:srgbClr val="BCBCBC">
-                  <a:alpha val="29804"/>
-                </a:srgbClr>
-              </a:solidFill>
-              <a:prstDash val="sysDot"/>
-            </a:ln>
-          </p:spPr>
-          <p:style>
-            <a:lnRef idx="1">
-              <a:schemeClr val="accent1"/>
-            </a:lnRef>
-            <a:fillRef idx="0">
-              <a:schemeClr val="accent1"/>
-            </a:fillRef>
-            <a:effectRef idx="0">
-              <a:schemeClr val="accent1"/>
-            </a:effectRef>
-            <a:fontRef idx="minor">
-              <a:schemeClr val="tx1"/>
-            </a:fontRef>
-          </p:style>
-        </p:cxnSp>
-        <p:cxnSp>
-          <p:nvCxnSpPr>
-            <p:cNvPr id="33" name="Straight Connector 32"/>
-            <p:cNvCxnSpPr/>
-            <p:nvPr/>
-          </p:nvCxnSpPr>
-          <p:spPr>
-            <a:xfrm>
-              <a:off x="0" y="6857999"/>
-              <a:ext cx="12192000" cy="0"/>
-            </a:xfrm>
-            <a:prstGeom prst="line">
-              <a:avLst/>
-            </a:prstGeom>
-            <a:ln w="12700">
-              <a:solidFill>
-                <a:srgbClr val="BCBCBC">
-                  <a:alpha val="29804"/>
-                </a:srgbClr>
-              </a:solidFill>
-              <a:prstDash val="sysDot"/>
-            </a:ln>
-          </p:spPr>
-          <p:style>
-            <a:lnRef idx="1">
-              <a:schemeClr val="accent1"/>
-            </a:lnRef>
-            <a:fillRef idx="0">
-              <a:schemeClr val="accent1"/>
-            </a:fillRef>
-            <a:effectRef idx="0">
-              <a:schemeClr val="accent1"/>
-            </a:effectRef>
-            <a:fontRef idx="minor">
-              <a:schemeClr val="tx1"/>
-            </a:fontRef>
-          </p:style>
-        </p:cxnSp>
-        <p:cxnSp>
-          <p:nvCxnSpPr>
-            <p:cNvPr id="34" name="Straight Connector 33"/>
-            <p:cNvCxnSpPr/>
-            <p:nvPr/>
-          </p:nvCxnSpPr>
-          <p:spPr>
-            <a:xfrm>
-              <a:off x="16613" y="6143407"/>
-              <a:ext cx="12192000" cy="0"/>
-            </a:xfrm>
-            <a:prstGeom prst="line">
-              <a:avLst/>
-            </a:prstGeom>
-            <a:ln w="12700">
-              <a:solidFill>
-                <a:srgbClr val="BCBCBC">
-                  <a:alpha val="29804"/>
-                </a:srgbClr>
-              </a:solidFill>
-              <a:prstDash val="sysDot"/>
-            </a:ln>
-          </p:spPr>
-          <p:style>
-            <a:lnRef idx="1">
-              <a:schemeClr val="accent1"/>
-            </a:lnRef>
-            <a:fillRef idx="0">
-              <a:schemeClr val="accent1"/>
-            </a:fillRef>
-            <a:effectRef idx="0">
-              <a:schemeClr val="accent1"/>
-            </a:effectRef>
-            <a:fontRef idx="minor">
-              <a:schemeClr val="tx1"/>
-            </a:fontRef>
-          </p:style>
-        </p:cxnSp>
-        <p:cxnSp>
-          <p:nvCxnSpPr>
-            <p:cNvPr id="35" name="Straight Connector 34"/>
-            <p:cNvCxnSpPr/>
-            <p:nvPr/>
-          </p:nvCxnSpPr>
-          <p:spPr>
-            <a:xfrm>
-              <a:off x="684225" y="171716"/>
-              <a:ext cx="0" cy="6511464"/>
-            </a:xfrm>
-            <a:prstGeom prst="line">
-              <a:avLst/>
-            </a:prstGeom>
-            <a:ln w="12700">
-              <a:solidFill>
-                <a:srgbClr val="BCBCBC">
-                  <a:alpha val="29804"/>
-                </a:srgbClr>
-              </a:solidFill>
-              <a:prstDash val="sysDot"/>
-            </a:ln>
-          </p:spPr>
-          <p:style>
-            <a:lnRef idx="1">
-              <a:schemeClr val="accent1"/>
-            </a:lnRef>
-            <a:fillRef idx="0">
-              <a:schemeClr val="accent1"/>
-            </a:fillRef>
-            <a:effectRef idx="0">
-              <a:schemeClr val="accent1"/>
-            </a:effectRef>
-            <a:fontRef idx="minor">
-              <a:schemeClr val="tx1"/>
-            </a:fontRef>
-          </p:style>
-        </p:cxnSp>
-        <p:cxnSp>
-          <p:nvCxnSpPr>
-            <p:cNvPr id="36" name="Straight Connector 35"/>
-            <p:cNvCxnSpPr/>
-            <p:nvPr/>
-          </p:nvCxnSpPr>
-          <p:spPr>
-            <a:xfrm>
-              <a:off x="11508412" y="173267"/>
-              <a:ext cx="0" cy="6511464"/>
-            </a:xfrm>
-            <a:prstGeom prst="line">
-              <a:avLst/>
-            </a:prstGeom>
-            <a:ln w="12700">
-              <a:solidFill>
-                <a:srgbClr val="BCBCBC">
-                  <a:alpha val="29804"/>
-                </a:srgbClr>
-              </a:solidFill>
-              <a:prstDash val="sysDot"/>
-            </a:ln>
-          </p:spPr>
-          <p:style>
-            <a:lnRef idx="1">
-              <a:schemeClr val="accent1"/>
-            </a:lnRef>
-            <a:fillRef idx="0">
-              <a:schemeClr val="accent1"/>
-            </a:fillRef>
-            <a:effectRef idx="0">
-              <a:schemeClr val="accent1"/>
-            </a:effectRef>
-            <a:fontRef idx="minor">
-              <a:schemeClr val="tx1"/>
-            </a:fontRef>
-          </p:style>
-        </p:cxnSp>
-      </p:grpSp>
-      <p:sp>
-        <p:nvSpPr>
-          <p:cNvPr id="38" name="Picture Placeholder 37">
-            <a:extLst>
-              <a:ext uri="{FF2B5EF4-FFF2-40B4-BE49-F238E27FC236}">
-                <a16:creationId xmlns:a16="http://schemas.microsoft.com/office/drawing/2014/main" id="{BC0FE04E-8B1F-5AAB-0D71-93977D91780A}"/>
-              </a:ext>
-            </a:extLst>
-          </p:cNvPr>
-          <p:cNvSpPr>
-            <a:spLocks noGrp="1"/>
-          </p:cNvSpPr>
-          <p:nvPr>
-            <p:ph type="pic" sz="quarter" idx="10"/>
-          </p:nvPr>
-        </p:nvSpPr>
-        <p:spPr>
-          <a:xfrm>
-            <a:off x="-6215" y="-2"/>
-            <a:ext cx="12169165" cy="6857998"/>
-          </a:xfrm>
-        </p:spPr>
-        <p:txBody>
-          <a:bodyPr/>
-          <a:lstStyle/>
-          <a:p>
-            <a:endParaRPr lang="en-CN"/>
-          </a:p>
-        </p:txBody>
-      </p:sp>
-      <p:sp>
-        <p:nvSpPr>
-          <p:cNvPr id="40" name="Title 1">
-            <a:extLst>
-              <a:ext uri="{FF2B5EF4-FFF2-40B4-BE49-F238E27FC236}">
-                <a16:creationId xmlns:a16="http://schemas.microsoft.com/office/drawing/2014/main" id="{6B2C9348-E48E-5174-E099-8CDD4966B455}"/>
-              </a:ext>
-            </a:extLst>
-          </p:cNvPr>
-          <p:cNvSpPr>
-            <a:spLocks noGrp="1"/>
-          </p:cNvSpPr>
-          <p:nvPr>
-            <p:ph type="title"/>
-          </p:nvPr>
-        </p:nvSpPr>
-        <p:spPr>
-          <a:xfrm>
-            <a:off x="876752" y="725951"/>
-            <a:ext cx="9940581" cy="1893175"/>
-          </a:xfrm>
-        </p:spPr>
-        <p:txBody>
-          <a:bodyPr anchor="ctr">
-            <a:normAutofit/>
-          </a:bodyPr>
-          <a:lstStyle>
-            <a:lvl1pPr algn="ctr">
-              <a:defRPr kumimoji="0" lang="en-US" sz="5200" b="1" i="0" u="none" strike="noStrike" kern="1200" cap="none" spc="0" normalizeH="0" baseline="0" dirty="0">
-                <a:ln>
-                  <a:noFill/>
-                </a:ln>
-                <a:solidFill>
-                  <a:srgbClr val="FFFFFF"/>
-                </a:solidFill>
-                <a:effectLst/>
-                <a:uLnTx/>
-                <a:uFillTx/>
-                <a:latin typeface="Helvetica Neue Medium" panose="02000503000000020004"/>
-                <a:ea typeface="Helvetica Neue Medium" panose="02000503000000020004"/>
-                <a:cs typeface="Helvetica Neue Medium" panose="02000503000000020004"/>
-              </a:defRPr>
-            </a:lvl1pPr>
-          </a:lstStyle>
-          <a:p>
-            <a:r>
-              <a:rPr lang="en-US" dirty="0"/>
-              <a:t>Click to edit Master title style</a:t>
-            </a:r>
-          </a:p>
-        </p:txBody>
-      </p:sp>
-    </p:spTree>
-    <p:extLst>
-      <p:ext uri="{BB962C8B-B14F-4D97-AF65-F5344CB8AC3E}">
-        <p14:creationId xmlns:p14="http://schemas.microsoft.com/office/powerpoint/2010/main" val="376238915"/>
       </p:ext>
     </p:extLst>
   </p:cSld>
@@ -14718,14 +16112,15 @@
     <p:sldLayoutId id="2147483723" r:id="rId2"/>
     <p:sldLayoutId id="2147483702" r:id="rId3"/>
     <p:sldLayoutId id="2147483708" r:id="rId4"/>
-    <p:sldLayoutId id="2147483719" r:id="rId5"/>
-    <p:sldLayoutId id="2147483725" r:id="rId6"/>
-    <p:sldLayoutId id="2147483709" r:id="rId7"/>
-    <p:sldLayoutId id="2147483720" r:id="rId8"/>
-    <p:sldLayoutId id="2147483707" r:id="rId9"/>
-    <p:sldLayoutId id="2147483716" r:id="rId10"/>
-    <p:sldLayoutId id="2147483715" r:id="rId11"/>
-    <p:sldLayoutId id="2147483717" r:id="rId12"/>
+    <p:sldLayoutId id="2147483726" r:id="rId5"/>
+    <p:sldLayoutId id="2147483719" r:id="rId6"/>
+    <p:sldLayoutId id="2147483725" r:id="rId7"/>
+    <p:sldLayoutId id="2147483709" r:id="rId8"/>
+    <p:sldLayoutId id="2147483720" r:id="rId9"/>
+    <p:sldLayoutId id="2147483707" r:id="rId10"/>
+    <p:sldLayoutId id="2147483716" r:id="rId11"/>
+    <p:sldLayoutId id="2147483715" r:id="rId12"/>
+    <p:sldLayoutId id="2147483717" r:id="rId13"/>
   </p:sldLayoutIdLst>
   <p:txStyles>
     <p:titleStyle>
@@ -15837,35 +17232,6 @@
 </file>
 
 <file path=customXml/item1.xml><?xml version="1.0" encoding="utf-8"?>
-<?mso-contentType ?>
-<FormTemplates xmlns="http://schemas.microsoft.com/sharepoint/v3/contenttype/forms">
-  <Display>DocumentLibraryForm</Display>
-  <Edit>DocumentLibraryForm</Edit>
-  <New>DocumentLibraryForm</New>
-</FormTemplates>
-</file>
-
-<file path=customXml/item2.xml><?xml version="1.0" encoding="utf-8"?>
-<p:properties xmlns:p="http://schemas.microsoft.com/office/2006/metadata/properties" xmlns:xsi="http://www.w3.org/2001/XMLSchema-instance" xmlns:pc="http://schemas.microsoft.com/office/infopath/2007/PartnerControls">
-  <documentManagement>
-    <_ip_UnifiedCompliancePolicyUIAction xmlns="http://schemas.microsoft.com/sharepoint/v3" xsi:nil="true"/>
-    <Image xmlns="71af3243-3dd4-4a8d-8c0d-dd76da1f02a5">
-      <Url xsi:nil="true"/>
-      <Description xsi:nil="true"/>
-    </Image>
-    <Status xmlns="71af3243-3dd4-4a8d-8c0d-dd76da1f02a5">Not started</Status>
-    <Background xmlns="71af3243-3dd4-4a8d-8c0d-dd76da1f02a5">false</Background>
-    <_ip_UnifiedCompliancePolicyProperties xmlns="http://schemas.microsoft.com/sharepoint/v3" xsi:nil="true"/>
-    <ImageTagsTaxHTField xmlns="71af3243-3dd4-4a8d-8c0d-dd76da1f02a5">
-      <Terms xmlns="http://schemas.microsoft.com/office/infopath/2007/PartnerControls"/>
-    </ImageTagsTaxHTField>
-    <TaxCatchAll xmlns="230e9df3-be65-4c73-a93b-d1236ebd677e" xsi:nil="true"/>
-    <MediaServiceKeyPoints xmlns="71af3243-3dd4-4a8d-8c0d-dd76da1f02a5" xsi:nil="true"/>
-  </documentManagement>
-</p:properties>
-</file>
-
-<file path=customXml/item3.xml><?xml version="1.0" encoding="utf-8"?>
 <ct:contentTypeSchema xmlns:ct="http://schemas.microsoft.com/office/2006/metadata/contentType" xmlns:ma="http://schemas.microsoft.com/office/2006/metadata/properties/metaAttributes" ct:_="" ma:_="" ma:contentTypeName="Document" ma:contentTypeID="0x01010079F111ED35F8CC479449609E8A0923A6" ma:contentTypeVersion="28" ma:contentTypeDescription="Create a new document." ma:contentTypeScope="" ma:versionID="60f5a4f2d2b0abadcf532d48ebf9cb71">
   <xsd:schema xmlns:xsd="http://www.w3.org/2001/XMLSchema" xmlns:xs="http://www.w3.org/2001/XMLSchema" xmlns:p="http://schemas.microsoft.com/office/2006/metadata/properties" xmlns:ns1="http://schemas.microsoft.com/sharepoint/v3" xmlns:ns2="71af3243-3dd4-4a8d-8c0d-dd76da1f02a5" xmlns:ns3="16c05727-aa75-4e4a-9b5f-8a80a1165891" xmlns:ns4="230e9df3-be65-4c73-a93b-d1236ebd677e" targetNamespace="http://schemas.microsoft.com/office/2006/metadata/properties" ma:root="true" ma:fieldsID="7dd78129e6a1811f84807ad11c651531" ns1:_="" ns2:_="" ns3:_="" ns4:_="">
     <xsd:import namespace="http://schemas.microsoft.com/sharepoint/v3"/>
@@ -16177,27 +17543,36 @@
 </ct:contentTypeSchema>
 </file>
 
-<file path=customXml/itemProps1.xml><?xml version="1.0" encoding="utf-8"?>
-<ds:datastoreItem xmlns:ds="http://schemas.openxmlformats.org/officeDocument/2006/customXml" ds:itemID="{A78D9019-7CE1-4B77-8F5D-67F6576598CB}">
-  <ds:schemaRefs>
-    <ds:schemaRef ds:uri="http://schemas.microsoft.com/sharepoint/v3/contenttype/forms"/>
-  </ds:schemaRefs>
-</ds:datastoreItem>
+<file path=customXml/item2.xml><?xml version="1.0" encoding="utf-8"?>
+<p:properties xmlns:p="http://schemas.microsoft.com/office/2006/metadata/properties" xmlns:xsi="http://www.w3.org/2001/XMLSchema-instance" xmlns:pc="http://schemas.microsoft.com/office/infopath/2007/PartnerControls">
+  <documentManagement>
+    <_ip_UnifiedCompliancePolicyUIAction xmlns="http://schemas.microsoft.com/sharepoint/v3" xsi:nil="true"/>
+    <Image xmlns="71af3243-3dd4-4a8d-8c0d-dd76da1f02a5">
+      <Url xsi:nil="true"/>
+      <Description xsi:nil="true"/>
+    </Image>
+    <Status xmlns="71af3243-3dd4-4a8d-8c0d-dd76da1f02a5">Not started</Status>
+    <Background xmlns="71af3243-3dd4-4a8d-8c0d-dd76da1f02a5">false</Background>
+    <_ip_UnifiedCompliancePolicyProperties xmlns="http://schemas.microsoft.com/sharepoint/v3" xsi:nil="true"/>
+    <ImageTagsTaxHTField xmlns="71af3243-3dd4-4a8d-8c0d-dd76da1f02a5">
+      <Terms xmlns="http://schemas.microsoft.com/office/infopath/2007/PartnerControls"/>
+    </ImageTagsTaxHTField>
+    <TaxCatchAll xmlns="230e9df3-be65-4c73-a93b-d1236ebd677e" xsi:nil="true"/>
+    <MediaServiceKeyPoints xmlns="71af3243-3dd4-4a8d-8c0d-dd76da1f02a5" xsi:nil="true"/>
+  </documentManagement>
+</p:properties>
 </file>
 
-<file path=customXml/itemProps2.xml><?xml version="1.0" encoding="utf-8"?>
-<ds:datastoreItem xmlns:ds="http://schemas.openxmlformats.org/officeDocument/2006/customXml" ds:itemID="{E42E6C21-1752-4E06-9FE3-208D45ADB668}">
-  <ds:schemaRefs>
-    <ds:schemaRef ds:uri="http://schemas.microsoft.com/office/2006/metadata/properties"/>
-    <ds:schemaRef ds:uri="http://schemas.microsoft.com/office/infopath/2007/PartnerControls"/>
-    <ds:schemaRef ds:uri="http://schemas.microsoft.com/sharepoint/v3"/>
-    <ds:schemaRef ds:uri="71af3243-3dd4-4a8d-8c0d-dd76da1f02a5"/>
-    <ds:schemaRef ds:uri="230e9df3-be65-4c73-a93b-d1236ebd677e"/>
-  </ds:schemaRefs>
-</ds:datastoreItem>
+<file path=customXml/item3.xml><?xml version="1.0" encoding="utf-8"?>
+<?mso-contentType ?>
+<FormTemplates xmlns="http://schemas.microsoft.com/sharepoint/v3/contenttype/forms">
+  <Display>DocumentLibraryForm</Display>
+  <Edit>DocumentLibraryForm</Edit>
+  <New>DocumentLibraryForm</New>
+</FormTemplates>
 </file>
 
-<file path=customXml/itemProps3.xml><?xml version="1.0" encoding="utf-8"?>
+<file path=customXml/itemProps1.xml><?xml version="1.0" encoding="utf-8"?>
 <ds:datastoreItem xmlns:ds="http://schemas.openxmlformats.org/officeDocument/2006/customXml" ds:itemID="{AF6E7B4D-FB62-47B7-AAA7-0DEC9938DB8A}">
   <ds:schemaRefs>
     <ds:schemaRef ds:uri="http://schemas.microsoft.com/office/2006/metadata/contentType"/>
@@ -16218,6 +17593,26 @@
 </ds:datastoreItem>
 </file>
 
+<file path=customXml/itemProps2.xml><?xml version="1.0" encoding="utf-8"?>
+<ds:datastoreItem xmlns:ds="http://schemas.openxmlformats.org/officeDocument/2006/customXml" ds:itemID="{E42E6C21-1752-4E06-9FE3-208D45ADB668}">
+  <ds:schemaRefs>
+    <ds:schemaRef ds:uri="http://schemas.microsoft.com/office/2006/metadata/properties"/>
+    <ds:schemaRef ds:uri="http://schemas.microsoft.com/office/infopath/2007/PartnerControls"/>
+    <ds:schemaRef ds:uri="http://schemas.microsoft.com/sharepoint/v3"/>
+    <ds:schemaRef ds:uri="71af3243-3dd4-4a8d-8c0d-dd76da1f02a5"/>
+    <ds:schemaRef ds:uri="230e9df3-be65-4c73-a93b-d1236ebd677e"/>
+  </ds:schemaRefs>
+</ds:datastoreItem>
+</file>
+
+<file path=customXml/itemProps3.xml><?xml version="1.0" encoding="utf-8"?>
+<ds:datastoreItem xmlns:ds="http://schemas.openxmlformats.org/officeDocument/2006/customXml" ds:itemID="{A78D9019-7CE1-4B77-8F5D-67F6576598CB}">
+  <ds:schemaRefs>
+    <ds:schemaRef ds:uri="http://schemas.microsoft.com/sharepoint/v3/contenttype/forms"/>
+  </ds:schemaRefs>
+</ds:datastoreItem>
+</file>
+
 <file path=docMetadata/LabelInfo.xml><?xml version="1.0" encoding="utf-8"?>
 <clbl:labelList xmlns:clbl="http://schemas.microsoft.com/office/2020/mipLabelMetadata"/>
 </file>
</xml_diff>

<commit_message>
feat: Implement ImageAdvisor class with Bing image retrieval, retry logic, and Jupyter demo
</commit_message>
<xml_diff>
--- a/templates/SimpleTemplate.pptx
+++ b/templates/SimpleTemplate.pptx
@@ -229,7 +229,7 @@
           <a:p>
             <a:fld id="{258BFD57-AB0A-470B-A7AF-56DFE7B5174A}" type="datetimeFigureOut">
               <a:rPr lang="en-US" smtClean="0"/>
-              <a:t>10/30/24</a:t>
+              <a:t>11/1/24</a:t>
             </a:fld>
             <a:endParaRPr lang="en-US" dirty="0"/>
           </a:p>
@@ -406,7 +406,7 @@
           <a:p>
             <a:fld id="{D4B3339F-6CEA-4641-BE08-40DAFD6FCF25}" type="datetimeFigureOut">
               <a:rPr lang="en-US" smtClean="0"/>
-              <a:t>10/30/24</a:t>
+              <a:t>11/1/24</a:t>
             </a:fld>
             <a:endParaRPr lang="en-US" dirty="0"/>
           </a:p>
@@ -2397,6 +2397,1311 @@
 
 <file path=ppt/slideLayouts/slideLayout10.xml><?xml version="1.0" encoding="utf-8"?>
 <p:sldLayout xmlns:a="http://schemas.openxmlformats.org/drawingml/2006/main" xmlns:r="http://schemas.openxmlformats.org/officeDocument/2006/relationships" xmlns:p="http://schemas.openxmlformats.org/presentationml/2006/main" showMasterSp="0" preserve="1" userDrawn="1">
+  <p:cSld name="Title, Picture 0">
+    <p:spTree>
+      <p:nvGrpSpPr>
+        <p:cNvPr id="1" name=""/>
+        <p:cNvGrpSpPr/>
+        <p:nvPr/>
+      </p:nvGrpSpPr>
+      <p:grpSpPr>
+        <a:xfrm>
+          <a:off x="0" y="0"/>
+          <a:ext cx="0" cy="0"/>
+          <a:chOff x="0" y="0"/>
+          <a:chExt cx="0" cy="0"/>
+        </a:xfrm>
+      </p:grpSpPr>
+      <p:grpSp>
+        <p:nvGrpSpPr>
+          <p:cNvPr id="5" name="Group 4"/>
+          <p:cNvGrpSpPr/>
+          <p:nvPr/>
+        </p:nvGrpSpPr>
+        <p:grpSpPr>
+          <a:xfrm>
+            <a:off x="-6214" y="-1"/>
+            <a:ext cx="12214827" cy="6858000"/>
+            <a:chOff x="-6214" y="-1"/>
+            <a:chExt cx="12214827" cy="6858000"/>
+          </a:xfrm>
+        </p:grpSpPr>
+        <p:cxnSp>
+          <p:nvCxnSpPr>
+            <p:cNvPr id="6" name="Straight Connector 5"/>
+            <p:cNvCxnSpPr/>
+            <p:nvPr/>
+          </p:nvCxnSpPr>
+          <p:spPr>
+            <a:xfrm>
+              <a:off x="-6214" y="6686283"/>
+              <a:ext cx="12192000" cy="0"/>
+            </a:xfrm>
+            <a:prstGeom prst="line">
+              <a:avLst/>
+            </a:prstGeom>
+            <a:ln w="12700">
+              <a:solidFill>
+                <a:srgbClr val="BCBCBC">
+                  <a:alpha val="29804"/>
+                </a:srgbClr>
+              </a:solidFill>
+              <a:prstDash val="sysDot"/>
+            </a:ln>
+          </p:spPr>
+          <p:style>
+            <a:lnRef idx="1">
+              <a:schemeClr val="accent1"/>
+            </a:lnRef>
+            <a:fillRef idx="0">
+              <a:schemeClr val="accent1"/>
+            </a:fillRef>
+            <a:effectRef idx="0">
+              <a:schemeClr val="accent1"/>
+            </a:effectRef>
+            <a:fontRef idx="minor">
+              <a:schemeClr val="tx1"/>
+            </a:fontRef>
+          </p:style>
+        </p:cxnSp>
+        <p:cxnSp>
+          <p:nvCxnSpPr>
+            <p:cNvPr id="7" name="Straight Connector 6"/>
+            <p:cNvCxnSpPr/>
+            <p:nvPr/>
+          </p:nvCxnSpPr>
+          <p:spPr>
+            <a:xfrm>
+              <a:off x="0" y="-1"/>
+              <a:ext cx="0" cy="6858000"/>
+            </a:xfrm>
+            <a:prstGeom prst="line">
+              <a:avLst/>
+            </a:prstGeom>
+            <a:ln w="12700">
+              <a:solidFill>
+                <a:srgbClr val="BCBCBC">
+                  <a:alpha val="29804"/>
+                </a:srgbClr>
+              </a:solidFill>
+              <a:prstDash val="sysDot"/>
+            </a:ln>
+          </p:spPr>
+          <p:style>
+            <a:lnRef idx="1">
+              <a:schemeClr val="accent1"/>
+            </a:lnRef>
+            <a:fillRef idx="0">
+              <a:schemeClr val="accent1"/>
+            </a:fillRef>
+            <a:effectRef idx="0">
+              <a:schemeClr val="accent1"/>
+            </a:effectRef>
+            <a:fontRef idx="minor">
+              <a:schemeClr val="tx1"/>
+            </a:fontRef>
+          </p:style>
+        </p:cxnSp>
+        <p:cxnSp>
+          <p:nvCxnSpPr>
+            <p:cNvPr id="8" name="Straight Connector 7"/>
+            <p:cNvCxnSpPr/>
+            <p:nvPr/>
+          </p:nvCxnSpPr>
+          <p:spPr>
+            <a:xfrm>
+              <a:off x="11993258" y="-1"/>
+              <a:ext cx="0" cy="6858000"/>
+            </a:xfrm>
+            <a:prstGeom prst="line">
+              <a:avLst/>
+            </a:prstGeom>
+            <a:ln w="12700">
+              <a:solidFill>
+                <a:srgbClr val="BCBCBC">
+                  <a:alpha val="29804"/>
+                </a:srgbClr>
+              </a:solidFill>
+              <a:prstDash val="sysDot"/>
+            </a:ln>
+          </p:spPr>
+          <p:style>
+            <a:lnRef idx="1">
+              <a:schemeClr val="accent1"/>
+            </a:lnRef>
+            <a:fillRef idx="0">
+              <a:schemeClr val="accent1"/>
+            </a:fillRef>
+            <a:effectRef idx="0">
+              <a:schemeClr val="accent1"/>
+            </a:effectRef>
+            <a:fontRef idx="minor">
+              <a:schemeClr val="tx1"/>
+            </a:fontRef>
+          </p:style>
+        </p:cxnSp>
+        <p:cxnSp>
+          <p:nvCxnSpPr>
+            <p:cNvPr id="9" name="Straight Connector 8"/>
+            <p:cNvCxnSpPr/>
+            <p:nvPr/>
+          </p:nvCxnSpPr>
+          <p:spPr>
+            <a:xfrm>
+              <a:off x="192528" y="-1"/>
+              <a:ext cx="0" cy="6858000"/>
+            </a:xfrm>
+            <a:prstGeom prst="line">
+              <a:avLst/>
+            </a:prstGeom>
+            <a:ln w="12700">
+              <a:solidFill>
+                <a:srgbClr val="BCBCBC">
+                  <a:alpha val="29804"/>
+                </a:srgbClr>
+              </a:solidFill>
+              <a:prstDash val="sysDot"/>
+            </a:ln>
+          </p:spPr>
+          <p:style>
+            <a:lnRef idx="1">
+              <a:schemeClr val="accent1"/>
+            </a:lnRef>
+            <a:fillRef idx="0">
+              <a:schemeClr val="accent1"/>
+            </a:fillRef>
+            <a:effectRef idx="0">
+              <a:schemeClr val="accent1"/>
+            </a:effectRef>
+            <a:fontRef idx="minor">
+              <a:schemeClr val="tx1"/>
+            </a:fontRef>
+          </p:style>
+        </p:cxnSp>
+        <p:cxnSp>
+          <p:nvCxnSpPr>
+            <p:cNvPr id="10" name="Straight Connector 9"/>
+            <p:cNvCxnSpPr/>
+            <p:nvPr/>
+          </p:nvCxnSpPr>
+          <p:spPr>
+            <a:xfrm>
+              <a:off x="1175922" y="-1"/>
+              <a:ext cx="0" cy="6858000"/>
+            </a:xfrm>
+            <a:prstGeom prst="line">
+              <a:avLst/>
+            </a:prstGeom>
+            <a:ln w="12700">
+              <a:solidFill>
+                <a:srgbClr val="BCBCBC">
+                  <a:alpha val="29804"/>
+                </a:srgbClr>
+              </a:solidFill>
+              <a:prstDash val="sysDot"/>
+            </a:ln>
+          </p:spPr>
+          <p:style>
+            <a:lnRef idx="1">
+              <a:schemeClr val="accent1"/>
+            </a:lnRef>
+            <a:fillRef idx="0">
+              <a:schemeClr val="accent1"/>
+            </a:fillRef>
+            <a:effectRef idx="0">
+              <a:schemeClr val="accent1"/>
+            </a:effectRef>
+            <a:fontRef idx="minor">
+              <a:schemeClr val="tx1"/>
+            </a:fontRef>
+          </p:style>
+        </p:cxnSp>
+        <p:cxnSp>
+          <p:nvCxnSpPr>
+            <p:cNvPr id="11" name="Straight Connector 10"/>
+            <p:cNvCxnSpPr/>
+            <p:nvPr/>
+          </p:nvCxnSpPr>
+          <p:spPr>
+            <a:xfrm>
+              <a:off x="2159316" y="-1"/>
+              <a:ext cx="0" cy="6858000"/>
+            </a:xfrm>
+            <a:prstGeom prst="line">
+              <a:avLst/>
+            </a:prstGeom>
+            <a:ln w="12700">
+              <a:solidFill>
+                <a:srgbClr val="BCBCBC">
+                  <a:alpha val="29804"/>
+                </a:srgbClr>
+              </a:solidFill>
+              <a:prstDash val="sysDot"/>
+            </a:ln>
+          </p:spPr>
+          <p:style>
+            <a:lnRef idx="1">
+              <a:schemeClr val="accent1"/>
+            </a:lnRef>
+            <a:fillRef idx="0">
+              <a:schemeClr val="accent1"/>
+            </a:fillRef>
+            <a:effectRef idx="0">
+              <a:schemeClr val="accent1"/>
+            </a:effectRef>
+            <a:fontRef idx="minor">
+              <a:schemeClr val="tx1"/>
+            </a:fontRef>
+          </p:style>
+        </p:cxnSp>
+        <p:cxnSp>
+          <p:nvCxnSpPr>
+            <p:cNvPr id="12" name="Straight Connector 11"/>
+            <p:cNvCxnSpPr/>
+            <p:nvPr/>
+          </p:nvCxnSpPr>
+          <p:spPr>
+            <a:xfrm>
+              <a:off x="3142710" y="-1"/>
+              <a:ext cx="0" cy="6858000"/>
+            </a:xfrm>
+            <a:prstGeom prst="line">
+              <a:avLst/>
+            </a:prstGeom>
+            <a:ln w="12700">
+              <a:solidFill>
+                <a:srgbClr val="BCBCBC">
+                  <a:alpha val="29804"/>
+                </a:srgbClr>
+              </a:solidFill>
+              <a:prstDash val="sysDot"/>
+            </a:ln>
+          </p:spPr>
+          <p:style>
+            <a:lnRef idx="1">
+              <a:schemeClr val="accent1"/>
+            </a:lnRef>
+            <a:fillRef idx="0">
+              <a:schemeClr val="accent1"/>
+            </a:fillRef>
+            <a:effectRef idx="0">
+              <a:schemeClr val="accent1"/>
+            </a:effectRef>
+            <a:fontRef idx="minor">
+              <a:schemeClr val="tx1"/>
+            </a:fontRef>
+          </p:style>
+        </p:cxnSp>
+        <p:cxnSp>
+          <p:nvCxnSpPr>
+            <p:cNvPr id="13" name="Straight Connector 12"/>
+            <p:cNvCxnSpPr/>
+            <p:nvPr/>
+          </p:nvCxnSpPr>
+          <p:spPr>
+            <a:xfrm>
+              <a:off x="4126104" y="-1"/>
+              <a:ext cx="0" cy="6858000"/>
+            </a:xfrm>
+            <a:prstGeom prst="line">
+              <a:avLst/>
+            </a:prstGeom>
+            <a:ln w="12700">
+              <a:solidFill>
+                <a:srgbClr val="BCBCBC">
+                  <a:alpha val="29804"/>
+                </a:srgbClr>
+              </a:solidFill>
+              <a:prstDash val="sysDot"/>
+            </a:ln>
+          </p:spPr>
+          <p:style>
+            <a:lnRef idx="1">
+              <a:schemeClr val="accent1"/>
+            </a:lnRef>
+            <a:fillRef idx="0">
+              <a:schemeClr val="accent1"/>
+            </a:fillRef>
+            <a:effectRef idx="0">
+              <a:schemeClr val="accent1"/>
+            </a:effectRef>
+            <a:fontRef idx="minor">
+              <a:schemeClr val="tx1"/>
+            </a:fontRef>
+          </p:style>
+        </p:cxnSp>
+        <p:cxnSp>
+          <p:nvCxnSpPr>
+            <p:cNvPr id="14" name="Straight Connector 13"/>
+            <p:cNvCxnSpPr/>
+            <p:nvPr/>
+          </p:nvCxnSpPr>
+          <p:spPr>
+            <a:xfrm>
+              <a:off x="5109498" y="-1"/>
+              <a:ext cx="0" cy="6858000"/>
+            </a:xfrm>
+            <a:prstGeom prst="line">
+              <a:avLst/>
+            </a:prstGeom>
+            <a:ln w="12700">
+              <a:solidFill>
+                <a:srgbClr val="BCBCBC">
+                  <a:alpha val="29804"/>
+                </a:srgbClr>
+              </a:solidFill>
+              <a:prstDash val="sysDot"/>
+            </a:ln>
+          </p:spPr>
+          <p:style>
+            <a:lnRef idx="1">
+              <a:schemeClr val="accent1"/>
+            </a:lnRef>
+            <a:fillRef idx="0">
+              <a:schemeClr val="accent1"/>
+            </a:fillRef>
+            <a:effectRef idx="0">
+              <a:schemeClr val="accent1"/>
+            </a:effectRef>
+            <a:fontRef idx="minor">
+              <a:schemeClr val="tx1"/>
+            </a:fontRef>
+          </p:style>
+        </p:cxnSp>
+        <p:cxnSp>
+          <p:nvCxnSpPr>
+            <p:cNvPr id="15" name="Straight Connector 14"/>
+            <p:cNvCxnSpPr/>
+            <p:nvPr/>
+          </p:nvCxnSpPr>
+          <p:spPr>
+            <a:xfrm>
+              <a:off x="6092892" y="-1"/>
+              <a:ext cx="0" cy="6858000"/>
+            </a:xfrm>
+            <a:prstGeom prst="line">
+              <a:avLst/>
+            </a:prstGeom>
+            <a:ln w="12700">
+              <a:solidFill>
+                <a:srgbClr val="BCBCBC">
+                  <a:alpha val="29804"/>
+                </a:srgbClr>
+              </a:solidFill>
+              <a:prstDash val="sysDot"/>
+            </a:ln>
+          </p:spPr>
+          <p:style>
+            <a:lnRef idx="1">
+              <a:schemeClr val="accent1"/>
+            </a:lnRef>
+            <a:fillRef idx="0">
+              <a:schemeClr val="accent1"/>
+            </a:fillRef>
+            <a:effectRef idx="0">
+              <a:schemeClr val="accent1"/>
+            </a:effectRef>
+            <a:fontRef idx="minor">
+              <a:schemeClr val="tx1"/>
+            </a:fontRef>
+          </p:style>
+        </p:cxnSp>
+        <p:cxnSp>
+          <p:nvCxnSpPr>
+            <p:cNvPr id="16" name="Straight Connector 15"/>
+            <p:cNvCxnSpPr/>
+            <p:nvPr/>
+          </p:nvCxnSpPr>
+          <p:spPr>
+            <a:xfrm>
+              <a:off x="7076286" y="-1"/>
+              <a:ext cx="0" cy="6858000"/>
+            </a:xfrm>
+            <a:prstGeom prst="line">
+              <a:avLst/>
+            </a:prstGeom>
+            <a:ln w="12700">
+              <a:solidFill>
+                <a:srgbClr val="BCBCBC">
+                  <a:alpha val="29804"/>
+                </a:srgbClr>
+              </a:solidFill>
+              <a:prstDash val="sysDot"/>
+            </a:ln>
+          </p:spPr>
+          <p:style>
+            <a:lnRef idx="1">
+              <a:schemeClr val="accent1"/>
+            </a:lnRef>
+            <a:fillRef idx="0">
+              <a:schemeClr val="accent1"/>
+            </a:fillRef>
+            <a:effectRef idx="0">
+              <a:schemeClr val="accent1"/>
+            </a:effectRef>
+            <a:fontRef idx="minor">
+              <a:schemeClr val="tx1"/>
+            </a:fontRef>
+          </p:style>
+        </p:cxnSp>
+        <p:cxnSp>
+          <p:nvCxnSpPr>
+            <p:cNvPr id="17" name="Straight Connector 16"/>
+            <p:cNvCxnSpPr/>
+            <p:nvPr/>
+          </p:nvCxnSpPr>
+          <p:spPr>
+            <a:xfrm>
+              <a:off x="8059680" y="-1"/>
+              <a:ext cx="0" cy="6858000"/>
+            </a:xfrm>
+            <a:prstGeom prst="line">
+              <a:avLst/>
+            </a:prstGeom>
+            <a:ln w="12700">
+              <a:solidFill>
+                <a:srgbClr val="BCBCBC">
+                  <a:alpha val="29804"/>
+                </a:srgbClr>
+              </a:solidFill>
+              <a:prstDash val="sysDot"/>
+            </a:ln>
+          </p:spPr>
+          <p:style>
+            <a:lnRef idx="1">
+              <a:schemeClr val="accent1"/>
+            </a:lnRef>
+            <a:fillRef idx="0">
+              <a:schemeClr val="accent1"/>
+            </a:fillRef>
+            <a:effectRef idx="0">
+              <a:schemeClr val="accent1"/>
+            </a:effectRef>
+            <a:fontRef idx="minor">
+              <a:schemeClr val="tx1"/>
+            </a:fontRef>
+          </p:style>
+        </p:cxnSp>
+        <p:cxnSp>
+          <p:nvCxnSpPr>
+            <p:cNvPr id="18" name="Straight Connector 17"/>
+            <p:cNvCxnSpPr/>
+            <p:nvPr/>
+          </p:nvCxnSpPr>
+          <p:spPr>
+            <a:xfrm>
+              <a:off x="9043074" y="-1"/>
+              <a:ext cx="0" cy="6858000"/>
+            </a:xfrm>
+            <a:prstGeom prst="line">
+              <a:avLst/>
+            </a:prstGeom>
+            <a:ln w="12700">
+              <a:solidFill>
+                <a:srgbClr val="BCBCBC">
+                  <a:alpha val="29804"/>
+                </a:srgbClr>
+              </a:solidFill>
+              <a:prstDash val="sysDot"/>
+            </a:ln>
+          </p:spPr>
+          <p:style>
+            <a:lnRef idx="1">
+              <a:schemeClr val="accent1"/>
+            </a:lnRef>
+            <a:fillRef idx="0">
+              <a:schemeClr val="accent1"/>
+            </a:fillRef>
+            <a:effectRef idx="0">
+              <a:schemeClr val="accent1"/>
+            </a:effectRef>
+            <a:fontRef idx="minor">
+              <a:schemeClr val="tx1"/>
+            </a:fontRef>
+          </p:style>
+        </p:cxnSp>
+        <p:cxnSp>
+          <p:nvCxnSpPr>
+            <p:cNvPr id="19" name="Straight Connector 18"/>
+            <p:cNvCxnSpPr/>
+            <p:nvPr/>
+          </p:nvCxnSpPr>
+          <p:spPr>
+            <a:xfrm>
+              <a:off x="10026468" y="-1"/>
+              <a:ext cx="0" cy="6858000"/>
+            </a:xfrm>
+            <a:prstGeom prst="line">
+              <a:avLst/>
+            </a:prstGeom>
+            <a:ln w="12700">
+              <a:solidFill>
+                <a:srgbClr val="BCBCBC">
+                  <a:alpha val="29804"/>
+                </a:srgbClr>
+              </a:solidFill>
+              <a:prstDash val="sysDot"/>
+            </a:ln>
+          </p:spPr>
+          <p:style>
+            <a:lnRef idx="1">
+              <a:schemeClr val="accent1"/>
+            </a:lnRef>
+            <a:fillRef idx="0">
+              <a:schemeClr val="accent1"/>
+            </a:fillRef>
+            <a:effectRef idx="0">
+              <a:schemeClr val="accent1"/>
+            </a:effectRef>
+            <a:fontRef idx="minor">
+              <a:schemeClr val="tx1"/>
+            </a:fontRef>
+          </p:style>
+        </p:cxnSp>
+        <p:cxnSp>
+          <p:nvCxnSpPr>
+            <p:cNvPr id="20" name="Straight Connector 19"/>
+            <p:cNvCxnSpPr/>
+            <p:nvPr/>
+          </p:nvCxnSpPr>
+          <p:spPr>
+            <a:xfrm>
+              <a:off x="11009862" y="-1"/>
+              <a:ext cx="0" cy="6858000"/>
+            </a:xfrm>
+            <a:prstGeom prst="line">
+              <a:avLst/>
+            </a:prstGeom>
+            <a:ln w="12700">
+              <a:solidFill>
+                <a:srgbClr val="BCBCBC">
+                  <a:alpha val="29804"/>
+                </a:srgbClr>
+              </a:solidFill>
+              <a:prstDash val="sysDot"/>
+            </a:ln>
+          </p:spPr>
+          <p:style>
+            <a:lnRef idx="1">
+              <a:schemeClr val="accent1"/>
+            </a:lnRef>
+            <a:fillRef idx="0">
+              <a:schemeClr val="accent1"/>
+            </a:fillRef>
+            <a:effectRef idx="0">
+              <a:schemeClr val="accent1"/>
+            </a:effectRef>
+            <a:fontRef idx="minor">
+              <a:schemeClr val="tx1"/>
+            </a:fontRef>
+          </p:style>
+        </p:cxnSp>
+        <p:cxnSp>
+          <p:nvCxnSpPr>
+            <p:cNvPr id="21" name="Straight Connector 20"/>
+            <p:cNvCxnSpPr/>
+            <p:nvPr/>
+          </p:nvCxnSpPr>
+          <p:spPr>
+            <a:xfrm>
+              <a:off x="12185786" y="-1"/>
+              <a:ext cx="0" cy="6858000"/>
+            </a:xfrm>
+            <a:prstGeom prst="line">
+              <a:avLst/>
+            </a:prstGeom>
+            <a:ln w="12700">
+              <a:solidFill>
+                <a:srgbClr val="BCBCBC">
+                  <a:alpha val="29804"/>
+                </a:srgbClr>
+              </a:solidFill>
+              <a:prstDash val="sysDot"/>
+            </a:ln>
+          </p:spPr>
+          <p:style>
+            <a:lnRef idx="1">
+              <a:schemeClr val="accent1"/>
+            </a:lnRef>
+            <a:fillRef idx="0">
+              <a:schemeClr val="accent1"/>
+            </a:fillRef>
+            <a:effectRef idx="0">
+              <a:schemeClr val="accent1"/>
+            </a:effectRef>
+            <a:fontRef idx="minor">
+              <a:schemeClr val="tx1"/>
+            </a:fontRef>
+          </p:style>
+        </p:cxnSp>
+        <p:cxnSp>
+          <p:nvCxnSpPr>
+            <p:cNvPr id="22" name="Straight Connector 21"/>
+            <p:cNvCxnSpPr/>
+            <p:nvPr/>
+          </p:nvCxnSpPr>
+          <p:spPr>
+            <a:xfrm>
+              <a:off x="0" y="171716"/>
+              <a:ext cx="12192000" cy="0"/>
+            </a:xfrm>
+            <a:prstGeom prst="line">
+              <a:avLst/>
+            </a:prstGeom>
+            <a:ln w="12700">
+              <a:solidFill>
+                <a:srgbClr val="BCBCBC">
+                  <a:alpha val="29804"/>
+                </a:srgbClr>
+              </a:solidFill>
+              <a:prstDash val="sysDot"/>
+            </a:ln>
+          </p:spPr>
+          <p:style>
+            <a:lnRef idx="1">
+              <a:schemeClr val="accent1"/>
+            </a:lnRef>
+            <a:fillRef idx="0">
+              <a:schemeClr val="accent1"/>
+            </a:fillRef>
+            <a:effectRef idx="0">
+              <a:schemeClr val="accent1"/>
+            </a:effectRef>
+            <a:fontRef idx="minor">
+              <a:schemeClr val="tx1"/>
+            </a:fontRef>
+          </p:style>
+        </p:cxnSp>
+        <p:cxnSp>
+          <p:nvCxnSpPr>
+            <p:cNvPr id="23" name="Straight Connector 22"/>
+            <p:cNvCxnSpPr/>
+            <p:nvPr/>
+          </p:nvCxnSpPr>
+          <p:spPr>
+            <a:xfrm>
+              <a:off x="0" y="714597"/>
+              <a:ext cx="12192000" cy="0"/>
+            </a:xfrm>
+            <a:prstGeom prst="line">
+              <a:avLst/>
+            </a:prstGeom>
+            <a:ln w="12700">
+              <a:solidFill>
+                <a:srgbClr val="BCBCBC">
+                  <a:alpha val="29804"/>
+                </a:srgbClr>
+              </a:solidFill>
+              <a:prstDash val="sysDot"/>
+            </a:ln>
+          </p:spPr>
+          <p:style>
+            <a:lnRef idx="1">
+              <a:schemeClr val="accent1"/>
+            </a:lnRef>
+            <a:fillRef idx="0">
+              <a:schemeClr val="accent1"/>
+            </a:fillRef>
+            <a:effectRef idx="0">
+              <a:schemeClr val="accent1"/>
+            </a:effectRef>
+            <a:fontRef idx="minor">
+              <a:schemeClr val="tx1"/>
+            </a:fontRef>
+          </p:style>
+        </p:cxnSp>
+        <p:cxnSp>
+          <p:nvCxnSpPr>
+            <p:cNvPr id="24" name="Straight Connector 23"/>
+            <p:cNvCxnSpPr/>
+            <p:nvPr/>
+          </p:nvCxnSpPr>
+          <p:spPr>
+            <a:xfrm>
+              <a:off x="0" y="1257478"/>
+              <a:ext cx="12192000" cy="0"/>
+            </a:xfrm>
+            <a:prstGeom prst="line">
+              <a:avLst/>
+            </a:prstGeom>
+            <a:ln w="12700">
+              <a:solidFill>
+                <a:srgbClr val="BCBCBC">
+                  <a:alpha val="29804"/>
+                </a:srgbClr>
+              </a:solidFill>
+              <a:prstDash val="sysDot"/>
+            </a:ln>
+          </p:spPr>
+          <p:style>
+            <a:lnRef idx="1">
+              <a:schemeClr val="accent1"/>
+            </a:lnRef>
+            <a:fillRef idx="0">
+              <a:schemeClr val="accent1"/>
+            </a:fillRef>
+            <a:effectRef idx="0">
+              <a:schemeClr val="accent1"/>
+            </a:effectRef>
+            <a:fontRef idx="minor">
+              <a:schemeClr val="tx1"/>
+            </a:fontRef>
+          </p:style>
+        </p:cxnSp>
+        <p:cxnSp>
+          <p:nvCxnSpPr>
+            <p:cNvPr id="25" name="Straight Connector 24"/>
+            <p:cNvCxnSpPr/>
+            <p:nvPr/>
+          </p:nvCxnSpPr>
+          <p:spPr>
+            <a:xfrm>
+              <a:off x="0" y="1800359"/>
+              <a:ext cx="12192000" cy="0"/>
+            </a:xfrm>
+            <a:prstGeom prst="line">
+              <a:avLst/>
+            </a:prstGeom>
+            <a:ln w="12700">
+              <a:solidFill>
+                <a:srgbClr val="BCBCBC">
+                  <a:alpha val="29804"/>
+                </a:srgbClr>
+              </a:solidFill>
+              <a:prstDash val="sysDot"/>
+            </a:ln>
+          </p:spPr>
+          <p:style>
+            <a:lnRef idx="1">
+              <a:schemeClr val="accent1"/>
+            </a:lnRef>
+            <a:fillRef idx="0">
+              <a:schemeClr val="accent1"/>
+            </a:fillRef>
+            <a:effectRef idx="0">
+              <a:schemeClr val="accent1"/>
+            </a:effectRef>
+            <a:fontRef idx="minor">
+              <a:schemeClr val="tx1"/>
+            </a:fontRef>
+          </p:style>
+        </p:cxnSp>
+        <p:cxnSp>
+          <p:nvCxnSpPr>
+            <p:cNvPr id="26" name="Straight Connector 25"/>
+            <p:cNvCxnSpPr/>
+            <p:nvPr/>
+          </p:nvCxnSpPr>
+          <p:spPr>
+            <a:xfrm>
+              <a:off x="0" y="2343240"/>
+              <a:ext cx="12192000" cy="0"/>
+            </a:xfrm>
+            <a:prstGeom prst="line">
+              <a:avLst/>
+            </a:prstGeom>
+            <a:ln w="12700">
+              <a:solidFill>
+                <a:srgbClr val="BCBCBC">
+                  <a:alpha val="29804"/>
+                </a:srgbClr>
+              </a:solidFill>
+              <a:prstDash val="sysDot"/>
+            </a:ln>
+          </p:spPr>
+          <p:style>
+            <a:lnRef idx="1">
+              <a:schemeClr val="accent1"/>
+            </a:lnRef>
+            <a:fillRef idx="0">
+              <a:schemeClr val="accent1"/>
+            </a:fillRef>
+            <a:effectRef idx="0">
+              <a:schemeClr val="accent1"/>
+            </a:effectRef>
+            <a:fontRef idx="minor">
+              <a:schemeClr val="tx1"/>
+            </a:fontRef>
+          </p:style>
+        </p:cxnSp>
+        <p:cxnSp>
+          <p:nvCxnSpPr>
+            <p:cNvPr id="27" name="Straight Connector 26"/>
+            <p:cNvCxnSpPr/>
+            <p:nvPr/>
+          </p:nvCxnSpPr>
+          <p:spPr>
+            <a:xfrm>
+              <a:off x="0" y="2886121"/>
+              <a:ext cx="12192000" cy="0"/>
+            </a:xfrm>
+            <a:prstGeom prst="line">
+              <a:avLst/>
+            </a:prstGeom>
+            <a:ln w="12700">
+              <a:solidFill>
+                <a:srgbClr val="BCBCBC">
+                  <a:alpha val="29804"/>
+                </a:srgbClr>
+              </a:solidFill>
+              <a:prstDash val="sysDot"/>
+            </a:ln>
+          </p:spPr>
+          <p:style>
+            <a:lnRef idx="1">
+              <a:schemeClr val="accent1"/>
+            </a:lnRef>
+            <a:fillRef idx="0">
+              <a:schemeClr val="accent1"/>
+            </a:fillRef>
+            <a:effectRef idx="0">
+              <a:schemeClr val="accent1"/>
+            </a:effectRef>
+            <a:fontRef idx="minor">
+              <a:schemeClr val="tx1"/>
+            </a:fontRef>
+          </p:style>
+        </p:cxnSp>
+        <p:cxnSp>
+          <p:nvCxnSpPr>
+            <p:cNvPr id="28" name="Straight Connector 27"/>
+            <p:cNvCxnSpPr/>
+            <p:nvPr/>
+          </p:nvCxnSpPr>
+          <p:spPr>
+            <a:xfrm>
+              <a:off x="0" y="3429002"/>
+              <a:ext cx="12192000" cy="0"/>
+            </a:xfrm>
+            <a:prstGeom prst="line">
+              <a:avLst/>
+            </a:prstGeom>
+            <a:ln w="12700">
+              <a:solidFill>
+                <a:srgbClr val="BCBCBC">
+                  <a:alpha val="29804"/>
+                </a:srgbClr>
+              </a:solidFill>
+              <a:prstDash val="sysDot"/>
+            </a:ln>
+          </p:spPr>
+          <p:style>
+            <a:lnRef idx="1">
+              <a:schemeClr val="accent1"/>
+            </a:lnRef>
+            <a:fillRef idx="0">
+              <a:schemeClr val="accent1"/>
+            </a:fillRef>
+            <a:effectRef idx="0">
+              <a:schemeClr val="accent1"/>
+            </a:effectRef>
+            <a:fontRef idx="minor">
+              <a:schemeClr val="tx1"/>
+            </a:fontRef>
+          </p:style>
+        </p:cxnSp>
+        <p:cxnSp>
+          <p:nvCxnSpPr>
+            <p:cNvPr id="29" name="Straight Connector 28"/>
+            <p:cNvCxnSpPr/>
+            <p:nvPr/>
+          </p:nvCxnSpPr>
+          <p:spPr>
+            <a:xfrm>
+              <a:off x="0" y="3971883"/>
+              <a:ext cx="12192000" cy="0"/>
+            </a:xfrm>
+            <a:prstGeom prst="line">
+              <a:avLst/>
+            </a:prstGeom>
+            <a:ln w="12700">
+              <a:solidFill>
+                <a:srgbClr val="BCBCBC">
+                  <a:alpha val="29804"/>
+                </a:srgbClr>
+              </a:solidFill>
+              <a:prstDash val="sysDot"/>
+            </a:ln>
+          </p:spPr>
+          <p:style>
+            <a:lnRef idx="1">
+              <a:schemeClr val="accent1"/>
+            </a:lnRef>
+            <a:fillRef idx="0">
+              <a:schemeClr val="accent1"/>
+            </a:fillRef>
+            <a:effectRef idx="0">
+              <a:schemeClr val="accent1"/>
+            </a:effectRef>
+            <a:fontRef idx="minor">
+              <a:schemeClr val="tx1"/>
+            </a:fontRef>
+          </p:style>
+        </p:cxnSp>
+        <p:cxnSp>
+          <p:nvCxnSpPr>
+            <p:cNvPr id="30" name="Straight Connector 29"/>
+            <p:cNvCxnSpPr/>
+            <p:nvPr/>
+          </p:nvCxnSpPr>
+          <p:spPr>
+            <a:xfrm>
+              <a:off x="0" y="4514764"/>
+              <a:ext cx="12192000" cy="0"/>
+            </a:xfrm>
+            <a:prstGeom prst="line">
+              <a:avLst/>
+            </a:prstGeom>
+            <a:ln w="12700">
+              <a:solidFill>
+                <a:srgbClr val="BCBCBC">
+                  <a:alpha val="29804"/>
+                </a:srgbClr>
+              </a:solidFill>
+              <a:prstDash val="sysDot"/>
+            </a:ln>
+          </p:spPr>
+          <p:style>
+            <a:lnRef idx="1">
+              <a:schemeClr val="accent1"/>
+            </a:lnRef>
+            <a:fillRef idx="0">
+              <a:schemeClr val="accent1"/>
+            </a:fillRef>
+            <a:effectRef idx="0">
+              <a:schemeClr val="accent1"/>
+            </a:effectRef>
+            <a:fontRef idx="minor">
+              <a:schemeClr val="tx1"/>
+            </a:fontRef>
+          </p:style>
+        </p:cxnSp>
+        <p:cxnSp>
+          <p:nvCxnSpPr>
+            <p:cNvPr id="31" name="Straight Connector 30"/>
+            <p:cNvCxnSpPr/>
+            <p:nvPr/>
+          </p:nvCxnSpPr>
+          <p:spPr>
+            <a:xfrm>
+              <a:off x="0" y="5057645"/>
+              <a:ext cx="12192000" cy="0"/>
+            </a:xfrm>
+            <a:prstGeom prst="line">
+              <a:avLst/>
+            </a:prstGeom>
+            <a:ln w="12700">
+              <a:solidFill>
+                <a:srgbClr val="BCBCBC">
+                  <a:alpha val="29804"/>
+                </a:srgbClr>
+              </a:solidFill>
+              <a:prstDash val="sysDot"/>
+            </a:ln>
+          </p:spPr>
+          <p:style>
+            <a:lnRef idx="1">
+              <a:schemeClr val="accent1"/>
+            </a:lnRef>
+            <a:fillRef idx="0">
+              <a:schemeClr val="accent1"/>
+            </a:fillRef>
+            <a:effectRef idx="0">
+              <a:schemeClr val="accent1"/>
+            </a:effectRef>
+            <a:fontRef idx="minor">
+              <a:schemeClr val="tx1"/>
+            </a:fontRef>
+          </p:style>
+        </p:cxnSp>
+        <p:cxnSp>
+          <p:nvCxnSpPr>
+            <p:cNvPr id="32" name="Straight Connector 31"/>
+            <p:cNvCxnSpPr/>
+            <p:nvPr/>
+          </p:nvCxnSpPr>
+          <p:spPr>
+            <a:xfrm>
+              <a:off x="0" y="5600526"/>
+              <a:ext cx="12192000" cy="0"/>
+            </a:xfrm>
+            <a:prstGeom prst="line">
+              <a:avLst/>
+            </a:prstGeom>
+            <a:ln w="12700">
+              <a:solidFill>
+                <a:srgbClr val="BCBCBC">
+                  <a:alpha val="29804"/>
+                </a:srgbClr>
+              </a:solidFill>
+              <a:prstDash val="sysDot"/>
+            </a:ln>
+          </p:spPr>
+          <p:style>
+            <a:lnRef idx="1">
+              <a:schemeClr val="accent1"/>
+            </a:lnRef>
+            <a:fillRef idx="0">
+              <a:schemeClr val="accent1"/>
+            </a:fillRef>
+            <a:effectRef idx="0">
+              <a:schemeClr val="accent1"/>
+            </a:effectRef>
+            <a:fontRef idx="minor">
+              <a:schemeClr val="tx1"/>
+            </a:fontRef>
+          </p:style>
+        </p:cxnSp>
+        <p:cxnSp>
+          <p:nvCxnSpPr>
+            <p:cNvPr id="33" name="Straight Connector 32"/>
+            <p:cNvCxnSpPr/>
+            <p:nvPr/>
+          </p:nvCxnSpPr>
+          <p:spPr>
+            <a:xfrm>
+              <a:off x="0" y="6857999"/>
+              <a:ext cx="12192000" cy="0"/>
+            </a:xfrm>
+            <a:prstGeom prst="line">
+              <a:avLst/>
+            </a:prstGeom>
+            <a:ln w="12700">
+              <a:solidFill>
+                <a:srgbClr val="BCBCBC">
+                  <a:alpha val="29804"/>
+                </a:srgbClr>
+              </a:solidFill>
+              <a:prstDash val="sysDot"/>
+            </a:ln>
+          </p:spPr>
+          <p:style>
+            <a:lnRef idx="1">
+              <a:schemeClr val="accent1"/>
+            </a:lnRef>
+            <a:fillRef idx="0">
+              <a:schemeClr val="accent1"/>
+            </a:fillRef>
+            <a:effectRef idx="0">
+              <a:schemeClr val="accent1"/>
+            </a:effectRef>
+            <a:fontRef idx="minor">
+              <a:schemeClr val="tx1"/>
+            </a:fontRef>
+          </p:style>
+        </p:cxnSp>
+        <p:cxnSp>
+          <p:nvCxnSpPr>
+            <p:cNvPr id="34" name="Straight Connector 33"/>
+            <p:cNvCxnSpPr/>
+            <p:nvPr/>
+          </p:nvCxnSpPr>
+          <p:spPr>
+            <a:xfrm>
+              <a:off x="16613" y="6143407"/>
+              <a:ext cx="12192000" cy="0"/>
+            </a:xfrm>
+            <a:prstGeom prst="line">
+              <a:avLst/>
+            </a:prstGeom>
+            <a:ln w="12700">
+              <a:solidFill>
+                <a:srgbClr val="BCBCBC">
+                  <a:alpha val="29804"/>
+                </a:srgbClr>
+              </a:solidFill>
+              <a:prstDash val="sysDot"/>
+            </a:ln>
+          </p:spPr>
+          <p:style>
+            <a:lnRef idx="1">
+              <a:schemeClr val="accent1"/>
+            </a:lnRef>
+            <a:fillRef idx="0">
+              <a:schemeClr val="accent1"/>
+            </a:fillRef>
+            <a:effectRef idx="0">
+              <a:schemeClr val="accent1"/>
+            </a:effectRef>
+            <a:fontRef idx="minor">
+              <a:schemeClr val="tx1"/>
+            </a:fontRef>
+          </p:style>
+        </p:cxnSp>
+        <p:cxnSp>
+          <p:nvCxnSpPr>
+            <p:cNvPr id="35" name="Straight Connector 34"/>
+            <p:cNvCxnSpPr/>
+            <p:nvPr/>
+          </p:nvCxnSpPr>
+          <p:spPr>
+            <a:xfrm>
+              <a:off x="684225" y="171716"/>
+              <a:ext cx="0" cy="6511464"/>
+            </a:xfrm>
+            <a:prstGeom prst="line">
+              <a:avLst/>
+            </a:prstGeom>
+            <a:ln w="12700">
+              <a:solidFill>
+                <a:srgbClr val="BCBCBC">
+                  <a:alpha val="29804"/>
+                </a:srgbClr>
+              </a:solidFill>
+              <a:prstDash val="sysDot"/>
+            </a:ln>
+          </p:spPr>
+          <p:style>
+            <a:lnRef idx="1">
+              <a:schemeClr val="accent1"/>
+            </a:lnRef>
+            <a:fillRef idx="0">
+              <a:schemeClr val="accent1"/>
+            </a:fillRef>
+            <a:effectRef idx="0">
+              <a:schemeClr val="accent1"/>
+            </a:effectRef>
+            <a:fontRef idx="minor">
+              <a:schemeClr val="tx1"/>
+            </a:fontRef>
+          </p:style>
+        </p:cxnSp>
+        <p:cxnSp>
+          <p:nvCxnSpPr>
+            <p:cNvPr id="36" name="Straight Connector 35"/>
+            <p:cNvCxnSpPr/>
+            <p:nvPr/>
+          </p:nvCxnSpPr>
+          <p:spPr>
+            <a:xfrm>
+              <a:off x="11508412" y="173267"/>
+              <a:ext cx="0" cy="6511464"/>
+            </a:xfrm>
+            <a:prstGeom prst="line">
+              <a:avLst/>
+            </a:prstGeom>
+            <a:ln w="12700">
+              <a:solidFill>
+                <a:srgbClr val="BCBCBC">
+                  <a:alpha val="29804"/>
+                </a:srgbClr>
+              </a:solidFill>
+              <a:prstDash val="sysDot"/>
+            </a:ln>
+          </p:spPr>
+          <p:style>
+            <a:lnRef idx="1">
+              <a:schemeClr val="accent1"/>
+            </a:lnRef>
+            <a:fillRef idx="0">
+              <a:schemeClr val="accent1"/>
+            </a:fillRef>
+            <a:effectRef idx="0">
+              <a:schemeClr val="accent1"/>
+            </a:effectRef>
+            <a:fontRef idx="minor">
+              <a:schemeClr val="tx1"/>
+            </a:fontRef>
+          </p:style>
+        </p:cxnSp>
+      </p:grpSp>
+      <p:sp>
+        <p:nvSpPr>
+          <p:cNvPr id="38" name="Picture Placeholder 37">
+            <a:extLst>
+              <a:ext uri="{FF2B5EF4-FFF2-40B4-BE49-F238E27FC236}">
+                <a16:creationId xmlns:a16="http://schemas.microsoft.com/office/drawing/2014/main" id="{BC0FE04E-8B1F-5AAB-0D71-93977D91780A}"/>
+              </a:ext>
+            </a:extLst>
+          </p:cNvPr>
+          <p:cNvSpPr>
+            <a:spLocks noGrp="1"/>
+          </p:cNvSpPr>
+          <p:nvPr>
+            <p:ph type="pic" sz="quarter" idx="10"/>
+          </p:nvPr>
+        </p:nvSpPr>
+        <p:spPr>
+          <a:xfrm>
+            <a:off x="-6215" y="-2"/>
+            <a:ext cx="12169165" cy="6857998"/>
+          </a:xfrm>
+        </p:spPr>
+        <p:txBody>
+          <a:bodyPr/>
+          <a:lstStyle/>
+          <a:p>
+            <a:endParaRPr lang="en-CN"/>
+          </a:p>
+        </p:txBody>
+      </p:sp>
+      <p:sp>
+        <p:nvSpPr>
+          <p:cNvPr id="40" name="Title 1">
+            <a:extLst>
+              <a:ext uri="{FF2B5EF4-FFF2-40B4-BE49-F238E27FC236}">
+                <a16:creationId xmlns:a16="http://schemas.microsoft.com/office/drawing/2014/main" id="{6B2C9348-E48E-5174-E099-8CDD4966B455}"/>
+              </a:ext>
+            </a:extLst>
+          </p:cNvPr>
+          <p:cNvSpPr>
+            <a:spLocks noGrp="1"/>
+          </p:cNvSpPr>
+          <p:nvPr>
+            <p:ph type="title"/>
+          </p:nvPr>
+        </p:nvSpPr>
+        <p:spPr>
+          <a:xfrm>
+            <a:off x="876752" y="725951"/>
+            <a:ext cx="9940581" cy="1893175"/>
+          </a:xfrm>
+        </p:spPr>
+        <p:txBody>
+          <a:bodyPr anchor="ctr">
+            <a:normAutofit/>
+          </a:bodyPr>
+          <a:lstStyle>
+            <a:lvl1pPr algn="ctr">
+              <a:defRPr kumimoji="0" lang="en-US" sz="5200" b="1" i="0" u="none" strike="noStrike" kern="1200" cap="none" spc="0" normalizeH="0" baseline="0" dirty="0">
+                <a:ln>
+                  <a:noFill/>
+                </a:ln>
+                <a:solidFill>
+                  <a:srgbClr val="FFFFFF"/>
+                </a:solidFill>
+                <a:effectLst/>
+                <a:uLnTx/>
+                <a:uFillTx/>
+                <a:latin typeface="Helvetica Neue Medium" panose="02000503000000020004"/>
+                <a:ea typeface="Helvetica Neue Medium" panose="02000503000000020004"/>
+                <a:cs typeface="Helvetica Neue Medium" panose="02000503000000020004"/>
+              </a:defRPr>
+            </a:lvl1pPr>
+          </a:lstStyle>
+          <a:p>
+            <a:r>
+              <a:rPr lang="en-US" dirty="0"/>
+              <a:t>Click to edit Master title style</a:t>
+            </a:r>
+          </a:p>
+        </p:txBody>
+      </p:sp>
+    </p:spTree>
+    <p:extLst>
+      <p:ext uri="{BB962C8B-B14F-4D97-AF65-F5344CB8AC3E}">
+        <p14:creationId xmlns:p14="http://schemas.microsoft.com/office/powerpoint/2010/main" val="376238915"/>
+      </p:ext>
+    </p:extLst>
+  </p:cSld>
+  <p:clrMapOvr>
+    <a:masterClrMapping/>
+  </p:clrMapOvr>
+</p:sldLayout>
+</file>
+
+<file path=ppt/slideLayouts/slideLayout11.xml><?xml version="1.0" encoding="utf-8"?>
+<p:sldLayout xmlns:a="http://schemas.openxmlformats.org/drawingml/2006/main" xmlns:r="http://schemas.openxmlformats.org/officeDocument/2006/relationships" xmlns:p="http://schemas.openxmlformats.org/presentationml/2006/main" showMasterSp="0" preserve="1" userDrawn="1">
   <p:cSld name="Picture 0">
     <p:spTree>
       <p:nvGrpSpPr>
@@ -2536,7 +3841,7 @@
 </p:sldLayout>
 </file>
 
-<file path=ppt/slideLayouts/slideLayout11.xml><?xml version="1.0" encoding="utf-8"?>
+<file path=ppt/slideLayouts/slideLayout12.xml><?xml version="1.0" encoding="utf-8"?>
 <p:sldLayout xmlns:a="http://schemas.openxmlformats.org/drawingml/2006/main" xmlns:r="http://schemas.openxmlformats.org/officeDocument/2006/relationships" xmlns:p="http://schemas.openxmlformats.org/presentationml/2006/main" showMasterSp="0" preserve="1" userDrawn="1">
   <p:cSld name="Title, Picture 1">
     <p:spTree>
@@ -2802,7 +4107,7 @@
 </p:sldLayout>
 </file>
 
-<file path=ppt/slideLayouts/slideLayout12.xml><?xml version="1.0" encoding="utf-8"?>
+<file path=ppt/slideLayouts/slideLayout13.xml><?xml version="1.0" encoding="utf-8"?>
 <p:sldLayout xmlns:a="http://schemas.openxmlformats.org/drawingml/2006/main" xmlns:r="http://schemas.openxmlformats.org/officeDocument/2006/relationships" xmlns:p="http://schemas.openxmlformats.org/presentationml/2006/main" preserve="1" userDrawn="1">
   <p:cSld name="blank">
     <p:spTree>
@@ -5098,12 +6403,12 @@
         </p:nvSpPr>
         <p:spPr>
           <a:xfrm>
-            <a:off x="5698672" y="708102"/>
-            <a:ext cx="5656716" cy="5430644"/>
+            <a:off x="5698671" y="708102"/>
+            <a:ext cx="6271749" cy="5430644"/>
           </a:xfrm>
         </p:spPr>
         <p:txBody>
-          <a:bodyPr>
+          <a:bodyPr anchor="ctr">
             <a:normAutofit/>
           </a:bodyPr>
           <a:lstStyle>
@@ -6368,7 +7673,7 @@
     </p:spTree>
     <p:extLst>
       <p:ext uri="{BB962C8B-B14F-4D97-AF65-F5344CB8AC3E}">
-        <p14:creationId xmlns:p14="http://schemas.microsoft.com/office/powerpoint/2010/main" val="315663076"/>
+        <p14:creationId xmlns:p14="http://schemas.microsoft.com/office/powerpoint/2010/main" val="2342903008"/>
       </p:ext>
     </p:extLst>
   </p:cSld>
@@ -7722,6 +9027,1412 @@
 
 <file path=ppt/slideLayouts/slideLayout6.xml><?xml version="1.0" encoding="utf-8"?>
 <p:sldLayout xmlns:a="http://schemas.openxmlformats.org/drawingml/2006/main" xmlns:r="http://schemas.openxmlformats.org/officeDocument/2006/relationships" xmlns:p="http://schemas.openxmlformats.org/presentationml/2006/main" showMasterSp="0" preserve="1" userDrawn="1">
+  <p:cSld name="Title, Content 3">
+    <p:spTree>
+      <p:nvGrpSpPr>
+        <p:cNvPr id="1" name=""/>
+        <p:cNvGrpSpPr/>
+        <p:nvPr/>
+      </p:nvGrpSpPr>
+      <p:grpSpPr>
+        <a:xfrm>
+          <a:off x="0" y="0"/>
+          <a:ext cx="0" cy="0"/>
+          <a:chOff x="0" y="0"/>
+          <a:chExt cx="0" cy="0"/>
+        </a:xfrm>
+      </p:grpSpPr>
+      <p:grpSp>
+        <p:nvGrpSpPr>
+          <p:cNvPr id="8" name="Group 7"/>
+          <p:cNvGrpSpPr/>
+          <p:nvPr/>
+        </p:nvGrpSpPr>
+        <p:grpSpPr>
+          <a:xfrm>
+            <a:off x="-6214" y="-1"/>
+            <a:ext cx="12214827" cy="6858000"/>
+            <a:chOff x="-6214" y="-1"/>
+            <a:chExt cx="12214827" cy="6858000"/>
+          </a:xfrm>
+        </p:grpSpPr>
+        <p:cxnSp>
+          <p:nvCxnSpPr>
+            <p:cNvPr id="9" name="Straight Connector 8"/>
+            <p:cNvCxnSpPr/>
+            <p:nvPr/>
+          </p:nvCxnSpPr>
+          <p:spPr>
+            <a:xfrm>
+              <a:off x="-6214" y="6686283"/>
+              <a:ext cx="12192000" cy="0"/>
+            </a:xfrm>
+            <a:prstGeom prst="line">
+              <a:avLst/>
+            </a:prstGeom>
+            <a:ln w="12700">
+              <a:solidFill>
+                <a:srgbClr val="BCBCBC">
+                  <a:alpha val="29804"/>
+                </a:srgbClr>
+              </a:solidFill>
+              <a:prstDash val="sysDot"/>
+            </a:ln>
+          </p:spPr>
+          <p:style>
+            <a:lnRef idx="1">
+              <a:schemeClr val="accent1"/>
+            </a:lnRef>
+            <a:fillRef idx="0">
+              <a:schemeClr val="accent1"/>
+            </a:fillRef>
+            <a:effectRef idx="0">
+              <a:schemeClr val="accent1"/>
+            </a:effectRef>
+            <a:fontRef idx="minor">
+              <a:schemeClr val="tx1"/>
+            </a:fontRef>
+          </p:style>
+        </p:cxnSp>
+        <p:cxnSp>
+          <p:nvCxnSpPr>
+            <p:cNvPr id="10" name="Straight Connector 9"/>
+            <p:cNvCxnSpPr/>
+            <p:nvPr/>
+          </p:nvCxnSpPr>
+          <p:spPr>
+            <a:xfrm>
+              <a:off x="0" y="-1"/>
+              <a:ext cx="0" cy="6858000"/>
+            </a:xfrm>
+            <a:prstGeom prst="line">
+              <a:avLst/>
+            </a:prstGeom>
+            <a:ln w="12700">
+              <a:solidFill>
+                <a:srgbClr val="BCBCBC">
+                  <a:alpha val="29804"/>
+                </a:srgbClr>
+              </a:solidFill>
+              <a:prstDash val="sysDot"/>
+            </a:ln>
+          </p:spPr>
+          <p:style>
+            <a:lnRef idx="1">
+              <a:schemeClr val="accent1"/>
+            </a:lnRef>
+            <a:fillRef idx="0">
+              <a:schemeClr val="accent1"/>
+            </a:fillRef>
+            <a:effectRef idx="0">
+              <a:schemeClr val="accent1"/>
+            </a:effectRef>
+            <a:fontRef idx="minor">
+              <a:schemeClr val="tx1"/>
+            </a:fontRef>
+          </p:style>
+        </p:cxnSp>
+        <p:cxnSp>
+          <p:nvCxnSpPr>
+            <p:cNvPr id="11" name="Straight Connector 10"/>
+            <p:cNvCxnSpPr/>
+            <p:nvPr/>
+          </p:nvCxnSpPr>
+          <p:spPr>
+            <a:xfrm>
+              <a:off x="11993258" y="-1"/>
+              <a:ext cx="0" cy="6858000"/>
+            </a:xfrm>
+            <a:prstGeom prst="line">
+              <a:avLst/>
+            </a:prstGeom>
+            <a:ln w="12700">
+              <a:solidFill>
+                <a:srgbClr val="BCBCBC">
+                  <a:alpha val="29804"/>
+                </a:srgbClr>
+              </a:solidFill>
+              <a:prstDash val="sysDot"/>
+            </a:ln>
+          </p:spPr>
+          <p:style>
+            <a:lnRef idx="1">
+              <a:schemeClr val="accent1"/>
+            </a:lnRef>
+            <a:fillRef idx="0">
+              <a:schemeClr val="accent1"/>
+            </a:fillRef>
+            <a:effectRef idx="0">
+              <a:schemeClr val="accent1"/>
+            </a:effectRef>
+            <a:fontRef idx="minor">
+              <a:schemeClr val="tx1"/>
+            </a:fontRef>
+          </p:style>
+        </p:cxnSp>
+        <p:cxnSp>
+          <p:nvCxnSpPr>
+            <p:cNvPr id="12" name="Straight Connector 11"/>
+            <p:cNvCxnSpPr/>
+            <p:nvPr/>
+          </p:nvCxnSpPr>
+          <p:spPr>
+            <a:xfrm>
+              <a:off x="192528" y="-1"/>
+              <a:ext cx="0" cy="6858000"/>
+            </a:xfrm>
+            <a:prstGeom prst="line">
+              <a:avLst/>
+            </a:prstGeom>
+            <a:ln w="12700">
+              <a:solidFill>
+                <a:srgbClr val="BCBCBC">
+                  <a:alpha val="29804"/>
+                </a:srgbClr>
+              </a:solidFill>
+              <a:prstDash val="sysDot"/>
+            </a:ln>
+          </p:spPr>
+          <p:style>
+            <a:lnRef idx="1">
+              <a:schemeClr val="accent1"/>
+            </a:lnRef>
+            <a:fillRef idx="0">
+              <a:schemeClr val="accent1"/>
+            </a:fillRef>
+            <a:effectRef idx="0">
+              <a:schemeClr val="accent1"/>
+            </a:effectRef>
+            <a:fontRef idx="minor">
+              <a:schemeClr val="tx1"/>
+            </a:fontRef>
+          </p:style>
+        </p:cxnSp>
+        <p:cxnSp>
+          <p:nvCxnSpPr>
+            <p:cNvPr id="13" name="Straight Connector 12"/>
+            <p:cNvCxnSpPr/>
+            <p:nvPr/>
+          </p:nvCxnSpPr>
+          <p:spPr>
+            <a:xfrm>
+              <a:off x="1175922" y="-1"/>
+              <a:ext cx="0" cy="6858000"/>
+            </a:xfrm>
+            <a:prstGeom prst="line">
+              <a:avLst/>
+            </a:prstGeom>
+            <a:ln w="12700">
+              <a:solidFill>
+                <a:srgbClr val="BCBCBC">
+                  <a:alpha val="29804"/>
+                </a:srgbClr>
+              </a:solidFill>
+              <a:prstDash val="sysDot"/>
+            </a:ln>
+          </p:spPr>
+          <p:style>
+            <a:lnRef idx="1">
+              <a:schemeClr val="accent1"/>
+            </a:lnRef>
+            <a:fillRef idx="0">
+              <a:schemeClr val="accent1"/>
+            </a:fillRef>
+            <a:effectRef idx="0">
+              <a:schemeClr val="accent1"/>
+            </a:effectRef>
+            <a:fontRef idx="minor">
+              <a:schemeClr val="tx1"/>
+            </a:fontRef>
+          </p:style>
+        </p:cxnSp>
+        <p:cxnSp>
+          <p:nvCxnSpPr>
+            <p:cNvPr id="14" name="Straight Connector 13"/>
+            <p:cNvCxnSpPr/>
+            <p:nvPr/>
+          </p:nvCxnSpPr>
+          <p:spPr>
+            <a:xfrm>
+              <a:off x="2159316" y="-1"/>
+              <a:ext cx="0" cy="6858000"/>
+            </a:xfrm>
+            <a:prstGeom prst="line">
+              <a:avLst/>
+            </a:prstGeom>
+            <a:ln w="12700">
+              <a:solidFill>
+                <a:srgbClr val="BCBCBC">
+                  <a:alpha val="29804"/>
+                </a:srgbClr>
+              </a:solidFill>
+              <a:prstDash val="sysDot"/>
+            </a:ln>
+          </p:spPr>
+          <p:style>
+            <a:lnRef idx="1">
+              <a:schemeClr val="accent1"/>
+            </a:lnRef>
+            <a:fillRef idx="0">
+              <a:schemeClr val="accent1"/>
+            </a:fillRef>
+            <a:effectRef idx="0">
+              <a:schemeClr val="accent1"/>
+            </a:effectRef>
+            <a:fontRef idx="minor">
+              <a:schemeClr val="tx1"/>
+            </a:fontRef>
+          </p:style>
+        </p:cxnSp>
+        <p:cxnSp>
+          <p:nvCxnSpPr>
+            <p:cNvPr id="15" name="Straight Connector 14"/>
+            <p:cNvCxnSpPr/>
+            <p:nvPr/>
+          </p:nvCxnSpPr>
+          <p:spPr>
+            <a:xfrm>
+              <a:off x="3142710" y="-1"/>
+              <a:ext cx="0" cy="6858000"/>
+            </a:xfrm>
+            <a:prstGeom prst="line">
+              <a:avLst/>
+            </a:prstGeom>
+            <a:ln w="12700">
+              <a:solidFill>
+                <a:srgbClr val="BCBCBC">
+                  <a:alpha val="29804"/>
+                </a:srgbClr>
+              </a:solidFill>
+              <a:prstDash val="sysDot"/>
+            </a:ln>
+          </p:spPr>
+          <p:style>
+            <a:lnRef idx="1">
+              <a:schemeClr val="accent1"/>
+            </a:lnRef>
+            <a:fillRef idx="0">
+              <a:schemeClr val="accent1"/>
+            </a:fillRef>
+            <a:effectRef idx="0">
+              <a:schemeClr val="accent1"/>
+            </a:effectRef>
+            <a:fontRef idx="minor">
+              <a:schemeClr val="tx1"/>
+            </a:fontRef>
+          </p:style>
+        </p:cxnSp>
+        <p:cxnSp>
+          <p:nvCxnSpPr>
+            <p:cNvPr id="16" name="Straight Connector 15"/>
+            <p:cNvCxnSpPr/>
+            <p:nvPr/>
+          </p:nvCxnSpPr>
+          <p:spPr>
+            <a:xfrm>
+              <a:off x="4126104" y="-1"/>
+              <a:ext cx="0" cy="6858000"/>
+            </a:xfrm>
+            <a:prstGeom prst="line">
+              <a:avLst/>
+            </a:prstGeom>
+            <a:ln w="12700">
+              <a:solidFill>
+                <a:srgbClr val="BCBCBC">
+                  <a:alpha val="29804"/>
+                </a:srgbClr>
+              </a:solidFill>
+              <a:prstDash val="sysDot"/>
+            </a:ln>
+          </p:spPr>
+          <p:style>
+            <a:lnRef idx="1">
+              <a:schemeClr val="accent1"/>
+            </a:lnRef>
+            <a:fillRef idx="0">
+              <a:schemeClr val="accent1"/>
+            </a:fillRef>
+            <a:effectRef idx="0">
+              <a:schemeClr val="accent1"/>
+            </a:effectRef>
+            <a:fontRef idx="minor">
+              <a:schemeClr val="tx1"/>
+            </a:fontRef>
+          </p:style>
+        </p:cxnSp>
+        <p:cxnSp>
+          <p:nvCxnSpPr>
+            <p:cNvPr id="17" name="Straight Connector 16"/>
+            <p:cNvCxnSpPr/>
+            <p:nvPr/>
+          </p:nvCxnSpPr>
+          <p:spPr>
+            <a:xfrm>
+              <a:off x="5109498" y="-1"/>
+              <a:ext cx="0" cy="6858000"/>
+            </a:xfrm>
+            <a:prstGeom prst="line">
+              <a:avLst/>
+            </a:prstGeom>
+            <a:ln w="12700">
+              <a:solidFill>
+                <a:srgbClr val="BCBCBC">
+                  <a:alpha val="29804"/>
+                </a:srgbClr>
+              </a:solidFill>
+              <a:prstDash val="sysDot"/>
+            </a:ln>
+          </p:spPr>
+          <p:style>
+            <a:lnRef idx="1">
+              <a:schemeClr val="accent1"/>
+            </a:lnRef>
+            <a:fillRef idx="0">
+              <a:schemeClr val="accent1"/>
+            </a:fillRef>
+            <a:effectRef idx="0">
+              <a:schemeClr val="accent1"/>
+            </a:effectRef>
+            <a:fontRef idx="minor">
+              <a:schemeClr val="tx1"/>
+            </a:fontRef>
+          </p:style>
+        </p:cxnSp>
+        <p:cxnSp>
+          <p:nvCxnSpPr>
+            <p:cNvPr id="18" name="Straight Connector 17"/>
+            <p:cNvCxnSpPr/>
+            <p:nvPr/>
+          </p:nvCxnSpPr>
+          <p:spPr>
+            <a:xfrm>
+              <a:off x="6092892" y="-1"/>
+              <a:ext cx="0" cy="6858000"/>
+            </a:xfrm>
+            <a:prstGeom prst="line">
+              <a:avLst/>
+            </a:prstGeom>
+            <a:ln w="12700">
+              <a:solidFill>
+                <a:srgbClr val="BCBCBC">
+                  <a:alpha val="29804"/>
+                </a:srgbClr>
+              </a:solidFill>
+              <a:prstDash val="sysDot"/>
+            </a:ln>
+          </p:spPr>
+          <p:style>
+            <a:lnRef idx="1">
+              <a:schemeClr val="accent1"/>
+            </a:lnRef>
+            <a:fillRef idx="0">
+              <a:schemeClr val="accent1"/>
+            </a:fillRef>
+            <a:effectRef idx="0">
+              <a:schemeClr val="accent1"/>
+            </a:effectRef>
+            <a:fontRef idx="minor">
+              <a:schemeClr val="tx1"/>
+            </a:fontRef>
+          </p:style>
+        </p:cxnSp>
+        <p:cxnSp>
+          <p:nvCxnSpPr>
+            <p:cNvPr id="19" name="Straight Connector 18"/>
+            <p:cNvCxnSpPr/>
+            <p:nvPr/>
+          </p:nvCxnSpPr>
+          <p:spPr>
+            <a:xfrm>
+              <a:off x="7076286" y="-1"/>
+              <a:ext cx="0" cy="6858000"/>
+            </a:xfrm>
+            <a:prstGeom prst="line">
+              <a:avLst/>
+            </a:prstGeom>
+            <a:ln w="12700">
+              <a:solidFill>
+                <a:srgbClr val="BCBCBC">
+                  <a:alpha val="29804"/>
+                </a:srgbClr>
+              </a:solidFill>
+              <a:prstDash val="sysDot"/>
+            </a:ln>
+          </p:spPr>
+          <p:style>
+            <a:lnRef idx="1">
+              <a:schemeClr val="accent1"/>
+            </a:lnRef>
+            <a:fillRef idx="0">
+              <a:schemeClr val="accent1"/>
+            </a:fillRef>
+            <a:effectRef idx="0">
+              <a:schemeClr val="accent1"/>
+            </a:effectRef>
+            <a:fontRef idx="minor">
+              <a:schemeClr val="tx1"/>
+            </a:fontRef>
+          </p:style>
+        </p:cxnSp>
+        <p:cxnSp>
+          <p:nvCxnSpPr>
+            <p:cNvPr id="20" name="Straight Connector 19"/>
+            <p:cNvCxnSpPr/>
+            <p:nvPr/>
+          </p:nvCxnSpPr>
+          <p:spPr>
+            <a:xfrm>
+              <a:off x="8059680" y="-1"/>
+              <a:ext cx="0" cy="6858000"/>
+            </a:xfrm>
+            <a:prstGeom prst="line">
+              <a:avLst/>
+            </a:prstGeom>
+            <a:ln w="12700">
+              <a:solidFill>
+                <a:srgbClr val="BCBCBC">
+                  <a:alpha val="29804"/>
+                </a:srgbClr>
+              </a:solidFill>
+              <a:prstDash val="sysDot"/>
+            </a:ln>
+          </p:spPr>
+          <p:style>
+            <a:lnRef idx="1">
+              <a:schemeClr val="accent1"/>
+            </a:lnRef>
+            <a:fillRef idx="0">
+              <a:schemeClr val="accent1"/>
+            </a:fillRef>
+            <a:effectRef idx="0">
+              <a:schemeClr val="accent1"/>
+            </a:effectRef>
+            <a:fontRef idx="minor">
+              <a:schemeClr val="tx1"/>
+            </a:fontRef>
+          </p:style>
+        </p:cxnSp>
+        <p:cxnSp>
+          <p:nvCxnSpPr>
+            <p:cNvPr id="21" name="Straight Connector 20"/>
+            <p:cNvCxnSpPr/>
+            <p:nvPr/>
+          </p:nvCxnSpPr>
+          <p:spPr>
+            <a:xfrm>
+              <a:off x="9043074" y="-1"/>
+              <a:ext cx="0" cy="6858000"/>
+            </a:xfrm>
+            <a:prstGeom prst="line">
+              <a:avLst/>
+            </a:prstGeom>
+            <a:ln w="12700">
+              <a:solidFill>
+                <a:srgbClr val="BCBCBC">
+                  <a:alpha val="29804"/>
+                </a:srgbClr>
+              </a:solidFill>
+              <a:prstDash val="sysDot"/>
+            </a:ln>
+          </p:spPr>
+          <p:style>
+            <a:lnRef idx="1">
+              <a:schemeClr val="accent1"/>
+            </a:lnRef>
+            <a:fillRef idx="0">
+              <a:schemeClr val="accent1"/>
+            </a:fillRef>
+            <a:effectRef idx="0">
+              <a:schemeClr val="accent1"/>
+            </a:effectRef>
+            <a:fontRef idx="minor">
+              <a:schemeClr val="tx1"/>
+            </a:fontRef>
+          </p:style>
+        </p:cxnSp>
+        <p:cxnSp>
+          <p:nvCxnSpPr>
+            <p:cNvPr id="22" name="Straight Connector 21"/>
+            <p:cNvCxnSpPr/>
+            <p:nvPr/>
+          </p:nvCxnSpPr>
+          <p:spPr>
+            <a:xfrm>
+              <a:off x="10026468" y="-1"/>
+              <a:ext cx="0" cy="6858000"/>
+            </a:xfrm>
+            <a:prstGeom prst="line">
+              <a:avLst/>
+            </a:prstGeom>
+            <a:ln w="12700">
+              <a:solidFill>
+                <a:srgbClr val="BCBCBC">
+                  <a:alpha val="29804"/>
+                </a:srgbClr>
+              </a:solidFill>
+              <a:prstDash val="sysDot"/>
+            </a:ln>
+          </p:spPr>
+          <p:style>
+            <a:lnRef idx="1">
+              <a:schemeClr val="accent1"/>
+            </a:lnRef>
+            <a:fillRef idx="0">
+              <a:schemeClr val="accent1"/>
+            </a:fillRef>
+            <a:effectRef idx="0">
+              <a:schemeClr val="accent1"/>
+            </a:effectRef>
+            <a:fontRef idx="minor">
+              <a:schemeClr val="tx1"/>
+            </a:fontRef>
+          </p:style>
+        </p:cxnSp>
+        <p:cxnSp>
+          <p:nvCxnSpPr>
+            <p:cNvPr id="23" name="Straight Connector 22"/>
+            <p:cNvCxnSpPr/>
+            <p:nvPr/>
+          </p:nvCxnSpPr>
+          <p:spPr>
+            <a:xfrm>
+              <a:off x="11009862" y="-1"/>
+              <a:ext cx="0" cy="6858000"/>
+            </a:xfrm>
+            <a:prstGeom prst="line">
+              <a:avLst/>
+            </a:prstGeom>
+            <a:ln w="12700">
+              <a:solidFill>
+                <a:srgbClr val="BCBCBC">
+                  <a:alpha val="29804"/>
+                </a:srgbClr>
+              </a:solidFill>
+              <a:prstDash val="sysDot"/>
+            </a:ln>
+          </p:spPr>
+          <p:style>
+            <a:lnRef idx="1">
+              <a:schemeClr val="accent1"/>
+            </a:lnRef>
+            <a:fillRef idx="0">
+              <a:schemeClr val="accent1"/>
+            </a:fillRef>
+            <a:effectRef idx="0">
+              <a:schemeClr val="accent1"/>
+            </a:effectRef>
+            <a:fontRef idx="minor">
+              <a:schemeClr val="tx1"/>
+            </a:fontRef>
+          </p:style>
+        </p:cxnSp>
+        <p:cxnSp>
+          <p:nvCxnSpPr>
+            <p:cNvPr id="24" name="Straight Connector 23"/>
+            <p:cNvCxnSpPr/>
+            <p:nvPr/>
+          </p:nvCxnSpPr>
+          <p:spPr>
+            <a:xfrm>
+              <a:off x="12185786" y="-1"/>
+              <a:ext cx="0" cy="6858000"/>
+            </a:xfrm>
+            <a:prstGeom prst="line">
+              <a:avLst/>
+            </a:prstGeom>
+            <a:ln w="12700">
+              <a:solidFill>
+                <a:srgbClr val="BCBCBC">
+                  <a:alpha val="29804"/>
+                </a:srgbClr>
+              </a:solidFill>
+              <a:prstDash val="sysDot"/>
+            </a:ln>
+          </p:spPr>
+          <p:style>
+            <a:lnRef idx="1">
+              <a:schemeClr val="accent1"/>
+            </a:lnRef>
+            <a:fillRef idx="0">
+              <a:schemeClr val="accent1"/>
+            </a:fillRef>
+            <a:effectRef idx="0">
+              <a:schemeClr val="accent1"/>
+            </a:effectRef>
+            <a:fontRef idx="minor">
+              <a:schemeClr val="tx1"/>
+            </a:fontRef>
+          </p:style>
+        </p:cxnSp>
+        <p:cxnSp>
+          <p:nvCxnSpPr>
+            <p:cNvPr id="25" name="Straight Connector 24"/>
+            <p:cNvCxnSpPr/>
+            <p:nvPr/>
+          </p:nvCxnSpPr>
+          <p:spPr>
+            <a:xfrm>
+              <a:off x="0" y="171716"/>
+              <a:ext cx="12192000" cy="0"/>
+            </a:xfrm>
+            <a:prstGeom prst="line">
+              <a:avLst/>
+            </a:prstGeom>
+            <a:ln w="12700">
+              <a:solidFill>
+                <a:srgbClr val="BCBCBC">
+                  <a:alpha val="29804"/>
+                </a:srgbClr>
+              </a:solidFill>
+              <a:prstDash val="sysDot"/>
+            </a:ln>
+          </p:spPr>
+          <p:style>
+            <a:lnRef idx="1">
+              <a:schemeClr val="accent1"/>
+            </a:lnRef>
+            <a:fillRef idx="0">
+              <a:schemeClr val="accent1"/>
+            </a:fillRef>
+            <a:effectRef idx="0">
+              <a:schemeClr val="accent1"/>
+            </a:effectRef>
+            <a:fontRef idx="minor">
+              <a:schemeClr val="tx1"/>
+            </a:fontRef>
+          </p:style>
+        </p:cxnSp>
+        <p:cxnSp>
+          <p:nvCxnSpPr>
+            <p:cNvPr id="26" name="Straight Connector 25"/>
+            <p:cNvCxnSpPr/>
+            <p:nvPr/>
+          </p:nvCxnSpPr>
+          <p:spPr>
+            <a:xfrm>
+              <a:off x="0" y="714597"/>
+              <a:ext cx="12192000" cy="0"/>
+            </a:xfrm>
+            <a:prstGeom prst="line">
+              <a:avLst/>
+            </a:prstGeom>
+            <a:ln w="12700">
+              <a:solidFill>
+                <a:srgbClr val="BCBCBC">
+                  <a:alpha val="29804"/>
+                </a:srgbClr>
+              </a:solidFill>
+              <a:prstDash val="sysDot"/>
+            </a:ln>
+          </p:spPr>
+          <p:style>
+            <a:lnRef idx="1">
+              <a:schemeClr val="accent1"/>
+            </a:lnRef>
+            <a:fillRef idx="0">
+              <a:schemeClr val="accent1"/>
+            </a:fillRef>
+            <a:effectRef idx="0">
+              <a:schemeClr val="accent1"/>
+            </a:effectRef>
+            <a:fontRef idx="minor">
+              <a:schemeClr val="tx1"/>
+            </a:fontRef>
+          </p:style>
+        </p:cxnSp>
+        <p:cxnSp>
+          <p:nvCxnSpPr>
+            <p:cNvPr id="27" name="Straight Connector 26"/>
+            <p:cNvCxnSpPr/>
+            <p:nvPr/>
+          </p:nvCxnSpPr>
+          <p:spPr>
+            <a:xfrm>
+              <a:off x="0" y="1257478"/>
+              <a:ext cx="12192000" cy="0"/>
+            </a:xfrm>
+            <a:prstGeom prst="line">
+              <a:avLst/>
+            </a:prstGeom>
+            <a:ln w="12700">
+              <a:solidFill>
+                <a:srgbClr val="BCBCBC">
+                  <a:alpha val="29804"/>
+                </a:srgbClr>
+              </a:solidFill>
+              <a:prstDash val="sysDot"/>
+            </a:ln>
+          </p:spPr>
+          <p:style>
+            <a:lnRef idx="1">
+              <a:schemeClr val="accent1"/>
+            </a:lnRef>
+            <a:fillRef idx="0">
+              <a:schemeClr val="accent1"/>
+            </a:fillRef>
+            <a:effectRef idx="0">
+              <a:schemeClr val="accent1"/>
+            </a:effectRef>
+            <a:fontRef idx="minor">
+              <a:schemeClr val="tx1"/>
+            </a:fontRef>
+          </p:style>
+        </p:cxnSp>
+        <p:cxnSp>
+          <p:nvCxnSpPr>
+            <p:cNvPr id="28" name="Straight Connector 27"/>
+            <p:cNvCxnSpPr/>
+            <p:nvPr/>
+          </p:nvCxnSpPr>
+          <p:spPr>
+            <a:xfrm>
+              <a:off x="0" y="1800359"/>
+              <a:ext cx="12192000" cy="0"/>
+            </a:xfrm>
+            <a:prstGeom prst="line">
+              <a:avLst/>
+            </a:prstGeom>
+            <a:ln w="12700">
+              <a:solidFill>
+                <a:srgbClr val="BCBCBC">
+                  <a:alpha val="29804"/>
+                </a:srgbClr>
+              </a:solidFill>
+              <a:prstDash val="sysDot"/>
+            </a:ln>
+          </p:spPr>
+          <p:style>
+            <a:lnRef idx="1">
+              <a:schemeClr val="accent1"/>
+            </a:lnRef>
+            <a:fillRef idx="0">
+              <a:schemeClr val="accent1"/>
+            </a:fillRef>
+            <a:effectRef idx="0">
+              <a:schemeClr val="accent1"/>
+            </a:effectRef>
+            <a:fontRef idx="minor">
+              <a:schemeClr val="tx1"/>
+            </a:fontRef>
+          </p:style>
+        </p:cxnSp>
+        <p:cxnSp>
+          <p:nvCxnSpPr>
+            <p:cNvPr id="29" name="Straight Connector 28"/>
+            <p:cNvCxnSpPr/>
+            <p:nvPr/>
+          </p:nvCxnSpPr>
+          <p:spPr>
+            <a:xfrm>
+              <a:off x="0" y="2343240"/>
+              <a:ext cx="12192000" cy="0"/>
+            </a:xfrm>
+            <a:prstGeom prst="line">
+              <a:avLst/>
+            </a:prstGeom>
+            <a:ln w="12700">
+              <a:solidFill>
+                <a:srgbClr val="BCBCBC">
+                  <a:alpha val="29804"/>
+                </a:srgbClr>
+              </a:solidFill>
+              <a:prstDash val="sysDot"/>
+            </a:ln>
+          </p:spPr>
+          <p:style>
+            <a:lnRef idx="1">
+              <a:schemeClr val="accent1"/>
+            </a:lnRef>
+            <a:fillRef idx="0">
+              <a:schemeClr val="accent1"/>
+            </a:fillRef>
+            <a:effectRef idx="0">
+              <a:schemeClr val="accent1"/>
+            </a:effectRef>
+            <a:fontRef idx="minor">
+              <a:schemeClr val="tx1"/>
+            </a:fontRef>
+          </p:style>
+        </p:cxnSp>
+        <p:cxnSp>
+          <p:nvCxnSpPr>
+            <p:cNvPr id="30" name="Straight Connector 29"/>
+            <p:cNvCxnSpPr/>
+            <p:nvPr/>
+          </p:nvCxnSpPr>
+          <p:spPr>
+            <a:xfrm>
+              <a:off x="0" y="2886121"/>
+              <a:ext cx="12192000" cy="0"/>
+            </a:xfrm>
+            <a:prstGeom prst="line">
+              <a:avLst/>
+            </a:prstGeom>
+            <a:ln w="12700">
+              <a:solidFill>
+                <a:srgbClr val="BCBCBC">
+                  <a:alpha val="29804"/>
+                </a:srgbClr>
+              </a:solidFill>
+              <a:prstDash val="sysDot"/>
+            </a:ln>
+          </p:spPr>
+          <p:style>
+            <a:lnRef idx="1">
+              <a:schemeClr val="accent1"/>
+            </a:lnRef>
+            <a:fillRef idx="0">
+              <a:schemeClr val="accent1"/>
+            </a:fillRef>
+            <a:effectRef idx="0">
+              <a:schemeClr val="accent1"/>
+            </a:effectRef>
+            <a:fontRef idx="minor">
+              <a:schemeClr val="tx1"/>
+            </a:fontRef>
+          </p:style>
+        </p:cxnSp>
+        <p:cxnSp>
+          <p:nvCxnSpPr>
+            <p:cNvPr id="31" name="Straight Connector 30"/>
+            <p:cNvCxnSpPr/>
+            <p:nvPr/>
+          </p:nvCxnSpPr>
+          <p:spPr>
+            <a:xfrm>
+              <a:off x="0" y="3429002"/>
+              <a:ext cx="12192000" cy="0"/>
+            </a:xfrm>
+            <a:prstGeom prst="line">
+              <a:avLst/>
+            </a:prstGeom>
+            <a:ln w="12700">
+              <a:solidFill>
+                <a:srgbClr val="BCBCBC">
+                  <a:alpha val="29804"/>
+                </a:srgbClr>
+              </a:solidFill>
+              <a:prstDash val="sysDot"/>
+            </a:ln>
+          </p:spPr>
+          <p:style>
+            <a:lnRef idx="1">
+              <a:schemeClr val="accent1"/>
+            </a:lnRef>
+            <a:fillRef idx="0">
+              <a:schemeClr val="accent1"/>
+            </a:fillRef>
+            <a:effectRef idx="0">
+              <a:schemeClr val="accent1"/>
+            </a:effectRef>
+            <a:fontRef idx="minor">
+              <a:schemeClr val="tx1"/>
+            </a:fontRef>
+          </p:style>
+        </p:cxnSp>
+        <p:cxnSp>
+          <p:nvCxnSpPr>
+            <p:cNvPr id="32" name="Straight Connector 31"/>
+            <p:cNvCxnSpPr/>
+            <p:nvPr/>
+          </p:nvCxnSpPr>
+          <p:spPr>
+            <a:xfrm>
+              <a:off x="0" y="3971883"/>
+              <a:ext cx="12192000" cy="0"/>
+            </a:xfrm>
+            <a:prstGeom prst="line">
+              <a:avLst/>
+            </a:prstGeom>
+            <a:ln w="12700">
+              <a:solidFill>
+                <a:srgbClr val="BCBCBC">
+                  <a:alpha val="29804"/>
+                </a:srgbClr>
+              </a:solidFill>
+              <a:prstDash val="sysDot"/>
+            </a:ln>
+          </p:spPr>
+          <p:style>
+            <a:lnRef idx="1">
+              <a:schemeClr val="accent1"/>
+            </a:lnRef>
+            <a:fillRef idx="0">
+              <a:schemeClr val="accent1"/>
+            </a:fillRef>
+            <a:effectRef idx="0">
+              <a:schemeClr val="accent1"/>
+            </a:effectRef>
+            <a:fontRef idx="minor">
+              <a:schemeClr val="tx1"/>
+            </a:fontRef>
+          </p:style>
+        </p:cxnSp>
+        <p:cxnSp>
+          <p:nvCxnSpPr>
+            <p:cNvPr id="33" name="Straight Connector 32"/>
+            <p:cNvCxnSpPr/>
+            <p:nvPr/>
+          </p:nvCxnSpPr>
+          <p:spPr>
+            <a:xfrm>
+              <a:off x="0" y="4514764"/>
+              <a:ext cx="12192000" cy="0"/>
+            </a:xfrm>
+            <a:prstGeom prst="line">
+              <a:avLst/>
+            </a:prstGeom>
+            <a:ln w="12700">
+              <a:solidFill>
+                <a:srgbClr val="BCBCBC">
+                  <a:alpha val="29804"/>
+                </a:srgbClr>
+              </a:solidFill>
+              <a:prstDash val="sysDot"/>
+            </a:ln>
+          </p:spPr>
+          <p:style>
+            <a:lnRef idx="1">
+              <a:schemeClr val="accent1"/>
+            </a:lnRef>
+            <a:fillRef idx="0">
+              <a:schemeClr val="accent1"/>
+            </a:fillRef>
+            <a:effectRef idx="0">
+              <a:schemeClr val="accent1"/>
+            </a:effectRef>
+            <a:fontRef idx="minor">
+              <a:schemeClr val="tx1"/>
+            </a:fontRef>
+          </p:style>
+        </p:cxnSp>
+        <p:cxnSp>
+          <p:nvCxnSpPr>
+            <p:cNvPr id="34" name="Straight Connector 33"/>
+            <p:cNvCxnSpPr/>
+            <p:nvPr/>
+          </p:nvCxnSpPr>
+          <p:spPr>
+            <a:xfrm>
+              <a:off x="0" y="5057645"/>
+              <a:ext cx="12192000" cy="0"/>
+            </a:xfrm>
+            <a:prstGeom prst="line">
+              <a:avLst/>
+            </a:prstGeom>
+            <a:ln w="12700">
+              <a:solidFill>
+                <a:srgbClr val="BCBCBC">
+                  <a:alpha val="29804"/>
+                </a:srgbClr>
+              </a:solidFill>
+              <a:prstDash val="sysDot"/>
+            </a:ln>
+          </p:spPr>
+          <p:style>
+            <a:lnRef idx="1">
+              <a:schemeClr val="accent1"/>
+            </a:lnRef>
+            <a:fillRef idx="0">
+              <a:schemeClr val="accent1"/>
+            </a:fillRef>
+            <a:effectRef idx="0">
+              <a:schemeClr val="accent1"/>
+            </a:effectRef>
+            <a:fontRef idx="minor">
+              <a:schemeClr val="tx1"/>
+            </a:fontRef>
+          </p:style>
+        </p:cxnSp>
+        <p:cxnSp>
+          <p:nvCxnSpPr>
+            <p:cNvPr id="35" name="Straight Connector 34"/>
+            <p:cNvCxnSpPr/>
+            <p:nvPr/>
+          </p:nvCxnSpPr>
+          <p:spPr>
+            <a:xfrm>
+              <a:off x="0" y="5600526"/>
+              <a:ext cx="12192000" cy="0"/>
+            </a:xfrm>
+            <a:prstGeom prst="line">
+              <a:avLst/>
+            </a:prstGeom>
+            <a:ln w="12700">
+              <a:solidFill>
+                <a:srgbClr val="BCBCBC">
+                  <a:alpha val="29804"/>
+                </a:srgbClr>
+              </a:solidFill>
+              <a:prstDash val="sysDot"/>
+            </a:ln>
+          </p:spPr>
+          <p:style>
+            <a:lnRef idx="1">
+              <a:schemeClr val="accent1"/>
+            </a:lnRef>
+            <a:fillRef idx="0">
+              <a:schemeClr val="accent1"/>
+            </a:fillRef>
+            <a:effectRef idx="0">
+              <a:schemeClr val="accent1"/>
+            </a:effectRef>
+            <a:fontRef idx="minor">
+              <a:schemeClr val="tx1"/>
+            </a:fontRef>
+          </p:style>
+        </p:cxnSp>
+        <p:cxnSp>
+          <p:nvCxnSpPr>
+            <p:cNvPr id="36" name="Straight Connector 35"/>
+            <p:cNvCxnSpPr/>
+            <p:nvPr/>
+          </p:nvCxnSpPr>
+          <p:spPr>
+            <a:xfrm>
+              <a:off x="0" y="6857999"/>
+              <a:ext cx="12192000" cy="0"/>
+            </a:xfrm>
+            <a:prstGeom prst="line">
+              <a:avLst/>
+            </a:prstGeom>
+            <a:ln w="12700">
+              <a:solidFill>
+                <a:srgbClr val="BCBCBC">
+                  <a:alpha val="29804"/>
+                </a:srgbClr>
+              </a:solidFill>
+              <a:prstDash val="sysDot"/>
+            </a:ln>
+          </p:spPr>
+          <p:style>
+            <a:lnRef idx="1">
+              <a:schemeClr val="accent1"/>
+            </a:lnRef>
+            <a:fillRef idx="0">
+              <a:schemeClr val="accent1"/>
+            </a:fillRef>
+            <a:effectRef idx="0">
+              <a:schemeClr val="accent1"/>
+            </a:effectRef>
+            <a:fontRef idx="minor">
+              <a:schemeClr val="tx1"/>
+            </a:fontRef>
+          </p:style>
+        </p:cxnSp>
+        <p:cxnSp>
+          <p:nvCxnSpPr>
+            <p:cNvPr id="37" name="Straight Connector 36"/>
+            <p:cNvCxnSpPr/>
+            <p:nvPr/>
+          </p:nvCxnSpPr>
+          <p:spPr>
+            <a:xfrm>
+              <a:off x="16613" y="6143407"/>
+              <a:ext cx="12192000" cy="0"/>
+            </a:xfrm>
+            <a:prstGeom prst="line">
+              <a:avLst/>
+            </a:prstGeom>
+            <a:ln w="12700">
+              <a:solidFill>
+                <a:srgbClr val="BCBCBC">
+                  <a:alpha val="29804"/>
+                </a:srgbClr>
+              </a:solidFill>
+              <a:prstDash val="sysDot"/>
+            </a:ln>
+          </p:spPr>
+          <p:style>
+            <a:lnRef idx="1">
+              <a:schemeClr val="accent1"/>
+            </a:lnRef>
+            <a:fillRef idx="0">
+              <a:schemeClr val="accent1"/>
+            </a:fillRef>
+            <a:effectRef idx="0">
+              <a:schemeClr val="accent1"/>
+            </a:effectRef>
+            <a:fontRef idx="minor">
+              <a:schemeClr val="tx1"/>
+            </a:fontRef>
+          </p:style>
+        </p:cxnSp>
+        <p:cxnSp>
+          <p:nvCxnSpPr>
+            <p:cNvPr id="38" name="Straight Connector 37"/>
+            <p:cNvCxnSpPr/>
+            <p:nvPr/>
+          </p:nvCxnSpPr>
+          <p:spPr>
+            <a:xfrm>
+              <a:off x="684225" y="171716"/>
+              <a:ext cx="0" cy="6511464"/>
+            </a:xfrm>
+            <a:prstGeom prst="line">
+              <a:avLst/>
+            </a:prstGeom>
+            <a:ln w="12700">
+              <a:solidFill>
+                <a:srgbClr val="BCBCBC">
+                  <a:alpha val="29804"/>
+                </a:srgbClr>
+              </a:solidFill>
+              <a:prstDash val="sysDot"/>
+            </a:ln>
+          </p:spPr>
+          <p:style>
+            <a:lnRef idx="1">
+              <a:schemeClr val="accent1"/>
+            </a:lnRef>
+            <a:fillRef idx="0">
+              <a:schemeClr val="accent1"/>
+            </a:fillRef>
+            <a:effectRef idx="0">
+              <a:schemeClr val="accent1"/>
+            </a:effectRef>
+            <a:fontRef idx="minor">
+              <a:schemeClr val="tx1"/>
+            </a:fontRef>
+          </p:style>
+        </p:cxnSp>
+        <p:cxnSp>
+          <p:nvCxnSpPr>
+            <p:cNvPr id="39" name="Straight Connector 38"/>
+            <p:cNvCxnSpPr/>
+            <p:nvPr/>
+          </p:nvCxnSpPr>
+          <p:spPr>
+            <a:xfrm>
+              <a:off x="11508412" y="173267"/>
+              <a:ext cx="0" cy="6511464"/>
+            </a:xfrm>
+            <a:prstGeom prst="line">
+              <a:avLst/>
+            </a:prstGeom>
+            <a:ln w="12700">
+              <a:solidFill>
+                <a:srgbClr val="BCBCBC">
+                  <a:alpha val="29804"/>
+                </a:srgbClr>
+              </a:solidFill>
+              <a:prstDash val="sysDot"/>
+            </a:ln>
+          </p:spPr>
+          <p:style>
+            <a:lnRef idx="1">
+              <a:schemeClr val="accent1"/>
+            </a:lnRef>
+            <a:fillRef idx="0">
+              <a:schemeClr val="accent1"/>
+            </a:fillRef>
+            <a:effectRef idx="0">
+              <a:schemeClr val="accent1"/>
+            </a:effectRef>
+            <a:fontRef idx="minor">
+              <a:schemeClr val="tx1"/>
+            </a:fontRef>
+          </p:style>
+        </p:cxnSp>
+      </p:grpSp>
+      <p:sp>
+        <p:nvSpPr>
+          <p:cNvPr id="40" name="Right Triangle 39"/>
+          <p:cNvSpPr/>
+          <p:nvPr/>
+        </p:nvSpPr>
+        <p:spPr>
+          <a:xfrm rot="2700000">
+            <a:off x="11901644" y="3058996"/>
+            <a:ext cx="568289" cy="568289"/>
+          </a:xfrm>
+          <a:prstGeom prst="rtTriangle">
+            <a:avLst/>
+          </a:prstGeom>
+          <a:solidFill>
+            <a:schemeClr val="accent1">
+              <a:alpha val="50000"/>
+            </a:schemeClr>
+          </a:solidFill>
+          <a:ln>
+            <a:noFill/>
+          </a:ln>
+        </p:spPr>
+        <p:style>
+          <a:lnRef idx="2">
+            <a:schemeClr val="accent1">
+              <a:shade val="50000"/>
+            </a:schemeClr>
+          </a:lnRef>
+          <a:fillRef idx="1">
+            <a:schemeClr val="accent1"/>
+          </a:fillRef>
+          <a:effectRef idx="0">
+            <a:schemeClr val="accent1"/>
+          </a:effectRef>
+          <a:fontRef idx="minor">
+            <a:schemeClr val="lt1"/>
+          </a:fontRef>
+        </p:style>
+        <p:txBody>
+          <a:bodyPr rtlCol="0" anchor="ctr"/>
+          <a:lstStyle/>
+          <a:p>
+            <a:pPr algn="ctr"/>
+            <a:endParaRPr lang="en-US">
+              <a:solidFill>
+                <a:schemeClr val="tx1"/>
+              </a:solidFill>
+            </a:endParaRPr>
+          </a:p>
+        </p:txBody>
+      </p:sp>
+      <p:sp>
+        <p:nvSpPr>
+          <p:cNvPr id="3" name="Content Placeholder 2">
+            <a:extLst>
+              <a:ext uri="{FF2B5EF4-FFF2-40B4-BE49-F238E27FC236}">
+                <a16:creationId xmlns:a16="http://schemas.microsoft.com/office/drawing/2014/main" id="{70605A8E-5AC2-1E56-A14E-729035DC9F88}"/>
+              </a:ext>
+            </a:extLst>
+          </p:cNvPr>
+          <p:cNvSpPr>
+            <a:spLocks noGrp="1"/>
+          </p:cNvSpPr>
+          <p:nvPr>
+            <p:ph idx="1"/>
+          </p:nvPr>
+        </p:nvSpPr>
+        <p:spPr>
+          <a:xfrm>
+            <a:off x="443915" y="708102"/>
+            <a:ext cx="6230523" cy="5430644"/>
+          </a:xfrm>
+        </p:spPr>
+        <p:txBody>
+          <a:bodyPr anchor="ctr">
+            <a:normAutofit/>
+          </a:bodyPr>
+          <a:lstStyle>
+            <a:lvl1pPr>
+              <a:defRPr sz="1800"/>
+            </a:lvl1pPr>
+            <a:lvl2pPr>
+              <a:defRPr sz="1600"/>
+            </a:lvl2pPr>
+            <a:lvl3pPr>
+              <a:defRPr sz="1400"/>
+            </a:lvl3pPr>
+            <a:lvl4pPr>
+              <a:defRPr sz="1200"/>
+            </a:lvl4pPr>
+            <a:lvl5pPr>
+              <a:defRPr sz="1200"/>
+            </a:lvl5pPr>
+            <a:lvl6pPr>
+              <a:defRPr sz="2000"/>
+            </a:lvl6pPr>
+            <a:lvl7pPr>
+              <a:defRPr sz="2000"/>
+            </a:lvl7pPr>
+            <a:lvl8pPr>
+              <a:defRPr sz="2000"/>
+            </a:lvl8pPr>
+            <a:lvl9pPr>
+              <a:defRPr sz="2000"/>
+            </a:lvl9pPr>
+          </a:lstStyle>
+          <a:p>
+            <a:pPr lvl="0"/>
+            <a:r>
+              <a:rPr lang="en-US" dirty="0"/>
+              <a:t>Click to edit Master text styles</a:t>
+            </a:r>
+          </a:p>
+          <a:p>
+            <a:pPr lvl="1"/>
+            <a:r>
+              <a:rPr lang="en-US" dirty="0"/>
+              <a:t>Second level</a:t>
+            </a:r>
+          </a:p>
+          <a:p>
+            <a:pPr lvl="2"/>
+            <a:r>
+              <a:rPr lang="en-US" dirty="0"/>
+              <a:t>Third level</a:t>
+            </a:r>
+          </a:p>
+          <a:p>
+            <a:pPr lvl="3"/>
+            <a:r>
+              <a:rPr lang="en-US" dirty="0"/>
+              <a:t>Fourth level</a:t>
+            </a:r>
+          </a:p>
+          <a:p>
+            <a:pPr lvl="4"/>
+            <a:r>
+              <a:rPr lang="en-US" dirty="0"/>
+              <a:t>Fifth level</a:t>
+            </a:r>
+          </a:p>
+        </p:txBody>
+      </p:sp>
+      <p:sp>
+        <p:nvSpPr>
+          <p:cNvPr id="5" name="Title 1">
+            <a:extLst>
+              <a:ext uri="{FF2B5EF4-FFF2-40B4-BE49-F238E27FC236}">
+                <a16:creationId xmlns:a16="http://schemas.microsoft.com/office/drawing/2014/main" id="{461C309F-1BCE-9817-6664-E26DE5E05A19}"/>
+              </a:ext>
+            </a:extLst>
+          </p:cNvPr>
+          <p:cNvSpPr>
+            <a:spLocks noGrp="1"/>
+          </p:cNvSpPr>
+          <p:nvPr>
+            <p:ph type="title"/>
+          </p:nvPr>
+        </p:nvSpPr>
+        <p:spPr>
+          <a:xfrm>
+            <a:off x="6870732" y="713677"/>
+            <a:ext cx="4499914" cy="2996581"/>
+          </a:xfrm>
+        </p:spPr>
+        <p:txBody>
+          <a:bodyPr anchor="b">
+            <a:normAutofit/>
+          </a:bodyPr>
+          <a:lstStyle>
+            <a:lvl1pPr>
+              <a:defRPr sz="3600"/>
+            </a:lvl1pPr>
+          </a:lstStyle>
+          <a:p>
+            <a:r>
+              <a:rPr lang="en-US" dirty="0"/>
+              <a:t>Click to edit Master title style</a:t>
+            </a:r>
+          </a:p>
+        </p:txBody>
+      </p:sp>
+    </p:spTree>
+    <p:extLst>
+      <p:ext uri="{BB962C8B-B14F-4D97-AF65-F5344CB8AC3E}">
+        <p14:creationId xmlns:p14="http://schemas.microsoft.com/office/powerpoint/2010/main" val="3944018171"/>
+      </p:ext>
+    </p:extLst>
+  </p:cSld>
+  <p:clrMapOvr>
+    <a:masterClrMapping/>
+  </p:clrMapOvr>
+</p:sldLayout>
+</file>
+
+<file path=ppt/slideLayouts/slideLayout7.xml><?xml version="1.0" encoding="utf-8"?>
+<p:sldLayout xmlns:a="http://schemas.openxmlformats.org/drawingml/2006/main" xmlns:r="http://schemas.openxmlformats.org/officeDocument/2006/relationships" xmlns:p="http://schemas.openxmlformats.org/presentationml/2006/main" showMasterSp="0" preserve="1" userDrawn="1">
   <p:cSld name="Title, Content, Picture 1">
     <p:spTree>
       <p:nvGrpSpPr>
@@ -9139,7 +11850,7 @@
 </p:sldLayout>
 </file>
 
-<file path=ppt/slideLayouts/slideLayout7.xml><?xml version="1.0" encoding="utf-8"?>
+<file path=ppt/slideLayouts/slideLayout8.xml><?xml version="1.0" encoding="utf-8"?>
 <p:sldLayout xmlns:a="http://schemas.openxmlformats.org/drawingml/2006/main" xmlns:r="http://schemas.openxmlformats.org/officeDocument/2006/relationships" xmlns:p="http://schemas.openxmlformats.org/presentationml/2006/main" showMasterSp="0" preserve="1" userDrawn="1">
   <p:cSld name="Title, Content, Picture 0">
     <p:spTree>
@@ -10558,7 +13269,7 @@
 </p:sldLayout>
 </file>
 
-<file path=ppt/slideLayouts/slideLayout8.xml><?xml version="1.0" encoding="utf-8"?>
+<file path=ppt/slideLayouts/slideLayout9.xml><?xml version="1.0" encoding="utf-8"?>
 <p:sldLayout xmlns:a="http://schemas.openxmlformats.org/drawingml/2006/main" xmlns:r="http://schemas.openxmlformats.org/officeDocument/2006/relationships" xmlns:p="http://schemas.openxmlformats.org/presentationml/2006/main" showMasterSp="0" preserve="1" userDrawn="1">
   <p:cSld name="Title, Content, Picture 2">
     <p:spTree>
@@ -11920,1311 +14631,6 @@
 </p:sldLayout>
 </file>
 
-<file path=ppt/slideLayouts/slideLayout9.xml><?xml version="1.0" encoding="utf-8"?>
-<p:sldLayout xmlns:a="http://schemas.openxmlformats.org/drawingml/2006/main" xmlns:r="http://schemas.openxmlformats.org/officeDocument/2006/relationships" xmlns:p="http://schemas.openxmlformats.org/presentationml/2006/main" showMasterSp="0" preserve="1" userDrawn="1">
-  <p:cSld name="Title, Picture 0">
-    <p:spTree>
-      <p:nvGrpSpPr>
-        <p:cNvPr id="1" name=""/>
-        <p:cNvGrpSpPr/>
-        <p:nvPr/>
-      </p:nvGrpSpPr>
-      <p:grpSpPr>
-        <a:xfrm>
-          <a:off x="0" y="0"/>
-          <a:ext cx="0" cy="0"/>
-          <a:chOff x="0" y="0"/>
-          <a:chExt cx="0" cy="0"/>
-        </a:xfrm>
-      </p:grpSpPr>
-      <p:grpSp>
-        <p:nvGrpSpPr>
-          <p:cNvPr id="5" name="Group 4"/>
-          <p:cNvGrpSpPr/>
-          <p:nvPr/>
-        </p:nvGrpSpPr>
-        <p:grpSpPr>
-          <a:xfrm>
-            <a:off x="-6214" y="-1"/>
-            <a:ext cx="12214827" cy="6858000"/>
-            <a:chOff x="-6214" y="-1"/>
-            <a:chExt cx="12214827" cy="6858000"/>
-          </a:xfrm>
-        </p:grpSpPr>
-        <p:cxnSp>
-          <p:nvCxnSpPr>
-            <p:cNvPr id="6" name="Straight Connector 5"/>
-            <p:cNvCxnSpPr/>
-            <p:nvPr/>
-          </p:nvCxnSpPr>
-          <p:spPr>
-            <a:xfrm>
-              <a:off x="-6214" y="6686283"/>
-              <a:ext cx="12192000" cy="0"/>
-            </a:xfrm>
-            <a:prstGeom prst="line">
-              <a:avLst/>
-            </a:prstGeom>
-            <a:ln w="12700">
-              <a:solidFill>
-                <a:srgbClr val="BCBCBC">
-                  <a:alpha val="29804"/>
-                </a:srgbClr>
-              </a:solidFill>
-              <a:prstDash val="sysDot"/>
-            </a:ln>
-          </p:spPr>
-          <p:style>
-            <a:lnRef idx="1">
-              <a:schemeClr val="accent1"/>
-            </a:lnRef>
-            <a:fillRef idx="0">
-              <a:schemeClr val="accent1"/>
-            </a:fillRef>
-            <a:effectRef idx="0">
-              <a:schemeClr val="accent1"/>
-            </a:effectRef>
-            <a:fontRef idx="minor">
-              <a:schemeClr val="tx1"/>
-            </a:fontRef>
-          </p:style>
-        </p:cxnSp>
-        <p:cxnSp>
-          <p:nvCxnSpPr>
-            <p:cNvPr id="7" name="Straight Connector 6"/>
-            <p:cNvCxnSpPr/>
-            <p:nvPr/>
-          </p:nvCxnSpPr>
-          <p:spPr>
-            <a:xfrm>
-              <a:off x="0" y="-1"/>
-              <a:ext cx="0" cy="6858000"/>
-            </a:xfrm>
-            <a:prstGeom prst="line">
-              <a:avLst/>
-            </a:prstGeom>
-            <a:ln w="12700">
-              <a:solidFill>
-                <a:srgbClr val="BCBCBC">
-                  <a:alpha val="29804"/>
-                </a:srgbClr>
-              </a:solidFill>
-              <a:prstDash val="sysDot"/>
-            </a:ln>
-          </p:spPr>
-          <p:style>
-            <a:lnRef idx="1">
-              <a:schemeClr val="accent1"/>
-            </a:lnRef>
-            <a:fillRef idx="0">
-              <a:schemeClr val="accent1"/>
-            </a:fillRef>
-            <a:effectRef idx="0">
-              <a:schemeClr val="accent1"/>
-            </a:effectRef>
-            <a:fontRef idx="minor">
-              <a:schemeClr val="tx1"/>
-            </a:fontRef>
-          </p:style>
-        </p:cxnSp>
-        <p:cxnSp>
-          <p:nvCxnSpPr>
-            <p:cNvPr id="8" name="Straight Connector 7"/>
-            <p:cNvCxnSpPr/>
-            <p:nvPr/>
-          </p:nvCxnSpPr>
-          <p:spPr>
-            <a:xfrm>
-              <a:off x="11993258" y="-1"/>
-              <a:ext cx="0" cy="6858000"/>
-            </a:xfrm>
-            <a:prstGeom prst="line">
-              <a:avLst/>
-            </a:prstGeom>
-            <a:ln w="12700">
-              <a:solidFill>
-                <a:srgbClr val="BCBCBC">
-                  <a:alpha val="29804"/>
-                </a:srgbClr>
-              </a:solidFill>
-              <a:prstDash val="sysDot"/>
-            </a:ln>
-          </p:spPr>
-          <p:style>
-            <a:lnRef idx="1">
-              <a:schemeClr val="accent1"/>
-            </a:lnRef>
-            <a:fillRef idx="0">
-              <a:schemeClr val="accent1"/>
-            </a:fillRef>
-            <a:effectRef idx="0">
-              <a:schemeClr val="accent1"/>
-            </a:effectRef>
-            <a:fontRef idx="minor">
-              <a:schemeClr val="tx1"/>
-            </a:fontRef>
-          </p:style>
-        </p:cxnSp>
-        <p:cxnSp>
-          <p:nvCxnSpPr>
-            <p:cNvPr id="9" name="Straight Connector 8"/>
-            <p:cNvCxnSpPr/>
-            <p:nvPr/>
-          </p:nvCxnSpPr>
-          <p:spPr>
-            <a:xfrm>
-              <a:off x="192528" y="-1"/>
-              <a:ext cx="0" cy="6858000"/>
-            </a:xfrm>
-            <a:prstGeom prst="line">
-              <a:avLst/>
-            </a:prstGeom>
-            <a:ln w="12700">
-              <a:solidFill>
-                <a:srgbClr val="BCBCBC">
-                  <a:alpha val="29804"/>
-                </a:srgbClr>
-              </a:solidFill>
-              <a:prstDash val="sysDot"/>
-            </a:ln>
-          </p:spPr>
-          <p:style>
-            <a:lnRef idx="1">
-              <a:schemeClr val="accent1"/>
-            </a:lnRef>
-            <a:fillRef idx="0">
-              <a:schemeClr val="accent1"/>
-            </a:fillRef>
-            <a:effectRef idx="0">
-              <a:schemeClr val="accent1"/>
-            </a:effectRef>
-            <a:fontRef idx="minor">
-              <a:schemeClr val="tx1"/>
-            </a:fontRef>
-          </p:style>
-        </p:cxnSp>
-        <p:cxnSp>
-          <p:nvCxnSpPr>
-            <p:cNvPr id="10" name="Straight Connector 9"/>
-            <p:cNvCxnSpPr/>
-            <p:nvPr/>
-          </p:nvCxnSpPr>
-          <p:spPr>
-            <a:xfrm>
-              <a:off x="1175922" y="-1"/>
-              <a:ext cx="0" cy="6858000"/>
-            </a:xfrm>
-            <a:prstGeom prst="line">
-              <a:avLst/>
-            </a:prstGeom>
-            <a:ln w="12700">
-              <a:solidFill>
-                <a:srgbClr val="BCBCBC">
-                  <a:alpha val="29804"/>
-                </a:srgbClr>
-              </a:solidFill>
-              <a:prstDash val="sysDot"/>
-            </a:ln>
-          </p:spPr>
-          <p:style>
-            <a:lnRef idx="1">
-              <a:schemeClr val="accent1"/>
-            </a:lnRef>
-            <a:fillRef idx="0">
-              <a:schemeClr val="accent1"/>
-            </a:fillRef>
-            <a:effectRef idx="0">
-              <a:schemeClr val="accent1"/>
-            </a:effectRef>
-            <a:fontRef idx="minor">
-              <a:schemeClr val="tx1"/>
-            </a:fontRef>
-          </p:style>
-        </p:cxnSp>
-        <p:cxnSp>
-          <p:nvCxnSpPr>
-            <p:cNvPr id="11" name="Straight Connector 10"/>
-            <p:cNvCxnSpPr/>
-            <p:nvPr/>
-          </p:nvCxnSpPr>
-          <p:spPr>
-            <a:xfrm>
-              <a:off x="2159316" y="-1"/>
-              <a:ext cx="0" cy="6858000"/>
-            </a:xfrm>
-            <a:prstGeom prst="line">
-              <a:avLst/>
-            </a:prstGeom>
-            <a:ln w="12700">
-              <a:solidFill>
-                <a:srgbClr val="BCBCBC">
-                  <a:alpha val="29804"/>
-                </a:srgbClr>
-              </a:solidFill>
-              <a:prstDash val="sysDot"/>
-            </a:ln>
-          </p:spPr>
-          <p:style>
-            <a:lnRef idx="1">
-              <a:schemeClr val="accent1"/>
-            </a:lnRef>
-            <a:fillRef idx="0">
-              <a:schemeClr val="accent1"/>
-            </a:fillRef>
-            <a:effectRef idx="0">
-              <a:schemeClr val="accent1"/>
-            </a:effectRef>
-            <a:fontRef idx="minor">
-              <a:schemeClr val="tx1"/>
-            </a:fontRef>
-          </p:style>
-        </p:cxnSp>
-        <p:cxnSp>
-          <p:nvCxnSpPr>
-            <p:cNvPr id="12" name="Straight Connector 11"/>
-            <p:cNvCxnSpPr/>
-            <p:nvPr/>
-          </p:nvCxnSpPr>
-          <p:spPr>
-            <a:xfrm>
-              <a:off x="3142710" y="-1"/>
-              <a:ext cx="0" cy="6858000"/>
-            </a:xfrm>
-            <a:prstGeom prst="line">
-              <a:avLst/>
-            </a:prstGeom>
-            <a:ln w="12700">
-              <a:solidFill>
-                <a:srgbClr val="BCBCBC">
-                  <a:alpha val="29804"/>
-                </a:srgbClr>
-              </a:solidFill>
-              <a:prstDash val="sysDot"/>
-            </a:ln>
-          </p:spPr>
-          <p:style>
-            <a:lnRef idx="1">
-              <a:schemeClr val="accent1"/>
-            </a:lnRef>
-            <a:fillRef idx="0">
-              <a:schemeClr val="accent1"/>
-            </a:fillRef>
-            <a:effectRef idx="0">
-              <a:schemeClr val="accent1"/>
-            </a:effectRef>
-            <a:fontRef idx="minor">
-              <a:schemeClr val="tx1"/>
-            </a:fontRef>
-          </p:style>
-        </p:cxnSp>
-        <p:cxnSp>
-          <p:nvCxnSpPr>
-            <p:cNvPr id="13" name="Straight Connector 12"/>
-            <p:cNvCxnSpPr/>
-            <p:nvPr/>
-          </p:nvCxnSpPr>
-          <p:spPr>
-            <a:xfrm>
-              <a:off x="4126104" y="-1"/>
-              <a:ext cx="0" cy="6858000"/>
-            </a:xfrm>
-            <a:prstGeom prst="line">
-              <a:avLst/>
-            </a:prstGeom>
-            <a:ln w="12700">
-              <a:solidFill>
-                <a:srgbClr val="BCBCBC">
-                  <a:alpha val="29804"/>
-                </a:srgbClr>
-              </a:solidFill>
-              <a:prstDash val="sysDot"/>
-            </a:ln>
-          </p:spPr>
-          <p:style>
-            <a:lnRef idx="1">
-              <a:schemeClr val="accent1"/>
-            </a:lnRef>
-            <a:fillRef idx="0">
-              <a:schemeClr val="accent1"/>
-            </a:fillRef>
-            <a:effectRef idx="0">
-              <a:schemeClr val="accent1"/>
-            </a:effectRef>
-            <a:fontRef idx="minor">
-              <a:schemeClr val="tx1"/>
-            </a:fontRef>
-          </p:style>
-        </p:cxnSp>
-        <p:cxnSp>
-          <p:nvCxnSpPr>
-            <p:cNvPr id="14" name="Straight Connector 13"/>
-            <p:cNvCxnSpPr/>
-            <p:nvPr/>
-          </p:nvCxnSpPr>
-          <p:spPr>
-            <a:xfrm>
-              <a:off x="5109498" y="-1"/>
-              <a:ext cx="0" cy="6858000"/>
-            </a:xfrm>
-            <a:prstGeom prst="line">
-              <a:avLst/>
-            </a:prstGeom>
-            <a:ln w="12700">
-              <a:solidFill>
-                <a:srgbClr val="BCBCBC">
-                  <a:alpha val="29804"/>
-                </a:srgbClr>
-              </a:solidFill>
-              <a:prstDash val="sysDot"/>
-            </a:ln>
-          </p:spPr>
-          <p:style>
-            <a:lnRef idx="1">
-              <a:schemeClr val="accent1"/>
-            </a:lnRef>
-            <a:fillRef idx="0">
-              <a:schemeClr val="accent1"/>
-            </a:fillRef>
-            <a:effectRef idx="0">
-              <a:schemeClr val="accent1"/>
-            </a:effectRef>
-            <a:fontRef idx="minor">
-              <a:schemeClr val="tx1"/>
-            </a:fontRef>
-          </p:style>
-        </p:cxnSp>
-        <p:cxnSp>
-          <p:nvCxnSpPr>
-            <p:cNvPr id="15" name="Straight Connector 14"/>
-            <p:cNvCxnSpPr/>
-            <p:nvPr/>
-          </p:nvCxnSpPr>
-          <p:spPr>
-            <a:xfrm>
-              <a:off x="6092892" y="-1"/>
-              <a:ext cx="0" cy="6858000"/>
-            </a:xfrm>
-            <a:prstGeom prst="line">
-              <a:avLst/>
-            </a:prstGeom>
-            <a:ln w="12700">
-              <a:solidFill>
-                <a:srgbClr val="BCBCBC">
-                  <a:alpha val="29804"/>
-                </a:srgbClr>
-              </a:solidFill>
-              <a:prstDash val="sysDot"/>
-            </a:ln>
-          </p:spPr>
-          <p:style>
-            <a:lnRef idx="1">
-              <a:schemeClr val="accent1"/>
-            </a:lnRef>
-            <a:fillRef idx="0">
-              <a:schemeClr val="accent1"/>
-            </a:fillRef>
-            <a:effectRef idx="0">
-              <a:schemeClr val="accent1"/>
-            </a:effectRef>
-            <a:fontRef idx="minor">
-              <a:schemeClr val="tx1"/>
-            </a:fontRef>
-          </p:style>
-        </p:cxnSp>
-        <p:cxnSp>
-          <p:nvCxnSpPr>
-            <p:cNvPr id="16" name="Straight Connector 15"/>
-            <p:cNvCxnSpPr/>
-            <p:nvPr/>
-          </p:nvCxnSpPr>
-          <p:spPr>
-            <a:xfrm>
-              <a:off x="7076286" y="-1"/>
-              <a:ext cx="0" cy="6858000"/>
-            </a:xfrm>
-            <a:prstGeom prst="line">
-              <a:avLst/>
-            </a:prstGeom>
-            <a:ln w="12700">
-              <a:solidFill>
-                <a:srgbClr val="BCBCBC">
-                  <a:alpha val="29804"/>
-                </a:srgbClr>
-              </a:solidFill>
-              <a:prstDash val="sysDot"/>
-            </a:ln>
-          </p:spPr>
-          <p:style>
-            <a:lnRef idx="1">
-              <a:schemeClr val="accent1"/>
-            </a:lnRef>
-            <a:fillRef idx="0">
-              <a:schemeClr val="accent1"/>
-            </a:fillRef>
-            <a:effectRef idx="0">
-              <a:schemeClr val="accent1"/>
-            </a:effectRef>
-            <a:fontRef idx="minor">
-              <a:schemeClr val="tx1"/>
-            </a:fontRef>
-          </p:style>
-        </p:cxnSp>
-        <p:cxnSp>
-          <p:nvCxnSpPr>
-            <p:cNvPr id="17" name="Straight Connector 16"/>
-            <p:cNvCxnSpPr/>
-            <p:nvPr/>
-          </p:nvCxnSpPr>
-          <p:spPr>
-            <a:xfrm>
-              <a:off x="8059680" y="-1"/>
-              <a:ext cx="0" cy="6858000"/>
-            </a:xfrm>
-            <a:prstGeom prst="line">
-              <a:avLst/>
-            </a:prstGeom>
-            <a:ln w="12700">
-              <a:solidFill>
-                <a:srgbClr val="BCBCBC">
-                  <a:alpha val="29804"/>
-                </a:srgbClr>
-              </a:solidFill>
-              <a:prstDash val="sysDot"/>
-            </a:ln>
-          </p:spPr>
-          <p:style>
-            <a:lnRef idx="1">
-              <a:schemeClr val="accent1"/>
-            </a:lnRef>
-            <a:fillRef idx="0">
-              <a:schemeClr val="accent1"/>
-            </a:fillRef>
-            <a:effectRef idx="0">
-              <a:schemeClr val="accent1"/>
-            </a:effectRef>
-            <a:fontRef idx="minor">
-              <a:schemeClr val="tx1"/>
-            </a:fontRef>
-          </p:style>
-        </p:cxnSp>
-        <p:cxnSp>
-          <p:nvCxnSpPr>
-            <p:cNvPr id="18" name="Straight Connector 17"/>
-            <p:cNvCxnSpPr/>
-            <p:nvPr/>
-          </p:nvCxnSpPr>
-          <p:spPr>
-            <a:xfrm>
-              <a:off x="9043074" y="-1"/>
-              <a:ext cx="0" cy="6858000"/>
-            </a:xfrm>
-            <a:prstGeom prst="line">
-              <a:avLst/>
-            </a:prstGeom>
-            <a:ln w="12700">
-              <a:solidFill>
-                <a:srgbClr val="BCBCBC">
-                  <a:alpha val="29804"/>
-                </a:srgbClr>
-              </a:solidFill>
-              <a:prstDash val="sysDot"/>
-            </a:ln>
-          </p:spPr>
-          <p:style>
-            <a:lnRef idx="1">
-              <a:schemeClr val="accent1"/>
-            </a:lnRef>
-            <a:fillRef idx="0">
-              <a:schemeClr val="accent1"/>
-            </a:fillRef>
-            <a:effectRef idx="0">
-              <a:schemeClr val="accent1"/>
-            </a:effectRef>
-            <a:fontRef idx="minor">
-              <a:schemeClr val="tx1"/>
-            </a:fontRef>
-          </p:style>
-        </p:cxnSp>
-        <p:cxnSp>
-          <p:nvCxnSpPr>
-            <p:cNvPr id="19" name="Straight Connector 18"/>
-            <p:cNvCxnSpPr/>
-            <p:nvPr/>
-          </p:nvCxnSpPr>
-          <p:spPr>
-            <a:xfrm>
-              <a:off x="10026468" y="-1"/>
-              <a:ext cx="0" cy="6858000"/>
-            </a:xfrm>
-            <a:prstGeom prst="line">
-              <a:avLst/>
-            </a:prstGeom>
-            <a:ln w="12700">
-              <a:solidFill>
-                <a:srgbClr val="BCBCBC">
-                  <a:alpha val="29804"/>
-                </a:srgbClr>
-              </a:solidFill>
-              <a:prstDash val="sysDot"/>
-            </a:ln>
-          </p:spPr>
-          <p:style>
-            <a:lnRef idx="1">
-              <a:schemeClr val="accent1"/>
-            </a:lnRef>
-            <a:fillRef idx="0">
-              <a:schemeClr val="accent1"/>
-            </a:fillRef>
-            <a:effectRef idx="0">
-              <a:schemeClr val="accent1"/>
-            </a:effectRef>
-            <a:fontRef idx="minor">
-              <a:schemeClr val="tx1"/>
-            </a:fontRef>
-          </p:style>
-        </p:cxnSp>
-        <p:cxnSp>
-          <p:nvCxnSpPr>
-            <p:cNvPr id="20" name="Straight Connector 19"/>
-            <p:cNvCxnSpPr/>
-            <p:nvPr/>
-          </p:nvCxnSpPr>
-          <p:spPr>
-            <a:xfrm>
-              <a:off x="11009862" y="-1"/>
-              <a:ext cx="0" cy="6858000"/>
-            </a:xfrm>
-            <a:prstGeom prst="line">
-              <a:avLst/>
-            </a:prstGeom>
-            <a:ln w="12700">
-              <a:solidFill>
-                <a:srgbClr val="BCBCBC">
-                  <a:alpha val="29804"/>
-                </a:srgbClr>
-              </a:solidFill>
-              <a:prstDash val="sysDot"/>
-            </a:ln>
-          </p:spPr>
-          <p:style>
-            <a:lnRef idx="1">
-              <a:schemeClr val="accent1"/>
-            </a:lnRef>
-            <a:fillRef idx="0">
-              <a:schemeClr val="accent1"/>
-            </a:fillRef>
-            <a:effectRef idx="0">
-              <a:schemeClr val="accent1"/>
-            </a:effectRef>
-            <a:fontRef idx="minor">
-              <a:schemeClr val="tx1"/>
-            </a:fontRef>
-          </p:style>
-        </p:cxnSp>
-        <p:cxnSp>
-          <p:nvCxnSpPr>
-            <p:cNvPr id="21" name="Straight Connector 20"/>
-            <p:cNvCxnSpPr/>
-            <p:nvPr/>
-          </p:nvCxnSpPr>
-          <p:spPr>
-            <a:xfrm>
-              <a:off x="12185786" y="-1"/>
-              <a:ext cx="0" cy="6858000"/>
-            </a:xfrm>
-            <a:prstGeom prst="line">
-              <a:avLst/>
-            </a:prstGeom>
-            <a:ln w="12700">
-              <a:solidFill>
-                <a:srgbClr val="BCBCBC">
-                  <a:alpha val="29804"/>
-                </a:srgbClr>
-              </a:solidFill>
-              <a:prstDash val="sysDot"/>
-            </a:ln>
-          </p:spPr>
-          <p:style>
-            <a:lnRef idx="1">
-              <a:schemeClr val="accent1"/>
-            </a:lnRef>
-            <a:fillRef idx="0">
-              <a:schemeClr val="accent1"/>
-            </a:fillRef>
-            <a:effectRef idx="0">
-              <a:schemeClr val="accent1"/>
-            </a:effectRef>
-            <a:fontRef idx="minor">
-              <a:schemeClr val="tx1"/>
-            </a:fontRef>
-          </p:style>
-        </p:cxnSp>
-        <p:cxnSp>
-          <p:nvCxnSpPr>
-            <p:cNvPr id="22" name="Straight Connector 21"/>
-            <p:cNvCxnSpPr/>
-            <p:nvPr/>
-          </p:nvCxnSpPr>
-          <p:spPr>
-            <a:xfrm>
-              <a:off x="0" y="171716"/>
-              <a:ext cx="12192000" cy="0"/>
-            </a:xfrm>
-            <a:prstGeom prst="line">
-              <a:avLst/>
-            </a:prstGeom>
-            <a:ln w="12700">
-              <a:solidFill>
-                <a:srgbClr val="BCBCBC">
-                  <a:alpha val="29804"/>
-                </a:srgbClr>
-              </a:solidFill>
-              <a:prstDash val="sysDot"/>
-            </a:ln>
-          </p:spPr>
-          <p:style>
-            <a:lnRef idx="1">
-              <a:schemeClr val="accent1"/>
-            </a:lnRef>
-            <a:fillRef idx="0">
-              <a:schemeClr val="accent1"/>
-            </a:fillRef>
-            <a:effectRef idx="0">
-              <a:schemeClr val="accent1"/>
-            </a:effectRef>
-            <a:fontRef idx="minor">
-              <a:schemeClr val="tx1"/>
-            </a:fontRef>
-          </p:style>
-        </p:cxnSp>
-        <p:cxnSp>
-          <p:nvCxnSpPr>
-            <p:cNvPr id="23" name="Straight Connector 22"/>
-            <p:cNvCxnSpPr/>
-            <p:nvPr/>
-          </p:nvCxnSpPr>
-          <p:spPr>
-            <a:xfrm>
-              <a:off x="0" y="714597"/>
-              <a:ext cx="12192000" cy="0"/>
-            </a:xfrm>
-            <a:prstGeom prst="line">
-              <a:avLst/>
-            </a:prstGeom>
-            <a:ln w="12700">
-              <a:solidFill>
-                <a:srgbClr val="BCBCBC">
-                  <a:alpha val="29804"/>
-                </a:srgbClr>
-              </a:solidFill>
-              <a:prstDash val="sysDot"/>
-            </a:ln>
-          </p:spPr>
-          <p:style>
-            <a:lnRef idx="1">
-              <a:schemeClr val="accent1"/>
-            </a:lnRef>
-            <a:fillRef idx="0">
-              <a:schemeClr val="accent1"/>
-            </a:fillRef>
-            <a:effectRef idx="0">
-              <a:schemeClr val="accent1"/>
-            </a:effectRef>
-            <a:fontRef idx="minor">
-              <a:schemeClr val="tx1"/>
-            </a:fontRef>
-          </p:style>
-        </p:cxnSp>
-        <p:cxnSp>
-          <p:nvCxnSpPr>
-            <p:cNvPr id="24" name="Straight Connector 23"/>
-            <p:cNvCxnSpPr/>
-            <p:nvPr/>
-          </p:nvCxnSpPr>
-          <p:spPr>
-            <a:xfrm>
-              <a:off x="0" y="1257478"/>
-              <a:ext cx="12192000" cy="0"/>
-            </a:xfrm>
-            <a:prstGeom prst="line">
-              <a:avLst/>
-            </a:prstGeom>
-            <a:ln w="12700">
-              <a:solidFill>
-                <a:srgbClr val="BCBCBC">
-                  <a:alpha val="29804"/>
-                </a:srgbClr>
-              </a:solidFill>
-              <a:prstDash val="sysDot"/>
-            </a:ln>
-          </p:spPr>
-          <p:style>
-            <a:lnRef idx="1">
-              <a:schemeClr val="accent1"/>
-            </a:lnRef>
-            <a:fillRef idx="0">
-              <a:schemeClr val="accent1"/>
-            </a:fillRef>
-            <a:effectRef idx="0">
-              <a:schemeClr val="accent1"/>
-            </a:effectRef>
-            <a:fontRef idx="minor">
-              <a:schemeClr val="tx1"/>
-            </a:fontRef>
-          </p:style>
-        </p:cxnSp>
-        <p:cxnSp>
-          <p:nvCxnSpPr>
-            <p:cNvPr id="25" name="Straight Connector 24"/>
-            <p:cNvCxnSpPr/>
-            <p:nvPr/>
-          </p:nvCxnSpPr>
-          <p:spPr>
-            <a:xfrm>
-              <a:off x="0" y="1800359"/>
-              <a:ext cx="12192000" cy="0"/>
-            </a:xfrm>
-            <a:prstGeom prst="line">
-              <a:avLst/>
-            </a:prstGeom>
-            <a:ln w="12700">
-              <a:solidFill>
-                <a:srgbClr val="BCBCBC">
-                  <a:alpha val="29804"/>
-                </a:srgbClr>
-              </a:solidFill>
-              <a:prstDash val="sysDot"/>
-            </a:ln>
-          </p:spPr>
-          <p:style>
-            <a:lnRef idx="1">
-              <a:schemeClr val="accent1"/>
-            </a:lnRef>
-            <a:fillRef idx="0">
-              <a:schemeClr val="accent1"/>
-            </a:fillRef>
-            <a:effectRef idx="0">
-              <a:schemeClr val="accent1"/>
-            </a:effectRef>
-            <a:fontRef idx="minor">
-              <a:schemeClr val="tx1"/>
-            </a:fontRef>
-          </p:style>
-        </p:cxnSp>
-        <p:cxnSp>
-          <p:nvCxnSpPr>
-            <p:cNvPr id="26" name="Straight Connector 25"/>
-            <p:cNvCxnSpPr/>
-            <p:nvPr/>
-          </p:nvCxnSpPr>
-          <p:spPr>
-            <a:xfrm>
-              <a:off x="0" y="2343240"/>
-              <a:ext cx="12192000" cy="0"/>
-            </a:xfrm>
-            <a:prstGeom prst="line">
-              <a:avLst/>
-            </a:prstGeom>
-            <a:ln w="12700">
-              <a:solidFill>
-                <a:srgbClr val="BCBCBC">
-                  <a:alpha val="29804"/>
-                </a:srgbClr>
-              </a:solidFill>
-              <a:prstDash val="sysDot"/>
-            </a:ln>
-          </p:spPr>
-          <p:style>
-            <a:lnRef idx="1">
-              <a:schemeClr val="accent1"/>
-            </a:lnRef>
-            <a:fillRef idx="0">
-              <a:schemeClr val="accent1"/>
-            </a:fillRef>
-            <a:effectRef idx="0">
-              <a:schemeClr val="accent1"/>
-            </a:effectRef>
-            <a:fontRef idx="minor">
-              <a:schemeClr val="tx1"/>
-            </a:fontRef>
-          </p:style>
-        </p:cxnSp>
-        <p:cxnSp>
-          <p:nvCxnSpPr>
-            <p:cNvPr id="27" name="Straight Connector 26"/>
-            <p:cNvCxnSpPr/>
-            <p:nvPr/>
-          </p:nvCxnSpPr>
-          <p:spPr>
-            <a:xfrm>
-              <a:off x="0" y="2886121"/>
-              <a:ext cx="12192000" cy="0"/>
-            </a:xfrm>
-            <a:prstGeom prst="line">
-              <a:avLst/>
-            </a:prstGeom>
-            <a:ln w="12700">
-              <a:solidFill>
-                <a:srgbClr val="BCBCBC">
-                  <a:alpha val="29804"/>
-                </a:srgbClr>
-              </a:solidFill>
-              <a:prstDash val="sysDot"/>
-            </a:ln>
-          </p:spPr>
-          <p:style>
-            <a:lnRef idx="1">
-              <a:schemeClr val="accent1"/>
-            </a:lnRef>
-            <a:fillRef idx="0">
-              <a:schemeClr val="accent1"/>
-            </a:fillRef>
-            <a:effectRef idx="0">
-              <a:schemeClr val="accent1"/>
-            </a:effectRef>
-            <a:fontRef idx="minor">
-              <a:schemeClr val="tx1"/>
-            </a:fontRef>
-          </p:style>
-        </p:cxnSp>
-        <p:cxnSp>
-          <p:nvCxnSpPr>
-            <p:cNvPr id="28" name="Straight Connector 27"/>
-            <p:cNvCxnSpPr/>
-            <p:nvPr/>
-          </p:nvCxnSpPr>
-          <p:spPr>
-            <a:xfrm>
-              <a:off x="0" y="3429002"/>
-              <a:ext cx="12192000" cy="0"/>
-            </a:xfrm>
-            <a:prstGeom prst="line">
-              <a:avLst/>
-            </a:prstGeom>
-            <a:ln w="12700">
-              <a:solidFill>
-                <a:srgbClr val="BCBCBC">
-                  <a:alpha val="29804"/>
-                </a:srgbClr>
-              </a:solidFill>
-              <a:prstDash val="sysDot"/>
-            </a:ln>
-          </p:spPr>
-          <p:style>
-            <a:lnRef idx="1">
-              <a:schemeClr val="accent1"/>
-            </a:lnRef>
-            <a:fillRef idx="0">
-              <a:schemeClr val="accent1"/>
-            </a:fillRef>
-            <a:effectRef idx="0">
-              <a:schemeClr val="accent1"/>
-            </a:effectRef>
-            <a:fontRef idx="minor">
-              <a:schemeClr val="tx1"/>
-            </a:fontRef>
-          </p:style>
-        </p:cxnSp>
-        <p:cxnSp>
-          <p:nvCxnSpPr>
-            <p:cNvPr id="29" name="Straight Connector 28"/>
-            <p:cNvCxnSpPr/>
-            <p:nvPr/>
-          </p:nvCxnSpPr>
-          <p:spPr>
-            <a:xfrm>
-              <a:off x="0" y="3971883"/>
-              <a:ext cx="12192000" cy="0"/>
-            </a:xfrm>
-            <a:prstGeom prst="line">
-              <a:avLst/>
-            </a:prstGeom>
-            <a:ln w="12700">
-              <a:solidFill>
-                <a:srgbClr val="BCBCBC">
-                  <a:alpha val="29804"/>
-                </a:srgbClr>
-              </a:solidFill>
-              <a:prstDash val="sysDot"/>
-            </a:ln>
-          </p:spPr>
-          <p:style>
-            <a:lnRef idx="1">
-              <a:schemeClr val="accent1"/>
-            </a:lnRef>
-            <a:fillRef idx="0">
-              <a:schemeClr val="accent1"/>
-            </a:fillRef>
-            <a:effectRef idx="0">
-              <a:schemeClr val="accent1"/>
-            </a:effectRef>
-            <a:fontRef idx="minor">
-              <a:schemeClr val="tx1"/>
-            </a:fontRef>
-          </p:style>
-        </p:cxnSp>
-        <p:cxnSp>
-          <p:nvCxnSpPr>
-            <p:cNvPr id="30" name="Straight Connector 29"/>
-            <p:cNvCxnSpPr/>
-            <p:nvPr/>
-          </p:nvCxnSpPr>
-          <p:spPr>
-            <a:xfrm>
-              <a:off x="0" y="4514764"/>
-              <a:ext cx="12192000" cy="0"/>
-            </a:xfrm>
-            <a:prstGeom prst="line">
-              <a:avLst/>
-            </a:prstGeom>
-            <a:ln w="12700">
-              <a:solidFill>
-                <a:srgbClr val="BCBCBC">
-                  <a:alpha val="29804"/>
-                </a:srgbClr>
-              </a:solidFill>
-              <a:prstDash val="sysDot"/>
-            </a:ln>
-          </p:spPr>
-          <p:style>
-            <a:lnRef idx="1">
-              <a:schemeClr val="accent1"/>
-            </a:lnRef>
-            <a:fillRef idx="0">
-              <a:schemeClr val="accent1"/>
-            </a:fillRef>
-            <a:effectRef idx="0">
-              <a:schemeClr val="accent1"/>
-            </a:effectRef>
-            <a:fontRef idx="minor">
-              <a:schemeClr val="tx1"/>
-            </a:fontRef>
-          </p:style>
-        </p:cxnSp>
-        <p:cxnSp>
-          <p:nvCxnSpPr>
-            <p:cNvPr id="31" name="Straight Connector 30"/>
-            <p:cNvCxnSpPr/>
-            <p:nvPr/>
-          </p:nvCxnSpPr>
-          <p:spPr>
-            <a:xfrm>
-              <a:off x="0" y="5057645"/>
-              <a:ext cx="12192000" cy="0"/>
-            </a:xfrm>
-            <a:prstGeom prst="line">
-              <a:avLst/>
-            </a:prstGeom>
-            <a:ln w="12700">
-              <a:solidFill>
-                <a:srgbClr val="BCBCBC">
-                  <a:alpha val="29804"/>
-                </a:srgbClr>
-              </a:solidFill>
-              <a:prstDash val="sysDot"/>
-            </a:ln>
-          </p:spPr>
-          <p:style>
-            <a:lnRef idx="1">
-              <a:schemeClr val="accent1"/>
-            </a:lnRef>
-            <a:fillRef idx="0">
-              <a:schemeClr val="accent1"/>
-            </a:fillRef>
-            <a:effectRef idx="0">
-              <a:schemeClr val="accent1"/>
-            </a:effectRef>
-            <a:fontRef idx="minor">
-              <a:schemeClr val="tx1"/>
-            </a:fontRef>
-          </p:style>
-        </p:cxnSp>
-        <p:cxnSp>
-          <p:nvCxnSpPr>
-            <p:cNvPr id="32" name="Straight Connector 31"/>
-            <p:cNvCxnSpPr/>
-            <p:nvPr/>
-          </p:nvCxnSpPr>
-          <p:spPr>
-            <a:xfrm>
-              <a:off x="0" y="5600526"/>
-              <a:ext cx="12192000" cy="0"/>
-            </a:xfrm>
-            <a:prstGeom prst="line">
-              <a:avLst/>
-            </a:prstGeom>
-            <a:ln w="12700">
-              <a:solidFill>
-                <a:srgbClr val="BCBCBC">
-                  <a:alpha val="29804"/>
-                </a:srgbClr>
-              </a:solidFill>
-              <a:prstDash val="sysDot"/>
-            </a:ln>
-          </p:spPr>
-          <p:style>
-            <a:lnRef idx="1">
-              <a:schemeClr val="accent1"/>
-            </a:lnRef>
-            <a:fillRef idx="0">
-              <a:schemeClr val="accent1"/>
-            </a:fillRef>
-            <a:effectRef idx="0">
-              <a:schemeClr val="accent1"/>
-            </a:effectRef>
-            <a:fontRef idx="minor">
-              <a:schemeClr val="tx1"/>
-            </a:fontRef>
-          </p:style>
-        </p:cxnSp>
-        <p:cxnSp>
-          <p:nvCxnSpPr>
-            <p:cNvPr id="33" name="Straight Connector 32"/>
-            <p:cNvCxnSpPr/>
-            <p:nvPr/>
-          </p:nvCxnSpPr>
-          <p:spPr>
-            <a:xfrm>
-              <a:off x="0" y="6857999"/>
-              <a:ext cx="12192000" cy="0"/>
-            </a:xfrm>
-            <a:prstGeom prst="line">
-              <a:avLst/>
-            </a:prstGeom>
-            <a:ln w="12700">
-              <a:solidFill>
-                <a:srgbClr val="BCBCBC">
-                  <a:alpha val="29804"/>
-                </a:srgbClr>
-              </a:solidFill>
-              <a:prstDash val="sysDot"/>
-            </a:ln>
-          </p:spPr>
-          <p:style>
-            <a:lnRef idx="1">
-              <a:schemeClr val="accent1"/>
-            </a:lnRef>
-            <a:fillRef idx="0">
-              <a:schemeClr val="accent1"/>
-            </a:fillRef>
-            <a:effectRef idx="0">
-              <a:schemeClr val="accent1"/>
-            </a:effectRef>
-            <a:fontRef idx="minor">
-              <a:schemeClr val="tx1"/>
-            </a:fontRef>
-          </p:style>
-        </p:cxnSp>
-        <p:cxnSp>
-          <p:nvCxnSpPr>
-            <p:cNvPr id="34" name="Straight Connector 33"/>
-            <p:cNvCxnSpPr/>
-            <p:nvPr/>
-          </p:nvCxnSpPr>
-          <p:spPr>
-            <a:xfrm>
-              <a:off x="16613" y="6143407"/>
-              <a:ext cx="12192000" cy="0"/>
-            </a:xfrm>
-            <a:prstGeom prst="line">
-              <a:avLst/>
-            </a:prstGeom>
-            <a:ln w="12700">
-              <a:solidFill>
-                <a:srgbClr val="BCBCBC">
-                  <a:alpha val="29804"/>
-                </a:srgbClr>
-              </a:solidFill>
-              <a:prstDash val="sysDot"/>
-            </a:ln>
-          </p:spPr>
-          <p:style>
-            <a:lnRef idx="1">
-              <a:schemeClr val="accent1"/>
-            </a:lnRef>
-            <a:fillRef idx="0">
-              <a:schemeClr val="accent1"/>
-            </a:fillRef>
-            <a:effectRef idx="0">
-              <a:schemeClr val="accent1"/>
-            </a:effectRef>
-            <a:fontRef idx="minor">
-              <a:schemeClr val="tx1"/>
-            </a:fontRef>
-          </p:style>
-        </p:cxnSp>
-        <p:cxnSp>
-          <p:nvCxnSpPr>
-            <p:cNvPr id="35" name="Straight Connector 34"/>
-            <p:cNvCxnSpPr/>
-            <p:nvPr/>
-          </p:nvCxnSpPr>
-          <p:spPr>
-            <a:xfrm>
-              <a:off x="684225" y="171716"/>
-              <a:ext cx="0" cy="6511464"/>
-            </a:xfrm>
-            <a:prstGeom prst="line">
-              <a:avLst/>
-            </a:prstGeom>
-            <a:ln w="12700">
-              <a:solidFill>
-                <a:srgbClr val="BCBCBC">
-                  <a:alpha val="29804"/>
-                </a:srgbClr>
-              </a:solidFill>
-              <a:prstDash val="sysDot"/>
-            </a:ln>
-          </p:spPr>
-          <p:style>
-            <a:lnRef idx="1">
-              <a:schemeClr val="accent1"/>
-            </a:lnRef>
-            <a:fillRef idx="0">
-              <a:schemeClr val="accent1"/>
-            </a:fillRef>
-            <a:effectRef idx="0">
-              <a:schemeClr val="accent1"/>
-            </a:effectRef>
-            <a:fontRef idx="minor">
-              <a:schemeClr val="tx1"/>
-            </a:fontRef>
-          </p:style>
-        </p:cxnSp>
-        <p:cxnSp>
-          <p:nvCxnSpPr>
-            <p:cNvPr id="36" name="Straight Connector 35"/>
-            <p:cNvCxnSpPr/>
-            <p:nvPr/>
-          </p:nvCxnSpPr>
-          <p:spPr>
-            <a:xfrm>
-              <a:off x="11508412" y="173267"/>
-              <a:ext cx="0" cy="6511464"/>
-            </a:xfrm>
-            <a:prstGeom prst="line">
-              <a:avLst/>
-            </a:prstGeom>
-            <a:ln w="12700">
-              <a:solidFill>
-                <a:srgbClr val="BCBCBC">
-                  <a:alpha val="29804"/>
-                </a:srgbClr>
-              </a:solidFill>
-              <a:prstDash val="sysDot"/>
-            </a:ln>
-          </p:spPr>
-          <p:style>
-            <a:lnRef idx="1">
-              <a:schemeClr val="accent1"/>
-            </a:lnRef>
-            <a:fillRef idx="0">
-              <a:schemeClr val="accent1"/>
-            </a:fillRef>
-            <a:effectRef idx="0">
-              <a:schemeClr val="accent1"/>
-            </a:effectRef>
-            <a:fontRef idx="minor">
-              <a:schemeClr val="tx1"/>
-            </a:fontRef>
-          </p:style>
-        </p:cxnSp>
-      </p:grpSp>
-      <p:sp>
-        <p:nvSpPr>
-          <p:cNvPr id="38" name="Picture Placeholder 37">
-            <a:extLst>
-              <a:ext uri="{FF2B5EF4-FFF2-40B4-BE49-F238E27FC236}">
-                <a16:creationId xmlns:a16="http://schemas.microsoft.com/office/drawing/2014/main" id="{BC0FE04E-8B1F-5AAB-0D71-93977D91780A}"/>
-              </a:ext>
-            </a:extLst>
-          </p:cNvPr>
-          <p:cNvSpPr>
-            <a:spLocks noGrp="1"/>
-          </p:cNvSpPr>
-          <p:nvPr>
-            <p:ph type="pic" sz="quarter" idx="10"/>
-          </p:nvPr>
-        </p:nvSpPr>
-        <p:spPr>
-          <a:xfrm>
-            <a:off x="-6215" y="-2"/>
-            <a:ext cx="12169165" cy="6857998"/>
-          </a:xfrm>
-        </p:spPr>
-        <p:txBody>
-          <a:bodyPr/>
-          <a:lstStyle/>
-          <a:p>
-            <a:endParaRPr lang="en-CN"/>
-          </a:p>
-        </p:txBody>
-      </p:sp>
-      <p:sp>
-        <p:nvSpPr>
-          <p:cNvPr id="40" name="Title 1">
-            <a:extLst>
-              <a:ext uri="{FF2B5EF4-FFF2-40B4-BE49-F238E27FC236}">
-                <a16:creationId xmlns:a16="http://schemas.microsoft.com/office/drawing/2014/main" id="{6B2C9348-E48E-5174-E099-8CDD4966B455}"/>
-              </a:ext>
-            </a:extLst>
-          </p:cNvPr>
-          <p:cNvSpPr>
-            <a:spLocks noGrp="1"/>
-          </p:cNvSpPr>
-          <p:nvPr>
-            <p:ph type="title"/>
-          </p:nvPr>
-        </p:nvSpPr>
-        <p:spPr>
-          <a:xfrm>
-            <a:off x="876752" y="725951"/>
-            <a:ext cx="9940581" cy="1893175"/>
-          </a:xfrm>
-        </p:spPr>
-        <p:txBody>
-          <a:bodyPr anchor="ctr">
-            <a:normAutofit/>
-          </a:bodyPr>
-          <a:lstStyle>
-            <a:lvl1pPr algn="ctr">
-              <a:defRPr kumimoji="0" lang="en-US" sz="5200" b="1" i="0" u="none" strike="noStrike" kern="1200" cap="none" spc="0" normalizeH="0" baseline="0" dirty="0">
-                <a:ln>
-                  <a:noFill/>
-                </a:ln>
-                <a:solidFill>
-                  <a:srgbClr val="FFFFFF"/>
-                </a:solidFill>
-                <a:effectLst/>
-                <a:uLnTx/>
-                <a:uFillTx/>
-                <a:latin typeface="Helvetica Neue Medium" panose="02000503000000020004"/>
-                <a:ea typeface="Helvetica Neue Medium" panose="02000503000000020004"/>
-                <a:cs typeface="Helvetica Neue Medium" panose="02000503000000020004"/>
-              </a:defRPr>
-            </a:lvl1pPr>
-          </a:lstStyle>
-          <a:p>
-            <a:r>
-              <a:rPr lang="en-US" dirty="0"/>
-              <a:t>Click to edit Master title style</a:t>
-            </a:r>
-          </a:p>
-        </p:txBody>
-      </p:sp>
-    </p:spTree>
-    <p:extLst>
-      <p:ext uri="{BB962C8B-B14F-4D97-AF65-F5344CB8AC3E}">
-        <p14:creationId xmlns:p14="http://schemas.microsoft.com/office/powerpoint/2010/main" val="376238915"/>
-      </p:ext>
-    </p:extLst>
-  </p:cSld>
-  <p:clrMapOvr>
-    <a:masterClrMapping/>
-  </p:clrMapOvr>
-</p:sldLayout>
-</file>
-
 <file path=ppt/slideMasters/slideMaster1.xml><?xml version="1.0" encoding="utf-8"?>
 <p:sldMaster xmlns:a="http://schemas.openxmlformats.org/drawingml/2006/main" xmlns:r="http://schemas.openxmlformats.org/officeDocument/2006/relationships" xmlns:p="http://schemas.openxmlformats.org/presentationml/2006/main" preserve="1">
   <p:cSld>
@@ -14569,7 +15975,7 @@
           <a:p>
             <a:fld id="{8F72BA41-EC5B-4197-BCC8-0FD2E523CD7A}" type="datetimeFigureOut">
               <a:rPr lang="en-US" smtClean="0"/>
-              <a:t>10/30/24</a:t>
+              <a:t>11/1/24</a:t>
             </a:fld>
             <a:endParaRPr lang="en-US" dirty="0"/>
           </a:p>
@@ -14717,15 +16123,16 @@
     <p:sldLayoutId id="2147483713" r:id="rId1"/>
     <p:sldLayoutId id="2147483723" r:id="rId2"/>
     <p:sldLayoutId id="2147483702" r:id="rId3"/>
-    <p:sldLayoutId id="2147483708" r:id="rId4"/>
+    <p:sldLayoutId id="2147483726" r:id="rId4"/>
     <p:sldLayoutId id="2147483719" r:id="rId5"/>
-    <p:sldLayoutId id="2147483725" r:id="rId6"/>
-    <p:sldLayoutId id="2147483709" r:id="rId7"/>
-    <p:sldLayoutId id="2147483720" r:id="rId8"/>
-    <p:sldLayoutId id="2147483707" r:id="rId9"/>
-    <p:sldLayoutId id="2147483716" r:id="rId10"/>
-    <p:sldLayoutId id="2147483715" r:id="rId11"/>
-    <p:sldLayoutId id="2147483717" r:id="rId12"/>
+    <p:sldLayoutId id="2147483727" r:id="rId6"/>
+    <p:sldLayoutId id="2147483725" r:id="rId7"/>
+    <p:sldLayoutId id="2147483709" r:id="rId8"/>
+    <p:sldLayoutId id="2147483720" r:id="rId9"/>
+    <p:sldLayoutId id="2147483707" r:id="rId10"/>
+    <p:sldLayoutId id="2147483716" r:id="rId11"/>
+    <p:sldLayoutId id="2147483715" r:id="rId12"/>
+    <p:sldLayoutId id="2147483717" r:id="rId13"/>
   </p:sldLayoutIdLst>
   <p:txStyles>
     <p:titleStyle>
@@ -15837,15 +17244,6 @@
 </file>
 
 <file path=customXml/item1.xml><?xml version="1.0" encoding="utf-8"?>
-<?mso-contentType ?>
-<FormTemplates xmlns="http://schemas.microsoft.com/sharepoint/v3/contenttype/forms">
-  <Display>DocumentLibraryForm</Display>
-  <Edit>DocumentLibraryForm</Edit>
-  <New>DocumentLibraryForm</New>
-</FormTemplates>
-</file>
-
-<file path=customXml/item2.xml><?xml version="1.0" encoding="utf-8"?>
 <p:properties xmlns:p="http://schemas.microsoft.com/office/2006/metadata/properties" xmlns:xsi="http://www.w3.org/2001/XMLSchema-instance" xmlns:pc="http://schemas.microsoft.com/office/infopath/2007/PartnerControls">
   <documentManagement>
     <_ip_UnifiedCompliancePolicyUIAction xmlns="http://schemas.microsoft.com/sharepoint/v3" xsi:nil="true"/>
@@ -15863,6 +17261,15 @@
     <MediaServiceKeyPoints xmlns="71af3243-3dd4-4a8d-8c0d-dd76da1f02a5" xsi:nil="true"/>
   </documentManagement>
 </p:properties>
+</file>
+
+<file path=customXml/item2.xml><?xml version="1.0" encoding="utf-8"?>
+<?mso-contentType ?>
+<FormTemplates xmlns="http://schemas.microsoft.com/sharepoint/v3/contenttype/forms">
+  <Display>DocumentLibraryForm</Display>
+  <Edit>DocumentLibraryForm</Edit>
+  <New>DocumentLibraryForm</New>
+</FormTemplates>
 </file>
 
 <file path=customXml/item3.xml><?xml version="1.0" encoding="utf-8"?>
@@ -16178,14 +17585,6 @@
 </file>
 
 <file path=customXml/itemProps1.xml><?xml version="1.0" encoding="utf-8"?>
-<ds:datastoreItem xmlns:ds="http://schemas.openxmlformats.org/officeDocument/2006/customXml" ds:itemID="{A78D9019-7CE1-4B77-8F5D-67F6576598CB}">
-  <ds:schemaRefs>
-    <ds:schemaRef ds:uri="http://schemas.microsoft.com/sharepoint/v3/contenttype/forms"/>
-  </ds:schemaRefs>
-</ds:datastoreItem>
-</file>
-
-<file path=customXml/itemProps2.xml><?xml version="1.0" encoding="utf-8"?>
 <ds:datastoreItem xmlns:ds="http://schemas.openxmlformats.org/officeDocument/2006/customXml" ds:itemID="{E42E6C21-1752-4E06-9FE3-208D45ADB668}">
   <ds:schemaRefs>
     <ds:schemaRef ds:uri="http://schemas.microsoft.com/office/2006/metadata/properties"/>
@@ -16193,6 +17592,14 @@
     <ds:schemaRef ds:uri="http://schemas.microsoft.com/sharepoint/v3"/>
     <ds:schemaRef ds:uri="71af3243-3dd4-4a8d-8c0d-dd76da1f02a5"/>
     <ds:schemaRef ds:uri="230e9df3-be65-4c73-a93b-d1236ebd677e"/>
+  </ds:schemaRefs>
+</ds:datastoreItem>
+</file>
+
+<file path=customXml/itemProps2.xml><?xml version="1.0" encoding="utf-8"?>
+<ds:datastoreItem xmlns:ds="http://schemas.openxmlformats.org/officeDocument/2006/customXml" ds:itemID="{A78D9019-7CE1-4B77-8F5D-67F6576598CB}">
+  <ds:schemaRefs>
+    <ds:schemaRef ds:uri="http://schemas.microsoft.com/sharepoint/v3/contenttype/forms"/>
   </ds:schemaRefs>
 </ds:datastoreItem>
 </file>

</xml_diff>